<commit_message>
Update NanoVer iMD tutorial page
Update flow diagram - made it smaller, rearranged it and corrected a mistake about the flow for a PC-VR setup with a private network. Rearrange
</commit_message>
<xml_diff>
--- a/source/assets/flow-chart.pptx
+++ b/source/assets/flow-chart.pptx
@@ -5,11 +5,12 @@
     <p:sldMasterId id="2147483660" r:id="rId1"/>
   </p:sldMasterIdLst>
   <p:notesMasterIdLst>
-    <p:notesMasterId r:id="rId4"/>
+    <p:notesMasterId r:id="rId5"/>
   </p:notesMasterIdLst>
   <p:sldIdLst>
-    <p:sldId id="262" r:id="rId2"/>
+    <p:sldId id="264" r:id="rId2"/>
     <p:sldId id="263" r:id="rId3"/>
+    <p:sldId id="262" r:id="rId4"/>
   </p:sldIdLst>
   <p:sldSz cx="18000663" cy="18000663"/>
   <p:notesSz cx="6858000" cy="9144000"/>
@@ -116,602 +117,23 @@
 </p:presentation>
 </file>
 
-<file path=ppt/revisionInfo.xml><?xml version="1.0" encoding="utf-8"?>
-<p1510:revInfo xmlns:a="http://schemas.openxmlformats.org/drawingml/2006/main" xmlns:r="http://schemas.openxmlformats.org/officeDocument/2006/relationships" xmlns:p1510="http://schemas.microsoft.com/office/powerpoint/2015/10/main">
-  <p1510:revLst>
-    <p1510:client id="{9539E4F2-C474-48D6-B56C-A71574028F87}" v="97" dt="2024-08-05T14:56:37.064"/>
-  </p1510:revLst>
-</p1510:revInfo>
-</file>
-
 <file path=ppt/changesInfos/changesInfo1.xml><?xml version="1.0" encoding="utf-8"?>
 <pc:chgInfo xmlns:a="http://schemas.openxmlformats.org/drawingml/2006/main" xmlns:r="http://schemas.openxmlformats.org/officeDocument/2006/relationships" xmlns:ac="http://schemas.microsoft.com/office/drawing/2013/main/command" xmlns:pc="http://schemas.microsoft.com/office/powerpoint/2013/main/command">
   <pc:docChgLst>
-    <pc:chgData name="ROEBUCK WILLIAMS RHOSLYN" userId="19c0e951-307b-46f9-a42c-f83c2dbad1d6" providerId="ADAL" clId="{9539E4F2-C474-48D6-B56C-A71574028F87}"/>
-    <pc:docChg chg="undo redo custSel addSld delSld modSld sldOrd">
-      <pc:chgData name="ROEBUCK WILLIAMS RHOSLYN" userId="19c0e951-307b-46f9-a42c-f83c2dbad1d6" providerId="ADAL" clId="{9539E4F2-C474-48D6-B56C-A71574028F87}" dt="2024-08-12T15:13:10.724" v="5223" actId="14100"/>
+    <pc:chgData name="ROEBUCK WILLIAMS RHOSLYN" userId="19c0e951-307b-46f9-a42c-f83c2dbad1d6" providerId="ADAL" clId="{CA170275-7344-438A-A8F7-1467E1F3B891}"/>
+    <pc:docChg chg="modSld sldOrd">
+      <pc:chgData name="ROEBUCK WILLIAMS RHOSLYN" userId="19c0e951-307b-46f9-a42c-f83c2dbad1d6" providerId="ADAL" clId="{CA170275-7344-438A-A8F7-1467E1F3B891}" dt="2024-11-01T08:59:28.872" v="104" actId="14100"/>
       <pc:docMkLst>
         <pc:docMk/>
       </pc:docMkLst>
-      <pc:sldChg chg="del">
-        <pc:chgData name="ROEBUCK WILLIAMS RHOSLYN" userId="19c0e951-307b-46f9-a42c-f83c2dbad1d6" providerId="ADAL" clId="{9539E4F2-C474-48D6-B56C-A71574028F87}" dt="2024-08-05T11:21:39.913" v="3200" actId="47"/>
-        <pc:sldMkLst>
-          <pc:docMk/>
-          <pc:sldMk cId="2896242572" sldId="257"/>
-        </pc:sldMkLst>
-      </pc:sldChg>
-      <pc:sldChg chg="addSp delSp modSp del mod ord">
-        <pc:chgData name="ROEBUCK WILLIAMS RHOSLYN" userId="19c0e951-307b-46f9-a42c-f83c2dbad1d6" providerId="ADAL" clId="{9539E4F2-C474-48D6-B56C-A71574028F87}" dt="2024-08-05T11:21:39.913" v="3200" actId="47"/>
-        <pc:sldMkLst>
-          <pc:docMk/>
-          <pc:sldMk cId="822998820" sldId="258"/>
-        </pc:sldMkLst>
-        <pc:spChg chg="mod">
-          <ac:chgData name="ROEBUCK WILLIAMS RHOSLYN" userId="19c0e951-307b-46f9-a42c-f83c2dbad1d6" providerId="ADAL" clId="{9539E4F2-C474-48D6-B56C-A71574028F87}" dt="2024-08-02T14:23:16.103" v="2439" actId="14100"/>
-          <ac:spMkLst>
-            <pc:docMk/>
-            <pc:sldMk cId="822998820" sldId="258"/>
-            <ac:spMk id="4" creationId="{22887272-8CFA-BF44-CACD-537694360768}"/>
-          </ac:spMkLst>
-        </pc:spChg>
-        <pc:spChg chg="mod">
-          <ac:chgData name="ROEBUCK WILLIAMS RHOSLYN" userId="19c0e951-307b-46f9-a42c-f83c2dbad1d6" providerId="ADAL" clId="{9539E4F2-C474-48D6-B56C-A71574028F87}" dt="2024-08-02T14:15:00.012" v="2364" actId="1076"/>
-          <ac:spMkLst>
-            <pc:docMk/>
-            <pc:sldMk cId="822998820" sldId="258"/>
-            <ac:spMk id="5" creationId="{346FBF56-A7DF-4167-FC34-8C7AAEEE9647}"/>
-          </ac:spMkLst>
-        </pc:spChg>
-        <pc:spChg chg="mod">
-          <ac:chgData name="ROEBUCK WILLIAMS RHOSLYN" userId="19c0e951-307b-46f9-a42c-f83c2dbad1d6" providerId="ADAL" clId="{9539E4F2-C474-48D6-B56C-A71574028F87}" dt="2024-08-02T14:22:27.766" v="2429" actId="20577"/>
-          <ac:spMkLst>
-            <pc:docMk/>
-            <pc:sldMk cId="822998820" sldId="258"/>
-            <ac:spMk id="9" creationId="{1B919D91-FC0C-7368-90E2-67BC1C60183D}"/>
-          </ac:spMkLst>
-        </pc:spChg>
-        <pc:spChg chg="mod">
-          <ac:chgData name="ROEBUCK WILLIAMS RHOSLYN" userId="19c0e951-307b-46f9-a42c-f83c2dbad1d6" providerId="ADAL" clId="{9539E4F2-C474-48D6-B56C-A71574028F87}" dt="2024-08-02T14:15:12.327" v="2366" actId="14100"/>
-          <ac:spMkLst>
-            <pc:docMk/>
-            <pc:sldMk cId="822998820" sldId="258"/>
-            <ac:spMk id="15" creationId="{1EAFDDEE-0E21-A708-736B-D49DE6669369}"/>
-          </ac:spMkLst>
-        </pc:spChg>
-        <pc:spChg chg="mod">
-          <ac:chgData name="ROEBUCK WILLIAMS RHOSLYN" userId="19c0e951-307b-46f9-a42c-f83c2dbad1d6" providerId="ADAL" clId="{9539E4F2-C474-48D6-B56C-A71574028F87}" dt="2024-08-02T14:28:59.310" v="2538" actId="20577"/>
-          <ac:spMkLst>
-            <pc:docMk/>
-            <pc:sldMk cId="822998820" sldId="258"/>
-            <ac:spMk id="19" creationId="{D2A92E3D-448A-A5B8-E6F4-384524ED1057}"/>
-          </ac:spMkLst>
-        </pc:spChg>
-        <pc:spChg chg="mod">
-          <ac:chgData name="ROEBUCK WILLIAMS RHOSLYN" userId="19c0e951-307b-46f9-a42c-f83c2dbad1d6" providerId="ADAL" clId="{9539E4F2-C474-48D6-B56C-A71574028F87}" dt="2024-08-03T08:04:34.910" v="2738" actId="1076"/>
-          <ac:spMkLst>
-            <pc:docMk/>
-            <pc:sldMk cId="822998820" sldId="258"/>
-            <ac:spMk id="24" creationId="{0A510DB6-C573-9104-CAAB-0035485EEB71}"/>
-          </ac:spMkLst>
-        </pc:spChg>
-        <pc:spChg chg="mod">
-          <ac:chgData name="ROEBUCK WILLIAMS RHOSLYN" userId="19c0e951-307b-46f9-a42c-f83c2dbad1d6" providerId="ADAL" clId="{9539E4F2-C474-48D6-B56C-A71574028F87}" dt="2024-08-03T08:04:31.868" v="2737" actId="1076"/>
-          <ac:spMkLst>
-            <pc:docMk/>
-            <pc:sldMk cId="822998820" sldId="258"/>
-            <ac:spMk id="29" creationId="{4D859BB7-BEE1-CF6A-BF53-B561B421A0BD}"/>
-          </ac:spMkLst>
-        </pc:spChg>
-        <pc:spChg chg="del mod">
-          <ac:chgData name="ROEBUCK WILLIAMS RHOSLYN" userId="19c0e951-307b-46f9-a42c-f83c2dbad1d6" providerId="ADAL" clId="{9539E4F2-C474-48D6-B56C-A71574028F87}" dt="2024-08-02T13:55:53.437" v="1994" actId="478"/>
-          <ac:spMkLst>
-            <pc:docMk/>
-            <pc:sldMk cId="822998820" sldId="258"/>
-            <ac:spMk id="30" creationId="{A8BB5F93-AA12-98E0-3D8E-30E3F1C00D0B}"/>
-          </ac:spMkLst>
-        </pc:spChg>
-        <pc:spChg chg="mod">
-          <ac:chgData name="ROEBUCK WILLIAMS RHOSLYN" userId="19c0e951-307b-46f9-a42c-f83c2dbad1d6" providerId="ADAL" clId="{9539E4F2-C474-48D6-B56C-A71574028F87}" dt="2024-08-02T14:22:35.484" v="2433" actId="20577"/>
-          <ac:spMkLst>
-            <pc:docMk/>
-            <pc:sldMk cId="822998820" sldId="258"/>
-            <ac:spMk id="38" creationId="{50AD24AF-4564-D938-2BE1-3F69D5C62F17}"/>
-          </ac:spMkLst>
-        </pc:spChg>
-        <pc:spChg chg="mod">
-          <ac:chgData name="ROEBUCK WILLIAMS RHOSLYN" userId="19c0e951-307b-46f9-a42c-f83c2dbad1d6" providerId="ADAL" clId="{9539E4F2-C474-48D6-B56C-A71574028F87}" dt="2024-08-02T14:23:16.103" v="2439" actId="14100"/>
-          <ac:spMkLst>
-            <pc:docMk/>
-            <pc:sldMk cId="822998820" sldId="258"/>
-            <ac:spMk id="40" creationId="{026E36F0-35D8-4E3A-EE82-977CCCA6EB0F}"/>
-          </ac:spMkLst>
-        </pc:spChg>
-        <pc:spChg chg="mod">
-          <ac:chgData name="ROEBUCK WILLIAMS RHOSLYN" userId="19c0e951-307b-46f9-a42c-f83c2dbad1d6" providerId="ADAL" clId="{9539E4F2-C474-48D6-B56C-A71574028F87}" dt="2024-08-02T14:31:31.682" v="2559" actId="1076"/>
-          <ac:spMkLst>
-            <pc:docMk/>
-            <pc:sldMk cId="822998820" sldId="258"/>
-            <ac:spMk id="42" creationId="{A14A1D4B-5AA1-522A-397C-D1964657C751}"/>
-          </ac:spMkLst>
-        </pc:spChg>
-        <pc:spChg chg="mod">
-          <ac:chgData name="ROEBUCK WILLIAMS RHOSLYN" userId="19c0e951-307b-46f9-a42c-f83c2dbad1d6" providerId="ADAL" clId="{9539E4F2-C474-48D6-B56C-A71574028F87}" dt="2024-08-02T14:23:16.103" v="2439" actId="14100"/>
-          <ac:spMkLst>
-            <pc:docMk/>
-            <pc:sldMk cId="822998820" sldId="258"/>
-            <ac:spMk id="44" creationId="{9A2DFD34-E640-EEAD-3436-DD63DC7A9817}"/>
-          </ac:spMkLst>
-        </pc:spChg>
-        <pc:spChg chg="del mod">
-          <ac:chgData name="ROEBUCK WILLIAMS RHOSLYN" userId="19c0e951-307b-46f9-a42c-f83c2dbad1d6" providerId="ADAL" clId="{9539E4F2-C474-48D6-B56C-A71574028F87}" dt="2024-08-02T14:01:19.925" v="2042" actId="478"/>
-          <ac:spMkLst>
-            <pc:docMk/>
-            <pc:sldMk cId="822998820" sldId="258"/>
-            <ac:spMk id="48" creationId="{B724A3D6-BE52-821F-F0CA-1E032478E6FC}"/>
-          </ac:spMkLst>
-        </pc:spChg>
-        <pc:spChg chg="mod">
-          <ac:chgData name="ROEBUCK WILLIAMS RHOSLYN" userId="19c0e951-307b-46f9-a42c-f83c2dbad1d6" providerId="ADAL" clId="{9539E4F2-C474-48D6-B56C-A71574028F87}" dt="2024-08-02T12:44:53.872" v="359" actId="255"/>
-          <ac:spMkLst>
-            <pc:docMk/>
-            <pc:sldMk cId="822998820" sldId="258"/>
-            <ac:spMk id="52" creationId="{0FC5A7EE-B148-0368-C995-579A86B17CD8}"/>
-          </ac:spMkLst>
-        </pc:spChg>
-        <pc:spChg chg="mod">
-          <ac:chgData name="ROEBUCK WILLIAMS RHOSLYN" userId="19c0e951-307b-46f9-a42c-f83c2dbad1d6" providerId="ADAL" clId="{9539E4F2-C474-48D6-B56C-A71574028F87}" dt="2024-08-02T14:05:11.979" v="2062" actId="1076"/>
-          <ac:spMkLst>
-            <pc:docMk/>
-            <pc:sldMk cId="822998820" sldId="258"/>
-            <ac:spMk id="56" creationId="{9398C94E-A74A-D10C-095D-9AE7266F22CC}"/>
-          </ac:spMkLst>
-        </pc:spChg>
-        <pc:spChg chg="mod">
-          <ac:chgData name="ROEBUCK WILLIAMS RHOSLYN" userId="19c0e951-307b-46f9-a42c-f83c2dbad1d6" providerId="ADAL" clId="{9539E4F2-C474-48D6-B56C-A71574028F87}" dt="2024-08-02T14:26:32.843" v="2517" actId="14100"/>
-          <ac:spMkLst>
-            <pc:docMk/>
-            <pc:sldMk cId="822998820" sldId="258"/>
-            <ac:spMk id="61" creationId="{340C4477-8A90-8A8C-65B7-202314C3ABCC}"/>
-          </ac:spMkLst>
-        </pc:spChg>
-        <pc:spChg chg="mod">
-          <ac:chgData name="ROEBUCK WILLIAMS RHOSLYN" userId="19c0e951-307b-46f9-a42c-f83c2dbad1d6" providerId="ADAL" clId="{9539E4F2-C474-48D6-B56C-A71574028F87}" dt="2024-08-02T14:05:21.669" v="2066" actId="1076"/>
-          <ac:spMkLst>
-            <pc:docMk/>
-            <pc:sldMk cId="822998820" sldId="258"/>
-            <ac:spMk id="64" creationId="{F1DB31A6-A394-9581-35E2-1B45D8C8135E}"/>
-          </ac:spMkLst>
-        </pc:spChg>
-        <pc:spChg chg="add mod">
-          <ac:chgData name="ROEBUCK WILLIAMS RHOSLYN" userId="19c0e951-307b-46f9-a42c-f83c2dbad1d6" providerId="ADAL" clId="{9539E4F2-C474-48D6-B56C-A71574028F87}" dt="2024-08-02T13:06:04.368" v="988" actId="1076"/>
-          <ac:spMkLst>
-            <pc:docMk/>
-            <pc:sldMk cId="822998820" sldId="258"/>
-            <ac:spMk id="271" creationId="{9731557B-6A8D-ECE3-CBF2-FAF304D57E5B}"/>
-          </ac:spMkLst>
-        </pc:spChg>
-        <pc:spChg chg="add mod">
-          <ac:chgData name="ROEBUCK WILLIAMS RHOSLYN" userId="19c0e951-307b-46f9-a42c-f83c2dbad1d6" providerId="ADAL" clId="{9539E4F2-C474-48D6-B56C-A71574028F87}" dt="2024-08-02T13:50:04.403" v="1962" actId="14100"/>
-          <ac:spMkLst>
-            <pc:docMk/>
-            <pc:sldMk cId="822998820" sldId="258"/>
-            <ac:spMk id="275" creationId="{8B8BBD31-1124-0F3F-A559-EBBC9215C49B}"/>
-          </ac:spMkLst>
-        </pc:spChg>
-        <pc:spChg chg="add mod">
-          <ac:chgData name="ROEBUCK WILLIAMS RHOSLYN" userId="19c0e951-307b-46f9-a42c-f83c2dbad1d6" providerId="ADAL" clId="{9539E4F2-C474-48D6-B56C-A71574028F87}" dt="2024-08-02T14:28:12.893" v="2522" actId="20577"/>
-          <ac:spMkLst>
-            <pc:docMk/>
-            <pc:sldMk cId="822998820" sldId="258"/>
-            <ac:spMk id="277" creationId="{3115CC88-6263-38C2-0D3E-003BDACFE043}"/>
-          </ac:spMkLst>
-        </pc:spChg>
-        <pc:spChg chg="add del mod">
-          <ac:chgData name="ROEBUCK WILLIAMS RHOSLYN" userId="19c0e951-307b-46f9-a42c-f83c2dbad1d6" providerId="ADAL" clId="{9539E4F2-C474-48D6-B56C-A71574028F87}" dt="2024-08-02T13:33:28.290" v="1549" actId="478"/>
-          <ac:spMkLst>
-            <pc:docMk/>
-            <pc:sldMk cId="822998820" sldId="258"/>
-            <ac:spMk id="299" creationId="{3DB9A0EF-23AE-F47C-4248-8EDBBEE1CE06}"/>
-          </ac:spMkLst>
-        </pc:spChg>
-        <pc:spChg chg="add del mod">
-          <ac:chgData name="ROEBUCK WILLIAMS RHOSLYN" userId="19c0e951-307b-46f9-a42c-f83c2dbad1d6" providerId="ADAL" clId="{9539E4F2-C474-48D6-B56C-A71574028F87}" dt="2024-08-02T13:50:43.906" v="1966" actId="1076"/>
-          <ac:spMkLst>
-            <pc:docMk/>
-            <pc:sldMk cId="822998820" sldId="258"/>
-            <ac:spMk id="300" creationId="{80207DE3-4325-095A-7ABD-C12AD403D167}"/>
-          </ac:spMkLst>
-        </pc:spChg>
-        <pc:spChg chg="add mod">
-          <ac:chgData name="ROEBUCK WILLIAMS RHOSLYN" userId="19c0e951-307b-46f9-a42c-f83c2dbad1d6" providerId="ADAL" clId="{9539E4F2-C474-48D6-B56C-A71574028F87}" dt="2024-08-02T14:15:28.622" v="2369" actId="14100"/>
-          <ac:spMkLst>
-            <pc:docMk/>
-            <pc:sldMk cId="822998820" sldId="258"/>
-            <ac:spMk id="305" creationId="{E93FBCF3-1541-0A07-BEC4-E6C4601835E9}"/>
-          </ac:spMkLst>
-        </pc:spChg>
-        <pc:spChg chg="add mod">
-          <ac:chgData name="ROEBUCK WILLIAMS RHOSLYN" userId="19c0e951-307b-46f9-a42c-f83c2dbad1d6" providerId="ADAL" clId="{9539E4F2-C474-48D6-B56C-A71574028F87}" dt="2024-08-02T14:29:35.689" v="2547" actId="20577"/>
-          <ac:spMkLst>
-            <pc:docMk/>
-            <pc:sldMk cId="822998820" sldId="258"/>
-            <ac:spMk id="314" creationId="{6FF04236-50E5-8739-1895-3CA914FEB9DF}"/>
-          </ac:spMkLst>
-        </pc:spChg>
-        <pc:spChg chg="add mod">
-          <ac:chgData name="ROEBUCK WILLIAMS RHOSLYN" userId="19c0e951-307b-46f9-a42c-f83c2dbad1d6" providerId="ADAL" clId="{9539E4F2-C474-48D6-B56C-A71574028F87}" dt="2024-08-02T14:24:27.121" v="2449" actId="113"/>
-          <ac:spMkLst>
-            <pc:docMk/>
-            <pc:sldMk cId="822998820" sldId="258"/>
-            <ac:spMk id="324" creationId="{6A00F52B-C080-2BFF-9C5D-566A00C0B6BD}"/>
-          </ac:spMkLst>
-        </pc:spChg>
-        <pc:spChg chg="add mod">
-          <ac:chgData name="ROEBUCK WILLIAMS RHOSLYN" userId="19c0e951-307b-46f9-a42c-f83c2dbad1d6" providerId="ADAL" clId="{9539E4F2-C474-48D6-B56C-A71574028F87}" dt="2024-08-02T14:31:44.425" v="2561" actId="113"/>
-          <ac:spMkLst>
-            <pc:docMk/>
-            <pc:sldMk cId="822998820" sldId="258"/>
-            <ac:spMk id="329" creationId="{CAB42C7C-D886-2F51-799D-9AE8A4A3E3CA}"/>
-          </ac:spMkLst>
-        </pc:spChg>
-        <pc:spChg chg="add mod">
-          <ac:chgData name="ROEBUCK WILLIAMS RHOSLYN" userId="19c0e951-307b-46f9-a42c-f83c2dbad1d6" providerId="ADAL" clId="{9539E4F2-C474-48D6-B56C-A71574028F87}" dt="2024-08-03T08:03:40.444" v="2726" actId="1076"/>
-          <ac:spMkLst>
-            <pc:docMk/>
-            <pc:sldMk cId="822998820" sldId="258"/>
-            <ac:spMk id="334" creationId="{69E8B08F-6DCC-96A9-0430-EFAF16983513}"/>
-          </ac:spMkLst>
-        </pc:spChg>
-        <pc:spChg chg="add mod">
-          <ac:chgData name="ROEBUCK WILLIAMS RHOSLYN" userId="19c0e951-307b-46f9-a42c-f83c2dbad1d6" providerId="ADAL" clId="{9539E4F2-C474-48D6-B56C-A71574028F87}" dt="2024-08-03T08:03:52.177" v="2728" actId="1076"/>
-          <ac:spMkLst>
-            <pc:docMk/>
-            <pc:sldMk cId="822998820" sldId="258"/>
-            <ac:spMk id="338" creationId="{AF7A6573-2EB0-85AC-1396-5C156AEBC5D4}"/>
-          </ac:spMkLst>
-        </pc:spChg>
-        <pc:spChg chg="add mod">
-          <ac:chgData name="ROEBUCK WILLIAMS RHOSLYN" userId="19c0e951-307b-46f9-a42c-f83c2dbad1d6" providerId="ADAL" clId="{9539E4F2-C474-48D6-B56C-A71574028F87}" dt="2024-08-02T13:19:37.790" v="1267" actId="207"/>
-          <ac:spMkLst>
-            <pc:docMk/>
-            <pc:sldMk cId="822998820" sldId="258"/>
-            <ac:spMk id="363" creationId="{33B453C8-38F8-3B27-667B-C8A99434E2AD}"/>
-          </ac:spMkLst>
-        </pc:spChg>
-        <pc:spChg chg="add mod">
-          <ac:chgData name="ROEBUCK WILLIAMS RHOSLYN" userId="19c0e951-307b-46f9-a42c-f83c2dbad1d6" providerId="ADAL" clId="{9539E4F2-C474-48D6-B56C-A71574028F87}" dt="2024-08-02T13:20:39.591" v="1293"/>
-          <ac:spMkLst>
-            <pc:docMk/>
-            <pc:sldMk cId="822998820" sldId="258"/>
-            <ac:spMk id="365" creationId="{519E1AFC-C0F5-BF15-5039-88A485B9CAA5}"/>
-          </ac:spMkLst>
-        </pc:spChg>
-        <pc:spChg chg="add mod">
-          <ac:chgData name="ROEBUCK WILLIAMS RHOSLYN" userId="19c0e951-307b-46f9-a42c-f83c2dbad1d6" providerId="ADAL" clId="{9539E4F2-C474-48D6-B56C-A71574028F87}" dt="2024-08-02T13:33:07.422" v="1544" actId="14100"/>
-          <ac:spMkLst>
-            <pc:docMk/>
-            <pc:sldMk cId="822998820" sldId="258"/>
-            <ac:spMk id="370" creationId="{1E6C3132-5A2F-96A7-98D0-8FCF4269FB45}"/>
-          </ac:spMkLst>
-        </pc:spChg>
-        <pc:spChg chg="add mod">
-          <ac:chgData name="ROEBUCK WILLIAMS RHOSLYN" userId="19c0e951-307b-46f9-a42c-f83c2dbad1d6" providerId="ADAL" clId="{9539E4F2-C474-48D6-B56C-A71574028F87}" dt="2024-08-03T08:04:08.330" v="2730" actId="1076"/>
-          <ac:spMkLst>
-            <pc:docMk/>
-            <pc:sldMk cId="822998820" sldId="258"/>
-            <ac:spMk id="371" creationId="{A79CC35C-7554-7426-B927-FF1CD8F0DFAA}"/>
-          </ac:spMkLst>
-        </pc:spChg>
-        <pc:spChg chg="add mod">
-          <ac:chgData name="ROEBUCK WILLIAMS RHOSLYN" userId="19c0e951-307b-46f9-a42c-f83c2dbad1d6" providerId="ADAL" clId="{9539E4F2-C474-48D6-B56C-A71574028F87}" dt="2024-08-02T14:22:08.852" v="2425" actId="1076"/>
-          <ac:spMkLst>
-            <pc:docMk/>
-            <pc:sldMk cId="822998820" sldId="258"/>
-            <ac:spMk id="385" creationId="{D00C56CC-CD79-D04E-6939-916AD014486C}"/>
-          </ac:spMkLst>
-        </pc:spChg>
-        <pc:spChg chg="add del mod">
-          <ac:chgData name="ROEBUCK WILLIAMS RHOSLYN" userId="19c0e951-307b-46f9-a42c-f83c2dbad1d6" providerId="ADAL" clId="{9539E4F2-C474-48D6-B56C-A71574028F87}" dt="2024-08-02T13:56:31.480" v="2004" actId="478"/>
-          <ac:spMkLst>
-            <pc:docMk/>
-            <pc:sldMk cId="822998820" sldId="258"/>
-            <ac:spMk id="408" creationId="{81552B28-3C5E-0817-DB34-06D8B5C2100C}"/>
-          </ac:spMkLst>
-        </pc:spChg>
-        <pc:spChg chg="add del mod">
-          <ac:chgData name="ROEBUCK WILLIAMS RHOSLYN" userId="19c0e951-307b-46f9-a42c-f83c2dbad1d6" providerId="ADAL" clId="{9539E4F2-C474-48D6-B56C-A71574028F87}" dt="2024-08-02T13:56:58.529" v="2010" actId="478"/>
-          <ac:spMkLst>
-            <pc:docMk/>
-            <pc:sldMk cId="822998820" sldId="258"/>
-            <ac:spMk id="409" creationId="{1416F415-169F-40CA-C993-B4B04C77729C}"/>
-          </ac:spMkLst>
-        </pc:spChg>
-        <pc:spChg chg="add del mod">
-          <ac:chgData name="ROEBUCK WILLIAMS RHOSLYN" userId="19c0e951-307b-46f9-a42c-f83c2dbad1d6" providerId="ADAL" clId="{9539E4F2-C474-48D6-B56C-A71574028F87}" dt="2024-08-02T13:56:50.956" v="2008" actId="478"/>
-          <ac:spMkLst>
-            <pc:docMk/>
-            <pc:sldMk cId="822998820" sldId="258"/>
-            <ac:spMk id="410" creationId="{E354E138-3846-9D61-9110-93E53BEB5A0B}"/>
-          </ac:spMkLst>
-        </pc:spChg>
-        <pc:grpChg chg="add mod">
-          <ac:chgData name="ROEBUCK WILLIAMS RHOSLYN" userId="19c0e951-307b-46f9-a42c-f83c2dbad1d6" providerId="ADAL" clId="{9539E4F2-C474-48D6-B56C-A71574028F87}" dt="2024-08-02T14:02:19.606" v="2046" actId="164"/>
-          <ac:grpSpMkLst>
-            <pc:docMk/>
-            <pc:sldMk cId="822998820" sldId="258"/>
-            <ac:grpSpMk id="454" creationId="{B44AF0C9-5264-F189-84BB-3594A5969415}"/>
-          </ac:grpSpMkLst>
-        </pc:grpChg>
-        <pc:cxnChg chg="mod">
-          <ac:chgData name="ROEBUCK WILLIAMS RHOSLYN" userId="19c0e951-307b-46f9-a42c-f83c2dbad1d6" providerId="ADAL" clId="{9539E4F2-C474-48D6-B56C-A71574028F87}" dt="2024-08-02T14:23:16.103" v="2439" actId="14100"/>
-          <ac:cxnSpMkLst>
-            <pc:docMk/>
-            <pc:sldMk cId="822998820" sldId="258"/>
-            <ac:cxnSpMk id="12" creationId="{926B9899-69C1-DC20-8EAB-50BDC2C23273}"/>
-          </ac:cxnSpMkLst>
-        </pc:cxnChg>
-        <pc:cxnChg chg="mod">
-          <ac:chgData name="ROEBUCK WILLIAMS RHOSLYN" userId="19c0e951-307b-46f9-a42c-f83c2dbad1d6" providerId="ADAL" clId="{9539E4F2-C474-48D6-B56C-A71574028F87}" dt="2024-08-02T14:15:12.327" v="2366" actId="14100"/>
-          <ac:cxnSpMkLst>
-            <pc:docMk/>
-            <pc:sldMk cId="822998820" sldId="258"/>
-            <ac:cxnSpMk id="16" creationId="{235209DE-3AC7-AEA2-ED89-4975A1C0D3D4}"/>
-          </ac:cxnSpMkLst>
-        </pc:cxnChg>
-        <pc:cxnChg chg="mod">
-          <ac:chgData name="ROEBUCK WILLIAMS RHOSLYN" userId="19c0e951-307b-46f9-a42c-f83c2dbad1d6" providerId="ADAL" clId="{9539E4F2-C474-48D6-B56C-A71574028F87}" dt="2024-08-02T14:15:17.055" v="2367" actId="1076"/>
-          <ac:cxnSpMkLst>
-            <pc:docMk/>
-            <pc:sldMk cId="822998820" sldId="258"/>
-            <ac:cxnSpMk id="26" creationId="{B4679F37-C6D4-6A1D-0567-7B9D67A33907}"/>
-          </ac:cxnSpMkLst>
-        </pc:cxnChg>
-        <pc:cxnChg chg="add del mod">
-          <ac:chgData name="ROEBUCK WILLIAMS RHOSLYN" userId="19c0e951-307b-46f9-a42c-f83c2dbad1d6" providerId="ADAL" clId="{9539E4F2-C474-48D6-B56C-A71574028F87}" dt="2024-08-02T12:24:56.096" v="151" actId="478"/>
-          <ac:cxnSpMkLst>
-            <pc:docMk/>
-            <pc:sldMk cId="822998820" sldId="258"/>
-            <ac:cxnSpMk id="39" creationId="{63015399-6201-1FD0-7A89-56340F3B4E03}"/>
-          </ac:cxnSpMkLst>
-        </pc:cxnChg>
-        <pc:cxnChg chg="mod">
-          <ac:chgData name="ROEBUCK WILLIAMS RHOSLYN" userId="19c0e951-307b-46f9-a42c-f83c2dbad1d6" providerId="ADAL" clId="{9539E4F2-C474-48D6-B56C-A71574028F87}" dt="2024-08-02T14:15:00.012" v="2364" actId="1076"/>
-          <ac:cxnSpMkLst>
-            <pc:docMk/>
-            <pc:sldMk cId="822998820" sldId="258"/>
-            <ac:cxnSpMk id="53" creationId="{C54EEBD3-28EB-9784-419E-34A411BC041E}"/>
-          </ac:cxnSpMkLst>
-        </pc:cxnChg>
-        <pc:cxnChg chg="mod">
-          <ac:chgData name="ROEBUCK WILLIAMS RHOSLYN" userId="19c0e951-307b-46f9-a42c-f83c2dbad1d6" providerId="ADAL" clId="{9539E4F2-C474-48D6-B56C-A71574028F87}" dt="2024-08-02T14:26:32.843" v="2517" actId="14100"/>
-          <ac:cxnSpMkLst>
-            <pc:docMk/>
-            <pc:sldMk cId="822998820" sldId="258"/>
-            <ac:cxnSpMk id="57" creationId="{C2C88BF7-142B-C3FC-489F-7EEDAA2ED7A9}"/>
-          </ac:cxnSpMkLst>
-        </pc:cxnChg>
-        <pc:cxnChg chg="add del mod">
-          <ac:chgData name="ROEBUCK WILLIAMS RHOSLYN" userId="19c0e951-307b-46f9-a42c-f83c2dbad1d6" providerId="ADAL" clId="{9539E4F2-C474-48D6-B56C-A71574028F87}" dt="2024-08-02T12:24:35.427" v="144" actId="478"/>
-          <ac:cxnSpMkLst>
-            <pc:docMk/>
-            <pc:sldMk cId="822998820" sldId="258"/>
-            <ac:cxnSpMk id="70" creationId="{16C9D944-125E-E5D2-91F2-77E9E77CB6D5}"/>
-          </ac:cxnSpMkLst>
-        </pc:cxnChg>
-        <pc:cxnChg chg="del mod">
-          <ac:chgData name="ROEBUCK WILLIAMS RHOSLYN" userId="19c0e951-307b-46f9-a42c-f83c2dbad1d6" providerId="ADAL" clId="{9539E4F2-C474-48D6-B56C-A71574028F87}" dt="2024-08-02T12:23:07.922" v="120" actId="478"/>
-          <ac:cxnSpMkLst>
-            <pc:docMk/>
-            <pc:sldMk cId="822998820" sldId="258"/>
-            <ac:cxnSpMk id="76" creationId="{AE591BCC-DECE-F195-49EA-20C6BFB1394D}"/>
-          </ac:cxnSpMkLst>
-        </pc:cxnChg>
-        <pc:cxnChg chg="add del mod">
-          <ac:chgData name="ROEBUCK WILLIAMS RHOSLYN" userId="19c0e951-307b-46f9-a42c-f83c2dbad1d6" providerId="ADAL" clId="{9539E4F2-C474-48D6-B56C-A71574028F87}" dt="2024-08-02T12:31:25.170" v="216" actId="478"/>
-          <ac:cxnSpMkLst>
-            <pc:docMk/>
-            <pc:sldMk cId="822998820" sldId="258"/>
-            <ac:cxnSpMk id="165" creationId="{65F0AE7C-9689-33F2-E5FA-39A986D10A4E}"/>
-          </ac:cxnSpMkLst>
-        </pc:cxnChg>
-        <pc:cxnChg chg="add del mod">
-          <ac:chgData name="ROEBUCK WILLIAMS RHOSLYN" userId="19c0e951-307b-46f9-a42c-f83c2dbad1d6" providerId="ADAL" clId="{9539E4F2-C474-48D6-B56C-A71574028F87}" dt="2024-08-02T12:24:55.344" v="150" actId="478"/>
-          <ac:cxnSpMkLst>
-            <pc:docMk/>
-            <pc:sldMk cId="822998820" sldId="258"/>
-            <ac:cxnSpMk id="201" creationId="{7D55D6B0-7793-1032-94BB-37F29ACFEC93}"/>
-          </ac:cxnSpMkLst>
-        </pc:cxnChg>
-        <pc:cxnChg chg="add del mod">
-          <ac:chgData name="ROEBUCK WILLIAMS RHOSLYN" userId="19c0e951-307b-46f9-a42c-f83c2dbad1d6" providerId="ADAL" clId="{9539E4F2-C474-48D6-B56C-A71574028F87}" dt="2024-08-02T13:17:33.542" v="1262" actId="478"/>
-          <ac:cxnSpMkLst>
-            <pc:docMk/>
-            <pc:sldMk cId="822998820" sldId="258"/>
-            <ac:cxnSpMk id="206" creationId="{EE022208-F676-BF61-DCC9-9C0CFF258276}"/>
-          </ac:cxnSpMkLst>
-        </pc:cxnChg>
-        <pc:cxnChg chg="add del">
-          <ac:chgData name="ROEBUCK WILLIAMS RHOSLYN" userId="19c0e951-307b-46f9-a42c-f83c2dbad1d6" providerId="ADAL" clId="{9539E4F2-C474-48D6-B56C-A71574028F87}" dt="2024-08-02T12:25:53.840" v="164" actId="478"/>
-          <ac:cxnSpMkLst>
-            <pc:docMk/>
-            <pc:sldMk cId="822998820" sldId="258"/>
-            <ac:cxnSpMk id="209" creationId="{C485AABC-44D4-0361-D451-730DF675939D}"/>
-          </ac:cxnSpMkLst>
-        </pc:cxnChg>
-        <pc:cxnChg chg="add del mod">
-          <ac:chgData name="ROEBUCK WILLIAMS RHOSLYN" userId="19c0e951-307b-46f9-a42c-f83c2dbad1d6" providerId="ADAL" clId="{9539E4F2-C474-48D6-B56C-A71574028F87}" dt="2024-08-02T12:28:42.803" v="172" actId="478"/>
-          <ac:cxnSpMkLst>
-            <pc:docMk/>
-            <pc:sldMk cId="822998820" sldId="258"/>
-            <ac:cxnSpMk id="211" creationId="{3F6A9DF7-D5A1-2A7C-98A1-2585107D06F9}"/>
-          </ac:cxnSpMkLst>
-        </pc:cxnChg>
-        <pc:cxnChg chg="add mod">
-          <ac:chgData name="ROEBUCK WILLIAMS RHOSLYN" userId="19c0e951-307b-46f9-a42c-f83c2dbad1d6" providerId="ADAL" clId="{9539E4F2-C474-48D6-B56C-A71574028F87}" dt="2024-08-02T14:23:16.103" v="2439" actId="14100"/>
-          <ac:cxnSpMkLst>
-            <pc:docMk/>
-            <pc:sldMk cId="822998820" sldId="258"/>
-            <ac:cxnSpMk id="214" creationId="{23F45CB1-F915-2592-A1C7-9FD48B78FDD7}"/>
-          </ac:cxnSpMkLst>
-        </pc:cxnChg>
-        <pc:cxnChg chg="add mod">
-          <ac:chgData name="ROEBUCK WILLIAMS RHOSLYN" userId="19c0e951-307b-46f9-a42c-f83c2dbad1d6" providerId="ADAL" clId="{9539E4F2-C474-48D6-B56C-A71574028F87}" dt="2024-08-02T14:21:44.666" v="2423"/>
-          <ac:cxnSpMkLst>
-            <pc:docMk/>
-            <pc:sldMk cId="822998820" sldId="258"/>
-            <ac:cxnSpMk id="242" creationId="{41120B5F-F708-A6F2-F648-80267F4FED55}"/>
-          </ac:cxnSpMkLst>
-        </pc:cxnChg>
-        <pc:cxnChg chg="add del mod">
-          <ac:chgData name="ROEBUCK WILLIAMS RHOSLYN" userId="19c0e951-307b-46f9-a42c-f83c2dbad1d6" providerId="ADAL" clId="{9539E4F2-C474-48D6-B56C-A71574028F87}" dt="2024-08-02T13:56:41.141" v="2007" actId="478"/>
-          <ac:cxnSpMkLst>
-            <pc:docMk/>
-            <pc:sldMk cId="822998820" sldId="258"/>
-            <ac:cxnSpMk id="273" creationId="{9DE6167A-5865-823B-B7D6-6B8D89723816}"/>
-          </ac:cxnSpMkLst>
-        </pc:cxnChg>
-        <pc:cxnChg chg="add del mod">
-          <ac:chgData name="ROEBUCK WILLIAMS RHOSLYN" userId="19c0e951-307b-46f9-a42c-f83c2dbad1d6" providerId="ADAL" clId="{9539E4F2-C474-48D6-B56C-A71574028F87}" dt="2024-08-02T12:54:37.457" v="610" actId="478"/>
-          <ac:cxnSpMkLst>
-            <pc:docMk/>
-            <pc:sldMk cId="822998820" sldId="258"/>
-            <ac:cxnSpMk id="281" creationId="{00C8B45E-E469-5A1D-2A41-1B7AF8BBAB0D}"/>
-          </ac:cxnSpMkLst>
-        </pc:cxnChg>
-        <pc:cxnChg chg="add mod">
-          <ac:chgData name="ROEBUCK WILLIAMS RHOSLYN" userId="19c0e951-307b-46f9-a42c-f83c2dbad1d6" providerId="ADAL" clId="{9539E4F2-C474-48D6-B56C-A71574028F87}" dt="2024-08-02T14:23:16.103" v="2439" actId="14100"/>
-          <ac:cxnSpMkLst>
-            <pc:docMk/>
-            <pc:sldMk cId="822998820" sldId="258"/>
-            <ac:cxnSpMk id="320" creationId="{B010DB81-FF87-6096-9227-5030260B4C51}"/>
-          </ac:cxnSpMkLst>
-        </pc:cxnChg>
-        <pc:cxnChg chg="add mod">
-          <ac:chgData name="ROEBUCK WILLIAMS RHOSLYN" userId="19c0e951-307b-46f9-a42c-f83c2dbad1d6" providerId="ADAL" clId="{9539E4F2-C474-48D6-B56C-A71574028F87}" dt="2024-08-02T14:31:31.682" v="2559" actId="1076"/>
-          <ac:cxnSpMkLst>
-            <pc:docMk/>
-            <pc:sldMk cId="822998820" sldId="258"/>
-            <ac:cxnSpMk id="330" creationId="{893746EB-0D3E-1251-F62D-B34FFC6F5154}"/>
-          </ac:cxnSpMkLst>
-        </pc:cxnChg>
-        <pc:cxnChg chg="add del mod">
-          <ac:chgData name="ROEBUCK WILLIAMS RHOSLYN" userId="19c0e951-307b-46f9-a42c-f83c2dbad1d6" providerId="ADAL" clId="{9539E4F2-C474-48D6-B56C-A71574028F87}" dt="2024-08-02T14:09:01.961" v="2107" actId="478"/>
-          <ac:cxnSpMkLst>
-            <pc:docMk/>
-            <pc:sldMk cId="822998820" sldId="258"/>
-            <ac:cxnSpMk id="335" creationId="{C772C035-D0C2-29A3-6882-8F33E7F56805}"/>
-          </ac:cxnSpMkLst>
-        </pc:cxnChg>
-        <pc:cxnChg chg="add mod">
-          <ac:chgData name="ROEBUCK WILLIAMS RHOSLYN" userId="19c0e951-307b-46f9-a42c-f83c2dbad1d6" providerId="ADAL" clId="{9539E4F2-C474-48D6-B56C-A71574028F87}" dt="2024-08-02T14:30:24.683" v="2552" actId="1076"/>
-          <ac:cxnSpMkLst>
-            <pc:docMk/>
-            <pc:sldMk cId="822998820" sldId="258"/>
-            <ac:cxnSpMk id="352" creationId="{FD7702DC-CEB3-F428-AC58-7631036208F5}"/>
-          </ac:cxnSpMkLst>
-        </pc:cxnChg>
-        <pc:cxnChg chg="add del mod">
-          <ac:chgData name="ROEBUCK WILLIAMS RHOSLYN" userId="19c0e951-307b-46f9-a42c-f83c2dbad1d6" providerId="ADAL" clId="{9539E4F2-C474-48D6-B56C-A71574028F87}" dt="2024-08-02T13:55:56.386" v="1995" actId="478"/>
-          <ac:cxnSpMkLst>
-            <pc:docMk/>
-            <pc:sldMk cId="822998820" sldId="258"/>
-            <ac:cxnSpMk id="359" creationId="{A5EDC472-8E4A-D0CE-D357-4F971605554D}"/>
-          </ac:cxnSpMkLst>
-        </pc:cxnChg>
-        <pc:cxnChg chg="add mod">
-          <ac:chgData name="ROEBUCK WILLIAMS RHOSLYN" userId="19c0e951-307b-46f9-a42c-f83c2dbad1d6" providerId="ADAL" clId="{9539E4F2-C474-48D6-B56C-A71574028F87}" dt="2024-08-02T13:20:39.591" v="1293"/>
-          <ac:cxnSpMkLst>
-            <pc:docMk/>
-            <pc:sldMk cId="822998820" sldId="258"/>
-            <ac:cxnSpMk id="364" creationId="{3D02C758-16C7-F121-7834-586DCEAE40D6}"/>
-          </ac:cxnSpMkLst>
-        </pc:cxnChg>
-        <pc:cxnChg chg="add mod">
-          <ac:chgData name="ROEBUCK WILLIAMS RHOSLYN" userId="19c0e951-307b-46f9-a42c-f83c2dbad1d6" providerId="ADAL" clId="{9539E4F2-C474-48D6-B56C-A71574028F87}" dt="2024-08-02T14:16:00.670" v="2374" actId="14100"/>
-          <ac:cxnSpMkLst>
-            <pc:docMk/>
-            <pc:sldMk cId="822998820" sldId="258"/>
-            <ac:cxnSpMk id="366" creationId="{01456621-189B-690B-2D6C-43CD380F59E4}"/>
-          </ac:cxnSpMkLst>
-        </pc:cxnChg>
-        <pc:cxnChg chg="add mod">
-          <ac:chgData name="ROEBUCK WILLIAMS RHOSLYN" userId="19c0e951-307b-46f9-a42c-f83c2dbad1d6" providerId="ADAL" clId="{9539E4F2-C474-48D6-B56C-A71574028F87}" dt="2024-08-02T14:23:16.103" v="2439" actId="14100"/>
-          <ac:cxnSpMkLst>
-            <pc:docMk/>
-            <pc:sldMk cId="822998820" sldId="258"/>
-            <ac:cxnSpMk id="402" creationId="{602FD4CE-BF27-5BA3-4A42-313934A36984}"/>
-          </ac:cxnSpMkLst>
-        </pc:cxnChg>
-        <pc:cxnChg chg="add del mod">
-          <ac:chgData name="ROEBUCK WILLIAMS RHOSLYN" userId="19c0e951-307b-46f9-a42c-f83c2dbad1d6" providerId="ADAL" clId="{9539E4F2-C474-48D6-B56C-A71574028F87}" dt="2024-08-02T13:56:38.531" v="2006" actId="478"/>
-          <ac:cxnSpMkLst>
-            <pc:docMk/>
-            <pc:sldMk cId="822998820" sldId="258"/>
-            <ac:cxnSpMk id="411" creationId="{ED61133C-99CD-8570-354F-84B1697EFDC6}"/>
-          </ac:cxnSpMkLst>
-        </pc:cxnChg>
-        <pc:cxnChg chg="add mod">
-          <ac:chgData name="ROEBUCK WILLIAMS RHOSLYN" userId="19c0e951-307b-46f9-a42c-f83c2dbad1d6" providerId="ADAL" clId="{9539E4F2-C474-48D6-B56C-A71574028F87}" dt="2024-08-02T14:23:24.814" v="2441" actId="14100"/>
-          <ac:cxnSpMkLst>
-            <pc:docMk/>
-            <pc:sldMk cId="822998820" sldId="258"/>
-            <ac:cxnSpMk id="414" creationId="{3EBB69BF-321C-B3CE-8472-0FD925D21411}"/>
-          </ac:cxnSpMkLst>
-        </pc:cxnChg>
-        <pc:cxnChg chg="add mod">
-          <ac:chgData name="ROEBUCK WILLIAMS RHOSLYN" userId="19c0e951-307b-46f9-a42c-f83c2dbad1d6" providerId="ADAL" clId="{9539E4F2-C474-48D6-B56C-A71574028F87}" dt="2024-08-02T14:31:07" v="2557" actId="33986"/>
-          <ac:cxnSpMkLst>
-            <pc:docMk/>
-            <pc:sldMk cId="822998820" sldId="258"/>
-            <ac:cxnSpMk id="526" creationId="{D53EE2C6-E9F4-0577-52F1-603DDF342357}"/>
-          </ac:cxnSpMkLst>
-        </pc:cxnChg>
-      </pc:sldChg>
-      <pc:sldChg chg="add del ord">
-        <pc:chgData name="ROEBUCK WILLIAMS RHOSLYN" userId="19c0e951-307b-46f9-a42c-f83c2dbad1d6" providerId="ADAL" clId="{9539E4F2-C474-48D6-B56C-A71574028F87}" dt="2024-08-05T11:21:39.913" v="3200" actId="47"/>
-        <pc:sldMkLst>
-          <pc:docMk/>
-          <pc:sldMk cId="4017035160" sldId="259"/>
-        </pc:sldMkLst>
-      </pc:sldChg>
-      <pc:sldChg chg="add del">
-        <pc:chgData name="ROEBUCK WILLIAMS RHOSLYN" userId="19c0e951-307b-46f9-a42c-f83c2dbad1d6" providerId="ADAL" clId="{9539E4F2-C474-48D6-B56C-A71574028F87}" dt="2024-08-05T11:21:39.913" v="3200" actId="47"/>
-        <pc:sldMkLst>
-          <pc:docMk/>
-          <pc:sldMk cId="4157479431" sldId="260"/>
-        </pc:sldMkLst>
-      </pc:sldChg>
-      <pc:sldChg chg="delSp modSp new del mod">
-        <pc:chgData name="ROEBUCK WILLIAMS RHOSLYN" userId="19c0e951-307b-46f9-a42c-f83c2dbad1d6" providerId="ADAL" clId="{9539E4F2-C474-48D6-B56C-A71574028F87}" dt="2024-08-05T11:21:39.913" v="3200" actId="47"/>
-        <pc:sldMkLst>
-          <pc:docMk/>
-          <pc:sldMk cId="641181504" sldId="261"/>
-        </pc:sldMkLst>
-        <pc:spChg chg="del">
-          <ac:chgData name="ROEBUCK WILLIAMS RHOSLYN" userId="19c0e951-307b-46f9-a42c-f83c2dbad1d6" providerId="ADAL" clId="{9539E4F2-C474-48D6-B56C-A71574028F87}" dt="2024-08-02T13:23:56.483" v="1482" actId="478"/>
-          <ac:spMkLst>
-            <pc:docMk/>
-            <pc:sldMk cId="641181504" sldId="261"/>
-            <ac:spMk id="2" creationId="{8EBFF33B-00C6-C498-82AF-6098B38D3D9C}"/>
-          </ac:spMkLst>
-        </pc:spChg>
-        <pc:spChg chg="mod">
-          <ac:chgData name="ROEBUCK WILLIAMS RHOSLYN" userId="19c0e951-307b-46f9-a42c-f83c2dbad1d6" providerId="ADAL" clId="{9539E4F2-C474-48D6-B56C-A71574028F87}" dt="2024-08-02T13:24:01.547" v="1486" actId="20577"/>
-          <ac:spMkLst>
-            <pc:docMk/>
-            <pc:sldMk cId="641181504" sldId="261"/>
-            <ac:spMk id="3" creationId="{2BDE50D2-F0DF-A701-798F-AB86BDCDAEF2}"/>
-          </ac:spMkLst>
-        </pc:spChg>
-      </pc:sldChg>
-      <pc:sldChg chg="addSp delSp modSp add mod ord">
-        <pc:chgData name="ROEBUCK WILLIAMS RHOSLYN" userId="19c0e951-307b-46f9-a42c-f83c2dbad1d6" providerId="ADAL" clId="{9539E4F2-C474-48D6-B56C-A71574028F87}" dt="2024-08-12T15:13:10.724" v="5223" actId="14100"/>
+      <pc:sldChg chg="modSp mod ord">
+        <pc:chgData name="ROEBUCK WILLIAMS RHOSLYN" userId="19c0e951-307b-46f9-a42c-f83c2dbad1d6" providerId="ADAL" clId="{CA170275-7344-438A-A8F7-1467E1F3B891}" dt="2024-11-01T08:59:28.872" v="104" actId="14100"/>
         <pc:sldMkLst>
           <pc:docMk/>
           <pc:sldMk cId="1752442661" sldId="262"/>
         </pc:sldMkLst>
         <pc:spChg chg="mod">
-          <ac:chgData name="ROEBUCK WILLIAMS RHOSLYN" userId="19c0e951-307b-46f9-a42c-f83c2dbad1d6" providerId="ADAL" clId="{9539E4F2-C474-48D6-B56C-A71574028F87}" dt="2024-08-05T10:58:57.906" v="3199" actId="14100"/>
+          <ac:chgData name="ROEBUCK WILLIAMS RHOSLYN" userId="19c0e951-307b-46f9-a42c-f83c2dbad1d6" providerId="ADAL" clId="{CA170275-7344-438A-A8F7-1467E1F3B891}" dt="2024-11-01T08:58:32.433" v="93" actId="1076"/>
           <ac:spMkLst>
             <pc:docMk/>
             <pc:sldMk cId="1752442661" sldId="262"/>
@@ -719,7 +141,39 @@
           </ac:spMkLst>
         </pc:spChg>
         <pc:spChg chg="mod">
-          <ac:chgData name="ROEBUCK WILLIAMS RHOSLYN" userId="19c0e951-307b-46f9-a42c-f83c2dbad1d6" providerId="ADAL" clId="{9539E4F2-C474-48D6-B56C-A71574028F87}" dt="2024-08-02T14:43:13.485" v="2724" actId="20577"/>
+          <ac:chgData name="ROEBUCK WILLIAMS RHOSLYN" userId="19c0e951-307b-46f9-a42c-f83c2dbad1d6" providerId="ADAL" clId="{CA170275-7344-438A-A8F7-1467E1F3B891}" dt="2024-11-01T08:58:24.928" v="91" actId="1076"/>
+          <ac:spMkLst>
+            <pc:docMk/>
+            <pc:sldMk cId="1752442661" sldId="262"/>
+            <ac:spMk id="5" creationId="{346FBF56-A7DF-4167-FC34-8C7AAEEE9647}"/>
+          </ac:spMkLst>
+        </pc:spChg>
+        <pc:spChg chg="mod">
+          <ac:chgData name="ROEBUCK WILLIAMS RHOSLYN" userId="19c0e951-307b-46f9-a42c-f83c2dbad1d6" providerId="ADAL" clId="{CA170275-7344-438A-A8F7-1467E1F3B891}" dt="2024-11-01T08:59:26.696" v="103" actId="14100"/>
+          <ac:spMkLst>
+            <pc:docMk/>
+            <pc:sldMk cId="1752442661" sldId="262"/>
+            <ac:spMk id="6" creationId="{CB0F3719-CBE3-A9A8-FFCD-2ECFD103C24E}"/>
+          </ac:spMkLst>
+        </pc:spChg>
+        <pc:spChg chg="mod">
+          <ac:chgData name="ROEBUCK WILLIAMS RHOSLYN" userId="19c0e951-307b-46f9-a42c-f83c2dbad1d6" providerId="ADAL" clId="{CA170275-7344-438A-A8F7-1467E1F3B891}" dt="2024-11-01T08:59:22.789" v="102" actId="14100"/>
+          <ac:spMkLst>
+            <pc:docMk/>
+            <pc:sldMk cId="1752442661" sldId="262"/>
+            <ac:spMk id="7" creationId="{64ABE1A5-932C-22BE-9EE8-247D1792463B}"/>
+          </ac:spMkLst>
+        </pc:spChg>
+        <pc:spChg chg="mod">
+          <ac:chgData name="ROEBUCK WILLIAMS RHOSLYN" userId="19c0e951-307b-46f9-a42c-f83c2dbad1d6" providerId="ADAL" clId="{CA170275-7344-438A-A8F7-1467E1F3B891}" dt="2024-11-01T08:58:34.991" v="94" actId="1076"/>
+          <ac:spMkLst>
+            <pc:docMk/>
+            <pc:sldMk cId="1752442661" sldId="262"/>
+            <ac:spMk id="9" creationId="{1B919D91-FC0C-7368-90E2-67BC1C60183D}"/>
+          </ac:spMkLst>
+        </pc:spChg>
+        <pc:spChg chg="mod">
+          <ac:chgData name="ROEBUCK WILLIAMS RHOSLYN" userId="19c0e951-307b-46f9-a42c-f83c2dbad1d6" providerId="ADAL" clId="{CA170275-7344-438A-A8F7-1467E1F3B891}" dt="2024-11-01T08:58:32.433" v="93" actId="1076"/>
           <ac:spMkLst>
             <pc:docMk/>
             <pc:sldMk cId="1752442661" sldId="262"/>
@@ -727,7 +181,15 @@
           </ac:spMkLst>
         </pc:spChg>
         <pc:spChg chg="mod">
-          <ac:chgData name="ROEBUCK WILLIAMS RHOSLYN" userId="19c0e951-307b-46f9-a42c-f83c2dbad1d6" providerId="ADAL" clId="{9539E4F2-C474-48D6-B56C-A71574028F87}" dt="2024-08-12T15:09:43.193" v="5207" actId="255"/>
+          <ac:chgData name="ROEBUCK WILLIAMS RHOSLYN" userId="19c0e951-307b-46f9-a42c-f83c2dbad1d6" providerId="ADAL" clId="{CA170275-7344-438A-A8F7-1467E1F3B891}" dt="2024-11-01T08:58:57.706" v="98" actId="14100"/>
+          <ac:spMkLst>
+            <pc:docMk/>
+            <pc:sldMk cId="1752442661" sldId="262"/>
+            <ac:spMk id="19" creationId="{D2A92E3D-448A-A5B8-E6F4-384524ED1057}"/>
+          </ac:spMkLst>
+        </pc:spChg>
+        <pc:spChg chg="mod">
+          <ac:chgData name="ROEBUCK WILLIAMS RHOSLYN" userId="19c0e951-307b-46f9-a42c-f83c2dbad1d6" providerId="ADAL" clId="{CA170275-7344-438A-A8F7-1467E1F3B891}" dt="2024-11-01T08:58:32.433" v="93" actId="1076"/>
           <ac:spMkLst>
             <pc:docMk/>
             <pc:sldMk cId="1752442661" sldId="262"/>
@@ -735,7 +197,7 @@
           </ac:spMkLst>
         </pc:spChg>
         <pc:spChg chg="mod">
-          <ac:chgData name="ROEBUCK WILLIAMS RHOSLYN" userId="19c0e951-307b-46f9-a42c-f83c2dbad1d6" providerId="ADAL" clId="{9539E4F2-C474-48D6-B56C-A71574028F87}" dt="2024-08-03T08:04:57.505" v="2746" actId="14100"/>
+          <ac:chgData name="ROEBUCK WILLIAMS RHOSLYN" userId="19c0e951-307b-46f9-a42c-f83c2dbad1d6" providerId="ADAL" clId="{CA170275-7344-438A-A8F7-1467E1F3B891}" dt="2024-11-01T08:58:40.060" v="95" actId="121"/>
           <ac:spMkLst>
             <pc:docMk/>
             <pc:sldMk cId="1752442661" sldId="262"/>
@@ -743,7 +205,7 @@
           </ac:spMkLst>
         </pc:spChg>
         <pc:spChg chg="mod">
-          <ac:chgData name="ROEBUCK WILLIAMS RHOSLYN" userId="19c0e951-307b-46f9-a42c-f83c2dbad1d6" providerId="ADAL" clId="{9539E4F2-C474-48D6-B56C-A71574028F87}" dt="2024-08-02T14:36:40.137" v="2623" actId="1076"/>
+          <ac:chgData name="ROEBUCK WILLIAMS RHOSLYN" userId="19c0e951-307b-46f9-a42c-f83c2dbad1d6" providerId="ADAL" clId="{CA170275-7344-438A-A8F7-1467E1F3B891}" dt="2024-11-01T08:58:24.928" v="91" actId="1076"/>
           <ac:spMkLst>
             <pc:docMk/>
             <pc:sldMk cId="1752442661" sldId="262"/>
@@ -751,7 +213,15 @@
           </ac:spMkLst>
         </pc:spChg>
         <pc:spChg chg="mod">
-          <ac:chgData name="ROEBUCK WILLIAMS RHOSLYN" userId="19c0e951-307b-46f9-a42c-f83c2dbad1d6" providerId="ADAL" clId="{9539E4F2-C474-48D6-B56C-A71574028F87}" dt="2024-08-12T15:13:10.724" v="5223" actId="14100"/>
+          <ac:chgData name="ROEBUCK WILLIAMS RHOSLYN" userId="19c0e951-307b-46f9-a42c-f83c2dbad1d6" providerId="ADAL" clId="{CA170275-7344-438A-A8F7-1467E1F3B891}" dt="2024-11-01T08:58:32.433" v="93" actId="1076"/>
+          <ac:spMkLst>
+            <pc:docMk/>
+            <pc:sldMk cId="1752442661" sldId="262"/>
+            <ac:spMk id="40" creationId="{026E36F0-35D8-4E3A-EE82-977CCCA6EB0F}"/>
+          </ac:spMkLst>
+        </pc:spChg>
+        <pc:spChg chg="mod">
+          <ac:chgData name="ROEBUCK WILLIAMS RHOSLYN" userId="19c0e951-307b-46f9-a42c-f83c2dbad1d6" providerId="ADAL" clId="{CA170275-7344-438A-A8F7-1467E1F3B891}" dt="2024-11-01T08:58:32.433" v="93" actId="1076"/>
           <ac:spMkLst>
             <pc:docMk/>
             <pc:sldMk cId="1752442661" sldId="262"/>
@@ -759,7 +229,7 @@
           </ac:spMkLst>
         </pc:spChg>
         <pc:spChg chg="mod">
-          <ac:chgData name="ROEBUCK WILLIAMS RHOSLYN" userId="19c0e951-307b-46f9-a42c-f83c2dbad1d6" providerId="ADAL" clId="{9539E4F2-C474-48D6-B56C-A71574028F87}" dt="2024-08-03T08:07:36.950" v="2781" actId="1076"/>
+          <ac:chgData name="ROEBUCK WILLIAMS RHOSLYN" userId="19c0e951-307b-46f9-a42c-f83c2dbad1d6" providerId="ADAL" clId="{CA170275-7344-438A-A8F7-1467E1F3B891}" dt="2024-11-01T08:58:32.433" v="93" actId="1076"/>
           <ac:spMkLst>
             <pc:docMk/>
             <pc:sldMk cId="1752442661" sldId="262"/>
@@ -767,55 +237,31 @@
           </ac:spMkLst>
         </pc:spChg>
         <pc:spChg chg="mod">
-          <ac:chgData name="ROEBUCK WILLIAMS RHOSLYN" userId="19c0e951-307b-46f9-a42c-f83c2dbad1d6" providerId="ADAL" clId="{9539E4F2-C474-48D6-B56C-A71574028F87}" dt="2024-08-05T09:57:52.663" v="3085" actId="20577"/>
+          <ac:chgData name="ROEBUCK WILLIAMS RHOSLYN" userId="19c0e951-307b-46f9-a42c-f83c2dbad1d6" providerId="ADAL" clId="{CA170275-7344-438A-A8F7-1467E1F3B891}" dt="2024-11-01T08:58:27.144" v="92" actId="1076"/>
           <ac:spMkLst>
             <pc:docMk/>
             <pc:sldMk cId="1752442661" sldId="262"/>
-            <ac:spMk id="61" creationId="{340C4477-8A90-8A8C-65B7-202314C3ABCC}"/>
+            <ac:spMk id="56" creationId="{9398C94E-A74A-D10C-095D-9AE7266F22CC}"/>
           </ac:spMkLst>
         </pc:spChg>
         <pc:spChg chg="mod">
-          <ac:chgData name="ROEBUCK WILLIAMS RHOSLYN" userId="19c0e951-307b-46f9-a42c-f83c2dbad1d6" providerId="ADAL" clId="{9539E4F2-C474-48D6-B56C-A71574028F87}" dt="2024-08-03T08:07:51.346" v="2782" actId="1076"/>
-          <ac:spMkLst>
-            <pc:docMk/>
-            <pc:sldMk cId="1752442661" sldId="262"/>
-            <ac:spMk id="64" creationId="{F1DB31A6-A394-9581-35E2-1B45D8C8135E}"/>
-          </ac:spMkLst>
-        </pc:spChg>
-        <pc:spChg chg="mod">
-          <ac:chgData name="ROEBUCK WILLIAMS RHOSLYN" userId="19c0e951-307b-46f9-a42c-f83c2dbad1d6" providerId="ADAL" clId="{9539E4F2-C474-48D6-B56C-A71574028F87}" dt="2024-08-03T08:09:19.672" v="2859" actId="1076"/>
-          <ac:spMkLst>
-            <pc:docMk/>
-            <pc:sldMk cId="1752442661" sldId="262"/>
-            <ac:spMk id="271" creationId="{9731557B-6A8D-ECE3-CBF2-FAF304D57E5B}"/>
-          </ac:spMkLst>
-        </pc:spChg>
-        <pc:spChg chg="del">
-          <ac:chgData name="ROEBUCK WILLIAMS RHOSLYN" userId="19c0e951-307b-46f9-a42c-f83c2dbad1d6" providerId="ADAL" clId="{9539E4F2-C474-48D6-B56C-A71574028F87}" dt="2024-08-03T08:09:15.716" v="2857" actId="478"/>
-          <ac:spMkLst>
-            <pc:docMk/>
-            <pc:sldMk cId="1752442661" sldId="262"/>
-            <ac:spMk id="275" creationId="{8B8BBD31-1124-0F3F-A559-EBBC9215C49B}"/>
-          </ac:spMkLst>
-        </pc:spChg>
-        <pc:spChg chg="mod">
-          <ac:chgData name="ROEBUCK WILLIAMS RHOSLYN" userId="19c0e951-307b-46f9-a42c-f83c2dbad1d6" providerId="ADAL" clId="{9539E4F2-C474-48D6-B56C-A71574028F87}" dt="2024-08-12T15:10:58.819" v="5211" actId="113"/>
+          <ac:chgData name="ROEBUCK WILLIAMS RHOSLYN" userId="19c0e951-307b-46f9-a42c-f83c2dbad1d6" providerId="ADAL" clId="{CA170275-7344-438A-A8F7-1467E1F3B891}" dt="2024-11-01T08:58:32.433" v="93" actId="1076"/>
           <ac:spMkLst>
             <pc:docMk/>
             <pc:sldMk cId="1752442661" sldId="262"/>
             <ac:spMk id="277" creationId="{3115CC88-6263-38C2-0D3E-003BDACFE043}"/>
           </ac:spMkLst>
         </pc:spChg>
-        <pc:spChg chg="del mod">
-          <ac:chgData name="ROEBUCK WILLIAMS RHOSLYN" userId="19c0e951-307b-46f9-a42c-f83c2dbad1d6" providerId="ADAL" clId="{9539E4F2-C474-48D6-B56C-A71574028F87}" dt="2024-08-03T08:09:17.582" v="2858" actId="478"/>
+        <pc:spChg chg="mod">
+          <ac:chgData name="ROEBUCK WILLIAMS RHOSLYN" userId="19c0e951-307b-46f9-a42c-f83c2dbad1d6" providerId="ADAL" clId="{CA170275-7344-438A-A8F7-1467E1F3B891}" dt="2024-11-01T08:58:32.433" v="93" actId="1076"/>
           <ac:spMkLst>
             <pc:docMk/>
             <pc:sldMk cId="1752442661" sldId="262"/>
-            <ac:spMk id="300" creationId="{80207DE3-4325-095A-7ABD-C12AD403D167}"/>
+            <ac:spMk id="305" creationId="{E93FBCF3-1541-0A07-BEC4-E6C4601835E9}"/>
           </ac:spMkLst>
         </pc:spChg>
         <pc:spChg chg="mod">
-          <ac:chgData name="ROEBUCK WILLIAMS RHOSLYN" userId="19c0e951-307b-46f9-a42c-f83c2dbad1d6" providerId="ADAL" clId="{9539E4F2-C474-48D6-B56C-A71574028F87}" dt="2024-08-12T15:10:49.798" v="5210" actId="113"/>
+          <ac:chgData name="ROEBUCK WILLIAMS RHOSLYN" userId="19c0e951-307b-46f9-a42c-f83c2dbad1d6" providerId="ADAL" clId="{CA170275-7344-438A-A8F7-1467E1F3B891}" dt="2024-11-01T08:58:24.928" v="91" actId="1076"/>
           <ac:spMkLst>
             <pc:docMk/>
             <pc:sldMk cId="1752442661" sldId="262"/>
@@ -823,7 +269,15 @@
           </ac:spMkLst>
         </pc:spChg>
         <pc:spChg chg="mod">
-          <ac:chgData name="ROEBUCK WILLIAMS RHOSLYN" userId="19c0e951-307b-46f9-a42c-f83c2dbad1d6" providerId="ADAL" clId="{9539E4F2-C474-48D6-B56C-A71574028F87}" dt="2024-08-03T08:06:46.855" v="2776" actId="14100"/>
+          <ac:chgData name="ROEBUCK WILLIAMS RHOSLYN" userId="19c0e951-307b-46f9-a42c-f83c2dbad1d6" providerId="ADAL" clId="{CA170275-7344-438A-A8F7-1467E1F3B891}" dt="2024-11-01T08:58:32.433" v="93" actId="1076"/>
+          <ac:spMkLst>
+            <pc:docMk/>
+            <pc:sldMk cId="1752442661" sldId="262"/>
+            <ac:spMk id="324" creationId="{6A00F52B-C080-2BFF-9C5D-566A00C0B6BD}"/>
+          </ac:spMkLst>
+        </pc:spChg>
+        <pc:spChg chg="mod">
+          <ac:chgData name="ROEBUCK WILLIAMS RHOSLYN" userId="19c0e951-307b-46f9-a42c-f83c2dbad1d6" providerId="ADAL" clId="{CA170275-7344-438A-A8F7-1467E1F3B891}" dt="2024-11-01T08:58:32.433" v="93" actId="1076"/>
           <ac:spMkLst>
             <pc:docMk/>
             <pc:sldMk cId="1752442661" sldId="262"/>
@@ -831,7 +285,7 @@
           </ac:spMkLst>
         </pc:spChg>
         <pc:spChg chg="mod">
-          <ac:chgData name="ROEBUCK WILLIAMS RHOSLYN" userId="19c0e951-307b-46f9-a42c-f83c2dbad1d6" providerId="ADAL" clId="{9539E4F2-C474-48D6-B56C-A71574028F87}" dt="2024-08-12T15:02:55.636" v="5019" actId="1076"/>
+          <ac:chgData name="ROEBUCK WILLIAMS RHOSLYN" userId="19c0e951-307b-46f9-a42c-f83c2dbad1d6" providerId="ADAL" clId="{CA170275-7344-438A-A8F7-1467E1F3B891}" dt="2024-11-01T08:58:47.534" v="96" actId="1076"/>
           <ac:spMkLst>
             <pc:docMk/>
             <pc:sldMk cId="1752442661" sldId="262"/>
@@ -839,7 +293,7 @@
           </ac:spMkLst>
         </pc:spChg>
         <pc:spChg chg="mod">
-          <ac:chgData name="ROEBUCK WILLIAMS RHOSLYN" userId="19c0e951-307b-46f9-a42c-f83c2dbad1d6" providerId="ADAL" clId="{9539E4F2-C474-48D6-B56C-A71574028F87}" dt="2024-08-02T14:34:29.254" v="2593" actId="1076"/>
+          <ac:chgData name="ROEBUCK WILLIAMS RHOSLYN" userId="19c0e951-307b-46f9-a42c-f83c2dbad1d6" providerId="ADAL" clId="{CA170275-7344-438A-A8F7-1467E1F3B891}" dt="2024-11-01T08:58:32.433" v="93" actId="1076"/>
           <ac:spMkLst>
             <pc:docMk/>
             <pc:sldMk cId="1752442661" sldId="262"/>
@@ -847,7 +301,7 @@
           </ac:spMkLst>
         </pc:spChg>
         <pc:spChg chg="mod">
-          <ac:chgData name="ROEBUCK WILLIAMS RHOSLYN" userId="19c0e951-307b-46f9-a42c-f83c2dbad1d6" providerId="ADAL" clId="{9539E4F2-C474-48D6-B56C-A71574028F87}" dt="2024-08-12T15:09:22.988" v="5206" actId="20577"/>
+          <ac:chgData name="ROEBUCK WILLIAMS RHOSLYN" userId="19c0e951-307b-46f9-a42c-f83c2dbad1d6" providerId="ADAL" clId="{CA170275-7344-438A-A8F7-1467E1F3B891}" dt="2024-11-01T08:59:28.872" v="104" actId="14100"/>
           <ac:spMkLst>
             <pc:docMk/>
             <pc:sldMk cId="1752442661" sldId="262"/>
@@ -855,15 +309,7 @@
           </ac:spMkLst>
         </pc:spChg>
         <pc:spChg chg="mod">
-          <ac:chgData name="ROEBUCK WILLIAMS RHOSLYN" userId="19c0e951-307b-46f9-a42c-f83c2dbad1d6" providerId="ADAL" clId="{9539E4F2-C474-48D6-B56C-A71574028F87}" dt="2024-08-03T08:10:07.173" v="2971" actId="20577"/>
-          <ac:spMkLst>
-            <pc:docMk/>
-            <pc:sldMk cId="1752442661" sldId="262"/>
-            <ac:spMk id="370" creationId="{1E6C3132-5A2F-96A7-98D0-8FCF4269FB45}"/>
-          </ac:spMkLst>
-        </pc:spChg>
-        <pc:spChg chg="mod">
-          <ac:chgData name="ROEBUCK WILLIAMS RHOSLYN" userId="19c0e951-307b-46f9-a42c-f83c2dbad1d6" providerId="ADAL" clId="{9539E4F2-C474-48D6-B56C-A71574028F87}" dt="2024-08-03T08:05:14.402" v="2750" actId="1076"/>
+          <ac:chgData name="ROEBUCK WILLIAMS RHOSLYN" userId="19c0e951-307b-46f9-a42c-f83c2dbad1d6" providerId="ADAL" clId="{CA170275-7344-438A-A8F7-1467E1F3B891}" dt="2024-11-01T08:58:32.433" v="93" actId="1076"/>
           <ac:spMkLst>
             <pc:docMk/>
             <pc:sldMk cId="1752442661" sldId="262"/>
@@ -871,7 +317,7 @@
           </ac:spMkLst>
         </pc:spChg>
         <pc:spChg chg="mod">
-          <ac:chgData name="ROEBUCK WILLIAMS RHOSLYN" userId="19c0e951-307b-46f9-a42c-f83c2dbad1d6" providerId="ADAL" clId="{9539E4F2-C474-48D6-B56C-A71574028F87}" dt="2024-08-03T08:05:06.706" v="2748" actId="1076"/>
+          <ac:chgData name="ROEBUCK WILLIAMS RHOSLYN" userId="19c0e951-307b-46f9-a42c-f83c2dbad1d6" providerId="ADAL" clId="{CA170275-7344-438A-A8F7-1467E1F3B891}" dt="2024-11-01T08:58:32.433" v="93" actId="1076"/>
           <ac:spMkLst>
             <pc:docMk/>
             <pc:sldMk cId="1752442661" sldId="262"/>
@@ -879,15 +325,23 @@
           </ac:spMkLst>
         </pc:spChg>
         <pc:cxnChg chg="mod">
-          <ac:chgData name="ROEBUCK WILLIAMS RHOSLYN" userId="19c0e951-307b-46f9-a42c-f83c2dbad1d6" providerId="ADAL" clId="{9539E4F2-C474-48D6-B56C-A71574028F87}" dt="2024-08-02T14:35:55.395" v="2613" actId="1038"/>
+          <ac:chgData name="ROEBUCK WILLIAMS RHOSLYN" userId="19c0e951-307b-46f9-a42c-f83c2dbad1d6" providerId="ADAL" clId="{CA170275-7344-438A-A8F7-1467E1F3B891}" dt="2024-11-01T08:58:24.928" v="91" actId="1076"/>
           <ac:cxnSpMkLst>
             <pc:docMk/>
             <pc:sldMk cId="1752442661" sldId="262"/>
             <ac:cxnSpMk id="12" creationId="{926B9899-69C1-DC20-8EAB-50BDC2C23273}"/>
           </ac:cxnSpMkLst>
         </pc:cxnChg>
-        <pc:cxnChg chg="add mod">
-          <ac:chgData name="ROEBUCK WILLIAMS RHOSLYN" userId="19c0e951-307b-46f9-a42c-f83c2dbad1d6" providerId="ADAL" clId="{9539E4F2-C474-48D6-B56C-A71574028F87}" dt="2024-08-12T15:13:10.724" v="5223" actId="14100"/>
+        <pc:cxnChg chg="mod">
+          <ac:chgData name="ROEBUCK WILLIAMS RHOSLYN" userId="19c0e951-307b-46f9-a42c-f83c2dbad1d6" providerId="ADAL" clId="{CA170275-7344-438A-A8F7-1467E1F3B891}" dt="2024-11-01T08:58:32.433" v="93" actId="1076"/>
+          <ac:cxnSpMkLst>
+            <pc:docMk/>
+            <pc:sldMk cId="1752442661" sldId="262"/>
+            <ac:cxnSpMk id="16" creationId="{235209DE-3AC7-AEA2-ED89-4975A1C0D3D4}"/>
+          </ac:cxnSpMkLst>
+        </pc:cxnChg>
+        <pc:cxnChg chg="mod">
+          <ac:chgData name="ROEBUCK WILLIAMS RHOSLYN" userId="19c0e951-307b-46f9-a42c-f83c2dbad1d6" providerId="ADAL" clId="{CA170275-7344-438A-A8F7-1467E1F3B891}" dt="2024-11-01T08:58:32.433" v="93" actId="1076"/>
           <ac:cxnSpMkLst>
             <pc:docMk/>
             <pc:sldMk cId="1752442661" sldId="262"/>
@@ -895,7 +349,7 @@
           </ac:cxnSpMkLst>
         </pc:cxnChg>
         <pc:cxnChg chg="mod">
-          <ac:chgData name="ROEBUCK WILLIAMS RHOSLYN" userId="19c0e951-307b-46f9-a42c-f83c2dbad1d6" providerId="ADAL" clId="{9539E4F2-C474-48D6-B56C-A71574028F87}" dt="2024-08-05T09:56:55.368" v="2990" actId="14100"/>
+          <ac:chgData name="ROEBUCK WILLIAMS RHOSLYN" userId="19c0e951-307b-46f9-a42c-f83c2dbad1d6" providerId="ADAL" clId="{CA170275-7344-438A-A8F7-1467E1F3B891}" dt="2024-11-01T08:58:32.433" v="93" actId="1076"/>
           <ac:cxnSpMkLst>
             <pc:docMk/>
             <pc:sldMk cId="1752442661" sldId="262"/>
@@ -903,7 +357,15 @@
           </ac:cxnSpMkLst>
         </pc:cxnChg>
         <pc:cxnChg chg="mod">
-          <ac:chgData name="ROEBUCK WILLIAMS RHOSLYN" userId="19c0e951-307b-46f9-a42c-f83c2dbad1d6" providerId="ADAL" clId="{9539E4F2-C474-48D6-B56C-A71574028F87}" dt="2024-08-05T10:58:57.906" v="3199" actId="14100"/>
+          <ac:chgData name="ROEBUCK WILLIAMS RHOSLYN" userId="19c0e951-307b-46f9-a42c-f83c2dbad1d6" providerId="ADAL" clId="{CA170275-7344-438A-A8F7-1467E1F3B891}" dt="2024-11-01T08:58:24.928" v="91" actId="1076"/>
+          <ac:cxnSpMkLst>
+            <pc:docMk/>
+            <pc:sldMk cId="1752442661" sldId="262"/>
+            <ac:cxnSpMk id="53" creationId="{C54EEBD3-28EB-9784-419E-34A411BC041E}"/>
+          </ac:cxnSpMkLst>
+        </pc:cxnChg>
+        <pc:cxnChg chg="mod">
+          <ac:chgData name="ROEBUCK WILLIAMS RHOSLYN" userId="19c0e951-307b-46f9-a42c-f83c2dbad1d6" providerId="ADAL" clId="{CA170275-7344-438A-A8F7-1467E1F3B891}" dt="2024-11-01T08:58:32.433" v="93" actId="1076"/>
           <ac:cxnSpMkLst>
             <pc:docMk/>
             <pc:sldMk cId="1752442661" sldId="262"/>
@@ -911,7 +373,15 @@
           </ac:cxnSpMkLst>
         </pc:cxnChg>
         <pc:cxnChg chg="mod">
-          <ac:chgData name="ROEBUCK WILLIAMS RHOSLYN" userId="19c0e951-307b-46f9-a42c-f83c2dbad1d6" providerId="ADAL" clId="{9539E4F2-C474-48D6-B56C-A71574028F87}" dt="2024-08-05T10:58:57.906" v="3199" actId="14100"/>
+          <ac:chgData name="ROEBUCK WILLIAMS RHOSLYN" userId="19c0e951-307b-46f9-a42c-f83c2dbad1d6" providerId="ADAL" clId="{CA170275-7344-438A-A8F7-1467E1F3B891}" dt="2024-11-01T08:58:32.433" v="93" actId="1076"/>
+          <ac:cxnSpMkLst>
+            <pc:docMk/>
+            <pc:sldMk cId="1752442661" sldId="262"/>
+            <ac:cxnSpMk id="242" creationId="{41120B5F-F708-A6F2-F648-80267F4FED55}"/>
+          </ac:cxnSpMkLst>
+        </pc:cxnChg>
+        <pc:cxnChg chg="mod">
+          <ac:chgData name="ROEBUCK WILLIAMS RHOSLYN" userId="19c0e951-307b-46f9-a42c-f83c2dbad1d6" providerId="ADAL" clId="{CA170275-7344-438A-A8F7-1467E1F3B891}" dt="2024-11-01T08:58:32.433" v="93" actId="1076"/>
           <ac:cxnSpMkLst>
             <pc:docMk/>
             <pc:sldMk cId="1752442661" sldId="262"/>
@@ -919,7 +389,7 @@
           </ac:cxnSpMkLst>
         </pc:cxnChg>
         <pc:cxnChg chg="mod">
-          <ac:chgData name="ROEBUCK WILLIAMS RHOSLYN" userId="19c0e951-307b-46f9-a42c-f83c2dbad1d6" providerId="ADAL" clId="{9539E4F2-C474-48D6-B56C-A71574028F87}" dt="2024-08-12T15:13:10.724" v="5223" actId="14100"/>
+          <ac:chgData name="ROEBUCK WILLIAMS RHOSLYN" userId="19c0e951-307b-46f9-a42c-f83c2dbad1d6" providerId="ADAL" clId="{CA170275-7344-438A-A8F7-1467E1F3B891}" dt="2024-11-01T08:58:32.433" v="93" actId="1076"/>
           <ac:cxnSpMkLst>
             <pc:docMk/>
             <pc:sldMk cId="1752442661" sldId="262"/>
@@ -927,7 +397,7 @@
           </ac:cxnSpMkLst>
         </pc:cxnChg>
         <pc:cxnChg chg="mod">
-          <ac:chgData name="ROEBUCK WILLIAMS RHOSLYN" userId="19c0e951-307b-46f9-a42c-f83c2dbad1d6" providerId="ADAL" clId="{9539E4F2-C474-48D6-B56C-A71574028F87}" dt="2024-08-05T10:58:57.906" v="3199" actId="14100"/>
+          <ac:chgData name="ROEBUCK WILLIAMS RHOSLYN" userId="19c0e951-307b-46f9-a42c-f83c2dbad1d6" providerId="ADAL" clId="{CA170275-7344-438A-A8F7-1467E1F3B891}" dt="2024-11-01T08:58:32.433" v="93" actId="1076"/>
           <ac:cxnSpMkLst>
             <pc:docMk/>
             <pc:sldMk cId="1752442661" sldId="262"/>
@@ -935,7 +405,15 @@
           </ac:cxnSpMkLst>
         </pc:cxnChg>
         <pc:cxnChg chg="mod">
-          <ac:chgData name="ROEBUCK WILLIAMS RHOSLYN" userId="19c0e951-307b-46f9-a42c-f83c2dbad1d6" providerId="ADAL" clId="{9539E4F2-C474-48D6-B56C-A71574028F87}" dt="2024-08-05T10:58:57.906" v="3199" actId="14100"/>
+          <ac:chgData name="ROEBUCK WILLIAMS RHOSLYN" userId="19c0e951-307b-46f9-a42c-f83c2dbad1d6" providerId="ADAL" clId="{CA170275-7344-438A-A8F7-1467E1F3B891}" dt="2024-11-01T08:58:57.706" v="98" actId="14100"/>
+          <ac:cxnSpMkLst>
+            <pc:docMk/>
+            <pc:sldMk cId="1752442661" sldId="262"/>
+            <ac:cxnSpMk id="366" creationId="{01456621-189B-690B-2D6C-43CD380F59E4}"/>
+          </ac:cxnSpMkLst>
+        </pc:cxnChg>
+        <pc:cxnChg chg="mod">
+          <ac:chgData name="ROEBUCK WILLIAMS RHOSLYN" userId="19c0e951-307b-46f9-a42c-f83c2dbad1d6" providerId="ADAL" clId="{CA170275-7344-438A-A8F7-1467E1F3B891}" dt="2024-11-01T08:58:32.433" v="93" actId="1076"/>
           <ac:cxnSpMkLst>
             <pc:docMk/>
             <pc:sldMk cId="1752442661" sldId="262"/>
@@ -943,7 +421,7 @@
           </ac:cxnSpMkLst>
         </pc:cxnChg>
         <pc:cxnChg chg="mod">
-          <ac:chgData name="ROEBUCK WILLIAMS RHOSLYN" userId="19c0e951-307b-46f9-a42c-f83c2dbad1d6" providerId="ADAL" clId="{9539E4F2-C474-48D6-B56C-A71574028F87}" dt="2024-08-05T09:56:55.368" v="2990" actId="14100"/>
+          <ac:chgData name="ROEBUCK WILLIAMS RHOSLYN" userId="19c0e951-307b-46f9-a42c-f83c2dbad1d6" providerId="ADAL" clId="{CA170275-7344-438A-A8F7-1467E1F3B891}" dt="2024-11-01T08:58:32.433" v="93" actId="1076"/>
           <ac:cxnSpMkLst>
             <pc:docMk/>
             <pc:sldMk cId="1752442661" sldId="262"/>
@@ -951,466 +429,11 @@
           </ac:cxnSpMkLst>
         </pc:cxnChg>
         <pc:cxnChg chg="mod">
-          <ac:chgData name="ROEBUCK WILLIAMS RHOSLYN" userId="19c0e951-307b-46f9-a42c-f83c2dbad1d6" providerId="ADAL" clId="{9539E4F2-C474-48D6-B56C-A71574028F87}" dt="2024-08-12T15:03:24.106" v="5065" actId="14100"/>
+          <ac:chgData name="ROEBUCK WILLIAMS RHOSLYN" userId="19c0e951-307b-46f9-a42c-f83c2dbad1d6" providerId="ADAL" clId="{CA170275-7344-438A-A8F7-1467E1F3B891}" dt="2024-11-01T08:58:32.433" v="93" actId="1076"/>
           <ac:cxnSpMkLst>
             <pc:docMk/>
             <pc:sldMk cId="1752442661" sldId="262"/>
             <ac:cxnSpMk id="526" creationId="{D53EE2C6-E9F4-0577-52F1-603DDF342357}"/>
-          </ac:cxnSpMkLst>
-        </pc:cxnChg>
-      </pc:sldChg>
-      <pc:sldChg chg="addSp delSp modSp new mod ord">
-        <pc:chgData name="ROEBUCK WILLIAMS RHOSLYN" userId="19c0e951-307b-46f9-a42c-f83c2dbad1d6" providerId="ADAL" clId="{9539E4F2-C474-48D6-B56C-A71574028F87}" dt="2024-08-05T15:04:48.539" v="4928" actId="1076"/>
-        <pc:sldMkLst>
-          <pc:docMk/>
-          <pc:sldMk cId="2676893550" sldId="263"/>
-        </pc:sldMkLst>
-        <pc:spChg chg="del">
-          <ac:chgData name="ROEBUCK WILLIAMS RHOSLYN" userId="19c0e951-307b-46f9-a42c-f83c2dbad1d6" providerId="ADAL" clId="{9539E4F2-C474-48D6-B56C-A71574028F87}" dt="2024-08-05T11:21:43.663" v="3202" actId="478"/>
-          <ac:spMkLst>
-            <pc:docMk/>
-            <pc:sldMk cId="2676893550" sldId="263"/>
-            <ac:spMk id="2" creationId="{C17FAF17-B73C-1BC2-0CD8-B9C6B077C650}"/>
-          </ac:spMkLst>
-        </pc:spChg>
-        <pc:spChg chg="del">
-          <ac:chgData name="ROEBUCK WILLIAMS RHOSLYN" userId="19c0e951-307b-46f9-a42c-f83c2dbad1d6" providerId="ADAL" clId="{9539E4F2-C474-48D6-B56C-A71574028F87}" dt="2024-08-05T11:21:44.382" v="3203" actId="478"/>
-          <ac:spMkLst>
-            <pc:docMk/>
-            <pc:sldMk cId="2676893550" sldId="263"/>
-            <ac:spMk id="3" creationId="{B534D582-78CF-C35E-697A-A0367507FE2C}"/>
-          </ac:spMkLst>
-        </pc:spChg>
-        <pc:spChg chg="add mod">
-          <ac:chgData name="ROEBUCK WILLIAMS RHOSLYN" userId="19c0e951-307b-46f9-a42c-f83c2dbad1d6" providerId="ADAL" clId="{9539E4F2-C474-48D6-B56C-A71574028F87}" dt="2024-08-05T11:38:36.043" v="4724" actId="1076"/>
-          <ac:spMkLst>
-            <pc:docMk/>
-            <pc:sldMk cId="2676893550" sldId="263"/>
-            <ac:spMk id="6" creationId="{6E07BB81-D828-144A-EB02-0B2D729F7626}"/>
-          </ac:spMkLst>
-        </pc:spChg>
-        <pc:spChg chg="add mod">
-          <ac:chgData name="ROEBUCK WILLIAMS RHOSLYN" userId="19c0e951-307b-46f9-a42c-f83c2dbad1d6" providerId="ADAL" clId="{9539E4F2-C474-48D6-B56C-A71574028F87}" dt="2024-08-05T11:38:36.043" v="4724" actId="1076"/>
-          <ac:spMkLst>
-            <pc:docMk/>
-            <pc:sldMk cId="2676893550" sldId="263"/>
-            <ac:spMk id="7" creationId="{E84E2C69-83A0-2B5C-C2DA-56CA1C2C769A}"/>
-          </ac:spMkLst>
-        </pc:spChg>
-        <pc:spChg chg="add del mod">
-          <ac:chgData name="ROEBUCK WILLIAMS RHOSLYN" userId="19c0e951-307b-46f9-a42c-f83c2dbad1d6" providerId="ADAL" clId="{9539E4F2-C474-48D6-B56C-A71574028F87}" dt="2024-08-05T11:23:31.542" v="3274" actId="478"/>
-          <ac:spMkLst>
-            <pc:docMk/>
-            <pc:sldMk cId="2676893550" sldId="263"/>
-            <ac:spMk id="8" creationId="{49DECEBE-7783-B9BC-67B7-D6D3ED9EE93A}"/>
-          </ac:spMkLst>
-        </pc:spChg>
-        <pc:spChg chg="add mod">
-          <ac:chgData name="ROEBUCK WILLIAMS RHOSLYN" userId="19c0e951-307b-46f9-a42c-f83c2dbad1d6" providerId="ADAL" clId="{9539E4F2-C474-48D6-B56C-A71574028F87}" dt="2024-08-05T11:41:10.749" v="4859" actId="1076"/>
-          <ac:spMkLst>
-            <pc:docMk/>
-            <pc:sldMk cId="2676893550" sldId="263"/>
-            <ac:spMk id="9" creationId="{488FD193-364C-B76F-A576-6A01CC4D876D}"/>
-          </ac:spMkLst>
-        </pc:spChg>
-        <pc:spChg chg="add mod">
-          <ac:chgData name="ROEBUCK WILLIAMS RHOSLYN" userId="19c0e951-307b-46f9-a42c-f83c2dbad1d6" providerId="ADAL" clId="{9539E4F2-C474-48D6-B56C-A71574028F87}" dt="2024-08-05T11:38:36.043" v="4724" actId="1076"/>
-          <ac:spMkLst>
-            <pc:docMk/>
-            <pc:sldMk cId="2676893550" sldId="263"/>
-            <ac:spMk id="10" creationId="{272927D8-E09A-64A9-A3E1-DDA99FC54C8C}"/>
-          </ac:spMkLst>
-        </pc:spChg>
-        <pc:spChg chg="add mod">
-          <ac:chgData name="ROEBUCK WILLIAMS RHOSLYN" userId="19c0e951-307b-46f9-a42c-f83c2dbad1d6" providerId="ADAL" clId="{9539E4F2-C474-48D6-B56C-A71574028F87}" dt="2024-08-05T11:38:36.043" v="4724" actId="1076"/>
-          <ac:spMkLst>
-            <pc:docMk/>
-            <pc:sldMk cId="2676893550" sldId="263"/>
-            <ac:spMk id="11" creationId="{72F9AC22-B3D0-400C-C41C-251C4935DF71}"/>
-          </ac:spMkLst>
-        </pc:spChg>
-        <pc:spChg chg="add mod">
-          <ac:chgData name="ROEBUCK WILLIAMS RHOSLYN" userId="19c0e951-307b-46f9-a42c-f83c2dbad1d6" providerId="ADAL" clId="{9539E4F2-C474-48D6-B56C-A71574028F87}" dt="2024-08-05T11:38:36.043" v="4724" actId="1076"/>
-          <ac:spMkLst>
-            <pc:docMk/>
-            <pc:sldMk cId="2676893550" sldId="263"/>
-            <ac:spMk id="12" creationId="{4B7B1D94-EC90-E19D-9B17-9F38F6661FAD}"/>
-          </ac:spMkLst>
-        </pc:spChg>
-        <pc:spChg chg="add mod">
-          <ac:chgData name="ROEBUCK WILLIAMS RHOSLYN" userId="19c0e951-307b-46f9-a42c-f83c2dbad1d6" providerId="ADAL" clId="{9539E4F2-C474-48D6-B56C-A71574028F87}" dt="2024-08-05T11:38:36.043" v="4724" actId="1076"/>
-          <ac:spMkLst>
-            <pc:docMk/>
-            <pc:sldMk cId="2676893550" sldId="263"/>
-            <ac:spMk id="13" creationId="{EE6B7265-0266-9F6D-AB95-EEEEB85CB011}"/>
-          </ac:spMkLst>
-        </pc:spChg>
-        <pc:spChg chg="add mod">
-          <ac:chgData name="ROEBUCK WILLIAMS RHOSLYN" userId="19c0e951-307b-46f9-a42c-f83c2dbad1d6" providerId="ADAL" clId="{9539E4F2-C474-48D6-B56C-A71574028F87}" dt="2024-08-05T11:38:36.043" v="4724" actId="1076"/>
-          <ac:spMkLst>
-            <pc:docMk/>
-            <pc:sldMk cId="2676893550" sldId="263"/>
-            <ac:spMk id="14" creationId="{D0FD8DF6-25C8-5F43-32EE-2064C0CF7D37}"/>
-          </ac:spMkLst>
-        </pc:spChg>
-        <pc:spChg chg="add mod">
-          <ac:chgData name="ROEBUCK WILLIAMS RHOSLYN" userId="19c0e951-307b-46f9-a42c-f83c2dbad1d6" providerId="ADAL" clId="{9539E4F2-C474-48D6-B56C-A71574028F87}" dt="2024-08-05T11:38:36.043" v="4724" actId="1076"/>
-          <ac:spMkLst>
-            <pc:docMk/>
-            <pc:sldMk cId="2676893550" sldId="263"/>
-            <ac:spMk id="15" creationId="{08256543-4CB1-CE21-0DE7-EE964B3723EA}"/>
-          </ac:spMkLst>
-        </pc:spChg>
-        <pc:spChg chg="add mod">
-          <ac:chgData name="ROEBUCK WILLIAMS RHOSLYN" userId="19c0e951-307b-46f9-a42c-f83c2dbad1d6" providerId="ADAL" clId="{9539E4F2-C474-48D6-B56C-A71574028F87}" dt="2024-08-05T11:38:36.043" v="4724" actId="1076"/>
-          <ac:spMkLst>
-            <pc:docMk/>
-            <pc:sldMk cId="2676893550" sldId="263"/>
-            <ac:spMk id="16" creationId="{BB874D05-B0E0-860E-9FB0-6D88A7ADC7AC}"/>
-          </ac:spMkLst>
-        </pc:spChg>
-        <pc:spChg chg="add mod">
-          <ac:chgData name="ROEBUCK WILLIAMS RHOSLYN" userId="19c0e951-307b-46f9-a42c-f83c2dbad1d6" providerId="ADAL" clId="{9539E4F2-C474-48D6-B56C-A71574028F87}" dt="2024-08-05T11:38:36.043" v="4724" actId="1076"/>
-          <ac:spMkLst>
-            <pc:docMk/>
-            <pc:sldMk cId="2676893550" sldId="263"/>
-            <ac:spMk id="17" creationId="{5E7585F8-BEBA-0297-A809-C24BC3EFEC68}"/>
-          </ac:spMkLst>
-        </pc:spChg>
-        <pc:spChg chg="add mod">
-          <ac:chgData name="ROEBUCK WILLIAMS RHOSLYN" userId="19c0e951-307b-46f9-a42c-f83c2dbad1d6" providerId="ADAL" clId="{9539E4F2-C474-48D6-B56C-A71574028F87}" dt="2024-08-05T11:38:36.043" v="4724" actId="1076"/>
-          <ac:spMkLst>
-            <pc:docMk/>
-            <pc:sldMk cId="2676893550" sldId="263"/>
-            <ac:spMk id="18" creationId="{F8737CFD-76FF-93BD-DF6B-9686F9D59FEE}"/>
-          </ac:spMkLst>
-        </pc:spChg>
-        <pc:spChg chg="add mod">
-          <ac:chgData name="ROEBUCK WILLIAMS RHOSLYN" userId="19c0e951-307b-46f9-a42c-f83c2dbad1d6" providerId="ADAL" clId="{9539E4F2-C474-48D6-B56C-A71574028F87}" dt="2024-08-05T11:38:36.043" v="4724" actId="1076"/>
-          <ac:spMkLst>
-            <pc:docMk/>
-            <pc:sldMk cId="2676893550" sldId="263"/>
-            <ac:spMk id="19" creationId="{5F6D6C7C-4C0A-2396-F7DF-836CB63FD869}"/>
-          </ac:spMkLst>
-        </pc:spChg>
-        <pc:spChg chg="add mod">
-          <ac:chgData name="ROEBUCK WILLIAMS RHOSLYN" userId="19c0e951-307b-46f9-a42c-f83c2dbad1d6" providerId="ADAL" clId="{9539E4F2-C474-48D6-B56C-A71574028F87}" dt="2024-08-05T11:38:36.043" v="4724" actId="1076"/>
-          <ac:spMkLst>
-            <pc:docMk/>
-            <pc:sldMk cId="2676893550" sldId="263"/>
-            <ac:spMk id="20" creationId="{80117929-D4A6-3D34-5660-F6DA5108CD8F}"/>
-          </ac:spMkLst>
-        </pc:spChg>
-        <pc:spChg chg="add mod">
-          <ac:chgData name="ROEBUCK WILLIAMS RHOSLYN" userId="19c0e951-307b-46f9-a42c-f83c2dbad1d6" providerId="ADAL" clId="{9539E4F2-C474-48D6-B56C-A71574028F87}" dt="2024-08-05T11:38:36.043" v="4724" actId="1076"/>
-          <ac:spMkLst>
-            <pc:docMk/>
-            <pc:sldMk cId="2676893550" sldId="263"/>
-            <ac:spMk id="21" creationId="{55F55DEF-20AD-AAB1-AB29-BC032AA0A40A}"/>
-          </ac:spMkLst>
-        </pc:spChg>
-        <pc:spChg chg="add mod">
-          <ac:chgData name="ROEBUCK WILLIAMS RHOSLYN" userId="19c0e951-307b-46f9-a42c-f83c2dbad1d6" providerId="ADAL" clId="{9539E4F2-C474-48D6-B56C-A71574028F87}" dt="2024-08-05T11:38:36.043" v="4724" actId="1076"/>
-          <ac:spMkLst>
-            <pc:docMk/>
-            <pc:sldMk cId="2676893550" sldId="263"/>
-            <ac:spMk id="22" creationId="{B92CF2EF-7863-7831-B4CB-A0BAF2922083}"/>
-          </ac:spMkLst>
-        </pc:spChg>
-        <pc:spChg chg="add mod">
-          <ac:chgData name="ROEBUCK WILLIAMS RHOSLYN" userId="19c0e951-307b-46f9-a42c-f83c2dbad1d6" providerId="ADAL" clId="{9539E4F2-C474-48D6-B56C-A71574028F87}" dt="2024-08-05T11:38:36.043" v="4724" actId="1076"/>
-          <ac:spMkLst>
-            <pc:docMk/>
-            <pc:sldMk cId="2676893550" sldId="263"/>
-            <ac:spMk id="23" creationId="{F8B03F6E-6F35-D78B-8BA0-0EE5BB8C5945}"/>
-          </ac:spMkLst>
-        </pc:spChg>
-        <pc:spChg chg="add mod">
-          <ac:chgData name="ROEBUCK WILLIAMS RHOSLYN" userId="19c0e951-307b-46f9-a42c-f83c2dbad1d6" providerId="ADAL" clId="{9539E4F2-C474-48D6-B56C-A71574028F87}" dt="2024-08-05T11:39:27.587" v="4741" actId="1076"/>
-          <ac:spMkLst>
-            <pc:docMk/>
-            <pc:sldMk cId="2676893550" sldId="263"/>
-            <ac:spMk id="24" creationId="{172B55A1-694D-BB7C-6665-B121EEA950AF}"/>
-          </ac:spMkLst>
-        </pc:spChg>
-        <pc:spChg chg="add mod">
-          <ac:chgData name="ROEBUCK WILLIAMS RHOSLYN" userId="19c0e951-307b-46f9-a42c-f83c2dbad1d6" providerId="ADAL" clId="{9539E4F2-C474-48D6-B56C-A71574028F87}" dt="2024-08-05T11:40:53.163" v="4857" actId="14100"/>
-          <ac:spMkLst>
-            <pc:docMk/>
-            <pc:sldMk cId="2676893550" sldId="263"/>
-            <ac:spMk id="25" creationId="{86D00E3F-561A-E0ED-F5FF-37A7FDDDD942}"/>
-          </ac:spMkLst>
-        </pc:spChg>
-        <pc:spChg chg="add mod">
-          <ac:chgData name="ROEBUCK WILLIAMS RHOSLYN" userId="19c0e951-307b-46f9-a42c-f83c2dbad1d6" providerId="ADAL" clId="{9539E4F2-C474-48D6-B56C-A71574028F87}" dt="2024-08-05T11:40:48.357" v="4855" actId="14100"/>
-          <ac:spMkLst>
-            <pc:docMk/>
-            <pc:sldMk cId="2676893550" sldId="263"/>
-            <ac:spMk id="26" creationId="{CCCA6C18-4808-6C21-A408-320E0F3E159B}"/>
-          </ac:spMkLst>
-        </pc:spChg>
-        <pc:spChg chg="add mod">
-          <ac:chgData name="ROEBUCK WILLIAMS RHOSLYN" userId="19c0e951-307b-46f9-a42c-f83c2dbad1d6" providerId="ADAL" clId="{9539E4F2-C474-48D6-B56C-A71574028F87}" dt="2024-08-05T11:39:53.625" v="4748" actId="20577"/>
-          <ac:spMkLst>
-            <pc:docMk/>
-            <pc:sldMk cId="2676893550" sldId="263"/>
-            <ac:spMk id="33" creationId="{F6376597-504F-D315-56EB-7DAB12073E45}"/>
-          </ac:spMkLst>
-        </pc:spChg>
-        <pc:spChg chg="add del mod">
-          <ac:chgData name="ROEBUCK WILLIAMS RHOSLYN" userId="19c0e951-307b-46f9-a42c-f83c2dbad1d6" providerId="ADAL" clId="{9539E4F2-C474-48D6-B56C-A71574028F87}" dt="2024-08-05T11:33:42.768" v="4384" actId="478"/>
-          <ac:spMkLst>
-            <pc:docMk/>
-            <pc:sldMk cId="2676893550" sldId="263"/>
-            <ac:spMk id="34" creationId="{AEC83513-C771-3363-9BE4-B5C12028D384}"/>
-          </ac:spMkLst>
-        </pc:spChg>
-        <pc:spChg chg="add mod">
-          <ac:chgData name="ROEBUCK WILLIAMS RHOSLYN" userId="19c0e951-307b-46f9-a42c-f83c2dbad1d6" providerId="ADAL" clId="{9539E4F2-C474-48D6-B56C-A71574028F87}" dt="2024-08-05T11:38:51.108" v="4726" actId="1076"/>
-          <ac:spMkLst>
-            <pc:docMk/>
-            <pc:sldMk cId="2676893550" sldId="263"/>
-            <ac:spMk id="35" creationId="{0397A6E3-6004-1107-CFA4-3DD0A244CBCC}"/>
-          </ac:spMkLst>
-        </pc:spChg>
-        <pc:spChg chg="add mod">
-          <ac:chgData name="ROEBUCK WILLIAMS RHOSLYN" userId="19c0e951-307b-46f9-a42c-f83c2dbad1d6" providerId="ADAL" clId="{9539E4F2-C474-48D6-B56C-A71574028F87}" dt="2024-08-05T11:38:36.043" v="4724" actId="1076"/>
-          <ac:spMkLst>
-            <pc:docMk/>
-            <pc:sldMk cId="2676893550" sldId="263"/>
-            <ac:spMk id="36" creationId="{052C7F83-0C2F-5979-5556-BD55491AF710}"/>
-          </ac:spMkLst>
-        </pc:spChg>
-        <pc:spChg chg="add mod">
-          <ac:chgData name="ROEBUCK WILLIAMS RHOSLYN" userId="19c0e951-307b-46f9-a42c-f83c2dbad1d6" providerId="ADAL" clId="{9539E4F2-C474-48D6-B56C-A71574028F87}" dt="2024-08-05T11:42:02.529" v="4876" actId="1076"/>
-          <ac:spMkLst>
-            <pc:docMk/>
-            <pc:sldMk cId="2676893550" sldId="263"/>
-            <ac:spMk id="37" creationId="{74F3C1B9-9AF4-244A-FD11-2A291F2B9ED7}"/>
-          </ac:spMkLst>
-        </pc:spChg>
-        <pc:spChg chg="add del mod">
-          <ac:chgData name="ROEBUCK WILLIAMS RHOSLYN" userId="19c0e951-307b-46f9-a42c-f83c2dbad1d6" providerId="ADAL" clId="{9539E4F2-C474-48D6-B56C-A71574028F87}" dt="2024-08-05T11:36:32.624" v="4696" actId="478"/>
-          <ac:spMkLst>
-            <pc:docMk/>
-            <pc:sldMk cId="2676893550" sldId="263"/>
-            <ac:spMk id="38" creationId="{2DC1C59F-C61C-06BE-62AE-503287BFBEB5}"/>
-          </ac:spMkLst>
-        </pc:spChg>
-        <pc:spChg chg="add mod">
-          <ac:chgData name="ROEBUCK WILLIAMS RHOSLYN" userId="19c0e951-307b-46f9-a42c-f83c2dbad1d6" providerId="ADAL" clId="{9539E4F2-C474-48D6-B56C-A71574028F87}" dt="2024-08-05T11:38:36.043" v="4724" actId="1076"/>
-          <ac:spMkLst>
-            <pc:docMk/>
-            <pc:sldMk cId="2676893550" sldId="263"/>
-            <ac:spMk id="39" creationId="{D7CA18CF-27F3-B728-483D-0DCAF0F1EBC3}"/>
-          </ac:spMkLst>
-        </pc:spChg>
-        <pc:spChg chg="add mod">
-          <ac:chgData name="ROEBUCK WILLIAMS RHOSLYN" userId="19c0e951-307b-46f9-a42c-f83c2dbad1d6" providerId="ADAL" clId="{9539E4F2-C474-48D6-B56C-A71574028F87}" dt="2024-08-05T11:38:36.043" v="4724" actId="1076"/>
-          <ac:spMkLst>
-            <pc:docMk/>
-            <pc:sldMk cId="2676893550" sldId="263"/>
-            <ac:spMk id="40" creationId="{94180434-932E-8F6F-C486-7C91200BA114}"/>
-          </ac:spMkLst>
-        </pc:spChg>
-        <pc:spChg chg="add mod">
-          <ac:chgData name="ROEBUCK WILLIAMS RHOSLYN" userId="19c0e951-307b-46f9-a42c-f83c2dbad1d6" providerId="ADAL" clId="{9539E4F2-C474-48D6-B56C-A71574028F87}" dt="2024-08-05T11:38:36.043" v="4724" actId="1076"/>
-          <ac:spMkLst>
-            <pc:docMk/>
-            <pc:sldMk cId="2676893550" sldId="263"/>
-            <ac:spMk id="41" creationId="{77B2A6A4-A8EE-9506-A49C-610AAF5D7832}"/>
-          </ac:spMkLst>
-        </pc:spChg>
-        <pc:spChg chg="add mod">
-          <ac:chgData name="ROEBUCK WILLIAMS RHOSLYN" userId="19c0e951-307b-46f9-a42c-f83c2dbad1d6" providerId="ADAL" clId="{9539E4F2-C474-48D6-B56C-A71574028F87}" dt="2024-08-05T11:41:40.675" v="4872" actId="1076"/>
-          <ac:spMkLst>
-            <pc:docMk/>
-            <pc:sldMk cId="2676893550" sldId="263"/>
-            <ac:spMk id="42" creationId="{530B05C7-E804-7C5A-E539-F16252160766}"/>
-          </ac:spMkLst>
-        </pc:spChg>
-        <pc:spChg chg="add del">
-          <ac:chgData name="ROEBUCK WILLIAMS RHOSLYN" userId="19c0e951-307b-46f9-a42c-f83c2dbad1d6" providerId="ADAL" clId="{9539E4F2-C474-48D6-B56C-A71574028F87}" dt="2024-08-05T11:37:03.871" v="4702" actId="11529"/>
-          <ac:spMkLst>
-            <pc:docMk/>
-            <pc:sldMk cId="2676893550" sldId="263"/>
-            <ac:spMk id="43" creationId="{60B31F21-1C30-3A92-6A87-59C1C8A02F9D}"/>
-          </ac:spMkLst>
-        </pc:spChg>
-        <pc:picChg chg="add mod modCrop">
-          <ac:chgData name="ROEBUCK WILLIAMS RHOSLYN" userId="19c0e951-307b-46f9-a42c-f83c2dbad1d6" providerId="ADAL" clId="{9539E4F2-C474-48D6-B56C-A71574028F87}" dt="2024-08-05T12:23:55.708" v="4887" actId="732"/>
-          <ac:picMkLst>
-            <pc:docMk/>
-            <pc:sldMk cId="2676893550" sldId="263"/>
-            <ac:picMk id="2" creationId="{818261D9-C1E3-5E1B-EC12-BF849741E425}"/>
-          </ac:picMkLst>
-        </pc:picChg>
-        <pc:picChg chg="add mod modCrop">
-          <ac:chgData name="ROEBUCK WILLIAMS RHOSLYN" userId="19c0e951-307b-46f9-a42c-f83c2dbad1d6" providerId="ADAL" clId="{9539E4F2-C474-48D6-B56C-A71574028F87}" dt="2024-08-05T13:51:46.518" v="4898" actId="732"/>
-          <ac:picMkLst>
-            <pc:docMk/>
-            <pc:sldMk cId="2676893550" sldId="263"/>
-            <ac:picMk id="3" creationId="{3A4F2863-E9B4-0F41-9B81-E29865ED308A}"/>
-          </ac:picMkLst>
-        </pc:picChg>
-        <pc:picChg chg="add mod modCrop">
-          <ac:chgData name="ROEBUCK WILLIAMS RHOSLYN" userId="19c0e951-307b-46f9-a42c-f83c2dbad1d6" providerId="ADAL" clId="{9539E4F2-C474-48D6-B56C-A71574028F87}" dt="2024-08-05T15:04:48.539" v="4928" actId="1076"/>
-          <ac:picMkLst>
-            <pc:docMk/>
-            <pc:sldMk cId="2676893550" sldId="263"/>
-            <ac:picMk id="4" creationId="{B763D365-327E-FCF9-1151-2497C47D918C}"/>
-          </ac:picMkLst>
-        </pc:picChg>
-        <pc:picChg chg="add mod">
-          <ac:chgData name="ROEBUCK WILLIAMS RHOSLYN" userId="19c0e951-307b-46f9-a42c-f83c2dbad1d6" providerId="ADAL" clId="{9539E4F2-C474-48D6-B56C-A71574028F87}" dt="2024-08-05T11:38:36.043" v="4724" actId="1076"/>
-          <ac:picMkLst>
-            <pc:docMk/>
-            <pc:sldMk cId="2676893550" sldId="263"/>
-            <ac:picMk id="5" creationId="{E93F567E-8717-EC59-935B-2ADCDAB9122B}"/>
-          </ac:picMkLst>
-        </pc:picChg>
-        <pc:picChg chg="add mod modCrop">
-          <ac:chgData name="ROEBUCK WILLIAMS RHOSLYN" userId="19c0e951-307b-46f9-a42c-f83c2dbad1d6" providerId="ADAL" clId="{9539E4F2-C474-48D6-B56C-A71574028F87}" dt="2024-08-05T14:35:01.215" v="4912" actId="1076"/>
-          <ac:picMkLst>
-            <pc:docMk/>
-            <pc:sldMk cId="2676893550" sldId="263"/>
-            <ac:picMk id="8" creationId="{7F0311CE-9841-8D7B-B7CD-A4B43A4080BC}"/>
-          </ac:picMkLst>
-        </pc:picChg>
-        <pc:picChg chg="add mod modCrop">
-          <ac:chgData name="ROEBUCK WILLIAMS RHOSLYN" userId="19c0e951-307b-46f9-a42c-f83c2dbad1d6" providerId="ADAL" clId="{9539E4F2-C474-48D6-B56C-A71574028F87}" dt="2024-08-05T14:35:15.529" v="4920" actId="732"/>
-          <ac:picMkLst>
-            <pc:docMk/>
-            <pc:sldMk cId="2676893550" sldId="263"/>
-            <ac:picMk id="27" creationId="{8EAEE66D-8E22-0044-E609-7970E632BF20}"/>
-          </ac:picMkLst>
-        </pc:picChg>
-        <pc:picChg chg="add mod">
-          <ac:chgData name="ROEBUCK WILLIAMS RHOSLYN" userId="19c0e951-307b-46f9-a42c-f83c2dbad1d6" providerId="ADAL" clId="{9539E4F2-C474-48D6-B56C-A71574028F87}" dt="2024-08-05T11:40:58.779" v="4858" actId="1076"/>
-          <ac:picMkLst>
-            <pc:docMk/>
-            <pc:sldMk cId="2676893550" sldId="263"/>
-            <ac:picMk id="28" creationId="{883E1A98-ABC3-47D2-BC09-0EE2F3747C93}"/>
-          </ac:picMkLst>
-        </pc:picChg>
-        <pc:picChg chg="add mod modCrop">
-          <ac:chgData name="ROEBUCK WILLIAMS RHOSLYN" userId="19c0e951-307b-46f9-a42c-f83c2dbad1d6" providerId="ADAL" clId="{9539E4F2-C474-48D6-B56C-A71574028F87}" dt="2024-08-05T14:56:49.157" v="4927" actId="732"/>
-          <ac:picMkLst>
-            <pc:docMk/>
-            <pc:sldMk cId="2676893550" sldId="263"/>
-            <ac:picMk id="29" creationId="{623BF1B8-F9C6-5A40-996E-4CCCCC11FF9C}"/>
-          </ac:picMkLst>
-        </pc:picChg>
-        <pc:picChg chg="add mod">
-          <ac:chgData name="ROEBUCK WILLIAMS RHOSLYN" userId="19c0e951-307b-46f9-a42c-f83c2dbad1d6" providerId="ADAL" clId="{9539E4F2-C474-48D6-B56C-A71574028F87}" dt="2024-08-05T11:38:51.108" v="4726" actId="1076"/>
-          <ac:picMkLst>
-            <pc:docMk/>
-            <pc:sldMk cId="2676893550" sldId="263"/>
-            <ac:picMk id="30" creationId="{80766357-3B97-AF21-B22A-54AEE5C5D93F}"/>
-          </ac:picMkLst>
-        </pc:picChg>
-        <pc:picChg chg="add mod">
-          <ac:chgData name="ROEBUCK WILLIAMS RHOSLYN" userId="19c0e951-307b-46f9-a42c-f83c2dbad1d6" providerId="ADAL" clId="{9539E4F2-C474-48D6-B56C-A71574028F87}" dt="2024-08-05T11:38:51.108" v="4726" actId="1076"/>
-          <ac:picMkLst>
-            <pc:docMk/>
-            <pc:sldMk cId="2676893550" sldId="263"/>
-            <ac:picMk id="32" creationId="{76B58336-0005-B29A-D9C1-4CCCF13BDD65}"/>
-          </ac:picMkLst>
-        </pc:picChg>
-        <pc:cxnChg chg="add mod">
-          <ac:chgData name="ROEBUCK WILLIAMS RHOSLYN" userId="19c0e951-307b-46f9-a42c-f83c2dbad1d6" providerId="ADAL" clId="{9539E4F2-C474-48D6-B56C-A71574028F87}" dt="2024-08-05T11:40:48.357" v="4855" actId="14100"/>
-          <ac:cxnSpMkLst>
-            <pc:docMk/>
-            <pc:sldMk cId="2676893550" sldId="263"/>
-            <ac:cxnSpMk id="45" creationId="{D646AB34-2024-5F47-5BB5-090F27E60CF3}"/>
-          </ac:cxnSpMkLst>
-        </pc:cxnChg>
-        <pc:cxnChg chg="add mod">
-          <ac:chgData name="ROEBUCK WILLIAMS RHOSLYN" userId="19c0e951-307b-46f9-a42c-f83c2dbad1d6" providerId="ADAL" clId="{9539E4F2-C474-48D6-B56C-A71574028F87}" dt="2024-08-05T11:40:53.163" v="4857" actId="14100"/>
-          <ac:cxnSpMkLst>
-            <pc:docMk/>
-            <pc:sldMk cId="2676893550" sldId="263"/>
-            <ac:cxnSpMk id="47" creationId="{55C9C976-3751-C3C5-C979-8969D443B41F}"/>
-          </ac:cxnSpMkLst>
-        </pc:cxnChg>
-        <pc:cxnChg chg="add mod">
-          <ac:chgData name="ROEBUCK WILLIAMS RHOSLYN" userId="19c0e951-307b-46f9-a42c-f83c2dbad1d6" providerId="ADAL" clId="{9539E4F2-C474-48D6-B56C-A71574028F87}" dt="2024-08-05T11:38:36.043" v="4724" actId="1076"/>
-          <ac:cxnSpMkLst>
-            <pc:docMk/>
-            <pc:sldMk cId="2676893550" sldId="263"/>
-            <ac:cxnSpMk id="50" creationId="{628EC9C4-2EF7-1F6D-2A9B-942679A3F1A3}"/>
-          </ac:cxnSpMkLst>
-        </pc:cxnChg>
-        <pc:cxnChg chg="add mod">
-          <ac:chgData name="ROEBUCK WILLIAMS RHOSLYN" userId="19c0e951-307b-46f9-a42c-f83c2dbad1d6" providerId="ADAL" clId="{9539E4F2-C474-48D6-B56C-A71574028F87}" dt="2024-08-05T11:39:27.587" v="4741" actId="1076"/>
-          <ac:cxnSpMkLst>
-            <pc:docMk/>
-            <pc:sldMk cId="2676893550" sldId="263"/>
-            <ac:cxnSpMk id="51" creationId="{9D90C76E-AAE3-1A13-9DEE-C3012EA5E9FB}"/>
-          </ac:cxnSpMkLst>
-        </pc:cxnChg>
-        <pc:cxnChg chg="add mod">
-          <ac:chgData name="ROEBUCK WILLIAMS RHOSLYN" userId="19c0e951-307b-46f9-a42c-f83c2dbad1d6" providerId="ADAL" clId="{9539E4F2-C474-48D6-B56C-A71574028F87}" dt="2024-08-05T11:38:51.108" v="4726" actId="1076"/>
-          <ac:cxnSpMkLst>
-            <pc:docMk/>
-            <pc:sldMk cId="2676893550" sldId="263"/>
-            <ac:cxnSpMk id="52" creationId="{25C87051-6B1F-1E9F-597C-BB991529D79E}"/>
-          </ac:cxnSpMkLst>
-        </pc:cxnChg>
-        <pc:cxnChg chg="add mod">
-          <ac:chgData name="ROEBUCK WILLIAMS RHOSLYN" userId="19c0e951-307b-46f9-a42c-f83c2dbad1d6" providerId="ADAL" clId="{9539E4F2-C474-48D6-B56C-A71574028F87}" dt="2024-08-05T11:41:56.251" v="4875" actId="1076"/>
-          <ac:cxnSpMkLst>
-            <pc:docMk/>
-            <pc:sldMk cId="2676893550" sldId="263"/>
-            <ac:cxnSpMk id="71" creationId="{B2395FF4-4C07-F9D7-5A5D-6A3DDD00CE33}"/>
-          </ac:cxnSpMkLst>
-        </pc:cxnChg>
-        <pc:cxnChg chg="add mod">
-          <ac:chgData name="ROEBUCK WILLIAMS RHOSLYN" userId="19c0e951-307b-46f9-a42c-f83c2dbad1d6" providerId="ADAL" clId="{9539E4F2-C474-48D6-B56C-A71574028F87}" dt="2024-08-05T11:41:56.251" v="4875" actId="1076"/>
-          <ac:cxnSpMkLst>
-            <pc:docMk/>
-            <pc:sldMk cId="2676893550" sldId="263"/>
-            <ac:cxnSpMk id="72" creationId="{49F8ABA7-EEB3-AC1F-A146-C5FD67C1D64C}"/>
-          </ac:cxnSpMkLst>
-        </pc:cxnChg>
-        <pc:cxnChg chg="add mod">
-          <ac:chgData name="ROEBUCK WILLIAMS RHOSLYN" userId="19c0e951-307b-46f9-a42c-f83c2dbad1d6" providerId="ADAL" clId="{9539E4F2-C474-48D6-B56C-A71574028F87}" dt="2024-08-05T11:41:56.251" v="4875" actId="1076"/>
-          <ac:cxnSpMkLst>
-            <pc:docMk/>
-            <pc:sldMk cId="2676893550" sldId="263"/>
-            <ac:cxnSpMk id="73" creationId="{730ECFF9-17E1-9676-909B-72EB33CDB34F}"/>
-          </ac:cxnSpMkLst>
-        </pc:cxnChg>
-        <pc:cxnChg chg="add mod">
-          <ac:chgData name="ROEBUCK WILLIAMS RHOSLYN" userId="19c0e951-307b-46f9-a42c-f83c2dbad1d6" providerId="ADAL" clId="{9539E4F2-C474-48D6-B56C-A71574028F87}" dt="2024-08-05T11:41:56.251" v="4875" actId="1076"/>
-          <ac:cxnSpMkLst>
-            <pc:docMk/>
-            <pc:sldMk cId="2676893550" sldId="263"/>
-            <ac:cxnSpMk id="74" creationId="{93E4ADD4-3A8D-A610-30BC-E6CF8956E03E}"/>
-          </ac:cxnSpMkLst>
-        </pc:cxnChg>
-        <pc:cxnChg chg="add mod">
-          <ac:chgData name="ROEBUCK WILLIAMS RHOSLYN" userId="19c0e951-307b-46f9-a42c-f83c2dbad1d6" providerId="ADAL" clId="{9539E4F2-C474-48D6-B56C-A71574028F87}" dt="2024-08-05T11:41:56.251" v="4875" actId="1076"/>
-          <ac:cxnSpMkLst>
-            <pc:docMk/>
-            <pc:sldMk cId="2676893550" sldId="263"/>
-            <ac:cxnSpMk id="75" creationId="{49406745-520E-D0E2-6F86-87C4E811A97F}"/>
-          </ac:cxnSpMkLst>
-        </pc:cxnChg>
-        <pc:cxnChg chg="add mod">
-          <ac:chgData name="ROEBUCK WILLIAMS RHOSLYN" userId="19c0e951-307b-46f9-a42c-f83c2dbad1d6" providerId="ADAL" clId="{9539E4F2-C474-48D6-B56C-A71574028F87}" dt="2024-08-05T11:41:48.569" v="4874" actId="14100"/>
-          <ac:cxnSpMkLst>
-            <pc:docMk/>
-            <pc:sldMk cId="2676893550" sldId="263"/>
-            <ac:cxnSpMk id="76" creationId="{633FA83C-04D9-65E0-EEF0-C45A137ED53E}"/>
-          </ac:cxnSpMkLst>
-        </pc:cxnChg>
-        <pc:cxnChg chg="add mod">
-          <ac:chgData name="ROEBUCK WILLIAMS RHOSLYN" userId="19c0e951-307b-46f9-a42c-f83c2dbad1d6" providerId="ADAL" clId="{9539E4F2-C474-48D6-B56C-A71574028F87}" dt="2024-08-05T11:42:07.481" v="4879" actId="14100"/>
-          <ac:cxnSpMkLst>
-            <pc:docMk/>
-            <pc:sldMk cId="2676893550" sldId="263"/>
-            <ac:cxnSpMk id="81" creationId="{F9571BB6-F48A-855C-998F-76A3D02FC766}"/>
           </ac:cxnSpMkLst>
         </pc:cxnChg>
       </pc:sldChg>
@@ -1501,7 +524,7 @@
           <a:p>
             <a:fld id="{E198B52E-59E9-459A-8A51-6D063C146C47}" type="datetimeFigureOut">
               <a:rPr lang="en-GB" smtClean="0"/>
-              <a:t>12/08/2024</a:t>
+              <a:t>01/11/2024</a:t>
             </a:fld>
             <a:endParaRPr lang="en-GB"/>
           </a:p>
@@ -1774,6 +797,114 @@
   <p:cSld>
     <p:spTree>
       <p:nvGrpSpPr>
+        <p:cNvPr id="1" name="">
+          <a:extLst>
+            <a:ext uri="{FF2B5EF4-FFF2-40B4-BE49-F238E27FC236}">
+              <a16:creationId xmlns:a16="http://schemas.microsoft.com/office/drawing/2014/main" id="{9A60DBAE-BE04-EC35-3677-452F24D5EAC5}"/>
+            </a:ext>
+          </a:extLst>
+        </p:cNvPr>
+        <p:cNvGrpSpPr/>
+        <p:nvPr/>
+      </p:nvGrpSpPr>
+      <p:grpSpPr>
+        <a:xfrm>
+          <a:off x="0" y="0"/>
+          <a:ext cx="0" cy="0"/>
+          <a:chOff x="0" y="0"/>
+          <a:chExt cx="0" cy="0"/>
+        </a:xfrm>
+      </p:grpSpPr>
+      <p:sp>
+        <p:nvSpPr>
+          <p:cNvPr id="2" name="Slide Image Placeholder 1">
+            <a:extLst>
+              <a:ext uri="{FF2B5EF4-FFF2-40B4-BE49-F238E27FC236}">
+                <a16:creationId xmlns:a16="http://schemas.microsoft.com/office/drawing/2014/main" id="{3FC26DAA-E3E4-A35B-6DC2-C41E23BB895A}"/>
+              </a:ext>
+            </a:extLst>
+          </p:cNvPr>
+          <p:cNvSpPr>
+            <a:spLocks noGrp="1" noRot="1" noChangeAspect="1"/>
+          </p:cNvSpPr>
+          <p:nvPr>
+            <p:ph type="sldImg"/>
+          </p:nvPr>
+        </p:nvSpPr>
+        <p:spPr/>
+      </p:sp>
+      <p:sp>
+        <p:nvSpPr>
+          <p:cNvPr id="3" name="Notes Placeholder 2">
+            <a:extLst>
+              <a:ext uri="{FF2B5EF4-FFF2-40B4-BE49-F238E27FC236}">
+                <a16:creationId xmlns:a16="http://schemas.microsoft.com/office/drawing/2014/main" id="{7B92C53B-B4F9-EA70-B44D-C9977A1A554A}"/>
+              </a:ext>
+            </a:extLst>
+          </p:cNvPr>
+          <p:cNvSpPr>
+            <a:spLocks noGrp="1"/>
+          </p:cNvSpPr>
+          <p:nvPr>
+            <p:ph type="body" idx="1"/>
+          </p:nvPr>
+        </p:nvSpPr>
+        <p:spPr/>
+        <p:txBody>
+          <a:bodyPr/>
+          <a:lstStyle/>
+          <a:p>
+            <a:endParaRPr lang="en-GB" dirty="0"/>
+          </a:p>
+        </p:txBody>
+      </p:sp>
+      <p:sp>
+        <p:nvSpPr>
+          <p:cNvPr id="4" name="Slide Number Placeholder 3">
+            <a:extLst>
+              <a:ext uri="{FF2B5EF4-FFF2-40B4-BE49-F238E27FC236}">
+                <a16:creationId xmlns:a16="http://schemas.microsoft.com/office/drawing/2014/main" id="{5223BC79-5566-4F25-DD06-C866D48AF91A}"/>
+              </a:ext>
+            </a:extLst>
+          </p:cNvPr>
+          <p:cNvSpPr>
+            <a:spLocks noGrp="1"/>
+          </p:cNvSpPr>
+          <p:nvPr>
+            <p:ph type="sldNum" sz="quarter" idx="5"/>
+          </p:nvPr>
+        </p:nvSpPr>
+        <p:spPr/>
+        <p:txBody>
+          <a:bodyPr/>
+          <a:lstStyle/>
+          <a:p>
+            <a:fld id="{01581AD5-E424-434F-99BD-F8DE17F851C7}" type="slidenum">
+              <a:rPr lang="en-GB" smtClean="0"/>
+              <a:t>1</a:t>
+            </a:fld>
+            <a:endParaRPr lang="en-GB"/>
+          </a:p>
+        </p:txBody>
+      </p:sp>
+    </p:spTree>
+    <p:extLst>
+      <p:ext uri="{BB962C8B-B14F-4D97-AF65-F5344CB8AC3E}">
+        <p14:creationId xmlns:p14="http://schemas.microsoft.com/office/powerpoint/2010/main" val="4249480563"/>
+      </p:ext>
+    </p:extLst>
+  </p:cSld>
+  <p:clrMapOvr>
+    <a:masterClrMapping/>
+  </p:clrMapOvr>
+</p:notes>
+</file>
+
+<file path=ppt/notesSlides/notesSlide2.xml><?xml version="1.0" encoding="utf-8"?>
+<p:notes xmlns:a="http://schemas.openxmlformats.org/drawingml/2006/main" xmlns:r="http://schemas.openxmlformats.org/officeDocument/2006/relationships" xmlns:p="http://schemas.openxmlformats.org/presentationml/2006/main">
+  <p:cSld>
+    <p:spTree>
+      <p:nvGrpSpPr>
         <p:cNvPr id="1" name=""/>
         <p:cNvGrpSpPr/>
         <p:nvPr/>
@@ -1834,7 +965,7 @@
           <a:p>
             <a:fld id="{01581AD5-E424-434F-99BD-F8DE17F851C7}" type="slidenum">
               <a:rPr lang="en-GB" smtClean="0"/>
-              <a:t>1</a:t>
+              <a:t>3</a:t>
             </a:fld>
             <a:endParaRPr lang="en-GB"/>
           </a:p>
@@ -1984,7 +1115,7 @@
           <a:p>
             <a:fld id="{3FBAF93D-98AC-4FE3-B4B6-00701F2D46F7}" type="datetimeFigureOut">
               <a:rPr lang="en-GB" smtClean="0"/>
-              <a:t>12/08/2024</a:t>
+              <a:t>01/11/2024</a:t>
             </a:fld>
             <a:endParaRPr lang="en-GB"/>
           </a:p>
@@ -2154,7 +1285,7 @@
           <a:p>
             <a:fld id="{3FBAF93D-98AC-4FE3-B4B6-00701F2D46F7}" type="datetimeFigureOut">
               <a:rPr lang="en-GB" smtClean="0"/>
-              <a:t>12/08/2024</a:t>
+              <a:t>01/11/2024</a:t>
             </a:fld>
             <a:endParaRPr lang="en-GB"/>
           </a:p>
@@ -2334,7 +1465,7 @@
           <a:p>
             <a:fld id="{3FBAF93D-98AC-4FE3-B4B6-00701F2D46F7}" type="datetimeFigureOut">
               <a:rPr lang="en-GB" smtClean="0"/>
-              <a:t>12/08/2024</a:t>
+              <a:t>01/11/2024</a:t>
             </a:fld>
             <a:endParaRPr lang="en-GB"/>
           </a:p>
@@ -2504,7 +1635,7 @@
           <a:p>
             <a:fld id="{3FBAF93D-98AC-4FE3-B4B6-00701F2D46F7}" type="datetimeFigureOut">
               <a:rPr lang="en-GB" smtClean="0"/>
-              <a:t>12/08/2024</a:t>
+              <a:t>01/11/2024</a:t>
             </a:fld>
             <a:endParaRPr lang="en-GB"/>
           </a:p>
@@ -2750,7 +1881,7 @@
           <a:p>
             <a:fld id="{3FBAF93D-98AC-4FE3-B4B6-00701F2D46F7}" type="datetimeFigureOut">
               <a:rPr lang="en-GB" smtClean="0"/>
-              <a:t>12/08/2024</a:t>
+              <a:t>01/11/2024</a:t>
             </a:fld>
             <a:endParaRPr lang="en-GB"/>
           </a:p>
@@ -2982,7 +2113,7 @@
           <a:p>
             <a:fld id="{3FBAF93D-98AC-4FE3-B4B6-00701F2D46F7}" type="datetimeFigureOut">
               <a:rPr lang="en-GB" smtClean="0"/>
-              <a:t>12/08/2024</a:t>
+              <a:t>01/11/2024</a:t>
             </a:fld>
             <a:endParaRPr lang="en-GB"/>
           </a:p>
@@ -3349,7 +2480,7 @@
           <a:p>
             <a:fld id="{3FBAF93D-98AC-4FE3-B4B6-00701F2D46F7}" type="datetimeFigureOut">
               <a:rPr lang="en-GB" smtClean="0"/>
-              <a:t>12/08/2024</a:t>
+              <a:t>01/11/2024</a:t>
             </a:fld>
             <a:endParaRPr lang="en-GB"/>
           </a:p>
@@ -3467,7 +2598,7 @@
           <a:p>
             <a:fld id="{3FBAF93D-98AC-4FE3-B4B6-00701F2D46F7}" type="datetimeFigureOut">
               <a:rPr lang="en-GB" smtClean="0"/>
-              <a:t>12/08/2024</a:t>
+              <a:t>01/11/2024</a:t>
             </a:fld>
             <a:endParaRPr lang="en-GB"/>
           </a:p>
@@ -3562,7 +2693,7 @@
           <a:p>
             <a:fld id="{3FBAF93D-98AC-4FE3-B4B6-00701F2D46F7}" type="datetimeFigureOut">
               <a:rPr lang="en-GB" smtClean="0"/>
-              <a:t>12/08/2024</a:t>
+              <a:t>01/11/2024</a:t>
             </a:fld>
             <a:endParaRPr lang="en-GB"/>
           </a:p>
@@ -3839,7 +2970,7 @@
           <a:p>
             <a:fld id="{3FBAF93D-98AC-4FE3-B4B6-00701F2D46F7}" type="datetimeFigureOut">
               <a:rPr lang="en-GB" smtClean="0"/>
-              <a:t>12/08/2024</a:t>
+              <a:t>01/11/2024</a:t>
             </a:fld>
             <a:endParaRPr lang="en-GB"/>
           </a:p>
@@ -4096,7 +3227,7 @@
           <a:p>
             <a:fld id="{3FBAF93D-98AC-4FE3-B4B6-00701F2D46F7}" type="datetimeFigureOut">
               <a:rPr lang="en-GB" smtClean="0"/>
-              <a:t>12/08/2024</a:t>
+              <a:t>01/11/2024</a:t>
             </a:fld>
             <a:endParaRPr lang="en-GB"/>
           </a:p>
@@ -4309,7 +3440,7 @@
           <a:p>
             <a:fld id="{3FBAF93D-98AC-4FE3-B4B6-00701F2D46F7}" type="datetimeFigureOut">
               <a:rPr lang="en-GB" smtClean="0"/>
-              <a:t>12/08/2024</a:t>
+              <a:t>01/11/2024</a:t>
             </a:fld>
             <a:endParaRPr lang="en-GB"/>
           </a:p>
@@ -4702,7 +3833,13 @@
   <p:cSld>
     <p:spTree>
       <p:nvGrpSpPr>
-        <p:cNvPr id="1" name=""/>
+        <p:cNvPr id="1" name="">
+          <a:extLst>
+            <a:ext uri="{FF2B5EF4-FFF2-40B4-BE49-F238E27FC236}">
+              <a16:creationId xmlns:a16="http://schemas.microsoft.com/office/drawing/2014/main" id="{F5F4711A-F49F-54B0-5EF6-45217BB4E1FF}"/>
+            </a:ext>
+          </a:extLst>
+        </p:cNvPr>
         <p:cNvGrpSpPr/>
         <p:nvPr/>
       </p:nvGrpSpPr>
@@ -4719,7 +3856,7 @@
           <p:cNvPr id="4" name="Rectangle 3">
             <a:extLst>
               <a:ext uri="{FF2B5EF4-FFF2-40B4-BE49-F238E27FC236}">
-                <a16:creationId xmlns:a16="http://schemas.microsoft.com/office/drawing/2014/main" id="{22887272-8CFA-BF44-CACD-537694360768}"/>
+                <a16:creationId xmlns:a16="http://schemas.microsoft.com/office/drawing/2014/main" id="{A2FAD702-8DD7-A37A-3ED0-A82F441A6E58}"/>
               </a:ext>
             </a:extLst>
           </p:cNvPr>
@@ -4793,7 +3930,7 @@
           <p:cNvPr id="5" name="Rectangle 4">
             <a:extLst>
               <a:ext uri="{FF2B5EF4-FFF2-40B4-BE49-F238E27FC236}">
-                <a16:creationId xmlns:a16="http://schemas.microsoft.com/office/drawing/2014/main" id="{346FBF56-A7DF-4167-FC34-8C7AAEEE9647}"/>
+                <a16:creationId xmlns:a16="http://schemas.microsoft.com/office/drawing/2014/main" id="{7CE8EFDC-AF70-645A-8B22-E4E90BFC9B3B}"/>
               </a:ext>
             </a:extLst>
           </p:cNvPr>
@@ -4867,7 +4004,7 @@
           <p:cNvPr id="9" name="TextBox 8">
             <a:extLst>
               <a:ext uri="{FF2B5EF4-FFF2-40B4-BE49-F238E27FC236}">
-                <a16:creationId xmlns:a16="http://schemas.microsoft.com/office/drawing/2014/main" id="{1B919D91-FC0C-7368-90E2-67BC1C60183D}"/>
+                <a16:creationId xmlns:a16="http://schemas.microsoft.com/office/drawing/2014/main" id="{D8A1B8CA-51D1-3C90-7BD8-3F765925E2E8}"/>
               </a:ext>
             </a:extLst>
           </p:cNvPr>
@@ -4903,7 +4040,7 @@
           <p:cNvPr id="12" name="Straight Arrow Connector 11">
             <a:extLst>
               <a:ext uri="{FF2B5EF4-FFF2-40B4-BE49-F238E27FC236}">
-                <a16:creationId xmlns:a16="http://schemas.microsoft.com/office/drawing/2014/main" id="{926B9899-69C1-DC20-8EAB-50BDC2C23273}"/>
+                <a16:creationId xmlns:a16="http://schemas.microsoft.com/office/drawing/2014/main" id="{E9947C11-89C9-617D-1395-69BE03F64A4D}"/>
               </a:ext>
             </a:extLst>
           </p:cNvPr>
@@ -4915,9 +4052,9 @@
           <p:nvPr/>
         </p:nvCxnSpPr>
         <p:spPr>
-          <a:xfrm>
-            <a:off x="3673878" y="5984281"/>
-            <a:ext cx="2632768" cy="2722"/>
+          <a:xfrm flipV="1">
+            <a:off x="3673878" y="5978826"/>
+            <a:ext cx="2632768" cy="5455"/>
           </a:xfrm>
           <a:prstGeom prst="straightConnector1">
             <a:avLst/>
@@ -4947,7 +4084,7 @@
           <p:cNvPr id="15" name="Rectangle 14">
             <a:extLst>
               <a:ext uri="{FF2B5EF4-FFF2-40B4-BE49-F238E27FC236}">
-                <a16:creationId xmlns:a16="http://schemas.microsoft.com/office/drawing/2014/main" id="{1EAFDDEE-0E21-A708-736B-D49DE6669369}"/>
+                <a16:creationId xmlns:a16="http://schemas.microsoft.com/office/drawing/2014/main" id="{55B72C93-E32A-3D96-9BE1-7ED2791C9484}"/>
               </a:ext>
             </a:extLst>
           </p:cNvPr>
@@ -5021,7 +4158,7 @@
           <p:cNvPr id="16" name="Straight Arrow Connector 15">
             <a:extLst>
               <a:ext uri="{FF2B5EF4-FFF2-40B4-BE49-F238E27FC236}">
-                <a16:creationId xmlns:a16="http://schemas.microsoft.com/office/drawing/2014/main" id="{235209DE-3AC7-AEA2-ED89-4975A1C0D3D4}"/>
+                <a16:creationId xmlns:a16="http://schemas.microsoft.com/office/drawing/2014/main" id="{9CDF47D4-E647-B8D3-0FEF-B8587CA5075F}"/>
               </a:ext>
             </a:extLst>
           </p:cNvPr>
@@ -5065,7 +4202,7 @@
           <p:cNvPr id="19" name="Rectangle 18">
             <a:extLst>
               <a:ext uri="{FF2B5EF4-FFF2-40B4-BE49-F238E27FC236}">
-                <a16:creationId xmlns:a16="http://schemas.microsoft.com/office/drawing/2014/main" id="{D2A92E3D-448A-A5B8-E6F4-384524ED1057}"/>
+                <a16:creationId xmlns:a16="http://schemas.microsoft.com/office/drawing/2014/main" id="{584C948F-3175-6CD7-B771-F31566E7BFCD}"/>
               </a:ext>
             </a:extLst>
           </p:cNvPr>
@@ -5140,7 +4277,7 @@
           <p:cNvPr id="24" name="TextBox 23">
             <a:extLst>
               <a:ext uri="{FF2B5EF4-FFF2-40B4-BE49-F238E27FC236}">
-                <a16:creationId xmlns:a16="http://schemas.microsoft.com/office/drawing/2014/main" id="{0A510DB6-C573-9104-CAAB-0035485EEB71}"/>
+                <a16:creationId xmlns:a16="http://schemas.microsoft.com/office/drawing/2014/main" id="{D0713938-E086-EA75-0F22-9FFB35C94E61}"/>
               </a:ext>
             </a:extLst>
           </p:cNvPr>
@@ -5185,7 +4322,7 @@
           <p:cNvPr id="26" name="Straight Arrow Connector 25">
             <a:extLst>
               <a:ext uri="{FF2B5EF4-FFF2-40B4-BE49-F238E27FC236}">
-                <a16:creationId xmlns:a16="http://schemas.microsoft.com/office/drawing/2014/main" id="{B4679F37-C6D4-6A1D-0567-7B9D67A33907}"/>
+                <a16:creationId xmlns:a16="http://schemas.microsoft.com/office/drawing/2014/main" id="{D5012E44-10FC-E095-69D2-A88C43EF1FBB}"/>
               </a:ext>
             </a:extLst>
           </p:cNvPr>
@@ -5229,7 +4366,7 @@
           <p:cNvPr id="29" name="TextBox 28">
             <a:extLst>
               <a:ext uri="{FF2B5EF4-FFF2-40B4-BE49-F238E27FC236}">
-                <a16:creationId xmlns:a16="http://schemas.microsoft.com/office/drawing/2014/main" id="{4D859BB7-BEE1-CF6A-BF53-B561B421A0BD}"/>
+                <a16:creationId xmlns:a16="http://schemas.microsoft.com/office/drawing/2014/main" id="{21C2B675-6EB8-254F-1E47-F62C60390582}"/>
               </a:ext>
             </a:extLst>
           </p:cNvPr>
@@ -5264,7 +4401,7 @@
           <p:cNvPr id="38" name="TextBox 37">
             <a:extLst>
               <a:ext uri="{FF2B5EF4-FFF2-40B4-BE49-F238E27FC236}">
-                <a16:creationId xmlns:a16="http://schemas.microsoft.com/office/drawing/2014/main" id="{50AD24AF-4564-D938-2BE1-3F69D5C62F17}"/>
+                <a16:creationId xmlns:a16="http://schemas.microsoft.com/office/drawing/2014/main" id="{79D96338-8637-2174-9D22-3340B13DBF76}"/>
               </a:ext>
             </a:extLst>
           </p:cNvPr>
@@ -5310,7 +4447,7 @@
           <p:cNvPr id="40" name="TextBox 39">
             <a:extLst>
               <a:ext uri="{FF2B5EF4-FFF2-40B4-BE49-F238E27FC236}">
-                <a16:creationId xmlns:a16="http://schemas.microsoft.com/office/drawing/2014/main" id="{026E36F0-35D8-4E3A-EE82-977CCCA6EB0F}"/>
+                <a16:creationId xmlns:a16="http://schemas.microsoft.com/office/drawing/2014/main" id="{01A9FA33-334D-E559-397F-2099F3B668DC}"/>
               </a:ext>
             </a:extLst>
           </p:cNvPr>
@@ -5353,7 +4490,7 @@
           <p:cNvPr id="42" name="Rectangle 41">
             <a:extLst>
               <a:ext uri="{FF2B5EF4-FFF2-40B4-BE49-F238E27FC236}">
-                <a16:creationId xmlns:a16="http://schemas.microsoft.com/office/drawing/2014/main" id="{A14A1D4B-5AA1-522A-397C-D1964657C751}"/>
+                <a16:creationId xmlns:a16="http://schemas.microsoft.com/office/drawing/2014/main" id="{2C44848B-8CCB-0FD0-82B6-5793FB8EDDFF}"/>
               </a:ext>
             </a:extLst>
           </p:cNvPr>
@@ -5474,7 +4611,7 @@
           <p:cNvPr id="44" name="TextBox 43">
             <a:extLst>
               <a:ext uri="{FF2B5EF4-FFF2-40B4-BE49-F238E27FC236}">
-                <a16:creationId xmlns:a16="http://schemas.microsoft.com/office/drawing/2014/main" id="{9A2DFD34-E640-EEAD-3436-DD63DC7A9817}"/>
+                <a16:creationId xmlns:a16="http://schemas.microsoft.com/office/drawing/2014/main" id="{4715A73C-FCFD-7450-B019-55EA79F7C8A9}"/>
               </a:ext>
             </a:extLst>
           </p:cNvPr>
@@ -5509,7 +4646,7 @@
           <p:cNvPr id="52" name="Rectangle 51">
             <a:extLst>
               <a:ext uri="{FF2B5EF4-FFF2-40B4-BE49-F238E27FC236}">
-                <a16:creationId xmlns:a16="http://schemas.microsoft.com/office/drawing/2014/main" id="{0FC5A7EE-B148-0368-C995-579A86B17CD8}"/>
+                <a16:creationId xmlns:a16="http://schemas.microsoft.com/office/drawing/2014/main" id="{A9F42814-BA83-FC20-C818-545BF4150D3A}"/>
               </a:ext>
             </a:extLst>
           </p:cNvPr>
@@ -5583,7 +4720,7 @@
           <p:cNvPr id="53" name="Straight Arrow Connector 52">
             <a:extLst>
               <a:ext uri="{FF2B5EF4-FFF2-40B4-BE49-F238E27FC236}">
-                <a16:creationId xmlns:a16="http://schemas.microsoft.com/office/drawing/2014/main" id="{C54EEBD3-28EB-9784-419E-34A411BC041E}"/>
+                <a16:creationId xmlns:a16="http://schemas.microsoft.com/office/drawing/2014/main" id="{FF98F939-3778-C647-30CA-D55FDAD22C50}"/>
               </a:ext>
             </a:extLst>
           </p:cNvPr>
@@ -5627,7 +4764,7 @@
           <p:cNvPr id="56" name="TextBox 55">
             <a:extLst>
               <a:ext uri="{FF2B5EF4-FFF2-40B4-BE49-F238E27FC236}">
-                <a16:creationId xmlns:a16="http://schemas.microsoft.com/office/drawing/2014/main" id="{9398C94E-A74A-D10C-095D-9AE7266F22CC}"/>
+                <a16:creationId xmlns:a16="http://schemas.microsoft.com/office/drawing/2014/main" id="{2DC2420B-077E-DD07-3FAC-507EBC2E6892}"/>
               </a:ext>
             </a:extLst>
           </p:cNvPr>
@@ -5662,7 +4799,7 @@
           <p:cNvPr id="57" name="Straight Arrow Connector 56">
             <a:extLst>
               <a:ext uri="{FF2B5EF4-FFF2-40B4-BE49-F238E27FC236}">
-                <a16:creationId xmlns:a16="http://schemas.microsoft.com/office/drawing/2014/main" id="{C2C88BF7-142B-C3FC-489F-7EEDAA2ED7A9}"/>
+                <a16:creationId xmlns:a16="http://schemas.microsoft.com/office/drawing/2014/main" id="{6D412D88-B13A-82C7-8E5F-224111B6AA86}"/>
               </a:ext>
             </a:extLst>
           </p:cNvPr>
@@ -5706,7 +4843,7 @@
           <p:cNvPr id="61" name="Rectangle 60">
             <a:extLst>
               <a:ext uri="{FF2B5EF4-FFF2-40B4-BE49-F238E27FC236}">
-                <a16:creationId xmlns:a16="http://schemas.microsoft.com/office/drawing/2014/main" id="{340C4477-8A90-8A8C-65B7-202314C3ABCC}"/>
+                <a16:creationId xmlns:a16="http://schemas.microsoft.com/office/drawing/2014/main" id="{00F965A2-4698-D65C-2B1F-3601FDCBF34D}"/>
               </a:ext>
             </a:extLst>
           </p:cNvPr>
@@ -5815,7 +4952,7 @@
           <p:cNvPr id="64" name="TextBox 63">
             <a:extLst>
               <a:ext uri="{FF2B5EF4-FFF2-40B4-BE49-F238E27FC236}">
-                <a16:creationId xmlns:a16="http://schemas.microsoft.com/office/drawing/2014/main" id="{F1DB31A6-A394-9581-35E2-1B45D8C8135E}"/>
+                <a16:creationId xmlns:a16="http://schemas.microsoft.com/office/drawing/2014/main" id="{E7DA87D9-7353-A367-0573-09BE9672AE94}"/>
               </a:ext>
             </a:extLst>
           </p:cNvPr>
@@ -5859,7 +4996,7 @@
           <p:cNvPr id="214" name="Connector: Elbow 213">
             <a:extLst>
               <a:ext uri="{FF2B5EF4-FFF2-40B4-BE49-F238E27FC236}">
-                <a16:creationId xmlns:a16="http://schemas.microsoft.com/office/drawing/2014/main" id="{23F45CB1-F915-2592-A1C7-9FD48B78FDD7}"/>
+                <a16:creationId xmlns:a16="http://schemas.microsoft.com/office/drawing/2014/main" id="{8915FEFC-CA70-F387-533F-0C8D5A8498EA}"/>
               </a:ext>
             </a:extLst>
           </p:cNvPr>
@@ -5903,7 +5040,7 @@
           <p:cNvPr id="242" name="Connector: Elbow 241">
             <a:extLst>
               <a:ext uri="{FF2B5EF4-FFF2-40B4-BE49-F238E27FC236}">
-                <a16:creationId xmlns:a16="http://schemas.microsoft.com/office/drawing/2014/main" id="{41120B5F-F708-A6F2-F648-80267F4FED55}"/>
+                <a16:creationId xmlns:a16="http://schemas.microsoft.com/office/drawing/2014/main" id="{0F449B89-EC22-6C06-2851-24D2ED0F59EA}"/>
               </a:ext>
             </a:extLst>
           </p:cNvPr>
@@ -5947,7 +5084,7 @@
           <p:cNvPr id="271" name="Rectangle 270">
             <a:extLst>
               <a:ext uri="{FF2B5EF4-FFF2-40B4-BE49-F238E27FC236}">
-                <a16:creationId xmlns:a16="http://schemas.microsoft.com/office/drawing/2014/main" id="{9731557B-6A8D-ECE3-CBF2-FAF304D57E5B}"/>
+                <a16:creationId xmlns:a16="http://schemas.microsoft.com/office/drawing/2014/main" id="{EFDFD7D8-A683-BDA2-6299-5DB0307AC51F}"/>
               </a:ext>
             </a:extLst>
           </p:cNvPr>
@@ -6013,7 +5150,7 @@
           <p:cNvPr id="277" name="Rectangle 276">
             <a:extLst>
               <a:ext uri="{FF2B5EF4-FFF2-40B4-BE49-F238E27FC236}">
-                <a16:creationId xmlns:a16="http://schemas.microsoft.com/office/drawing/2014/main" id="{3115CC88-6263-38C2-0D3E-003BDACFE043}"/>
+                <a16:creationId xmlns:a16="http://schemas.microsoft.com/office/drawing/2014/main" id="{054B4518-B4E6-0287-E41E-BCFD01E3E6D9}"/>
               </a:ext>
             </a:extLst>
           </p:cNvPr>
@@ -6103,7 +5240,7 @@
           <p:cNvPr id="305" name="Rectangle 304">
             <a:extLst>
               <a:ext uri="{FF2B5EF4-FFF2-40B4-BE49-F238E27FC236}">
-                <a16:creationId xmlns:a16="http://schemas.microsoft.com/office/drawing/2014/main" id="{E93FBCF3-1541-0A07-BEC4-E6C4601835E9}"/>
+                <a16:creationId xmlns:a16="http://schemas.microsoft.com/office/drawing/2014/main" id="{37186F6D-EA23-AC06-B48C-CF71E21CC18F}"/>
               </a:ext>
             </a:extLst>
           </p:cNvPr>
@@ -6177,7 +5314,7 @@
           <p:cNvPr id="314" name="Rectangle 313">
             <a:extLst>
               <a:ext uri="{FF2B5EF4-FFF2-40B4-BE49-F238E27FC236}">
-                <a16:creationId xmlns:a16="http://schemas.microsoft.com/office/drawing/2014/main" id="{6FF04236-50E5-8739-1895-3CA914FEB9DF}"/>
+                <a16:creationId xmlns:a16="http://schemas.microsoft.com/office/drawing/2014/main" id="{4ABE8EE9-4D34-8761-817F-837E91450588}"/>
               </a:ext>
             </a:extLst>
           </p:cNvPr>
@@ -6186,8 +5323,8 @@
         </p:nvSpPr>
         <p:spPr>
           <a:xfrm>
-            <a:off x="6306646" y="5488515"/>
-            <a:ext cx="2436388" cy="996976"/>
+            <a:off x="6306646" y="5156346"/>
+            <a:ext cx="2436388" cy="1644960"/>
           </a:xfrm>
           <a:prstGeom prst="rect">
             <a:avLst/>
@@ -6225,7 +5362,7 @@
                   <a:schemeClr val="tx1"/>
                 </a:solidFill>
               </a:rPr>
-              <a:t>You will need to use a </a:t>
+              <a:t>You will need to use a cable to connect your VR headset to your computer, see </a:t>
             </a:r>
             <a:r>
               <a:rPr lang="en-GB" sz="2000" b="1" dirty="0">
@@ -6233,7 +5370,7 @@
                   <a:schemeClr val="tx1"/>
                 </a:solidFill>
               </a:rPr>
-              <a:t>tethered </a:t>
+              <a:t>tethered</a:t>
             </a:r>
             <a:r>
               <a:rPr lang="en-GB" sz="2000" dirty="0">
@@ -6241,7 +5378,7 @@
                   <a:schemeClr val="tx1"/>
                 </a:solidFill>
               </a:rPr>
-              <a:t>setup.</a:t>
+              <a:t> setup.</a:t>
             </a:r>
           </a:p>
         </p:txBody>
@@ -6251,7 +5388,7 @@
           <p:cNvPr id="320" name="Straight Arrow Connector 319">
             <a:extLst>
               <a:ext uri="{FF2B5EF4-FFF2-40B4-BE49-F238E27FC236}">
-                <a16:creationId xmlns:a16="http://schemas.microsoft.com/office/drawing/2014/main" id="{B010DB81-FF87-6096-9227-5030260B4C51}"/>
+                <a16:creationId xmlns:a16="http://schemas.microsoft.com/office/drawing/2014/main" id="{4082EBAF-97DE-51D0-B32D-BFB60A659864}"/>
               </a:ext>
             </a:extLst>
           </p:cNvPr>
@@ -6264,8 +5401,8 @@
         </p:nvCxnSpPr>
         <p:spPr>
           <a:xfrm flipH="1">
-            <a:off x="7521504" y="6485491"/>
-            <a:ext cx="3336" cy="4291261"/>
+            <a:off x="7521504" y="6801306"/>
+            <a:ext cx="3336" cy="3975446"/>
           </a:xfrm>
           <a:prstGeom prst="straightConnector1">
             <a:avLst/>
@@ -6295,7 +5432,7 @@
           <p:cNvPr id="324" name="Rectangle 323">
             <a:extLst>
               <a:ext uri="{FF2B5EF4-FFF2-40B4-BE49-F238E27FC236}">
-                <a16:creationId xmlns:a16="http://schemas.microsoft.com/office/drawing/2014/main" id="{6A00F52B-C080-2BFF-9C5D-566A00C0B6BD}"/>
+                <a16:creationId xmlns:a16="http://schemas.microsoft.com/office/drawing/2014/main" id="{8B7A30EB-4E2C-0232-AB53-D2D1AA4C927A}"/>
               </a:ext>
             </a:extLst>
           </p:cNvPr>
@@ -6369,7 +5506,7 @@
           <p:cNvPr id="329" name="Rectangle 328">
             <a:extLst>
               <a:ext uri="{FF2B5EF4-FFF2-40B4-BE49-F238E27FC236}">
-                <a16:creationId xmlns:a16="http://schemas.microsoft.com/office/drawing/2014/main" id="{CAB42C7C-D886-2F51-799D-9AE8A4A3E3CA}"/>
+                <a16:creationId xmlns:a16="http://schemas.microsoft.com/office/drawing/2014/main" id="{5B436087-E31E-E23C-F799-5BCFC6A70BEB}"/>
               </a:ext>
             </a:extLst>
           </p:cNvPr>
@@ -6443,7 +5580,7 @@
           <p:cNvPr id="330" name="Straight Arrow Connector 329">
             <a:extLst>
               <a:ext uri="{FF2B5EF4-FFF2-40B4-BE49-F238E27FC236}">
-                <a16:creationId xmlns:a16="http://schemas.microsoft.com/office/drawing/2014/main" id="{893746EB-0D3E-1251-F62D-B34FFC6F5154}"/>
+                <a16:creationId xmlns:a16="http://schemas.microsoft.com/office/drawing/2014/main" id="{0E92A7F7-7B0A-2D55-5955-98EAA33B77F6}"/>
               </a:ext>
             </a:extLst>
           </p:cNvPr>
@@ -6487,7 +5624,7 @@
           <p:cNvPr id="334" name="TextBox 333">
             <a:extLst>
               <a:ext uri="{FF2B5EF4-FFF2-40B4-BE49-F238E27FC236}">
-                <a16:creationId xmlns:a16="http://schemas.microsoft.com/office/drawing/2014/main" id="{69E8B08F-6DCC-96A9-0430-EFAF16983513}"/>
+                <a16:creationId xmlns:a16="http://schemas.microsoft.com/office/drawing/2014/main" id="{2D9BE690-229C-4FD7-EE40-B9522A8FD700}"/>
               </a:ext>
             </a:extLst>
           </p:cNvPr>
@@ -6523,7 +5660,7 @@
           <p:cNvPr id="338" name="TextBox 337">
             <a:extLst>
               <a:ext uri="{FF2B5EF4-FFF2-40B4-BE49-F238E27FC236}">
-                <a16:creationId xmlns:a16="http://schemas.microsoft.com/office/drawing/2014/main" id="{AF7A6573-2EB0-85AC-1396-5C156AEBC5D4}"/>
+                <a16:creationId xmlns:a16="http://schemas.microsoft.com/office/drawing/2014/main" id="{7936CC4F-0E31-81CA-7154-1A0F59097619}"/>
               </a:ext>
             </a:extLst>
           </p:cNvPr>
@@ -6559,7 +5696,7 @@
           <p:cNvPr id="352" name="Straight Arrow Connector 351">
             <a:extLst>
               <a:ext uri="{FF2B5EF4-FFF2-40B4-BE49-F238E27FC236}">
-                <a16:creationId xmlns:a16="http://schemas.microsoft.com/office/drawing/2014/main" id="{FD7702DC-CEB3-F428-AC58-7631036208F5}"/>
+                <a16:creationId xmlns:a16="http://schemas.microsoft.com/office/drawing/2014/main" id="{2D87CCDF-2114-179A-6FBF-4C0D60B8CD5A}"/>
               </a:ext>
             </a:extLst>
           </p:cNvPr>
@@ -6603,7 +5740,7 @@
           <p:cNvPr id="363" name="Rectangle 362">
             <a:extLst>
               <a:ext uri="{FF2B5EF4-FFF2-40B4-BE49-F238E27FC236}">
-                <a16:creationId xmlns:a16="http://schemas.microsoft.com/office/drawing/2014/main" id="{33B453C8-38F8-3B27-667B-C8A99434E2AD}"/>
+                <a16:creationId xmlns:a16="http://schemas.microsoft.com/office/drawing/2014/main" id="{3FCABCA6-B23A-47BA-509B-5D47655E682F}"/>
               </a:ext>
             </a:extLst>
           </p:cNvPr>
@@ -6816,7 +5953,7 @@
           <p:cNvPr id="366" name="Straight Arrow Connector 365">
             <a:extLst>
               <a:ext uri="{FF2B5EF4-FFF2-40B4-BE49-F238E27FC236}">
-                <a16:creationId xmlns:a16="http://schemas.microsoft.com/office/drawing/2014/main" id="{01456621-189B-690B-2D6C-43CD380F59E4}"/>
+                <a16:creationId xmlns:a16="http://schemas.microsoft.com/office/drawing/2014/main" id="{35082CC1-0216-3C16-EAB7-F23A16C2CB6C}"/>
               </a:ext>
             </a:extLst>
           </p:cNvPr>
@@ -6860,7 +5997,7 @@
           <p:cNvPr id="370" name="Content Placeholder 2">
             <a:extLst>
               <a:ext uri="{FF2B5EF4-FFF2-40B4-BE49-F238E27FC236}">
-                <a16:creationId xmlns:a16="http://schemas.microsoft.com/office/drawing/2014/main" id="{1E6C3132-5A2F-96A7-98D0-8FCF4269FB45}"/>
+                <a16:creationId xmlns:a16="http://schemas.microsoft.com/office/drawing/2014/main" id="{2468CD57-6ABB-E6A0-F4E1-75AF0C420360}"/>
               </a:ext>
             </a:extLst>
           </p:cNvPr>
@@ -7007,7 +6144,7 @@
           <p:cNvPr id="371" name="TextBox 370">
             <a:extLst>
               <a:ext uri="{FF2B5EF4-FFF2-40B4-BE49-F238E27FC236}">
-                <a16:creationId xmlns:a16="http://schemas.microsoft.com/office/drawing/2014/main" id="{A79CC35C-7554-7426-B927-FF1CD8F0DFAA}"/>
+                <a16:creationId xmlns:a16="http://schemas.microsoft.com/office/drawing/2014/main" id="{E48CC2C6-AA99-29A0-6C4E-49FF890CFBB4}"/>
               </a:ext>
             </a:extLst>
           </p:cNvPr>
@@ -7043,7 +6180,7 @@
           <p:cNvPr id="385" name="TextBox 384">
             <a:extLst>
               <a:ext uri="{FF2B5EF4-FFF2-40B4-BE49-F238E27FC236}">
-                <a16:creationId xmlns:a16="http://schemas.microsoft.com/office/drawing/2014/main" id="{D00C56CC-CD79-D04E-6939-916AD014486C}"/>
+                <a16:creationId xmlns:a16="http://schemas.microsoft.com/office/drawing/2014/main" id="{5DF54585-F242-75F5-D2D0-D582E257D7DB}"/>
               </a:ext>
             </a:extLst>
           </p:cNvPr>
@@ -7079,7 +6216,7 @@
           <p:cNvPr id="402" name="Connector: Elbow 401">
             <a:extLst>
               <a:ext uri="{FF2B5EF4-FFF2-40B4-BE49-F238E27FC236}">
-                <a16:creationId xmlns:a16="http://schemas.microsoft.com/office/drawing/2014/main" id="{602FD4CE-BF27-5BA3-4A42-313934A36984}"/>
+                <a16:creationId xmlns:a16="http://schemas.microsoft.com/office/drawing/2014/main" id="{613D65C8-C4EF-D149-FD91-825305D1DEAE}"/>
               </a:ext>
             </a:extLst>
           </p:cNvPr>
@@ -7123,7 +6260,7 @@
           <p:cNvPr id="414" name="Connector: Elbow 413">
             <a:extLst>
               <a:ext uri="{FF2B5EF4-FFF2-40B4-BE49-F238E27FC236}">
-                <a16:creationId xmlns:a16="http://schemas.microsoft.com/office/drawing/2014/main" id="{3EBB69BF-321C-B3CE-8472-0FD925D21411}"/>
+                <a16:creationId xmlns:a16="http://schemas.microsoft.com/office/drawing/2014/main" id="{22F97906-8371-B057-3E92-43E13EC8D70E}"/>
               </a:ext>
             </a:extLst>
           </p:cNvPr>
@@ -7166,7 +6303,7 @@
           <p:cNvPr id="526" name="Connector: Elbow 525">
             <a:extLst>
               <a:ext uri="{FF2B5EF4-FFF2-40B4-BE49-F238E27FC236}">
-                <a16:creationId xmlns:a16="http://schemas.microsoft.com/office/drawing/2014/main" id="{D53EE2C6-E9F4-0577-52F1-603DDF342357}"/>
+                <a16:creationId xmlns:a16="http://schemas.microsoft.com/office/drawing/2014/main" id="{0B188F7E-236F-8D45-B01F-6447669D6776}"/>
               </a:ext>
             </a:extLst>
           </p:cNvPr>
@@ -7213,7 +6350,7 @@
           <p:cNvPr id="20" name="Connector: Elbow 213">
             <a:extLst>
               <a:ext uri="{FF2B5EF4-FFF2-40B4-BE49-F238E27FC236}">
-                <a16:creationId xmlns:a16="http://schemas.microsoft.com/office/drawing/2014/main" id="{38CF9B38-FDE4-A1FC-8EBD-60F2F36FA19B}"/>
+                <a16:creationId xmlns:a16="http://schemas.microsoft.com/office/drawing/2014/main" id="{DC564A8A-7E1F-7F21-E7A0-008F0935269A}"/>
               </a:ext>
             </a:extLst>
           </p:cNvPr>
@@ -7255,7 +6392,7 @@
     </p:spTree>
     <p:extLst>
       <p:ext uri="{BB962C8B-B14F-4D97-AF65-F5344CB8AC3E}">
-        <p14:creationId xmlns:p14="http://schemas.microsoft.com/office/powerpoint/2010/main" val="1752442661"/>
+        <p14:creationId xmlns:p14="http://schemas.microsoft.com/office/powerpoint/2010/main" val="1838229114"/>
       </p:ext>
     </p:extLst>
   </p:cSld>
@@ -9743,6 +8880,2438 @@
     <p:extLst>
       <p:ext uri="{BB962C8B-B14F-4D97-AF65-F5344CB8AC3E}">
         <p14:creationId xmlns:p14="http://schemas.microsoft.com/office/powerpoint/2010/main" val="2676893550"/>
+      </p:ext>
+    </p:extLst>
+  </p:cSld>
+  <p:clrMapOvr>
+    <a:masterClrMapping/>
+  </p:clrMapOvr>
+</p:sld>
+</file>
+
+<file path=ppt/slides/slide3.xml><?xml version="1.0" encoding="utf-8"?>
+<p:sld xmlns:a="http://schemas.openxmlformats.org/drawingml/2006/main" xmlns:r="http://schemas.openxmlformats.org/officeDocument/2006/relationships" xmlns:p="http://schemas.openxmlformats.org/presentationml/2006/main">
+  <p:cSld>
+    <p:spTree>
+      <p:nvGrpSpPr>
+        <p:cNvPr id="1" name=""/>
+        <p:cNvGrpSpPr/>
+        <p:nvPr/>
+      </p:nvGrpSpPr>
+      <p:grpSpPr>
+        <a:xfrm>
+          <a:off x="0" y="0"/>
+          <a:ext cx="0" cy="0"/>
+          <a:chOff x="0" y="0"/>
+          <a:chExt cx="0" cy="0"/>
+        </a:xfrm>
+      </p:grpSpPr>
+      <p:sp>
+        <p:nvSpPr>
+          <p:cNvPr id="4" name="Rectangle 3">
+            <a:extLst>
+              <a:ext uri="{FF2B5EF4-FFF2-40B4-BE49-F238E27FC236}">
+                <a16:creationId xmlns:a16="http://schemas.microsoft.com/office/drawing/2014/main" id="{22887272-8CFA-BF44-CACD-537694360768}"/>
+              </a:ext>
+            </a:extLst>
+          </p:cNvPr>
+          <p:cNvSpPr/>
+          <p:nvPr/>
+        </p:nvSpPr>
+        <p:spPr>
+          <a:xfrm>
+            <a:off x="6189662" y="9820434"/>
+            <a:ext cx="2663685" cy="1259320"/>
+          </a:xfrm>
+          <a:prstGeom prst="rect">
+            <a:avLst/>
+          </a:prstGeom>
+          <a:solidFill>
+            <a:schemeClr val="bg1">
+              <a:lumMod val="85000"/>
+            </a:schemeClr>
+          </a:solidFill>
+        </p:spPr>
+        <p:style>
+          <a:lnRef idx="2">
+            <a:schemeClr val="accent1">
+              <a:shade val="15000"/>
+            </a:schemeClr>
+          </a:lnRef>
+          <a:fillRef idx="1">
+            <a:schemeClr val="accent1"/>
+          </a:fillRef>
+          <a:effectRef idx="0">
+            <a:schemeClr val="accent1"/>
+          </a:effectRef>
+          <a:fontRef idx="minor">
+            <a:schemeClr val="lt1"/>
+          </a:fontRef>
+        </p:style>
+        <p:txBody>
+          <a:bodyPr rtlCol="0" anchor="ctr"/>
+          <a:lstStyle/>
+          <a:p>
+            <a:pPr algn="ctr"/>
+            <a:r>
+              <a:rPr lang="en-GB" sz="2000" dirty="0">
+                <a:solidFill>
+                  <a:schemeClr val="tx1"/>
+                </a:solidFill>
+              </a:rPr>
+              <a:t>Which </a:t>
+            </a:r>
+            <a:r>
+              <a:rPr lang="en-GB" sz="2000" b="1" dirty="0">
+                <a:solidFill>
+                  <a:schemeClr val="tx1"/>
+                </a:solidFill>
+              </a:rPr>
+              <a:t>configuration</a:t>
+            </a:r>
+            <a:r>
+              <a:rPr lang="en-GB" sz="2000" dirty="0">
+                <a:solidFill>
+                  <a:schemeClr val="tx1"/>
+                </a:solidFill>
+              </a:rPr>
+              <a:t> are you looking for?</a:t>
+            </a:r>
+          </a:p>
+        </p:txBody>
+      </p:sp>
+      <p:sp>
+        <p:nvSpPr>
+          <p:cNvPr id="5" name="Rectangle 4">
+            <a:extLst>
+              <a:ext uri="{FF2B5EF4-FFF2-40B4-BE49-F238E27FC236}">
+                <a16:creationId xmlns:a16="http://schemas.microsoft.com/office/drawing/2014/main" id="{346FBF56-A7DF-4167-FC34-8C7AAEEE9647}"/>
+              </a:ext>
+            </a:extLst>
+          </p:cNvPr>
+          <p:cNvSpPr/>
+          <p:nvPr/>
+        </p:nvSpPr>
+        <p:spPr>
+          <a:xfrm>
+            <a:off x="1237490" y="4564051"/>
+            <a:ext cx="2436388" cy="1644960"/>
+          </a:xfrm>
+          <a:prstGeom prst="rect">
+            <a:avLst/>
+          </a:prstGeom>
+          <a:solidFill>
+            <a:schemeClr val="bg1">
+              <a:lumMod val="85000"/>
+            </a:schemeClr>
+          </a:solidFill>
+        </p:spPr>
+        <p:style>
+          <a:lnRef idx="2">
+            <a:schemeClr val="accent1">
+              <a:shade val="15000"/>
+            </a:schemeClr>
+          </a:lnRef>
+          <a:fillRef idx="1">
+            <a:schemeClr val="accent1"/>
+          </a:fillRef>
+          <a:effectRef idx="0">
+            <a:schemeClr val="accent1"/>
+          </a:effectRef>
+          <a:fontRef idx="minor">
+            <a:schemeClr val="lt1"/>
+          </a:fontRef>
+        </p:style>
+        <p:txBody>
+          <a:bodyPr rtlCol="0" anchor="ctr"/>
+          <a:lstStyle/>
+          <a:p>
+            <a:pPr algn="ctr"/>
+            <a:r>
+              <a:rPr lang="en-GB" sz="2000" dirty="0">
+                <a:solidFill>
+                  <a:schemeClr val="tx1"/>
+                </a:solidFill>
+              </a:rPr>
+              <a:t>What type of </a:t>
+            </a:r>
+            <a:r>
+              <a:rPr lang="en-GB" sz="2000" b="1" dirty="0">
+                <a:solidFill>
+                  <a:schemeClr val="tx1"/>
+                </a:solidFill>
+              </a:rPr>
+              <a:t>network</a:t>
+            </a:r>
+            <a:r>
+              <a:rPr lang="en-GB" sz="2000" dirty="0">
+                <a:solidFill>
+                  <a:schemeClr val="tx1"/>
+                </a:solidFill>
+              </a:rPr>
+              <a:t> are you using?</a:t>
+            </a:r>
+          </a:p>
+        </p:txBody>
+      </p:sp>
+      <p:sp>
+        <p:nvSpPr>
+          <p:cNvPr id="9" name="TextBox 8">
+            <a:extLst>
+              <a:ext uri="{FF2B5EF4-FFF2-40B4-BE49-F238E27FC236}">
+                <a16:creationId xmlns:a16="http://schemas.microsoft.com/office/drawing/2014/main" id="{1B919D91-FC0C-7368-90E2-67BC1C60183D}"/>
+              </a:ext>
+            </a:extLst>
+          </p:cNvPr>
+          <p:cNvSpPr txBox="1"/>
+          <p:nvPr/>
+        </p:nvSpPr>
+        <p:spPr>
+          <a:xfrm>
+            <a:off x="2455682" y="6373915"/>
+            <a:ext cx="942374" cy="400110"/>
+          </a:xfrm>
+          <a:prstGeom prst="rect">
+            <a:avLst/>
+          </a:prstGeom>
+          <a:noFill/>
+        </p:spPr>
+        <p:txBody>
+          <a:bodyPr wrap="none" rtlCol="0">
+            <a:spAutoFit/>
+          </a:bodyPr>
+          <a:lstStyle/>
+          <a:p>
+            <a:r>
+              <a:rPr lang="en-GB" sz="2000" dirty="0"/>
+              <a:t>Private</a:t>
+            </a:r>
+            <a:endParaRPr lang="en-GB" sz="2000" b="1" dirty="0"/>
+          </a:p>
+        </p:txBody>
+      </p:sp>
+      <p:cxnSp>
+        <p:nvCxnSpPr>
+          <p:cNvPr id="12" name="Straight Arrow Connector 11">
+            <a:extLst>
+              <a:ext uri="{FF2B5EF4-FFF2-40B4-BE49-F238E27FC236}">
+                <a16:creationId xmlns:a16="http://schemas.microsoft.com/office/drawing/2014/main" id="{926B9899-69C1-DC20-8EAB-50BDC2C23273}"/>
+              </a:ext>
+            </a:extLst>
+          </p:cNvPr>
+          <p:cNvCxnSpPr>
+            <a:cxnSpLocks/>
+            <a:stCxn id="5" idx="3"/>
+            <a:endCxn id="314" idx="1"/>
+          </p:cNvCxnSpPr>
+          <p:nvPr/>
+        </p:nvCxnSpPr>
+        <p:spPr>
+          <a:xfrm flipV="1">
+            <a:off x="3673878" y="5381076"/>
+            <a:ext cx="2632768" cy="5455"/>
+          </a:xfrm>
+          <a:prstGeom prst="straightConnector1">
+            <a:avLst/>
+          </a:prstGeom>
+          <a:ln>
+            <a:headEnd type="none" w="med" len="med"/>
+            <a:tailEnd type="arrow" w="med" len="med"/>
+          </a:ln>
+        </p:spPr>
+        <p:style>
+          <a:lnRef idx="2">
+            <a:schemeClr val="dk1"/>
+          </a:lnRef>
+          <a:fillRef idx="0">
+            <a:schemeClr val="dk1"/>
+          </a:fillRef>
+          <a:effectRef idx="1">
+            <a:schemeClr val="dk1"/>
+          </a:effectRef>
+          <a:fontRef idx="minor">
+            <a:schemeClr val="tx1"/>
+          </a:fontRef>
+        </p:style>
+      </p:cxnSp>
+      <p:sp>
+        <p:nvSpPr>
+          <p:cNvPr id="15" name="Rectangle 14">
+            <a:extLst>
+              <a:ext uri="{FF2B5EF4-FFF2-40B4-BE49-F238E27FC236}">
+                <a16:creationId xmlns:a16="http://schemas.microsoft.com/office/drawing/2014/main" id="{1EAFDDEE-0E21-A708-736B-D49DE6669369}"/>
+              </a:ext>
+            </a:extLst>
+          </p:cNvPr>
+          <p:cNvSpPr/>
+          <p:nvPr/>
+        </p:nvSpPr>
+        <p:spPr>
+          <a:xfrm>
+            <a:off x="1237491" y="6986883"/>
+            <a:ext cx="2436387" cy="1644960"/>
+          </a:xfrm>
+          <a:prstGeom prst="rect">
+            <a:avLst/>
+          </a:prstGeom>
+          <a:solidFill>
+            <a:schemeClr val="bg1">
+              <a:lumMod val="85000"/>
+            </a:schemeClr>
+          </a:solidFill>
+        </p:spPr>
+        <p:style>
+          <a:lnRef idx="2">
+            <a:schemeClr val="accent1">
+              <a:shade val="15000"/>
+            </a:schemeClr>
+          </a:lnRef>
+          <a:fillRef idx="1">
+            <a:schemeClr val="accent1"/>
+          </a:fillRef>
+          <a:effectRef idx="0">
+            <a:schemeClr val="accent1"/>
+          </a:effectRef>
+          <a:fontRef idx="minor">
+            <a:schemeClr val="lt1"/>
+          </a:fontRef>
+        </p:style>
+        <p:txBody>
+          <a:bodyPr rtlCol="0" anchor="ctr"/>
+          <a:lstStyle/>
+          <a:p>
+            <a:pPr algn="ctr"/>
+            <a:r>
+              <a:rPr lang="en-GB" sz="2000" dirty="0">
+                <a:solidFill>
+                  <a:schemeClr val="tx1"/>
+                </a:solidFill>
+              </a:rPr>
+              <a:t>Which type of </a:t>
+            </a:r>
+            <a:r>
+              <a:rPr lang="en-GB" sz="2000" b="1" dirty="0">
+                <a:solidFill>
+                  <a:schemeClr val="tx1"/>
+                </a:solidFill>
+              </a:rPr>
+              <a:t>VR headset</a:t>
+            </a:r>
+            <a:r>
+              <a:rPr lang="en-GB" sz="2000" dirty="0">
+                <a:solidFill>
+                  <a:schemeClr val="tx1"/>
+                </a:solidFill>
+              </a:rPr>
+              <a:t> are you using?</a:t>
+            </a:r>
+          </a:p>
+        </p:txBody>
+      </p:sp>
+      <p:cxnSp>
+        <p:nvCxnSpPr>
+          <p:cNvPr id="16" name="Straight Arrow Connector 15">
+            <a:extLst>
+              <a:ext uri="{FF2B5EF4-FFF2-40B4-BE49-F238E27FC236}">
+                <a16:creationId xmlns:a16="http://schemas.microsoft.com/office/drawing/2014/main" id="{235209DE-3AC7-AEA2-ED89-4975A1C0D3D4}"/>
+              </a:ext>
+            </a:extLst>
+          </p:cNvPr>
+          <p:cNvCxnSpPr>
+            <a:cxnSpLocks/>
+            <a:stCxn id="5" idx="2"/>
+            <a:endCxn id="15" idx="0"/>
+          </p:cNvCxnSpPr>
+          <p:nvPr/>
+        </p:nvCxnSpPr>
+        <p:spPr>
+          <a:xfrm>
+            <a:off x="2455684" y="6209011"/>
+            <a:ext cx="1" cy="777872"/>
+          </a:xfrm>
+          <a:prstGeom prst="straightConnector1">
+            <a:avLst/>
+          </a:prstGeom>
+          <a:ln>
+            <a:headEnd type="none" w="med" len="med"/>
+            <a:tailEnd type="arrow" w="med" len="med"/>
+          </a:ln>
+        </p:spPr>
+        <p:style>
+          <a:lnRef idx="2">
+            <a:schemeClr val="dk1"/>
+          </a:lnRef>
+          <a:fillRef idx="0">
+            <a:schemeClr val="dk1"/>
+          </a:fillRef>
+          <a:effectRef idx="1">
+            <a:schemeClr val="dk1"/>
+          </a:effectRef>
+          <a:fontRef idx="minor">
+            <a:schemeClr val="tx1"/>
+          </a:fontRef>
+        </p:style>
+      </p:cxnSp>
+      <p:sp>
+        <p:nvSpPr>
+          <p:cNvPr id="19" name="Rectangle 18">
+            <a:extLst>
+              <a:ext uri="{FF2B5EF4-FFF2-40B4-BE49-F238E27FC236}">
+                <a16:creationId xmlns:a16="http://schemas.microsoft.com/office/drawing/2014/main" id="{D2A92E3D-448A-A5B8-E6F4-384524ED1057}"/>
+              </a:ext>
+            </a:extLst>
+          </p:cNvPr>
+          <p:cNvSpPr/>
+          <p:nvPr/>
+        </p:nvSpPr>
+        <p:spPr>
+          <a:xfrm>
+            <a:off x="1237490" y="12185799"/>
+            <a:ext cx="2436386" cy="1093980"/>
+          </a:xfrm>
+          <a:prstGeom prst="rect">
+            <a:avLst/>
+          </a:prstGeom>
+          <a:solidFill>
+            <a:schemeClr val="accent2">
+              <a:lumMod val="40000"/>
+              <a:lumOff val="60000"/>
+            </a:schemeClr>
+          </a:solidFill>
+        </p:spPr>
+        <p:style>
+          <a:lnRef idx="2">
+            <a:schemeClr val="accent1">
+              <a:shade val="15000"/>
+            </a:schemeClr>
+          </a:lnRef>
+          <a:fillRef idx="1">
+            <a:schemeClr val="accent1"/>
+          </a:fillRef>
+          <a:effectRef idx="0">
+            <a:schemeClr val="accent1"/>
+          </a:effectRef>
+          <a:fontRef idx="minor">
+            <a:schemeClr val="lt1"/>
+          </a:fontRef>
+        </p:style>
+        <p:txBody>
+          <a:bodyPr rtlCol="0" anchor="ctr"/>
+          <a:lstStyle/>
+          <a:p>
+            <a:pPr algn="ctr"/>
+            <a:r>
+              <a:rPr lang="en-GB" sz="2000" dirty="0">
+                <a:solidFill>
+                  <a:schemeClr val="tx1"/>
+                </a:solidFill>
+              </a:rPr>
+              <a:t>You can choose </a:t>
+            </a:r>
+            <a:r>
+              <a:rPr lang="en-GB" sz="2000" b="1" dirty="0">
+                <a:solidFill>
+                  <a:schemeClr val="tx1"/>
+                </a:solidFill>
+              </a:rPr>
+              <a:t>any installation option</a:t>
+            </a:r>
+            <a:r>
+              <a:rPr lang="en-GB" sz="2000" dirty="0">
+                <a:solidFill>
+                  <a:schemeClr val="tx1"/>
+                </a:solidFill>
+              </a:rPr>
+              <a:t>.</a:t>
+            </a:r>
+          </a:p>
+        </p:txBody>
+      </p:sp>
+      <p:sp>
+        <p:nvSpPr>
+          <p:cNvPr id="24" name="TextBox 23">
+            <a:extLst>
+              <a:ext uri="{FF2B5EF4-FFF2-40B4-BE49-F238E27FC236}">
+                <a16:creationId xmlns:a16="http://schemas.microsoft.com/office/drawing/2014/main" id="{0A510DB6-C573-9104-CAAB-0035485EEB71}"/>
+              </a:ext>
+            </a:extLst>
+          </p:cNvPr>
+          <p:cNvSpPr txBox="1"/>
+          <p:nvPr/>
+        </p:nvSpPr>
+        <p:spPr>
+          <a:xfrm>
+            <a:off x="3776743" y="7442101"/>
+            <a:ext cx="920445" cy="400110"/>
+          </a:xfrm>
+          <a:prstGeom prst="rect">
+            <a:avLst/>
+          </a:prstGeom>
+          <a:noFill/>
+        </p:spPr>
+        <p:txBody>
+          <a:bodyPr wrap="none" rtlCol="0">
+            <a:spAutoFit/>
+          </a:bodyPr>
+          <a:lstStyle/>
+          <a:p>
+            <a:r>
+              <a:rPr lang="en-GB" sz="2000" dirty="0"/>
+              <a:t>Other</a:t>
+            </a:r>
+            <a:r>
+              <a:rPr lang="en-GB" sz="2000" b="1" i="0" baseline="30000" dirty="0">
+                <a:solidFill>
+                  <a:srgbClr val="040C28"/>
+                </a:solidFill>
+                <a:effectLst/>
+              </a:rPr>
+              <a:t>†</a:t>
+            </a:r>
+            <a:endParaRPr lang="en-GB" sz="2000" b="1" baseline="30000" dirty="0"/>
+          </a:p>
+        </p:txBody>
+      </p:sp>
+      <p:cxnSp>
+        <p:nvCxnSpPr>
+          <p:cNvPr id="26" name="Straight Arrow Connector 25">
+            <a:extLst>
+              <a:ext uri="{FF2B5EF4-FFF2-40B4-BE49-F238E27FC236}">
+                <a16:creationId xmlns:a16="http://schemas.microsoft.com/office/drawing/2014/main" id="{B4679F37-C6D4-6A1D-0567-7B9D67A33907}"/>
+              </a:ext>
+            </a:extLst>
+          </p:cNvPr>
+          <p:cNvCxnSpPr>
+            <a:cxnSpLocks/>
+            <a:stCxn id="15" idx="3"/>
+            <a:endCxn id="277" idx="1"/>
+          </p:cNvCxnSpPr>
+          <p:nvPr/>
+        </p:nvCxnSpPr>
+        <p:spPr>
+          <a:xfrm>
+            <a:off x="3673878" y="7809363"/>
+            <a:ext cx="1150908" cy="6507"/>
+          </a:xfrm>
+          <a:prstGeom prst="straightConnector1">
+            <a:avLst/>
+          </a:prstGeom>
+          <a:ln>
+            <a:headEnd type="none" w="med" len="med"/>
+            <a:tailEnd type="arrow" w="med" len="med"/>
+          </a:ln>
+        </p:spPr>
+        <p:style>
+          <a:lnRef idx="2">
+            <a:schemeClr val="dk1"/>
+          </a:lnRef>
+          <a:fillRef idx="0">
+            <a:schemeClr val="dk1"/>
+          </a:fillRef>
+          <a:effectRef idx="1">
+            <a:schemeClr val="dk1"/>
+          </a:effectRef>
+          <a:fontRef idx="minor">
+            <a:schemeClr val="tx1"/>
+          </a:fontRef>
+        </p:style>
+      </p:cxnSp>
+      <p:sp>
+        <p:nvSpPr>
+          <p:cNvPr id="29" name="TextBox 28">
+            <a:extLst>
+              <a:ext uri="{FF2B5EF4-FFF2-40B4-BE49-F238E27FC236}">
+                <a16:creationId xmlns:a16="http://schemas.microsoft.com/office/drawing/2014/main" id="{4D859BB7-BEE1-CF6A-BF53-B561B421A0BD}"/>
+              </a:ext>
+            </a:extLst>
+          </p:cNvPr>
+          <p:cNvSpPr txBox="1"/>
+          <p:nvPr/>
+        </p:nvSpPr>
+        <p:spPr>
+          <a:xfrm>
+            <a:off x="1226608" y="8764555"/>
+            <a:ext cx="1205582" cy="707886"/>
+          </a:xfrm>
+          <a:prstGeom prst="rect">
+            <a:avLst/>
+          </a:prstGeom>
+          <a:noFill/>
+        </p:spPr>
+        <p:txBody>
+          <a:bodyPr wrap="square" rtlCol="0">
+            <a:spAutoFit/>
+          </a:bodyPr>
+          <a:lstStyle/>
+          <a:p>
+            <a:pPr algn="r"/>
+            <a:r>
+              <a:rPr lang="en-GB" sz="2000" dirty="0"/>
+              <a:t>Any Meta Quest</a:t>
+            </a:r>
+          </a:p>
+        </p:txBody>
+      </p:sp>
+      <p:sp>
+        <p:nvSpPr>
+          <p:cNvPr id="38" name="TextBox 37">
+            <a:extLst>
+              <a:ext uri="{FF2B5EF4-FFF2-40B4-BE49-F238E27FC236}">
+                <a16:creationId xmlns:a16="http://schemas.microsoft.com/office/drawing/2014/main" id="{50AD24AF-4564-D938-2BE1-3F69D5C62F17}"/>
+              </a:ext>
+            </a:extLst>
+          </p:cNvPr>
+          <p:cNvSpPr txBox="1"/>
+          <p:nvPr/>
+        </p:nvSpPr>
+        <p:spPr>
+          <a:xfrm>
+            <a:off x="3790863" y="4878699"/>
+            <a:ext cx="2398798" cy="1015663"/>
+          </a:xfrm>
+          <a:prstGeom prst="rect">
+            <a:avLst/>
+          </a:prstGeom>
+          <a:noFill/>
+        </p:spPr>
+        <p:txBody>
+          <a:bodyPr wrap="none" rtlCol="0">
+            <a:spAutoFit/>
+          </a:bodyPr>
+          <a:lstStyle/>
+          <a:p>
+            <a:pPr algn="ctr"/>
+            <a:r>
+              <a:rPr lang="en-GB" sz="2000" dirty="0"/>
+              <a:t>Public / Institutional</a:t>
+            </a:r>
+          </a:p>
+          <a:p>
+            <a:pPr algn="ctr"/>
+            <a:br>
+              <a:rPr lang="en-GB" sz="2000" dirty="0"/>
+            </a:br>
+            <a:r>
+              <a:rPr lang="en-GB" sz="2000" dirty="0"/>
+              <a:t>e.g. Eduroam</a:t>
+            </a:r>
+          </a:p>
+        </p:txBody>
+      </p:sp>
+      <p:sp>
+        <p:nvSpPr>
+          <p:cNvPr id="40" name="TextBox 39">
+            <a:extLst>
+              <a:ext uri="{FF2B5EF4-FFF2-40B4-BE49-F238E27FC236}">
+                <a16:creationId xmlns:a16="http://schemas.microsoft.com/office/drawing/2014/main" id="{026E36F0-35D8-4E3A-EE82-977CCCA6EB0F}"/>
+              </a:ext>
+            </a:extLst>
+          </p:cNvPr>
+          <p:cNvSpPr txBox="1"/>
+          <p:nvPr/>
+        </p:nvSpPr>
+        <p:spPr>
+          <a:xfrm>
+            <a:off x="8697192" y="9707619"/>
+            <a:ext cx="1756246" cy="707886"/>
+          </a:xfrm>
+          <a:prstGeom prst="rect">
+            <a:avLst/>
+          </a:prstGeom>
+          <a:noFill/>
+        </p:spPr>
+        <p:txBody>
+          <a:bodyPr wrap="square" rtlCol="0">
+            <a:spAutoFit/>
+          </a:bodyPr>
+          <a:lstStyle/>
+          <a:p>
+            <a:pPr algn="ctr"/>
+            <a:r>
+              <a:rPr lang="en-GB" sz="2000" dirty="0"/>
+              <a:t>Single-</a:t>
+            </a:r>
+          </a:p>
+          <a:p>
+            <a:pPr algn="ctr"/>
+            <a:r>
+              <a:rPr lang="en-GB" sz="2000" dirty="0"/>
+              <a:t>person</a:t>
+            </a:r>
+          </a:p>
+        </p:txBody>
+      </p:sp>
+      <p:sp>
+        <p:nvSpPr>
+          <p:cNvPr id="42" name="Rectangle 41">
+            <a:extLst>
+              <a:ext uri="{FF2B5EF4-FFF2-40B4-BE49-F238E27FC236}">
+                <a16:creationId xmlns:a16="http://schemas.microsoft.com/office/drawing/2014/main" id="{A14A1D4B-5AA1-522A-397C-D1964657C751}"/>
+              </a:ext>
+            </a:extLst>
+          </p:cNvPr>
+          <p:cNvSpPr/>
+          <p:nvPr/>
+        </p:nvSpPr>
+        <p:spPr>
+          <a:xfrm>
+            <a:off x="10402377" y="12004216"/>
+            <a:ext cx="2663685" cy="1554111"/>
+          </a:xfrm>
+          <a:prstGeom prst="rect">
+            <a:avLst/>
+          </a:prstGeom>
+          <a:solidFill>
+            <a:schemeClr val="accent2">
+              <a:lumMod val="40000"/>
+              <a:lumOff val="60000"/>
+            </a:schemeClr>
+          </a:solidFill>
+        </p:spPr>
+        <p:style>
+          <a:lnRef idx="2">
+            <a:schemeClr val="accent1">
+              <a:shade val="15000"/>
+            </a:schemeClr>
+          </a:lnRef>
+          <a:fillRef idx="1">
+            <a:schemeClr val="accent1"/>
+          </a:fillRef>
+          <a:effectRef idx="0">
+            <a:schemeClr val="accent1"/>
+          </a:effectRef>
+          <a:fontRef idx="minor">
+            <a:schemeClr val="lt1"/>
+          </a:fontRef>
+        </p:style>
+        <p:txBody>
+          <a:bodyPr rtlCol="0" anchor="ctr"/>
+          <a:lstStyle/>
+          <a:p>
+            <a:pPr algn="ctr"/>
+            <a:r>
+              <a:rPr lang="en-GB" sz="2000" dirty="0">
+                <a:solidFill>
+                  <a:schemeClr val="tx1"/>
+                </a:solidFill>
+              </a:rPr>
+              <a:t>Follow </a:t>
+            </a:r>
+            <a:r>
+              <a:rPr lang="en-GB" sz="2000" b="1" dirty="0">
+                <a:solidFill>
+                  <a:schemeClr val="tx1"/>
+                </a:solidFill>
+              </a:rPr>
+              <a:t>PC-VR</a:t>
+            </a:r>
+          </a:p>
+          <a:p>
+            <a:pPr algn="ctr"/>
+            <a:r>
+              <a:rPr lang="en-GB" sz="2000" u="sng" dirty="0">
+                <a:solidFill>
+                  <a:schemeClr val="tx1"/>
+                </a:solidFill>
+              </a:rPr>
+              <a:t>or</a:t>
+            </a:r>
+            <a:r>
+              <a:rPr lang="en-GB" sz="2000" dirty="0">
+                <a:solidFill>
+                  <a:schemeClr val="tx1"/>
+                </a:solidFill>
+              </a:rPr>
+              <a:t> </a:t>
+            </a:r>
+          </a:p>
+          <a:p>
+            <a:pPr algn="ctr"/>
+            <a:r>
+              <a:rPr lang="en-GB" sz="2000" b="1" dirty="0">
+                <a:solidFill>
+                  <a:schemeClr val="tx1"/>
+                </a:solidFill>
+              </a:rPr>
+              <a:t>tethered Meta Quest</a:t>
+            </a:r>
+            <a:r>
+              <a:rPr lang="en-GB" sz="2000" b="1" baseline="30000" dirty="0">
+                <a:solidFill>
+                  <a:schemeClr val="tx1"/>
+                </a:solidFill>
+              </a:rPr>
+              <a:t>‡</a:t>
+            </a:r>
+            <a:r>
+              <a:rPr lang="en-GB" sz="2000" b="1" dirty="0">
+                <a:solidFill>
+                  <a:schemeClr val="tx1"/>
+                </a:solidFill>
+              </a:rPr>
+              <a:t> </a:t>
+            </a:r>
+            <a:r>
+              <a:rPr lang="en-GB" sz="2000" dirty="0">
+                <a:solidFill>
+                  <a:schemeClr val="tx1"/>
+                </a:solidFill>
+              </a:rPr>
+              <a:t>instructions.</a:t>
+            </a:r>
+          </a:p>
+        </p:txBody>
+      </p:sp>
+      <p:sp>
+        <p:nvSpPr>
+          <p:cNvPr id="44" name="TextBox 43">
+            <a:extLst>
+              <a:ext uri="{FF2B5EF4-FFF2-40B4-BE49-F238E27FC236}">
+                <a16:creationId xmlns:a16="http://schemas.microsoft.com/office/drawing/2014/main" id="{9A2DFD34-E640-EEAD-3436-DD63DC7A9817}"/>
+              </a:ext>
+            </a:extLst>
+          </p:cNvPr>
+          <p:cNvSpPr txBox="1"/>
+          <p:nvPr/>
+        </p:nvSpPr>
+        <p:spPr>
+          <a:xfrm>
+            <a:off x="7548554" y="11148924"/>
+            <a:ext cx="1155922" cy="707886"/>
+          </a:xfrm>
+          <a:prstGeom prst="rect">
+            <a:avLst/>
+          </a:prstGeom>
+          <a:noFill/>
+        </p:spPr>
+        <p:txBody>
+          <a:bodyPr wrap="square" rtlCol="0">
+            <a:spAutoFit/>
+          </a:bodyPr>
+          <a:lstStyle/>
+          <a:p>
+            <a:r>
+              <a:rPr lang="en-GB" sz="2000" dirty="0"/>
+              <a:t>Multi-person</a:t>
+            </a:r>
+          </a:p>
+        </p:txBody>
+      </p:sp>
+      <p:sp>
+        <p:nvSpPr>
+          <p:cNvPr id="52" name="Rectangle 51">
+            <a:extLst>
+              <a:ext uri="{FF2B5EF4-FFF2-40B4-BE49-F238E27FC236}">
+                <a16:creationId xmlns:a16="http://schemas.microsoft.com/office/drawing/2014/main" id="{0FC5A7EE-B148-0368-C995-579A86B17CD8}"/>
+              </a:ext>
+            </a:extLst>
+          </p:cNvPr>
+          <p:cNvSpPr/>
+          <p:nvPr/>
+        </p:nvSpPr>
+        <p:spPr>
+          <a:xfrm>
+            <a:off x="1237490" y="2252064"/>
+            <a:ext cx="2436388" cy="1644960"/>
+          </a:xfrm>
+          <a:prstGeom prst="rect">
+            <a:avLst/>
+          </a:prstGeom>
+          <a:solidFill>
+            <a:schemeClr val="bg1">
+              <a:lumMod val="85000"/>
+            </a:schemeClr>
+          </a:solidFill>
+        </p:spPr>
+        <p:style>
+          <a:lnRef idx="2">
+            <a:schemeClr val="accent1">
+              <a:shade val="15000"/>
+            </a:schemeClr>
+          </a:lnRef>
+          <a:fillRef idx="1">
+            <a:schemeClr val="accent1"/>
+          </a:fillRef>
+          <a:effectRef idx="0">
+            <a:schemeClr val="accent1"/>
+          </a:effectRef>
+          <a:fontRef idx="minor">
+            <a:schemeClr val="lt1"/>
+          </a:fontRef>
+        </p:style>
+        <p:txBody>
+          <a:bodyPr rtlCol="0" anchor="ctr"/>
+          <a:lstStyle/>
+          <a:p>
+            <a:pPr algn="ctr"/>
+            <a:r>
+              <a:rPr lang="en-GB" sz="2000" dirty="0">
+                <a:solidFill>
+                  <a:schemeClr val="tx1"/>
+                </a:solidFill>
+              </a:rPr>
+              <a:t>Which </a:t>
+            </a:r>
+            <a:r>
+              <a:rPr lang="en-GB" sz="2000" b="1" dirty="0">
+                <a:solidFill>
+                  <a:schemeClr val="tx1"/>
+                </a:solidFill>
+              </a:rPr>
+              <a:t>operating system</a:t>
+            </a:r>
+            <a:r>
+              <a:rPr lang="en-GB" sz="2000" dirty="0">
+                <a:solidFill>
+                  <a:schemeClr val="tx1"/>
+                </a:solidFill>
+              </a:rPr>
+              <a:t> are you using?</a:t>
+            </a:r>
+          </a:p>
+        </p:txBody>
+      </p:sp>
+      <p:cxnSp>
+        <p:nvCxnSpPr>
+          <p:cNvPr id="53" name="Straight Arrow Connector 52">
+            <a:extLst>
+              <a:ext uri="{FF2B5EF4-FFF2-40B4-BE49-F238E27FC236}">
+                <a16:creationId xmlns:a16="http://schemas.microsoft.com/office/drawing/2014/main" id="{C54EEBD3-28EB-9784-419E-34A411BC041E}"/>
+              </a:ext>
+            </a:extLst>
+          </p:cNvPr>
+          <p:cNvCxnSpPr>
+            <a:cxnSpLocks/>
+            <a:stCxn id="52" idx="2"/>
+            <a:endCxn id="5" idx="0"/>
+          </p:cNvCxnSpPr>
+          <p:nvPr/>
+        </p:nvCxnSpPr>
+        <p:spPr>
+          <a:xfrm>
+            <a:off x="2455684" y="3897024"/>
+            <a:ext cx="0" cy="667027"/>
+          </a:xfrm>
+          <a:prstGeom prst="straightConnector1">
+            <a:avLst/>
+          </a:prstGeom>
+          <a:ln>
+            <a:headEnd type="none" w="med" len="med"/>
+            <a:tailEnd type="arrow" w="med" len="med"/>
+          </a:ln>
+        </p:spPr>
+        <p:style>
+          <a:lnRef idx="2">
+            <a:schemeClr val="dk1"/>
+          </a:lnRef>
+          <a:fillRef idx="0">
+            <a:schemeClr val="dk1"/>
+          </a:fillRef>
+          <a:effectRef idx="1">
+            <a:schemeClr val="dk1"/>
+          </a:effectRef>
+          <a:fontRef idx="minor">
+            <a:schemeClr val="tx1"/>
+          </a:fontRef>
+        </p:style>
+      </p:cxnSp>
+      <p:sp>
+        <p:nvSpPr>
+          <p:cNvPr id="56" name="TextBox 55">
+            <a:extLst>
+              <a:ext uri="{FF2B5EF4-FFF2-40B4-BE49-F238E27FC236}">
+                <a16:creationId xmlns:a16="http://schemas.microsoft.com/office/drawing/2014/main" id="{9398C94E-A74A-D10C-095D-9AE7266F22CC}"/>
+              </a:ext>
+            </a:extLst>
+          </p:cNvPr>
+          <p:cNvSpPr txBox="1"/>
+          <p:nvPr/>
+        </p:nvSpPr>
+        <p:spPr>
+          <a:xfrm>
+            <a:off x="2455682" y="4022141"/>
+            <a:ext cx="1206612" cy="400110"/>
+          </a:xfrm>
+          <a:prstGeom prst="rect">
+            <a:avLst/>
+          </a:prstGeom>
+          <a:noFill/>
+        </p:spPr>
+        <p:txBody>
+          <a:bodyPr wrap="none" rtlCol="0">
+            <a:spAutoFit/>
+          </a:bodyPr>
+          <a:lstStyle/>
+          <a:p>
+            <a:r>
+              <a:rPr lang="en-GB" sz="2000" dirty="0"/>
+              <a:t>Windows</a:t>
+            </a:r>
+          </a:p>
+        </p:txBody>
+      </p:sp>
+      <p:cxnSp>
+        <p:nvCxnSpPr>
+          <p:cNvPr id="57" name="Straight Arrow Connector 56">
+            <a:extLst>
+              <a:ext uri="{FF2B5EF4-FFF2-40B4-BE49-F238E27FC236}">
+                <a16:creationId xmlns:a16="http://schemas.microsoft.com/office/drawing/2014/main" id="{C2C88BF7-142B-C3FC-489F-7EEDAA2ED7A9}"/>
+              </a:ext>
+            </a:extLst>
+          </p:cNvPr>
+          <p:cNvCxnSpPr>
+            <a:cxnSpLocks/>
+            <a:stCxn id="52" idx="3"/>
+            <a:endCxn id="61" idx="1"/>
+          </p:cNvCxnSpPr>
+          <p:nvPr/>
+        </p:nvCxnSpPr>
+        <p:spPr>
+          <a:xfrm>
+            <a:off x="3673878" y="3074544"/>
+            <a:ext cx="1792328" cy="1"/>
+          </a:xfrm>
+          <a:prstGeom prst="straightConnector1">
+            <a:avLst/>
+          </a:prstGeom>
+          <a:ln>
+            <a:headEnd type="none" w="med" len="med"/>
+            <a:tailEnd type="arrow" w="med" len="med"/>
+          </a:ln>
+        </p:spPr>
+        <p:style>
+          <a:lnRef idx="2">
+            <a:schemeClr val="dk1"/>
+          </a:lnRef>
+          <a:fillRef idx="0">
+            <a:schemeClr val="dk1"/>
+          </a:fillRef>
+          <a:effectRef idx="1">
+            <a:schemeClr val="dk1"/>
+          </a:effectRef>
+          <a:fontRef idx="minor">
+            <a:schemeClr val="tx1"/>
+          </a:fontRef>
+        </p:style>
+      </p:cxnSp>
+      <p:sp>
+        <p:nvSpPr>
+          <p:cNvPr id="61" name="Rectangle 60">
+            <a:extLst>
+              <a:ext uri="{FF2B5EF4-FFF2-40B4-BE49-F238E27FC236}">
+                <a16:creationId xmlns:a16="http://schemas.microsoft.com/office/drawing/2014/main" id="{340C4477-8A90-8A8C-65B7-202314C3ABCC}"/>
+              </a:ext>
+            </a:extLst>
+          </p:cNvPr>
+          <p:cNvSpPr/>
+          <p:nvPr/>
+        </p:nvSpPr>
+        <p:spPr>
+          <a:xfrm>
+            <a:off x="5466206" y="2252065"/>
+            <a:ext cx="7599855" cy="1644960"/>
+          </a:xfrm>
+          <a:prstGeom prst="rect">
+            <a:avLst/>
+          </a:prstGeom>
+          <a:solidFill>
+            <a:schemeClr val="accent2">
+              <a:lumMod val="40000"/>
+              <a:lumOff val="60000"/>
+            </a:schemeClr>
+          </a:solidFill>
+        </p:spPr>
+        <p:style>
+          <a:lnRef idx="2">
+            <a:schemeClr val="accent1">
+              <a:shade val="15000"/>
+            </a:schemeClr>
+          </a:lnRef>
+          <a:fillRef idx="1">
+            <a:schemeClr val="accent1"/>
+          </a:fillRef>
+          <a:effectRef idx="0">
+            <a:schemeClr val="accent1"/>
+          </a:effectRef>
+          <a:fontRef idx="minor">
+            <a:schemeClr val="lt1"/>
+          </a:fontRef>
+        </p:style>
+        <p:txBody>
+          <a:bodyPr rtlCol="0" anchor="ctr"/>
+          <a:lstStyle/>
+          <a:p>
+            <a:pPr algn="ctr"/>
+            <a:r>
+              <a:rPr lang="en-GB" sz="2000" dirty="0">
+                <a:solidFill>
+                  <a:schemeClr val="tx1"/>
+                </a:solidFill>
+              </a:rPr>
+              <a:t>You will need to run the app </a:t>
+            </a:r>
+            <a:r>
+              <a:rPr lang="en-GB" sz="2000" b="1" dirty="0">
+                <a:solidFill>
+                  <a:schemeClr val="tx1"/>
+                </a:solidFill>
+              </a:rPr>
+              <a:t>locally on a Meta Quest</a:t>
+            </a:r>
+            <a:r>
+              <a:rPr lang="en-GB" sz="2000" dirty="0">
+                <a:solidFill>
+                  <a:schemeClr val="tx1"/>
+                </a:solidFill>
+              </a:rPr>
+              <a:t> headset (you cannot run PC-VR).</a:t>
+            </a:r>
+          </a:p>
+          <a:p>
+            <a:pPr algn="ctr"/>
+            <a:br>
+              <a:rPr lang="en-GB" sz="2000" dirty="0">
+                <a:solidFill>
+                  <a:schemeClr val="tx1"/>
+                </a:solidFill>
+              </a:rPr>
+            </a:br>
+            <a:r>
+              <a:rPr lang="en-GB" sz="2000" dirty="0">
+                <a:solidFill>
+                  <a:schemeClr val="tx1"/>
+                </a:solidFill>
+              </a:rPr>
+              <a:t> You must meet the </a:t>
+            </a:r>
+            <a:r>
+              <a:rPr lang="en-GB" sz="2000" b="1" dirty="0">
+                <a:solidFill>
+                  <a:schemeClr val="tx1"/>
+                </a:solidFill>
+              </a:rPr>
+              <a:t>requirements for a Wi-Fi setup*</a:t>
+            </a:r>
+            <a:r>
+              <a:rPr lang="en-GB" sz="2000" dirty="0">
+                <a:solidFill>
+                  <a:schemeClr val="tx1"/>
+                </a:solidFill>
+              </a:rPr>
+              <a:t>.</a:t>
+            </a:r>
+          </a:p>
+        </p:txBody>
+      </p:sp>
+      <p:sp>
+        <p:nvSpPr>
+          <p:cNvPr id="64" name="TextBox 63">
+            <a:extLst>
+              <a:ext uri="{FF2B5EF4-FFF2-40B4-BE49-F238E27FC236}">
+                <a16:creationId xmlns:a16="http://schemas.microsoft.com/office/drawing/2014/main" id="{F1DB31A6-A394-9581-35E2-1B45D8C8135E}"/>
+              </a:ext>
+            </a:extLst>
+          </p:cNvPr>
+          <p:cNvSpPr txBox="1"/>
+          <p:nvPr/>
+        </p:nvSpPr>
+        <p:spPr>
+          <a:xfrm>
+            <a:off x="4048104" y="2357147"/>
+            <a:ext cx="1043876" cy="707886"/>
+          </a:xfrm>
+          <a:prstGeom prst="rect">
+            <a:avLst/>
+          </a:prstGeom>
+          <a:noFill/>
+        </p:spPr>
+        <p:txBody>
+          <a:bodyPr wrap="none" rtlCol="0">
+            <a:spAutoFit/>
+          </a:bodyPr>
+          <a:lstStyle/>
+          <a:p>
+            <a:pPr algn="ctr"/>
+            <a:r>
+              <a:rPr lang="en-GB" sz="2000" dirty="0"/>
+              <a:t>MacOS </a:t>
+            </a:r>
+            <a:br>
+              <a:rPr lang="en-GB" sz="2000" dirty="0"/>
+            </a:br>
+            <a:r>
+              <a:rPr lang="en-GB" sz="2000" dirty="0"/>
+              <a:t>/ Linux</a:t>
+            </a:r>
+            <a:endParaRPr lang="en-GB" sz="2000" b="1" dirty="0"/>
+          </a:p>
+        </p:txBody>
+      </p:sp>
+      <p:cxnSp>
+        <p:nvCxnSpPr>
+          <p:cNvPr id="214" name="Connector: Elbow 213">
+            <a:extLst>
+              <a:ext uri="{FF2B5EF4-FFF2-40B4-BE49-F238E27FC236}">
+                <a16:creationId xmlns:a16="http://schemas.microsoft.com/office/drawing/2014/main" id="{23F45CB1-F915-2592-A1C7-9FD48B78FDD7}"/>
+              </a:ext>
+            </a:extLst>
+          </p:cNvPr>
+          <p:cNvCxnSpPr>
+            <a:cxnSpLocks/>
+            <a:stCxn id="4" idx="3"/>
+            <a:endCxn id="324" idx="1"/>
+          </p:cNvCxnSpPr>
+          <p:nvPr/>
+        </p:nvCxnSpPr>
+        <p:spPr>
+          <a:xfrm>
+            <a:off x="8853347" y="10450094"/>
+            <a:ext cx="1549927" cy="0"/>
+          </a:xfrm>
+          <a:prstGeom prst="straightConnector1">
+            <a:avLst/>
+          </a:prstGeom>
+          <a:ln>
+            <a:headEnd type="none" w="med" len="med"/>
+            <a:tailEnd type="arrow" w="med" len="med"/>
+          </a:ln>
+        </p:spPr>
+        <p:style>
+          <a:lnRef idx="2">
+            <a:schemeClr val="dk1"/>
+          </a:lnRef>
+          <a:fillRef idx="0">
+            <a:schemeClr val="dk1"/>
+          </a:fillRef>
+          <a:effectRef idx="1">
+            <a:schemeClr val="dk1"/>
+          </a:effectRef>
+          <a:fontRef idx="minor">
+            <a:schemeClr val="tx1"/>
+          </a:fontRef>
+        </p:style>
+      </p:cxnSp>
+      <p:cxnSp>
+        <p:nvCxnSpPr>
+          <p:cNvPr id="242" name="Connector: Elbow 241">
+            <a:extLst>
+              <a:ext uri="{FF2B5EF4-FFF2-40B4-BE49-F238E27FC236}">
+                <a16:creationId xmlns:a16="http://schemas.microsoft.com/office/drawing/2014/main" id="{41120B5F-F708-A6F2-F648-80267F4FED55}"/>
+              </a:ext>
+            </a:extLst>
+          </p:cNvPr>
+          <p:cNvCxnSpPr>
+            <a:cxnSpLocks/>
+            <a:stCxn id="15" idx="2"/>
+            <a:endCxn id="305" idx="0"/>
+          </p:cNvCxnSpPr>
+          <p:nvPr/>
+        </p:nvCxnSpPr>
+        <p:spPr>
+          <a:xfrm flipH="1">
+            <a:off x="2455683" y="8631843"/>
+            <a:ext cx="2" cy="998412"/>
+          </a:xfrm>
+          <a:prstGeom prst="straightConnector1">
+            <a:avLst/>
+          </a:prstGeom>
+          <a:ln>
+            <a:headEnd type="none" w="med" len="med"/>
+            <a:tailEnd type="arrow" w="med" len="med"/>
+          </a:ln>
+        </p:spPr>
+        <p:style>
+          <a:lnRef idx="2">
+            <a:schemeClr val="dk1"/>
+          </a:lnRef>
+          <a:fillRef idx="0">
+            <a:schemeClr val="dk1"/>
+          </a:fillRef>
+          <a:effectRef idx="1">
+            <a:schemeClr val="dk1"/>
+          </a:effectRef>
+          <a:fontRef idx="minor">
+            <a:schemeClr val="tx1"/>
+          </a:fontRef>
+        </p:style>
+      </p:cxnSp>
+      <p:sp>
+        <p:nvSpPr>
+          <p:cNvPr id="277" name="Rectangle 276">
+            <a:extLst>
+              <a:ext uri="{FF2B5EF4-FFF2-40B4-BE49-F238E27FC236}">
+                <a16:creationId xmlns:a16="http://schemas.microsoft.com/office/drawing/2014/main" id="{3115CC88-6263-38C2-0D3E-003BDACFE043}"/>
+              </a:ext>
+            </a:extLst>
+          </p:cNvPr>
+          <p:cNvSpPr/>
+          <p:nvPr/>
+        </p:nvSpPr>
+        <p:spPr>
+          <a:xfrm>
+            <a:off x="4824786" y="7186210"/>
+            <a:ext cx="2279745" cy="1259320"/>
+          </a:xfrm>
+          <a:prstGeom prst="rect">
+            <a:avLst/>
+          </a:prstGeom>
+          <a:solidFill>
+            <a:srgbClr val="2596BE">
+              <a:alpha val="30196"/>
+            </a:srgbClr>
+          </a:solidFill>
+        </p:spPr>
+        <p:style>
+          <a:lnRef idx="2">
+            <a:schemeClr val="accent1">
+              <a:shade val="15000"/>
+            </a:schemeClr>
+          </a:lnRef>
+          <a:fillRef idx="1">
+            <a:schemeClr val="accent1"/>
+          </a:fillRef>
+          <a:effectRef idx="0">
+            <a:schemeClr val="accent1"/>
+          </a:effectRef>
+          <a:fontRef idx="minor">
+            <a:schemeClr val="lt1"/>
+          </a:fontRef>
+        </p:style>
+        <p:txBody>
+          <a:bodyPr rtlCol="0" anchor="ctr"/>
+          <a:lstStyle/>
+          <a:p>
+            <a:pPr algn="ctr"/>
+            <a:r>
+              <a:rPr lang="en-GB" sz="2000" dirty="0">
+                <a:solidFill>
+                  <a:schemeClr val="tx1"/>
+                </a:solidFill>
+              </a:rPr>
+              <a:t>You will need to use a </a:t>
+            </a:r>
+            <a:r>
+              <a:rPr lang="en-GB" sz="2000" b="1" dirty="0">
+                <a:solidFill>
+                  <a:schemeClr val="tx1"/>
+                </a:solidFill>
+              </a:rPr>
+              <a:t>PC-VR </a:t>
+            </a:r>
+            <a:r>
+              <a:rPr lang="en-GB" sz="2000" dirty="0">
+                <a:solidFill>
+                  <a:schemeClr val="tx1"/>
+                </a:solidFill>
+              </a:rPr>
+              <a:t>setup</a:t>
+            </a:r>
+            <a:r>
+              <a:rPr lang="en-GB" sz="2000" b="1" dirty="0">
+                <a:solidFill>
+                  <a:schemeClr val="tx1"/>
+                </a:solidFill>
+              </a:rPr>
+              <a:t> via SteamVR</a:t>
+            </a:r>
+            <a:r>
+              <a:rPr lang="en-GB" sz="2000" dirty="0">
+                <a:solidFill>
+                  <a:schemeClr val="tx1"/>
+                </a:solidFill>
+              </a:rPr>
+              <a:t>.</a:t>
+            </a:r>
+          </a:p>
+        </p:txBody>
+      </p:sp>
+      <p:sp>
+        <p:nvSpPr>
+          <p:cNvPr id="305" name="Rectangle 304">
+            <a:extLst>
+              <a:ext uri="{FF2B5EF4-FFF2-40B4-BE49-F238E27FC236}">
+                <a16:creationId xmlns:a16="http://schemas.microsoft.com/office/drawing/2014/main" id="{E93FBCF3-1541-0A07-BEC4-E6C4601835E9}"/>
+              </a:ext>
+            </a:extLst>
+          </p:cNvPr>
+          <p:cNvSpPr/>
+          <p:nvPr/>
+        </p:nvSpPr>
+        <p:spPr>
+          <a:xfrm>
+            <a:off x="1237490" y="9630255"/>
+            <a:ext cx="2436386" cy="1644960"/>
+          </a:xfrm>
+          <a:prstGeom prst="rect">
+            <a:avLst/>
+          </a:prstGeom>
+          <a:solidFill>
+            <a:schemeClr val="bg1">
+              <a:lumMod val="85000"/>
+            </a:schemeClr>
+          </a:solidFill>
+        </p:spPr>
+        <p:style>
+          <a:lnRef idx="2">
+            <a:schemeClr val="accent1">
+              <a:shade val="15000"/>
+            </a:schemeClr>
+          </a:lnRef>
+          <a:fillRef idx="1">
+            <a:schemeClr val="accent1"/>
+          </a:fillRef>
+          <a:effectRef idx="0">
+            <a:schemeClr val="accent1"/>
+          </a:effectRef>
+          <a:fontRef idx="minor">
+            <a:schemeClr val="lt1"/>
+          </a:fontRef>
+        </p:style>
+        <p:txBody>
+          <a:bodyPr rtlCol="0" anchor="ctr"/>
+          <a:lstStyle/>
+          <a:p>
+            <a:pPr algn="ctr"/>
+            <a:r>
+              <a:rPr lang="en-GB" sz="2000" dirty="0">
+                <a:solidFill>
+                  <a:schemeClr val="tx1"/>
+                </a:solidFill>
+              </a:rPr>
+              <a:t>Do you have a </a:t>
+            </a:r>
+            <a:r>
+              <a:rPr lang="en-GB" sz="2000" b="1" dirty="0">
+                <a:solidFill>
+                  <a:schemeClr val="tx1"/>
+                </a:solidFill>
+              </a:rPr>
+              <a:t>strong and stable internet connection</a:t>
+            </a:r>
+            <a:r>
+              <a:rPr lang="en-GB" sz="2000" dirty="0">
+                <a:solidFill>
+                  <a:schemeClr val="tx1"/>
+                </a:solidFill>
+              </a:rPr>
+              <a:t>?</a:t>
+            </a:r>
+          </a:p>
+        </p:txBody>
+      </p:sp>
+      <p:sp>
+        <p:nvSpPr>
+          <p:cNvPr id="314" name="Rectangle 313">
+            <a:extLst>
+              <a:ext uri="{FF2B5EF4-FFF2-40B4-BE49-F238E27FC236}">
+                <a16:creationId xmlns:a16="http://schemas.microsoft.com/office/drawing/2014/main" id="{6FF04236-50E5-8739-1895-3CA914FEB9DF}"/>
+              </a:ext>
+            </a:extLst>
+          </p:cNvPr>
+          <p:cNvSpPr/>
+          <p:nvPr/>
+        </p:nvSpPr>
+        <p:spPr>
+          <a:xfrm>
+            <a:off x="6306646" y="4558596"/>
+            <a:ext cx="2436388" cy="1644960"/>
+          </a:xfrm>
+          <a:prstGeom prst="rect">
+            <a:avLst/>
+          </a:prstGeom>
+          <a:solidFill>
+            <a:srgbClr val="2596BE">
+              <a:alpha val="30196"/>
+            </a:srgbClr>
+          </a:solidFill>
+        </p:spPr>
+        <p:style>
+          <a:lnRef idx="2">
+            <a:schemeClr val="accent1">
+              <a:shade val="15000"/>
+            </a:schemeClr>
+          </a:lnRef>
+          <a:fillRef idx="1">
+            <a:schemeClr val="accent1"/>
+          </a:fillRef>
+          <a:effectRef idx="0">
+            <a:schemeClr val="accent1"/>
+          </a:effectRef>
+          <a:fontRef idx="minor">
+            <a:schemeClr val="lt1"/>
+          </a:fontRef>
+        </p:style>
+        <p:txBody>
+          <a:bodyPr rtlCol="0" anchor="ctr"/>
+          <a:lstStyle/>
+          <a:p>
+            <a:pPr algn="ctr"/>
+            <a:r>
+              <a:rPr lang="en-GB" sz="2000" dirty="0">
+                <a:solidFill>
+                  <a:schemeClr val="tx1"/>
+                </a:solidFill>
+              </a:rPr>
+              <a:t>You will need to use a cable to connect your VR headset to your computer (</a:t>
+            </a:r>
+            <a:r>
+              <a:rPr lang="en-GB" sz="2000" b="1" dirty="0">
+                <a:solidFill>
+                  <a:schemeClr val="tx1"/>
+                </a:solidFill>
+              </a:rPr>
+              <a:t>tethered</a:t>
+            </a:r>
+            <a:r>
+              <a:rPr lang="en-GB" sz="2000" dirty="0">
+                <a:solidFill>
+                  <a:schemeClr val="tx1"/>
+                </a:solidFill>
+              </a:rPr>
+              <a:t>).</a:t>
+            </a:r>
+          </a:p>
+        </p:txBody>
+      </p:sp>
+      <p:cxnSp>
+        <p:nvCxnSpPr>
+          <p:cNvPr id="320" name="Straight Arrow Connector 319">
+            <a:extLst>
+              <a:ext uri="{FF2B5EF4-FFF2-40B4-BE49-F238E27FC236}">
+                <a16:creationId xmlns:a16="http://schemas.microsoft.com/office/drawing/2014/main" id="{B010DB81-FF87-6096-9227-5030260B4C51}"/>
+              </a:ext>
+            </a:extLst>
+          </p:cNvPr>
+          <p:cNvCxnSpPr>
+            <a:cxnSpLocks/>
+            <a:stCxn id="314" idx="2"/>
+            <a:endCxn id="4" idx="0"/>
+          </p:cNvCxnSpPr>
+          <p:nvPr/>
+        </p:nvCxnSpPr>
+        <p:spPr>
+          <a:xfrm flipH="1">
+            <a:off x="7521505" y="6203556"/>
+            <a:ext cx="3335" cy="3616878"/>
+          </a:xfrm>
+          <a:prstGeom prst="straightConnector1">
+            <a:avLst/>
+          </a:prstGeom>
+          <a:ln>
+            <a:headEnd type="none" w="med" len="med"/>
+            <a:tailEnd type="arrow" w="med" len="med"/>
+          </a:ln>
+        </p:spPr>
+        <p:style>
+          <a:lnRef idx="2">
+            <a:schemeClr val="dk1"/>
+          </a:lnRef>
+          <a:fillRef idx="0">
+            <a:schemeClr val="dk1"/>
+          </a:fillRef>
+          <a:effectRef idx="1">
+            <a:schemeClr val="dk1"/>
+          </a:effectRef>
+          <a:fontRef idx="minor">
+            <a:schemeClr val="tx1"/>
+          </a:fontRef>
+        </p:style>
+      </p:cxnSp>
+      <p:sp>
+        <p:nvSpPr>
+          <p:cNvPr id="324" name="Rectangle 323">
+            <a:extLst>
+              <a:ext uri="{FF2B5EF4-FFF2-40B4-BE49-F238E27FC236}">
+                <a16:creationId xmlns:a16="http://schemas.microsoft.com/office/drawing/2014/main" id="{6A00F52B-C080-2BFF-9C5D-566A00C0B6BD}"/>
+              </a:ext>
+            </a:extLst>
+          </p:cNvPr>
+          <p:cNvSpPr/>
+          <p:nvPr/>
+        </p:nvSpPr>
+        <p:spPr>
+          <a:xfrm>
+            <a:off x="10403274" y="9820434"/>
+            <a:ext cx="2663685" cy="1259320"/>
+          </a:xfrm>
+          <a:prstGeom prst="rect">
+            <a:avLst/>
+          </a:prstGeom>
+          <a:solidFill>
+            <a:schemeClr val="bg1">
+              <a:lumMod val="85000"/>
+            </a:schemeClr>
+          </a:solidFill>
+        </p:spPr>
+        <p:style>
+          <a:lnRef idx="2">
+            <a:schemeClr val="accent1">
+              <a:shade val="15000"/>
+            </a:schemeClr>
+          </a:lnRef>
+          <a:fillRef idx="1">
+            <a:schemeClr val="accent1"/>
+          </a:fillRef>
+          <a:effectRef idx="0">
+            <a:schemeClr val="accent1"/>
+          </a:effectRef>
+          <a:fontRef idx="minor">
+            <a:schemeClr val="lt1"/>
+          </a:fontRef>
+        </p:style>
+        <p:txBody>
+          <a:bodyPr rtlCol="0" anchor="ctr"/>
+          <a:lstStyle/>
+          <a:p>
+            <a:pPr algn="ctr"/>
+            <a:r>
+              <a:rPr lang="en-GB" sz="2000" dirty="0">
+                <a:solidFill>
+                  <a:schemeClr val="tx1"/>
+                </a:solidFill>
+              </a:rPr>
+              <a:t>Are you running the server and client on the </a:t>
+            </a:r>
+            <a:r>
+              <a:rPr lang="en-GB" sz="2000" b="1" dirty="0">
+                <a:solidFill>
+                  <a:schemeClr val="tx1"/>
+                </a:solidFill>
+              </a:rPr>
+              <a:t>same computer</a:t>
+            </a:r>
+            <a:r>
+              <a:rPr lang="en-GB" sz="2000" dirty="0">
+                <a:solidFill>
+                  <a:schemeClr val="tx1"/>
+                </a:solidFill>
+              </a:rPr>
+              <a:t>?</a:t>
+            </a:r>
+          </a:p>
+        </p:txBody>
+      </p:sp>
+      <p:sp>
+        <p:nvSpPr>
+          <p:cNvPr id="329" name="Rectangle 328">
+            <a:extLst>
+              <a:ext uri="{FF2B5EF4-FFF2-40B4-BE49-F238E27FC236}">
+                <a16:creationId xmlns:a16="http://schemas.microsoft.com/office/drawing/2014/main" id="{CAB42C7C-D886-2F51-799D-9AE8A4A3E3CA}"/>
+              </a:ext>
+            </a:extLst>
+          </p:cNvPr>
+          <p:cNvSpPr/>
+          <p:nvPr/>
+        </p:nvSpPr>
+        <p:spPr>
+          <a:xfrm>
+            <a:off x="5170879" y="12004224"/>
+            <a:ext cx="4724962" cy="1554112"/>
+          </a:xfrm>
+          <a:prstGeom prst="rect">
+            <a:avLst/>
+          </a:prstGeom>
+          <a:solidFill>
+            <a:srgbClr val="2596BE">
+              <a:alpha val="30196"/>
+            </a:srgbClr>
+          </a:solidFill>
+        </p:spPr>
+        <p:style>
+          <a:lnRef idx="2">
+            <a:schemeClr val="accent1">
+              <a:shade val="15000"/>
+            </a:schemeClr>
+          </a:lnRef>
+          <a:fillRef idx="1">
+            <a:schemeClr val="accent1"/>
+          </a:fillRef>
+          <a:effectRef idx="0">
+            <a:schemeClr val="accent1"/>
+          </a:effectRef>
+          <a:fontRef idx="minor">
+            <a:schemeClr val="lt1"/>
+          </a:fontRef>
+        </p:style>
+        <p:txBody>
+          <a:bodyPr rtlCol="0" anchor="ctr"/>
+          <a:lstStyle/>
+          <a:p>
+            <a:pPr algn="ctr"/>
+            <a:r>
+              <a:rPr lang="en-GB" sz="2000" dirty="0">
+                <a:solidFill>
+                  <a:schemeClr val="tx1"/>
+                </a:solidFill>
+              </a:rPr>
+              <a:t>Your </a:t>
+            </a:r>
+            <a:r>
+              <a:rPr lang="en-GB" sz="2000" b="1" dirty="0">
+                <a:solidFill>
+                  <a:schemeClr val="tx1"/>
+                </a:solidFill>
+              </a:rPr>
+              <a:t>computers must be connected via an ethernet cable or LAN </a:t>
+            </a:r>
+            <a:r>
+              <a:rPr lang="en-GB" sz="2000" dirty="0">
+                <a:solidFill>
+                  <a:schemeClr val="tx1"/>
+                </a:solidFill>
+              </a:rPr>
+              <a:t>(internet connection not required).</a:t>
+            </a:r>
+          </a:p>
+        </p:txBody>
+      </p:sp>
+      <p:cxnSp>
+        <p:nvCxnSpPr>
+          <p:cNvPr id="330" name="Straight Arrow Connector 329">
+            <a:extLst>
+              <a:ext uri="{FF2B5EF4-FFF2-40B4-BE49-F238E27FC236}">
+                <a16:creationId xmlns:a16="http://schemas.microsoft.com/office/drawing/2014/main" id="{893746EB-0D3E-1251-F62D-B34FFC6F5154}"/>
+              </a:ext>
+            </a:extLst>
+          </p:cNvPr>
+          <p:cNvCxnSpPr>
+            <a:cxnSpLocks/>
+            <a:stCxn id="324" idx="2"/>
+            <a:endCxn id="42" idx="0"/>
+          </p:cNvCxnSpPr>
+          <p:nvPr/>
+        </p:nvCxnSpPr>
+        <p:spPr>
+          <a:xfrm flipH="1">
+            <a:off x="11734220" y="11079754"/>
+            <a:ext cx="897" cy="924462"/>
+          </a:xfrm>
+          <a:prstGeom prst="straightConnector1">
+            <a:avLst/>
+          </a:prstGeom>
+          <a:ln>
+            <a:headEnd type="none" w="med" len="med"/>
+            <a:tailEnd type="arrow" w="med" len="med"/>
+          </a:ln>
+        </p:spPr>
+        <p:style>
+          <a:lnRef idx="2">
+            <a:schemeClr val="dk1"/>
+          </a:lnRef>
+          <a:fillRef idx="0">
+            <a:schemeClr val="dk1"/>
+          </a:fillRef>
+          <a:effectRef idx="1">
+            <a:schemeClr val="dk1"/>
+          </a:effectRef>
+          <a:fontRef idx="minor">
+            <a:schemeClr val="tx1"/>
+          </a:fontRef>
+        </p:style>
+      </p:cxnSp>
+      <p:sp>
+        <p:nvSpPr>
+          <p:cNvPr id="334" name="TextBox 333">
+            <a:extLst>
+              <a:ext uri="{FF2B5EF4-FFF2-40B4-BE49-F238E27FC236}">
+                <a16:creationId xmlns:a16="http://schemas.microsoft.com/office/drawing/2014/main" id="{69E8B08F-6DCC-96A9-0430-EFAF16983513}"/>
+              </a:ext>
+            </a:extLst>
+          </p:cNvPr>
+          <p:cNvSpPr txBox="1"/>
+          <p:nvPr/>
+        </p:nvSpPr>
+        <p:spPr>
+          <a:xfrm>
+            <a:off x="11657207" y="11368769"/>
+            <a:ext cx="721103" cy="400110"/>
+          </a:xfrm>
+          <a:prstGeom prst="rect">
+            <a:avLst/>
+          </a:prstGeom>
+          <a:noFill/>
+        </p:spPr>
+        <p:txBody>
+          <a:bodyPr wrap="square" rtlCol="0">
+            <a:spAutoFit/>
+          </a:bodyPr>
+          <a:lstStyle/>
+          <a:p>
+            <a:pPr algn="ctr"/>
+            <a:r>
+              <a:rPr lang="en-GB" sz="2000" dirty="0"/>
+              <a:t>Yes</a:t>
+            </a:r>
+          </a:p>
+        </p:txBody>
+      </p:sp>
+      <p:sp>
+        <p:nvSpPr>
+          <p:cNvPr id="338" name="TextBox 337">
+            <a:extLst>
+              <a:ext uri="{FF2B5EF4-FFF2-40B4-BE49-F238E27FC236}">
+                <a16:creationId xmlns:a16="http://schemas.microsoft.com/office/drawing/2014/main" id="{AF7A6573-2EB0-85AC-1396-5C156AEBC5D4}"/>
+              </a:ext>
+            </a:extLst>
+          </p:cNvPr>
+          <p:cNvSpPr txBox="1"/>
+          <p:nvPr/>
+        </p:nvSpPr>
+        <p:spPr>
+          <a:xfrm>
+            <a:off x="13066062" y="9979909"/>
+            <a:ext cx="802351" cy="400110"/>
+          </a:xfrm>
+          <a:prstGeom prst="rect">
+            <a:avLst/>
+          </a:prstGeom>
+          <a:noFill/>
+        </p:spPr>
+        <p:txBody>
+          <a:bodyPr wrap="square" rtlCol="0">
+            <a:spAutoFit/>
+          </a:bodyPr>
+          <a:lstStyle/>
+          <a:p>
+            <a:pPr algn="ctr"/>
+            <a:r>
+              <a:rPr lang="en-GB" sz="2000" dirty="0"/>
+              <a:t>No</a:t>
+            </a:r>
+          </a:p>
+        </p:txBody>
+      </p:sp>
+      <p:cxnSp>
+        <p:nvCxnSpPr>
+          <p:cNvPr id="352" name="Straight Arrow Connector 351">
+            <a:extLst>
+              <a:ext uri="{FF2B5EF4-FFF2-40B4-BE49-F238E27FC236}">
+                <a16:creationId xmlns:a16="http://schemas.microsoft.com/office/drawing/2014/main" id="{FD7702DC-CEB3-F428-AC58-7631036208F5}"/>
+              </a:ext>
+            </a:extLst>
+          </p:cNvPr>
+          <p:cNvCxnSpPr>
+            <a:cxnSpLocks/>
+            <a:stCxn id="4" idx="2"/>
+            <a:endCxn id="329" idx="0"/>
+          </p:cNvCxnSpPr>
+          <p:nvPr/>
+        </p:nvCxnSpPr>
+        <p:spPr>
+          <a:xfrm>
+            <a:off x="7521505" y="11079754"/>
+            <a:ext cx="11855" cy="924470"/>
+          </a:xfrm>
+          <a:prstGeom prst="straightConnector1">
+            <a:avLst/>
+          </a:prstGeom>
+          <a:ln>
+            <a:headEnd type="none" w="med" len="med"/>
+            <a:tailEnd type="arrow" w="med" len="med"/>
+          </a:ln>
+        </p:spPr>
+        <p:style>
+          <a:lnRef idx="2">
+            <a:schemeClr val="dk1"/>
+          </a:lnRef>
+          <a:fillRef idx="0">
+            <a:schemeClr val="dk1"/>
+          </a:fillRef>
+          <a:effectRef idx="1">
+            <a:schemeClr val="dk1"/>
+          </a:effectRef>
+          <a:fontRef idx="minor">
+            <a:schemeClr val="tx1"/>
+          </a:fontRef>
+        </p:style>
+      </p:cxnSp>
+      <p:sp>
+        <p:nvSpPr>
+          <p:cNvPr id="363" name="Rectangle 362">
+            <a:extLst>
+              <a:ext uri="{FF2B5EF4-FFF2-40B4-BE49-F238E27FC236}">
+                <a16:creationId xmlns:a16="http://schemas.microsoft.com/office/drawing/2014/main" id="{33B453C8-38F8-3B27-667B-C8A99434E2AD}"/>
+              </a:ext>
+            </a:extLst>
+          </p:cNvPr>
+          <p:cNvSpPr/>
+          <p:nvPr/>
+        </p:nvSpPr>
+        <p:spPr>
+          <a:xfrm>
+            <a:off x="9857386" y="14468911"/>
+            <a:ext cx="3476229" cy="1406149"/>
+          </a:xfrm>
+          <a:prstGeom prst="rect">
+            <a:avLst/>
+          </a:prstGeom>
+          <a:solidFill>
+            <a:schemeClr val="accent5">
+              <a:lumMod val="50000"/>
+              <a:alpha val="30196"/>
+            </a:schemeClr>
+          </a:solidFill>
+        </p:spPr>
+        <p:style>
+          <a:lnRef idx="2">
+            <a:schemeClr val="accent1">
+              <a:shade val="15000"/>
+            </a:schemeClr>
+          </a:lnRef>
+          <a:fillRef idx="1">
+            <a:schemeClr val="accent1"/>
+          </a:fillRef>
+          <a:effectRef idx="0">
+            <a:schemeClr val="accent1"/>
+          </a:effectRef>
+          <a:fontRef idx="minor">
+            <a:schemeClr val="lt1"/>
+          </a:fontRef>
+        </p:style>
+        <p:txBody>
+          <a:bodyPr rtlCol="0" anchor="ctr"/>
+          <a:lstStyle/>
+          <a:p>
+            <a:r>
+              <a:rPr lang="en-GB" sz="2000" b="1" baseline="30000" dirty="0">
+                <a:solidFill>
+                  <a:schemeClr val="tx1"/>
+                </a:solidFill>
+              </a:rPr>
+              <a:t>‡ </a:t>
+            </a:r>
+            <a:r>
+              <a:rPr lang="en-GB" sz="2000" b="1" dirty="0">
+                <a:solidFill>
+                  <a:schemeClr val="tx1"/>
+                </a:solidFill>
+              </a:rPr>
+              <a:t>Using Meta Quest Link or SteamVR</a:t>
+            </a:r>
+            <a:r>
+              <a:rPr lang="en-GB" sz="2000" dirty="0">
+                <a:solidFill>
+                  <a:schemeClr val="tx1"/>
+                </a:solidFill>
+              </a:rPr>
+              <a:t> with a cable to your computer (tethered)</a:t>
+            </a:r>
+          </a:p>
+        </p:txBody>
+      </p:sp>
+      <p:cxnSp>
+        <p:nvCxnSpPr>
+          <p:cNvPr id="366" name="Straight Arrow Connector 365">
+            <a:extLst>
+              <a:ext uri="{FF2B5EF4-FFF2-40B4-BE49-F238E27FC236}">
+                <a16:creationId xmlns:a16="http://schemas.microsoft.com/office/drawing/2014/main" id="{01456621-189B-690B-2D6C-43CD380F59E4}"/>
+              </a:ext>
+            </a:extLst>
+          </p:cNvPr>
+          <p:cNvCxnSpPr>
+            <a:cxnSpLocks/>
+            <a:stCxn id="305" idx="2"/>
+            <a:endCxn id="19" idx="0"/>
+          </p:cNvCxnSpPr>
+          <p:nvPr/>
+        </p:nvCxnSpPr>
+        <p:spPr>
+          <a:xfrm>
+            <a:off x="2455683" y="11275215"/>
+            <a:ext cx="0" cy="910584"/>
+          </a:xfrm>
+          <a:prstGeom prst="straightConnector1">
+            <a:avLst/>
+          </a:prstGeom>
+          <a:ln>
+            <a:headEnd type="none" w="med" len="med"/>
+            <a:tailEnd type="arrow" w="med" len="med"/>
+          </a:ln>
+        </p:spPr>
+        <p:style>
+          <a:lnRef idx="2">
+            <a:schemeClr val="dk1"/>
+          </a:lnRef>
+          <a:fillRef idx="0">
+            <a:schemeClr val="dk1"/>
+          </a:fillRef>
+          <a:effectRef idx="1">
+            <a:schemeClr val="dk1"/>
+          </a:effectRef>
+          <a:fontRef idx="minor">
+            <a:schemeClr val="tx1"/>
+          </a:fontRef>
+        </p:style>
+      </p:cxnSp>
+      <p:sp>
+        <p:nvSpPr>
+          <p:cNvPr id="371" name="TextBox 370">
+            <a:extLst>
+              <a:ext uri="{FF2B5EF4-FFF2-40B4-BE49-F238E27FC236}">
+                <a16:creationId xmlns:a16="http://schemas.microsoft.com/office/drawing/2014/main" id="{A79CC35C-7554-7426-B927-FF1CD8F0DFAA}"/>
+              </a:ext>
+            </a:extLst>
+          </p:cNvPr>
+          <p:cNvSpPr txBox="1"/>
+          <p:nvPr/>
+        </p:nvSpPr>
+        <p:spPr>
+          <a:xfrm>
+            <a:off x="2432190" y="11439664"/>
+            <a:ext cx="646232" cy="400110"/>
+          </a:xfrm>
+          <a:prstGeom prst="rect">
+            <a:avLst/>
+          </a:prstGeom>
+          <a:noFill/>
+        </p:spPr>
+        <p:txBody>
+          <a:bodyPr wrap="square" rtlCol="0">
+            <a:spAutoFit/>
+          </a:bodyPr>
+          <a:lstStyle/>
+          <a:p>
+            <a:pPr algn="ctr"/>
+            <a:r>
+              <a:rPr lang="en-GB" sz="2000" dirty="0"/>
+              <a:t>Yes</a:t>
+            </a:r>
+          </a:p>
+        </p:txBody>
+      </p:sp>
+      <p:sp>
+        <p:nvSpPr>
+          <p:cNvPr id="385" name="TextBox 384">
+            <a:extLst>
+              <a:ext uri="{FF2B5EF4-FFF2-40B4-BE49-F238E27FC236}">
+                <a16:creationId xmlns:a16="http://schemas.microsoft.com/office/drawing/2014/main" id="{D00C56CC-CD79-D04E-6939-916AD014486C}"/>
+              </a:ext>
+            </a:extLst>
+          </p:cNvPr>
+          <p:cNvSpPr txBox="1"/>
+          <p:nvPr/>
+        </p:nvSpPr>
+        <p:spPr>
+          <a:xfrm>
+            <a:off x="4639504" y="10095043"/>
+            <a:ext cx="730306" cy="400110"/>
+          </a:xfrm>
+          <a:prstGeom prst="rect">
+            <a:avLst/>
+          </a:prstGeom>
+          <a:noFill/>
+        </p:spPr>
+        <p:txBody>
+          <a:bodyPr wrap="square" rtlCol="0">
+            <a:spAutoFit/>
+          </a:bodyPr>
+          <a:lstStyle/>
+          <a:p>
+            <a:pPr algn="ctr"/>
+            <a:r>
+              <a:rPr lang="en-GB" sz="2000" dirty="0"/>
+              <a:t>No</a:t>
+            </a:r>
+          </a:p>
+        </p:txBody>
+      </p:sp>
+      <p:cxnSp>
+        <p:nvCxnSpPr>
+          <p:cNvPr id="402" name="Connector: Elbow 401">
+            <a:extLst>
+              <a:ext uri="{FF2B5EF4-FFF2-40B4-BE49-F238E27FC236}">
+                <a16:creationId xmlns:a16="http://schemas.microsoft.com/office/drawing/2014/main" id="{602FD4CE-BF27-5BA3-4A42-313934A36984}"/>
+              </a:ext>
+            </a:extLst>
+          </p:cNvPr>
+          <p:cNvCxnSpPr>
+            <a:cxnSpLocks/>
+            <a:stCxn id="305" idx="3"/>
+            <a:endCxn id="4" idx="1"/>
+          </p:cNvCxnSpPr>
+          <p:nvPr/>
+        </p:nvCxnSpPr>
+        <p:spPr>
+          <a:xfrm flipV="1">
+            <a:off x="3673876" y="10450094"/>
+            <a:ext cx="2515786" cy="2641"/>
+          </a:xfrm>
+          <a:prstGeom prst="straightConnector1">
+            <a:avLst/>
+          </a:prstGeom>
+          <a:ln>
+            <a:headEnd type="none" w="med" len="med"/>
+            <a:tailEnd type="arrow" w="med" len="med"/>
+          </a:ln>
+        </p:spPr>
+        <p:style>
+          <a:lnRef idx="2">
+            <a:schemeClr val="dk1"/>
+          </a:lnRef>
+          <a:fillRef idx="0">
+            <a:schemeClr val="dk1"/>
+          </a:fillRef>
+          <a:effectRef idx="1">
+            <a:schemeClr val="dk1"/>
+          </a:effectRef>
+          <a:fontRef idx="minor">
+            <a:schemeClr val="tx1"/>
+          </a:fontRef>
+        </p:style>
+      </p:cxnSp>
+      <p:cxnSp>
+        <p:nvCxnSpPr>
+          <p:cNvPr id="414" name="Connector: Elbow 413">
+            <a:extLst>
+              <a:ext uri="{FF2B5EF4-FFF2-40B4-BE49-F238E27FC236}">
+                <a16:creationId xmlns:a16="http://schemas.microsoft.com/office/drawing/2014/main" id="{3EBB69BF-321C-B3CE-8472-0FD925D21411}"/>
+              </a:ext>
+            </a:extLst>
+          </p:cNvPr>
+          <p:cNvCxnSpPr>
+            <a:cxnSpLocks/>
+            <a:stCxn id="277" idx="2"/>
+            <a:endCxn id="305" idx="0"/>
+          </p:cNvCxnSpPr>
+          <p:nvPr/>
+        </p:nvCxnSpPr>
+        <p:spPr>
+          <a:xfrm rot="5400000">
+            <a:off x="3617809" y="7283404"/>
+            <a:ext cx="1184725" cy="3508976"/>
+          </a:xfrm>
+          <a:prstGeom prst="bentConnector3">
+            <a:avLst>
+              <a:gd name="adj1" fmla="val 50000"/>
+            </a:avLst>
+          </a:prstGeom>
+          <a:ln>
+            <a:headEnd type="none" w="med" len="med"/>
+            <a:tailEnd type="arrow" w="med" len="med"/>
+          </a:ln>
+        </p:spPr>
+        <p:style>
+          <a:lnRef idx="2">
+            <a:schemeClr val="dk1"/>
+          </a:lnRef>
+          <a:fillRef idx="0">
+            <a:schemeClr val="dk1"/>
+          </a:fillRef>
+          <a:effectRef idx="1">
+            <a:schemeClr val="dk1"/>
+          </a:effectRef>
+          <a:fontRef idx="minor">
+            <a:schemeClr val="tx1"/>
+          </a:fontRef>
+        </p:style>
+      </p:cxnSp>
+      <p:cxnSp>
+        <p:nvCxnSpPr>
+          <p:cNvPr id="526" name="Connector: Elbow 525">
+            <a:extLst>
+              <a:ext uri="{FF2B5EF4-FFF2-40B4-BE49-F238E27FC236}">
+                <a16:creationId xmlns:a16="http://schemas.microsoft.com/office/drawing/2014/main" id="{D53EE2C6-E9F4-0577-52F1-603DDF342357}"/>
+              </a:ext>
+            </a:extLst>
+          </p:cNvPr>
+          <p:cNvCxnSpPr>
+            <a:cxnSpLocks/>
+            <a:stCxn id="324" idx="3"/>
+            <a:endCxn id="329" idx="2"/>
+          </p:cNvCxnSpPr>
+          <p:nvPr/>
+        </p:nvCxnSpPr>
+        <p:spPr>
+          <a:xfrm flipH="1">
+            <a:off x="7533360" y="10450094"/>
+            <a:ext cx="5533599" cy="3108242"/>
+          </a:xfrm>
+          <a:prstGeom prst="bentConnector4">
+            <a:avLst>
+              <a:gd name="adj1" fmla="val -4131"/>
+              <a:gd name="adj2" fmla="val 109970"/>
+            </a:avLst>
+          </a:prstGeom>
+          <a:ln>
+            <a:headEnd type="none" w="med" len="med"/>
+            <a:tailEnd type="arrow" w="med" len="med"/>
+          </a:ln>
+        </p:spPr>
+        <p:style>
+          <a:lnRef idx="2">
+            <a:schemeClr val="dk1"/>
+          </a:lnRef>
+          <a:fillRef idx="0">
+            <a:schemeClr val="dk1"/>
+          </a:fillRef>
+          <a:effectRef idx="1">
+            <a:schemeClr val="dk1"/>
+          </a:effectRef>
+          <a:fontRef idx="minor">
+            <a:schemeClr val="tx1"/>
+          </a:fontRef>
+        </p:style>
+      </p:cxnSp>
+      <p:cxnSp>
+        <p:nvCxnSpPr>
+          <p:cNvPr id="20" name="Connector: Elbow 213">
+            <a:extLst>
+              <a:ext uri="{FF2B5EF4-FFF2-40B4-BE49-F238E27FC236}">
+                <a16:creationId xmlns:a16="http://schemas.microsoft.com/office/drawing/2014/main" id="{38CF9B38-FDE4-A1FC-8EBD-60F2F36FA19B}"/>
+              </a:ext>
+            </a:extLst>
+          </p:cNvPr>
+          <p:cNvCxnSpPr>
+            <a:cxnSpLocks/>
+            <a:stCxn id="329" idx="3"/>
+            <a:endCxn id="42" idx="1"/>
+          </p:cNvCxnSpPr>
+          <p:nvPr/>
+        </p:nvCxnSpPr>
+        <p:spPr>
+          <a:xfrm flipV="1">
+            <a:off x="9895841" y="12781272"/>
+            <a:ext cx="506536" cy="8"/>
+          </a:xfrm>
+          <a:prstGeom prst="straightConnector1">
+            <a:avLst/>
+          </a:prstGeom>
+          <a:ln>
+            <a:headEnd type="none" w="med" len="med"/>
+            <a:tailEnd type="arrow" w="med" len="med"/>
+          </a:ln>
+        </p:spPr>
+        <p:style>
+          <a:lnRef idx="2">
+            <a:schemeClr val="dk1"/>
+          </a:lnRef>
+          <a:fillRef idx="0">
+            <a:schemeClr val="dk1"/>
+          </a:fillRef>
+          <a:effectRef idx="1">
+            <a:schemeClr val="dk1"/>
+          </a:effectRef>
+          <a:fontRef idx="minor">
+            <a:schemeClr val="tx1"/>
+          </a:fontRef>
+        </p:style>
+      </p:cxnSp>
+      <p:sp>
+        <p:nvSpPr>
+          <p:cNvPr id="6" name="Rectangle 5">
+            <a:extLst>
+              <a:ext uri="{FF2B5EF4-FFF2-40B4-BE49-F238E27FC236}">
+                <a16:creationId xmlns:a16="http://schemas.microsoft.com/office/drawing/2014/main" id="{CB0F3719-CBE3-A9A8-FFCD-2ECFD103C24E}"/>
+              </a:ext>
+            </a:extLst>
+          </p:cNvPr>
+          <p:cNvSpPr/>
+          <p:nvPr/>
+        </p:nvSpPr>
+        <p:spPr>
+          <a:xfrm>
+            <a:off x="6031354" y="14468911"/>
+            <a:ext cx="3259128" cy="1406149"/>
+          </a:xfrm>
+          <a:prstGeom prst="rect">
+            <a:avLst/>
+          </a:prstGeom>
+          <a:solidFill>
+            <a:schemeClr val="accent5">
+              <a:lumMod val="50000"/>
+              <a:alpha val="30196"/>
+            </a:schemeClr>
+          </a:solidFill>
+        </p:spPr>
+        <p:style>
+          <a:lnRef idx="2">
+            <a:schemeClr val="accent1">
+              <a:shade val="15000"/>
+            </a:schemeClr>
+          </a:lnRef>
+          <a:fillRef idx="1">
+            <a:schemeClr val="accent1"/>
+          </a:fillRef>
+          <a:effectRef idx="0">
+            <a:schemeClr val="accent1"/>
+          </a:effectRef>
+          <a:fontRef idx="minor">
+            <a:schemeClr val="lt1"/>
+          </a:fontRef>
+        </p:style>
+        <p:txBody>
+          <a:bodyPr rtlCol="0" anchor="ctr"/>
+          <a:lstStyle/>
+          <a:p>
+            <a:r>
+              <a:rPr lang="en-GB" sz="2000" b="1" i="0" baseline="30000" dirty="0">
+                <a:solidFill>
+                  <a:srgbClr val="040C28"/>
+                </a:solidFill>
+                <a:effectLst/>
+              </a:rPr>
+              <a:t>†</a:t>
+            </a:r>
+            <a:r>
+              <a:rPr lang="en-GB" sz="2000" b="1" dirty="0">
+                <a:solidFill>
+                  <a:schemeClr val="tx1"/>
+                </a:solidFill>
+              </a:rPr>
+              <a:t>Other headsets </a:t>
+            </a:r>
+            <a:r>
+              <a:rPr lang="en-GB" sz="2000" dirty="0">
+                <a:solidFill>
+                  <a:schemeClr val="tx1"/>
+                </a:solidFill>
+              </a:rPr>
+              <a:t>include:</a:t>
+            </a:r>
+          </a:p>
+          <a:p>
+            <a:pPr marL="342900" indent="-342900">
+              <a:buFont typeface="Arial" panose="020B0604020202020204" pitchFamily="34" charset="0"/>
+              <a:buChar char="•"/>
+            </a:pPr>
+            <a:r>
+              <a:rPr lang="en-GB" sz="2000" dirty="0">
+                <a:solidFill>
+                  <a:schemeClr val="tx1"/>
+                </a:solidFill>
+              </a:rPr>
+              <a:t>HTC </a:t>
+            </a:r>
+            <a:r>
+              <a:rPr lang="en-GB" sz="2000" dirty="0" err="1">
+                <a:solidFill>
+                  <a:schemeClr val="tx1"/>
+                </a:solidFill>
+              </a:rPr>
+              <a:t>Vive</a:t>
+            </a:r>
+            <a:endParaRPr lang="en-GB" sz="2000" dirty="0">
+              <a:solidFill>
+                <a:schemeClr val="tx1"/>
+              </a:solidFill>
+            </a:endParaRPr>
+          </a:p>
+          <a:p>
+            <a:pPr marL="342900" indent="-342900">
+              <a:buFont typeface="Arial" panose="020B0604020202020204" pitchFamily="34" charset="0"/>
+              <a:buChar char="•"/>
+            </a:pPr>
+            <a:r>
+              <a:rPr lang="en-GB" sz="2000" dirty="0">
+                <a:solidFill>
+                  <a:schemeClr val="tx1"/>
+                </a:solidFill>
+              </a:rPr>
+              <a:t>HTC </a:t>
+            </a:r>
+            <a:r>
+              <a:rPr lang="en-GB" sz="2000" dirty="0" err="1">
+                <a:solidFill>
+                  <a:schemeClr val="tx1"/>
+                </a:solidFill>
+              </a:rPr>
+              <a:t>Vive</a:t>
+            </a:r>
+            <a:r>
+              <a:rPr lang="en-GB" sz="2000" dirty="0">
+                <a:solidFill>
+                  <a:schemeClr val="tx1"/>
+                </a:solidFill>
+              </a:rPr>
+              <a:t> Pro</a:t>
+            </a:r>
+          </a:p>
+          <a:p>
+            <a:pPr marL="342900" indent="-342900">
+              <a:buFont typeface="Arial" panose="020B0604020202020204" pitchFamily="34" charset="0"/>
+              <a:buChar char="•"/>
+            </a:pPr>
+            <a:r>
+              <a:rPr lang="en-GB" sz="2000" dirty="0">
+                <a:solidFill>
+                  <a:schemeClr val="tx1"/>
+                </a:solidFill>
+              </a:rPr>
+              <a:t>Valve Index</a:t>
+            </a:r>
+          </a:p>
+        </p:txBody>
+      </p:sp>
+      <p:sp>
+        <p:nvSpPr>
+          <p:cNvPr id="7" name="Rectangle 6">
+            <a:extLst>
+              <a:ext uri="{FF2B5EF4-FFF2-40B4-BE49-F238E27FC236}">
+                <a16:creationId xmlns:a16="http://schemas.microsoft.com/office/drawing/2014/main" id="{64ABE1A5-932C-22BE-9EE8-247D1792463B}"/>
+              </a:ext>
+            </a:extLst>
+          </p:cNvPr>
+          <p:cNvSpPr/>
+          <p:nvPr/>
+        </p:nvSpPr>
+        <p:spPr>
+          <a:xfrm>
+            <a:off x="1210132" y="14468911"/>
+            <a:ext cx="4159678" cy="1406149"/>
+          </a:xfrm>
+          <a:prstGeom prst="rect">
+            <a:avLst/>
+          </a:prstGeom>
+          <a:solidFill>
+            <a:schemeClr val="accent5">
+              <a:lumMod val="50000"/>
+              <a:alpha val="30196"/>
+            </a:schemeClr>
+          </a:solidFill>
+        </p:spPr>
+        <p:style>
+          <a:lnRef idx="2">
+            <a:schemeClr val="accent1">
+              <a:shade val="15000"/>
+            </a:schemeClr>
+          </a:lnRef>
+          <a:fillRef idx="1">
+            <a:schemeClr val="accent1"/>
+          </a:fillRef>
+          <a:effectRef idx="0">
+            <a:schemeClr val="accent1"/>
+          </a:effectRef>
+          <a:fontRef idx="minor">
+            <a:schemeClr val="lt1"/>
+          </a:fontRef>
+        </p:style>
+        <p:txBody>
+          <a:bodyPr rtlCol="0" anchor="ctr"/>
+          <a:lstStyle/>
+          <a:p>
+            <a:r>
+              <a:rPr lang="en-GB" sz="2000" b="1" dirty="0">
+                <a:solidFill>
+                  <a:schemeClr val="tx1"/>
+                </a:solidFill>
+              </a:rPr>
+              <a:t>*Requirements for a wireless setup: </a:t>
+            </a:r>
+            <a:r>
+              <a:rPr lang="en-GB" sz="2000" dirty="0">
+                <a:solidFill>
+                  <a:schemeClr val="tx1"/>
+                </a:solidFill>
+              </a:rPr>
+              <a:t>a strong and stable internet connection that allows communication over the network</a:t>
+            </a:r>
+          </a:p>
+        </p:txBody>
+      </p:sp>
+    </p:spTree>
+    <p:extLst>
+      <p:ext uri="{BB962C8B-B14F-4D97-AF65-F5344CB8AC3E}">
+        <p14:creationId xmlns:p14="http://schemas.microsoft.com/office/powerpoint/2010/main" val="1752442661"/>
       </p:ext>
     </p:extLst>
   </p:cSld>

</xml_diff>

<commit_message>
Update the flow chart and use dropdowns
Removed the "requirements for a wireless setup" from the flow chart", and moved it into a "key point" box directly in the rst file.

Used dropdowns to separate the sections on the two VR setups.
</commit_message>
<xml_diff>
--- a/source/assets/flow-chart.pptx
+++ b/source/assets/flow-chart.pptx
@@ -4889,41 +4889,58 @@
                   <a:schemeClr val="tx1"/>
                 </a:solidFill>
               </a:rPr>
-              <a:t> headset (you cannot run PC-VR).</a:t>
+              <a:t> </a:t>
+            </a:r>
+            <a:r>
+              <a:rPr lang="en-GB" sz="2000" b="1" dirty="0">
+                <a:solidFill>
+                  <a:schemeClr val="tx1"/>
+                </a:solidFill>
+              </a:rPr>
+              <a:t>headset wirelessly</a:t>
+            </a:r>
+            <a:r>
+              <a:rPr lang="en-GB" sz="2000" dirty="0">
+                <a:solidFill>
+                  <a:schemeClr val="tx1"/>
+                </a:solidFill>
+              </a:rPr>
+              <a:t>. You must meet the </a:t>
+            </a:r>
+            <a:r>
+              <a:rPr lang="en-GB" sz="2000" b="1" dirty="0">
+                <a:solidFill>
+                  <a:schemeClr val="tx1"/>
+                </a:solidFill>
+              </a:rPr>
+              <a:t>requirements for a wireless setup</a:t>
+            </a:r>
+            <a:r>
+              <a:rPr lang="en-GB" sz="2000" dirty="0">
+                <a:solidFill>
+                  <a:schemeClr val="tx1"/>
+                </a:solidFill>
+              </a:rPr>
+              <a:t>.</a:t>
             </a:r>
           </a:p>
           <a:p>
             <a:pPr algn="ctr"/>
-            <a:br>
+            <a:endParaRPr lang="en-GB" sz="2000" dirty="0">
+              <a:solidFill>
+                <a:schemeClr val="tx1"/>
+              </a:solidFill>
+            </a:endParaRPr>
+          </a:p>
+          <a:p>
+            <a:pPr algn="ctr"/>
+            <a:r>
               <a:rPr lang="en-GB" sz="2000" dirty="0">
                 <a:solidFill>
                   <a:schemeClr val="tx1"/>
                 </a:solidFill>
               </a:rPr>
-            </a:br>
-            <a:r>
-              <a:rPr lang="en-GB" sz="2000" dirty="0">
-                <a:solidFill>
-                  <a:schemeClr val="tx1"/>
-                </a:solidFill>
-              </a:rPr>
-              <a:t> You must meet the </a:t>
-            </a:r>
-            <a:r>
-              <a:rPr lang="en-GB" sz="2000" b="1" dirty="0">
-                <a:solidFill>
-                  <a:schemeClr val="tx1"/>
-                </a:solidFill>
-              </a:rPr>
-              <a:t>requirements for a wireless setup*</a:t>
-            </a:r>
-            <a:r>
-              <a:rPr lang="en-GB" sz="2000" dirty="0">
-                <a:solidFill>
-                  <a:schemeClr val="tx1"/>
-                </a:solidFill>
-              </a:rPr>
-              <a:t>.</a:t>
+              <a:t>You cannot run PC-VR or use a tethered setup.</a:t>
             </a:r>
           </a:p>
         </p:txBody>
@@ -5277,7 +5294,7 @@
                   <a:schemeClr val="tx1"/>
                 </a:solidFill>
               </a:rPr>
-              <a:t>You will need to use a cable to connect your VR headset to your computer (</a:t>
+              <a:t>You will need to use a cable to connect your VR headset to your computer (a </a:t>
             </a:r>
             <a:r>
               <a:rPr lang="en-GB" sz="2000" b="1" dirty="0">
@@ -5285,7 +5302,7 @@
                   <a:schemeClr val="tx1"/>
                 </a:solidFill>
               </a:rPr>
-              <a:t>tethered</a:t>
+              <a:t>tethered </a:t>
             </a:r>
             <a:r>
               <a:rPr lang="en-GB" sz="2000" dirty="0">
@@ -5293,7 +5310,7 @@
                   <a:schemeClr val="tx1"/>
                 </a:solidFill>
               </a:rPr>
-              <a:t>).</a:t>
+              <a:t>setup).</a:t>
             </a:r>
           </a:p>
         </p:txBody>
@@ -5958,10 +5975,10 @@
         </p:nvGrpSpPr>
         <p:grpSpPr>
           <a:xfrm>
-            <a:off x="2896724" y="14129813"/>
-            <a:ext cx="8415614" cy="2242295"/>
+            <a:off x="9426119" y="5937933"/>
+            <a:ext cx="3892696" cy="2242295"/>
             <a:chOff x="2801026" y="13978522"/>
-            <a:chExt cx="8415614" cy="2242295"/>
+            <a:chExt cx="3892696" cy="2242295"/>
           </a:xfrm>
         </p:grpSpPr>
         <p:sp>
@@ -5979,7 +5996,7 @@
           <p:spPr>
             <a:xfrm>
               <a:off x="2801026" y="13978522"/>
-              <a:ext cx="8415614" cy="2242295"/>
+              <a:ext cx="3892696" cy="2242295"/>
             </a:xfrm>
             <a:prstGeom prst="rect">
               <a:avLst/>
@@ -6078,7 +6095,7 @@
           </p:nvSpPr>
           <p:spPr>
             <a:xfrm>
-              <a:off x="7636569" y="14483355"/>
+              <a:off x="3092340" y="14475735"/>
               <a:ext cx="3259128" cy="1406149"/>
             </a:xfrm>
             <a:prstGeom prst="rect">
@@ -6206,72 +6223,6 @@
                   </a:solidFill>
                 </a:rPr>
                 <a:t>Valve Index</a:t>
-              </a:r>
-            </a:p>
-          </p:txBody>
-        </p:sp>
-        <p:sp>
-          <p:nvSpPr>
-            <p:cNvPr id="7" name="Rectangle 6">
-              <a:extLst>
-                <a:ext uri="{FF2B5EF4-FFF2-40B4-BE49-F238E27FC236}">
-                  <a16:creationId xmlns:a16="http://schemas.microsoft.com/office/drawing/2014/main" id="{64ABE1A5-932C-22BE-9EE8-247D1792463B}"/>
-                </a:ext>
-              </a:extLst>
-            </p:cNvPr>
-            <p:cNvSpPr/>
-            <p:nvPr/>
-          </p:nvSpPr>
-          <p:spPr>
-            <a:xfrm>
-              <a:off x="3091040" y="14468911"/>
-              <a:ext cx="4159678" cy="1406149"/>
-            </a:xfrm>
-            <a:prstGeom prst="rect">
-              <a:avLst/>
-            </a:prstGeom>
-            <a:solidFill>
-              <a:schemeClr val="accent5">
-                <a:lumMod val="50000"/>
-                <a:alpha val="30196"/>
-              </a:schemeClr>
-            </a:solidFill>
-          </p:spPr>
-          <p:style>
-            <a:lnRef idx="2">
-              <a:schemeClr val="accent1">
-                <a:shade val="15000"/>
-              </a:schemeClr>
-            </a:lnRef>
-            <a:fillRef idx="1">
-              <a:schemeClr val="accent1"/>
-            </a:fillRef>
-            <a:effectRef idx="0">
-              <a:schemeClr val="accent1"/>
-            </a:effectRef>
-            <a:fontRef idx="minor">
-              <a:schemeClr val="lt1"/>
-            </a:fontRef>
-          </p:style>
-          <p:txBody>
-            <a:bodyPr rtlCol="0" anchor="ctr"/>
-            <a:lstStyle/>
-            <a:p>
-              <a:r>
-                <a:rPr lang="en-GB" sz="2000" b="1" dirty="0">
-                  <a:solidFill>
-                    <a:schemeClr val="tx1"/>
-                  </a:solidFill>
-                </a:rPr>
-                <a:t>*Requirements for a wireless setup: </a:t>
-              </a:r>
-              <a:r>
-                <a:rPr lang="en-GB" sz="2000" dirty="0">
-                  <a:solidFill>
-                    <a:schemeClr val="tx1"/>
-                  </a:solidFill>
-                </a:rPr>
-                <a:t>a strong and stable internet connection that allows communication over the network</a:t>
               </a:r>
             </a:p>
           </p:txBody>

</xml_diff>

<commit_message>
Update nanover-imd installation & tutorial pages (#125)
* add SteamLink to options for PC-VR

Add Steam Link to options for PC-VR in the NanoVer iMD part of the installation page.

* Update flow diagram

The flow diagram stated that if someone is using "other" as their type of VR headset, then they must use SteamVR. This is not correct, they can actually use SteamVR (tethered) or SteamLink (wireless). This has been corrected in the 2nd blue box from the top in the flow diagram (both in the powerpoint source file and the png).
</commit_message>
<xml_diff>
--- a/source/assets/flow-chart.pptx
+++ b/source/assets/flow-chart.pptx
@@ -556,7 +556,7 @@
           <a:p>
             <a:fld id="{E198B52E-59E9-459A-8A51-6D063C146C47}" type="datetimeFigureOut">
               <a:rPr lang="en-GB" smtClean="0"/>
-              <a:t>01/11/2024</a:t>
+              <a:t>12/11/2024</a:t>
             </a:fld>
             <a:endParaRPr lang="en-GB"/>
           </a:p>
@@ -1147,7 +1147,7 @@
           <a:p>
             <a:fld id="{3FBAF93D-98AC-4FE3-B4B6-00701F2D46F7}" type="datetimeFigureOut">
               <a:rPr lang="en-GB" smtClean="0"/>
-              <a:t>01/11/2024</a:t>
+              <a:t>12/11/2024</a:t>
             </a:fld>
             <a:endParaRPr lang="en-GB"/>
           </a:p>
@@ -1317,7 +1317,7 @@
           <a:p>
             <a:fld id="{3FBAF93D-98AC-4FE3-B4B6-00701F2D46F7}" type="datetimeFigureOut">
               <a:rPr lang="en-GB" smtClean="0"/>
-              <a:t>01/11/2024</a:t>
+              <a:t>12/11/2024</a:t>
             </a:fld>
             <a:endParaRPr lang="en-GB"/>
           </a:p>
@@ -1497,7 +1497,7 @@
           <a:p>
             <a:fld id="{3FBAF93D-98AC-4FE3-B4B6-00701F2D46F7}" type="datetimeFigureOut">
               <a:rPr lang="en-GB" smtClean="0"/>
-              <a:t>01/11/2024</a:t>
+              <a:t>12/11/2024</a:t>
             </a:fld>
             <a:endParaRPr lang="en-GB"/>
           </a:p>
@@ -1667,7 +1667,7 @@
           <a:p>
             <a:fld id="{3FBAF93D-98AC-4FE3-B4B6-00701F2D46F7}" type="datetimeFigureOut">
               <a:rPr lang="en-GB" smtClean="0"/>
-              <a:t>01/11/2024</a:t>
+              <a:t>12/11/2024</a:t>
             </a:fld>
             <a:endParaRPr lang="en-GB"/>
           </a:p>
@@ -1913,7 +1913,7 @@
           <a:p>
             <a:fld id="{3FBAF93D-98AC-4FE3-B4B6-00701F2D46F7}" type="datetimeFigureOut">
               <a:rPr lang="en-GB" smtClean="0"/>
-              <a:t>01/11/2024</a:t>
+              <a:t>12/11/2024</a:t>
             </a:fld>
             <a:endParaRPr lang="en-GB"/>
           </a:p>
@@ -2145,7 +2145,7 @@
           <a:p>
             <a:fld id="{3FBAF93D-98AC-4FE3-B4B6-00701F2D46F7}" type="datetimeFigureOut">
               <a:rPr lang="en-GB" smtClean="0"/>
-              <a:t>01/11/2024</a:t>
+              <a:t>12/11/2024</a:t>
             </a:fld>
             <a:endParaRPr lang="en-GB"/>
           </a:p>
@@ -2512,7 +2512,7 @@
           <a:p>
             <a:fld id="{3FBAF93D-98AC-4FE3-B4B6-00701F2D46F7}" type="datetimeFigureOut">
               <a:rPr lang="en-GB" smtClean="0"/>
-              <a:t>01/11/2024</a:t>
+              <a:t>12/11/2024</a:t>
             </a:fld>
             <a:endParaRPr lang="en-GB"/>
           </a:p>
@@ -2630,7 +2630,7 @@
           <a:p>
             <a:fld id="{3FBAF93D-98AC-4FE3-B4B6-00701F2D46F7}" type="datetimeFigureOut">
               <a:rPr lang="en-GB" smtClean="0"/>
-              <a:t>01/11/2024</a:t>
+              <a:t>12/11/2024</a:t>
             </a:fld>
             <a:endParaRPr lang="en-GB"/>
           </a:p>
@@ -2725,7 +2725,7 @@
           <a:p>
             <a:fld id="{3FBAF93D-98AC-4FE3-B4B6-00701F2D46F7}" type="datetimeFigureOut">
               <a:rPr lang="en-GB" smtClean="0"/>
-              <a:t>01/11/2024</a:t>
+              <a:t>12/11/2024</a:t>
             </a:fld>
             <a:endParaRPr lang="en-GB"/>
           </a:p>
@@ -3002,7 +3002,7 @@
           <a:p>
             <a:fld id="{3FBAF93D-98AC-4FE3-B4B6-00701F2D46F7}" type="datetimeFigureOut">
               <a:rPr lang="en-GB" smtClean="0"/>
-              <a:t>01/11/2024</a:t>
+              <a:t>12/11/2024</a:t>
             </a:fld>
             <a:endParaRPr lang="en-GB"/>
           </a:p>
@@ -3259,7 +3259,7 @@
           <a:p>
             <a:fld id="{3FBAF93D-98AC-4FE3-B4B6-00701F2D46F7}" type="datetimeFigureOut">
               <a:rPr lang="en-GB" smtClean="0"/>
-              <a:t>01/11/2024</a:t>
+              <a:t>12/11/2024</a:t>
             </a:fld>
             <a:endParaRPr lang="en-GB"/>
           </a:p>
@@ -3472,7 +3472,7 @@
           <a:p>
             <a:fld id="{3FBAF93D-98AC-4FE3-B4B6-00701F2D46F7}" type="datetimeFigureOut">
               <a:rPr lang="en-GB" smtClean="0"/>
-              <a:t>01/11/2024</a:t>
+              <a:t>12/11/2024</a:t>
             </a:fld>
             <a:endParaRPr lang="en-GB"/>
           </a:p>
@@ -5154,7 +5154,7 @@
                   <a:schemeClr val="tx1"/>
                 </a:solidFill>
               </a:rPr>
-              <a:t> via SteamVR</a:t>
+              <a:t> via Steam</a:t>
             </a:r>
             <a:r>
               <a:rPr lang="en-GB" sz="2000" dirty="0">

</xml_diff>

<commit_message>
Add mobile hotspot as option to flow diagram
Modified the flow diagram for "choosing your iMD-VR setup" to specify that private networks include both private Wi-Fi and mobile hotspots. This change is reflected in the png image and the powerpoint source file. Also added headings to the powerpoint to make it clear what is on each page.
</commit_message>
<xml_diff>
--- a/source/assets/flow-chart.pptx
+++ b/source/assets/flow-chart.pptx
@@ -556,7 +556,7 @@
           <a:p>
             <a:fld id="{E198B52E-59E9-459A-8A51-6D063C146C47}" type="datetimeFigureOut">
               <a:rPr lang="en-GB" smtClean="0"/>
-              <a:t>12/11/2024</a:t>
+              <a:t>27/01/2025</a:t>
             </a:fld>
             <a:endParaRPr lang="en-GB"/>
           </a:p>
@@ -1147,7 +1147,7 @@
           <a:p>
             <a:fld id="{3FBAF93D-98AC-4FE3-B4B6-00701F2D46F7}" type="datetimeFigureOut">
               <a:rPr lang="en-GB" smtClean="0"/>
-              <a:t>12/11/2024</a:t>
+              <a:t>27/01/2025</a:t>
             </a:fld>
             <a:endParaRPr lang="en-GB"/>
           </a:p>
@@ -1317,7 +1317,7 @@
           <a:p>
             <a:fld id="{3FBAF93D-98AC-4FE3-B4B6-00701F2D46F7}" type="datetimeFigureOut">
               <a:rPr lang="en-GB" smtClean="0"/>
-              <a:t>12/11/2024</a:t>
+              <a:t>27/01/2025</a:t>
             </a:fld>
             <a:endParaRPr lang="en-GB"/>
           </a:p>
@@ -1497,7 +1497,7 @@
           <a:p>
             <a:fld id="{3FBAF93D-98AC-4FE3-B4B6-00701F2D46F7}" type="datetimeFigureOut">
               <a:rPr lang="en-GB" smtClean="0"/>
-              <a:t>12/11/2024</a:t>
+              <a:t>27/01/2025</a:t>
             </a:fld>
             <a:endParaRPr lang="en-GB"/>
           </a:p>
@@ -1667,7 +1667,7 @@
           <a:p>
             <a:fld id="{3FBAF93D-98AC-4FE3-B4B6-00701F2D46F7}" type="datetimeFigureOut">
               <a:rPr lang="en-GB" smtClean="0"/>
-              <a:t>12/11/2024</a:t>
+              <a:t>27/01/2025</a:t>
             </a:fld>
             <a:endParaRPr lang="en-GB"/>
           </a:p>
@@ -1913,7 +1913,7 @@
           <a:p>
             <a:fld id="{3FBAF93D-98AC-4FE3-B4B6-00701F2D46F7}" type="datetimeFigureOut">
               <a:rPr lang="en-GB" smtClean="0"/>
-              <a:t>12/11/2024</a:t>
+              <a:t>27/01/2025</a:t>
             </a:fld>
             <a:endParaRPr lang="en-GB"/>
           </a:p>
@@ -2145,7 +2145,7 @@
           <a:p>
             <a:fld id="{3FBAF93D-98AC-4FE3-B4B6-00701F2D46F7}" type="datetimeFigureOut">
               <a:rPr lang="en-GB" smtClean="0"/>
-              <a:t>12/11/2024</a:t>
+              <a:t>27/01/2025</a:t>
             </a:fld>
             <a:endParaRPr lang="en-GB"/>
           </a:p>
@@ -2512,7 +2512,7 @@
           <a:p>
             <a:fld id="{3FBAF93D-98AC-4FE3-B4B6-00701F2D46F7}" type="datetimeFigureOut">
               <a:rPr lang="en-GB" smtClean="0"/>
-              <a:t>12/11/2024</a:t>
+              <a:t>27/01/2025</a:t>
             </a:fld>
             <a:endParaRPr lang="en-GB"/>
           </a:p>
@@ -2630,7 +2630,7 @@
           <a:p>
             <a:fld id="{3FBAF93D-98AC-4FE3-B4B6-00701F2D46F7}" type="datetimeFigureOut">
               <a:rPr lang="en-GB" smtClean="0"/>
-              <a:t>12/11/2024</a:t>
+              <a:t>27/01/2025</a:t>
             </a:fld>
             <a:endParaRPr lang="en-GB"/>
           </a:p>
@@ -2725,7 +2725,7 @@
           <a:p>
             <a:fld id="{3FBAF93D-98AC-4FE3-B4B6-00701F2D46F7}" type="datetimeFigureOut">
               <a:rPr lang="en-GB" smtClean="0"/>
-              <a:t>12/11/2024</a:t>
+              <a:t>27/01/2025</a:t>
             </a:fld>
             <a:endParaRPr lang="en-GB"/>
           </a:p>
@@ -3002,7 +3002,7 @@
           <a:p>
             <a:fld id="{3FBAF93D-98AC-4FE3-B4B6-00701F2D46F7}" type="datetimeFigureOut">
               <a:rPr lang="en-GB" smtClean="0"/>
-              <a:t>12/11/2024</a:t>
+              <a:t>27/01/2025</a:t>
             </a:fld>
             <a:endParaRPr lang="en-GB"/>
           </a:p>
@@ -3259,7 +3259,7 @@
           <a:p>
             <a:fld id="{3FBAF93D-98AC-4FE3-B4B6-00701F2D46F7}" type="datetimeFigureOut">
               <a:rPr lang="en-GB" smtClean="0"/>
-              <a:t>12/11/2024</a:t>
+              <a:t>27/01/2025</a:t>
             </a:fld>
             <a:endParaRPr lang="en-GB"/>
           </a:p>
@@ -3472,7 +3472,7 @@
           <a:p>
             <a:fld id="{3FBAF93D-98AC-4FE3-B4B6-00701F2D46F7}" type="datetimeFigureOut">
               <a:rPr lang="en-GB" smtClean="0"/>
-              <a:t>12/11/2024</a:t>
+              <a:t>27/01/2025</a:t>
             </a:fld>
             <a:endParaRPr lang="en-GB"/>
           </a:p>
@@ -3891,7 +3891,7 @@
         </p:nvSpPr>
         <p:spPr>
           <a:xfrm>
-            <a:off x="6189662" y="9820434"/>
+            <a:off x="7935991" y="11803562"/>
             <a:ext cx="2663685" cy="1259320"/>
           </a:xfrm>
           <a:prstGeom prst="rect">
@@ -3965,7 +3965,7 @@
         </p:nvSpPr>
         <p:spPr>
           <a:xfrm>
-            <a:off x="1237490" y="4564051"/>
+            <a:off x="2983819" y="6055967"/>
             <a:ext cx="2436388" cy="1644960"/>
           </a:xfrm>
           <a:prstGeom prst="rect">
@@ -4039,8 +4039,8 @@
         </p:nvSpPr>
         <p:spPr>
           <a:xfrm>
-            <a:off x="2455682" y="6373915"/>
-            <a:ext cx="942374" cy="400110"/>
+            <a:off x="4202011" y="7970137"/>
+            <a:ext cx="2195409" cy="707886"/>
           </a:xfrm>
           <a:prstGeom prst="rect">
             <a:avLst/>
@@ -4055,7 +4055,13 @@
           <a:p>
             <a:r>
               <a:rPr lang="en-GB" sz="2000" dirty="0"/>
-              <a:t>Private</a:t>
+              <a:t>e.g. private Wi-Fi</a:t>
+            </a:r>
+          </a:p>
+          <a:p>
+            <a:r>
+              <a:rPr lang="en-GB" sz="2000" dirty="0"/>
+              <a:t> or mobile hotspot</a:t>
             </a:r>
             <a:endParaRPr lang="en-GB" sz="2000" b="1" dirty="0"/>
           </a:p>
@@ -4079,7 +4085,7 @@
         </p:nvCxnSpPr>
         <p:spPr>
           <a:xfrm flipV="1">
-            <a:off x="3673878" y="5381076"/>
+            <a:off x="5420207" y="6872992"/>
             <a:ext cx="2632768" cy="5455"/>
           </a:xfrm>
           <a:prstGeom prst="straightConnector1">
@@ -4119,7 +4125,7 @@
         </p:nvSpPr>
         <p:spPr>
           <a:xfrm>
-            <a:off x="1237491" y="6986883"/>
+            <a:off x="2983820" y="8970011"/>
             <a:ext cx="2436387" cy="1644960"/>
           </a:xfrm>
           <a:prstGeom prst="rect">
@@ -4197,8 +4203,8 @@
         </p:nvCxnSpPr>
         <p:spPr>
           <a:xfrm>
-            <a:off x="2455684" y="6209011"/>
-            <a:ext cx="1" cy="777872"/>
+            <a:off x="4202013" y="7700927"/>
+            <a:ext cx="1" cy="1269084"/>
           </a:xfrm>
           <a:prstGeom prst="straightConnector1">
             <a:avLst/>
@@ -4237,7 +4243,7 @@
         </p:nvSpPr>
         <p:spPr>
           <a:xfrm>
-            <a:off x="1237490" y="12185799"/>
+            <a:off x="2983819" y="14168927"/>
             <a:ext cx="2436386" cy="1093980"/>
           </a:xfrm>
           <a:prstGeom prst="rect">
@@ -4312,7 +4318,7 @@
         </p:nvSpPr>
         <p:spPr>
           <a:xfrm>
-            <a:off x="3776743" y="7442101"/>
+            <a:off x="5523072" y="9425229"/>
             <a:ext cx="920445" cy="400110"/>
           </a:xfrm>
           <a:prstGeom prst="rect">
@@ -4361,7 +4367,7 @@
         </p:nvCxnSpPr>
         <p:spPr>
           <a:xfrm>
-            <a:off x="3673878" y="7809363"/>
+            <a:off x="5420207" y="9792491"/>
             <a:ext cx="1150908" cy="6507"/>
           </a:xfrm>
           <a:prstGeom prst="straightConnector1">
@@ -4401,7 +4407,7 @@
         </p:nvSpPr>
         <p:spPr>
           <a:xfrm>
-            <a:off x="1226608" y="8764555"/>
+            <a:off x="2972937" y="10747683"/>
             <a:ext cx="1205582" cy="707886"/>
           </a:xfrm>
           <a:prstGeom prst="rect">
@@ -4437,7 +4443,7 @@
         </p:nvSpPr>
         <p:spPr>
           <a:xfrm>
-            <a:off x="3790863" y="4878699"/>
+            <a:off x="5537192" y="6370615"/>
             <a:ext cx="2398798" cy="1015663"/>
           </a:xfrm>
           <a:prstGeom prst="rect">
@@ -4483,7 +4489,7 @@
         </p:nvSpPr>
         <p:spPr>
           <a:xfrm>
-            <a:off x="8697192" y="9707619"/>
+            <a:off x="10443521" y="11690747"/>
             <a:ext cx="1756246" cy="707886"/>
           </a:xfrm>
           <a:prstGeom prst="rect">
@@ -4526,7 +4532,7 @@
         </p:nvSpPr>
         <p:spPr>
           <a:xfrm>
-            <a:off x="10402377" y="12004216"/>
+            <a:off x="12148706" y="13987344"/>
             <a:ext cx="2663685" cy="1554111"/>
           </a:xfrm>
           <a:prstGeom prst="rect">
@@ -4601,7 +4607,7 @@
         </p:nvSpPr>
         <p:spPr>
           <a:xfrm>
-            <a:off x="7548554" y="11148924"/>
+            <a:off x="9294883" y="13132052"/>
             <a:ext cx="1155922" cy="707886"/>
           </a:xfrm>
           <a:prstGeom prst="rect">
@@ -4636,7 +4642,7 @@
         </p:nvSpPr>
         <p:spPr>
           <a:xfrm>
-            <a:off x="1237490" y="2252064"/>
+            <a:off x="2983819" y="3743980"/>
             <a:ext cx="2436388" cy="1644960"/>
           </a:xfrm>
           <a:prstGeom prst="rect">
@@ -4714,7 +4720,7 @@
         </p:nvCxnSpPr>
         <p:spPr>
           <a:xfrm>
-            <a:off x="2455684" y="3897024"/>
+            <a:off x="4202013" y="5388940"/>
             <a:ext cx="0" cy="667027"/>
           </a:xfrm>
           <a:prstGeom prst="straightConnector1">
@@ -4754,7 +4760,7 @@
         </p:nvSpPr>
         <p:spPr>
           <a:xfrm>
-            <a:off x="2455682" y="4022141"/>
+            <a:off x="4202011" y="5514057"/>
             <a:ext cx="1206612" cy="400110"/>
           </a:xfrm>
           <a:prstGeom prst="rect">
@@ -4793,7 +4799,7 @@
         </p:nvCxnSpPr>
         <p:spPr>
           <a:xfrm>
-            <a:off x="3673878" y="3074544"/>
+            <a:off x="5420207" y="4566460"/>
             <a:ext cx="1792328" cy="1"/>
           </a:xfrm>
           <a:prstGeom prst="straightConnector1">
@@ -4833,7 +4839,7 @@
         </p:nvSpPr>
         <p:spPr>
           <a:xfrm>
-            <a:off x="5466206" y="2252065"/>
+            <a:off x="7212535" y="3743981"/>
             <a:ext cx="7599855" cy="1644960"/>
           </a:xfrm>
           <a:prstGeom prst="rect">
@@ -4959,7 +4965,7 @@
         </p:nvSpPr>
         <p:spPr>
           <a:xfrm>
-            <a:off x="4048104" y="2357147"/>
+            <a:off x="5794433" y="3849063"/>
             <a:ext cx="1043876" cy="707886"/>
           </a:xfrm>
           <a:prstGeom prst="rect">
@@ -5007,7 +5013,7 @@
         </p:nvCxnSpPr>
         <p:spPr>
           <a:xfrm>
-            <a:off x="8853347" y="10450094"/>
+            <a:off x="10599676" y="12433222"/>
             <a:ext cx="1549927" cy="0"/>
           </a:xfrm>
           <a:prstGeom prst="straightConnector1">
@@ -5051,7 +5057,7 @@
         </p:nvCxnSpPr>
         <p:spPr>
           <a:xfrm flipH="1">
-            <a:off x="2455683" y="8631843"/>
+            <a:off x="4202012" y="10614971"/>
             <a:ext cx="2" cy="998412"/>
           </a:xfrm>
           <a:prstGeom prst="straightConnector1">
@@ -5091,7 +5097,7 @@
         </p:nvSpPr>
         <p:spPr>
           <a:xfrm>
-            <a:off x="4824786" y="7186210"/>
+            <a:off x="6571115" y="9169338"/>
             <a:ext cx="2279745" cy="1259320"/>
           </a:xfrm>
           <a:prstGeom prst="rect">
@@ -5181,7 +5187,7 @@
         </p:nvSpPr>
         <p:spPr>
           <a:xfrm>
-            <a:off x="1237490" y="9630255"/>
+            <a:off x="2983819" y="11613383"/>
             <a:ext cx="2436386" cy="1644960"/>
           </a:xfrm>
           <a:prstGeom prst="rect">
@@ -5255,7 +5261,7 @@
         </p:nvSpPr>
         <p:spPr>
           <a:xfrm>
-            <a:off x="6306646" y="4558596"/>
+            <a:off x="8052975" y="6050512"/>
             <a:ext cx="2436388" cy="1644960"/>
           </a:xfrm>
           <a:prstGeom prst="rect">
@@ -5333,8 +5339,8 @@
         </p:nvCxnSpPr>
         <p:spPr>
           <a:xfrm flipH="1">
-            <a:off x="7521505" y="6203556"/>
-            <a:ext cx="3335" cy="3616878"/>
+            <a:off x="9267834" y="7695472"/>
+            <a:ext cx="3335" cy="4108090"/>
           </a:xfrm>
           <a:prstGeom prst="straightConnector1">
             <a:avLst/>
@@ -5373,7 +5379,7 @@
         </p:nvSpPr>
         <p:spPr>
           <a:xfrm>
-            <a:off x="10403274" y="9820434"/>
+            <a:off x="12149603" y="11803562"/>
             <a:ext cx="2663685" cy="1259320"/>
           </a:xfrm>
           <a:prstGeom prst="rect">
@@ -5447,7 +5453,7 @@
         </p:nvSpPr>
         <p:spPr>
           <a:xfrm>
-            <a:off x="5170879" y="12004224"/>
+            <a:off x="6917208" y="13987352"/>
             <a:ext cx="4724962" cy="1554112"/>
           </a:xfrm>
           <a:prstGeom prst="rect">
@@ -5525,7 +5531,7 @@
         </p:nvCxnSpPr>
         <p:spPr>
           <a:xfrm flipH="1">
-            <a:off x="11734220" y="11079754"/>
+            <a:off x="13480549" y="13062882"/>
             <a:ext cx="897" cy="924462"/>
           </a:xfrm>
           <a:prstGeom prst="straightConnector1">
@@ -5565,7 +5571,7 @@
         </p:nvSpPr>
         <p:spPr>
           <a:xfrm>
-            <a:off x="11657207" y="11368769"/>
+            <a:off x="13403536" y="13351897"/>
             <a:ext cx="721103" cy="400110"/>
           </a:xfrm>
           <a:prstGeom prst="rect">
@@ -5601,7 +5607,7 @@
         </p:nvSpPr>
         <p:spPr>
           <a:xfrm>
-            <a:off x="13066062" y="9979909"/>
+            <a:off x="14812391" y="11963037"/>
             <a:ext cx="802351" cy="400110"/>
           </a:xfrm>
           <a:prstGeom prst="rect">
@@ -5641,7 +5647,7 @@
         </p:nvCxnSpPr>
         <p:spPr>
           <a:xfrm>
-            <a:off x="7521505" y="11079754"/>
+            <a:off x="9267834" y="13062882"/>
             <a:ext cx="11855" cy="924470"/>
           </a:xfrm>
           <a:prstGeom prst="straightConnector1">
@@ -5685,7 +5691,7 @@
         </p:nvCxnSpPr>
         <p:spPr>
           <a:xfrm>
-            <a:off x="2455683" y="11275215"/>
+            <a:off x="4202012" y="13258343"/>
             <a:ext cx="0" cy="910584"/>
           </a:xfrm>
           <a:prstGeom prst="straightConnector1">
@@ -5725,7 +5731,7 @@
         </p:nvSpPr>
         <p:spPr>
           <a:xfrm>
-            <a:off x="2432190" y="11439664"/>
+            <a:off x="4178519" y="13422792"/>
             <a:ext cx="646232" cy="400110"/>
           </a:xfrm>
           <a:prstGeom prst="rect">
@@ -5761,7 +5767,7 @@
         </p:nvSpPr>
         <p:spPr>
           <a:xfrm>
-            <a:off x="4639504" y="10095043"/>
+            <a:off x="6385833" y="12078171"/>
             <a:ext cx="730306" cy="400110"/>
           </a:xfrm>
           <a:prstGeom prst="rect">
@@ -5801,7 +5807,7 @@
         </p:nvCxnSpPr>
         <p:spPr>
           <a:xfrm flipV="1">
-            <a:off x="3673876" y="10450094"/>
+            <a:off x="5420205" y="12433222"/>
             <a:ext cx="2515786" cy="2641"/>
           </a:xfrm>
           <a:prstGeom prst="straightConnector1">
@@ -5844,7 +5850,7 @@
         </p:nvCxnSpPr>
         <p:spPr>
           <a:xfrm rot="5400000">
-            <a:off x="4040538" y="8075537"/>
+            <a:off x="5786867" y="10058665"/>
             <a:ext cx="1554129" cy="2294115"/>
           </a:xfrm>
           <a:prstGeom prst="bentConnector2">
@@ -5888,7 +5894,7 @@
         </p:nvCxnSpPr>
         <p:spPr>
           <a:xfrm flipH="1">
-            <a:off x="7533360" y="10450094"/>
+            <a:off x="9279689" y="12433222"/>
             <a:ext cx="5533599" cy="3108242"/>
           </a:xfrm>
           <a:prstGeom prst="bentConnector4">
@@ -5935,7 +5941,7 @@
         </p:nvCxnSpPr>
         <p:spPr>
           <a:xfrm flipV="1">
-            <a:off x="9895841" y="12781272"/>
+            <a:off x="11642170" y="14764400"/>
             <a:ext cx="506536" cy="8"/>
           </a:xfrm>
           <a:prstGeom prst="straightConnector1">
@@ -5975,7 +5981,7 @@
         </p:nvGrpSpPr>
         <p:grpSpPr>
           <a:xfrm>
-            <a:off x="9426119" y="5937933"/>
+            <a:off x="11172448" y="7429849"/>
             <a:ext cx="3892696" cy="2242295"/>
             <a:chOff x="2801026" y="13978522"/>
             <a:chExt cx="3892696" cy="2242295"/>
@@ -6228,6 +6234,77 @@
           </p:txBody>
         </p:sp>
       </p:grpSp>
+      <p:sp>
+        <p:nvSpPr>
+          <p:cNvPr id="2" name="TextBox 1">
+            <a:extLst>
+              <a:ext uri="{FF2B5EF4-FFF2-40B4-BE49-F238E27FC236}">
+                <a16:creationId xmlns:a16="http://schemas.microsoft.com/office/drawing/2014/main" id="{ECB4CC63-F65B-1B06-1F77-5E21AF60CBB2}"/>
+              </a:ext>
+            </a:extLst>
+          </p:cNvPr>
+          <p:cNvSpPr txBox="1"/>
+          <p:nvPr/>
+        </p:nvSpPr>
+        <p:spPr>
+          <a:xfrm>
+            <a:off x="6917208" y="287920"/>
+            <a:ext cx="3574248" cy="769441"/>
+          </a:xfrm>
+          <a:prstGeom prst="rect">
+            <a:avLst/>
+          </a:prstGeom>
+          <a:noFill/>
+        </p:spPr>
+        <p:txBody>
+          <a:bodyPr wrap="none" rtlCol="0">
+            <a:spAutoFit/>
+          </a:bodyPr>
+          <a:lstStyle/>
+          <a:p>
+            <a:r>
+              <a:rPr lang="en-GB" sz="4400" dirty="0"/>
+              <a:t>Latest version</a:t>
+            </a:r>
+          </a:p>
+        </p:txBody>
+      </p:sp>
+      <p:sp>
+        <p:nvSpPr>
+          <p:cNvPr id="8" name="TextBox 7">
+            <a:extLst>
+              <a:ext uri="{FF2B5EF4-FFF2-40B4-BE49-F238E27FC236}">
+                <a16:creationId xmlns:a16="http://schemas.microsoft.com/office/drawing/2014/main" id="{D7E353EA-A529-B799-6CC2-BFD169EE4D00}"/>
+              </a:ext>
+            </a:extLst>
+          </p:cNvPr>
+          <p:cNvSpPr txBox="1"/>
+          <p:nvPr/>
+        </p:nvSpPr>
+        <p:spPr>
+          <a:xfrm>
+            <a:off x="3226499" y="8066841"/>
+            <a:ext cx="942374" cy="400110"/>
+          </a:xfrm>
+          <a:prstGeom prst="rect">
+            <a:avLst/>
+          </a:prstGeom>
+          <a:noFill/>
+        </p:spPr>
+        <p:txBody>
+          <a:bodyPr wrap="none" rtlCol="0">
+            <a:spAutoFit/>
+          </a:bodyPr>
+          <a:lstStyle/>
+          <a:p>
+            <a:r>
+              <a:rPr lang="en-GB" sz="2000" dirty="0"/>
+              <a:t>Private</a:t>
+            </a:r>
+            <a:endParaRPr lang="en-GB" sz="2000" b="1" dirty="0"/>
+          </a:p>
+        </p:txBody>
+      </p:sp>
     </p:spTree>
     <p:extLst>
       <p:ext uri="{BB962C8B-B14F-4D97-AF65-F5344CB8AC3E}">
@@ -6278,7 +6355,7 @@
         </p:nvSpPr>
         <p:spPr>
           <a:xfrm>
-            <a:off x="6189661" y="10776752"/>
+            <a:off x="7988858" y="11691152"/>
             <a:ext cx="2663685" cy="1259320"/>
           </a:xfrm>
           <a:prstGeom prst="rect">
@@ -6352,7 +6429,7 @@
         </p:nvSpPr>
         <p:spPr>
           <a:xfrm>
-            <a:off x="1237490" y="5161801"/>
+            <a:off x="3036687" y="6076201"/>
             <a:ext cx="2436388" cy="1644960"/>
           </a:xfrm>
           <a:prstGeom prst="rect">
@@ -6426,7 +6503,7 @@
         </p:nvSpPr>
         <p:spPr>
           <a:xfrm>
-            <a:off x="2497525" y="7137935"/>
+            <a:off x="4296722" y="8052335"/>
             <a:ext cx="942374" cy="400110"/>
           </a:xfrm>
           <a:prstGeom prst="rect">
@@ -6466,7 +6543,7 @@
         </p:nvCxnSpPr>
         <p:spPr>
           <a:xfrm flipV="1">
-            <a:off x="3673878" y="5978826"/>
+            <a:off x="5473075" y="6893226"/>
             <a:ext cx="2632768" cy="5455"/>
           </a:xfrm>
           <a:prstGeom prst="straightConnector1">
@@ -6506,7 +6583,7 @@
         </p:nvSpPr>
         <p:spPr>
           <a:xfrm>
-            <a:off x="1237490" y="7943201"/>
+            <a:off x="3036687" y="8857601"/>
             <a:ext cx="2436387" cy="1644960"/>
           </a:xfrm>
           <a:prstGeom prst="rect">
@@ -6584,7 +6661,7 @@
         </p:nvCxnSpPr>
         <p:spPr>
           <a:xfrm>
-            <a:off x="2455684" y="6806761"/>
+            <a:off x="4254881" y="7721161"/>
             <a:ext cx="0" cy="1136440"/>
           </a:xfrm>
           <a:prstGeom prst="straightConnector1">
@@ -6624,7 +6701,7 @@
         </p:nvSpPr>
         <p:spPr>
           <a:xfrm>
-            <a:off x="1237489" y="12960541"/>
+            <a:off x="3036686" y="13874941"/>
             <a:ext cx="2436386" cy="1644960"/>
           </a:xfrm>
           <a:prstGeom prst="rect">
@@ -6699,7 +6776,7 @@
         </p:nvSpPr>
         <p:spPr>
           <a:xfrm>
-            <a:off x="3776742" y="8398419"/>
+            <a:off x="5575939" y="9312819"/>
             <a:ext cx="920445" cy="400110"/>
           </a:xfrm>
           <a:prstGeom prst="rect">
@@ -6748,7 +6825,7 @@
         </p:nvCxnSpPr>
         <p:spPr>
           <a:xfrm>
-            <a:off x="3673877" y="8765681"/>
+            <a:off x="5473074" y="9680081"/>
             <a:ext cx="1150908" cy="6507"/>
           </a:xfrm>
           <a:prstGeom prst="straightConnector1">
@@ -6788,7 +6865,7 @@
         </p:nvSpPr>
         <p:spPr>
           <a:xfrm>
-            <a:off x="2468294" y="9733424"/>
+            <a:off x="4267491" y="10647824"/>
             <a:ext cx="1205582" cy="707886"/>
           </a:xfrm>
           <a:prstGeom prst="rect">
@@ -6823,7 +6900,7 @@
         </p:nvSpPr>
         <p:spPr>
           <a:xfrm>
-            <a:off x="3790863" y="5476449"/>
+            <a:off x="5590060" y="6390849"/>
             <a:ext cx="2398798" cy="1015663"/>
           </a:xfrm>
           <a:prstGeom prst="rect">
@@ -6869,7 +6946,7 @@
         </p:nvSpPr>
         <p:spPr>
           <a:xfrm>
-            <a:off x="8697191" y="10663937"/>
+            <a:off x="10496388" y="11578337"/>
             <a:ext cx="1756246" cy="707886"/>
           </a:xfrm>
           <a:prstGeom prst="rect">
@@ -6912,7 +6989,7 @@
         </p:nvSpPr>
         <p:spPr>
           <a:xfrm>
-            <a:off x="10402376" y="12960534"/>
+            <a:off x="12201573" y="13874934"/>
             <a:ext cx="2663685" cy="1554111"/>
           </a:xfrm>
           <a:prstGeom prst="rect">
@@ -7033,7 +7110,7 @@
         </p:nvSpPr>
         <p:spPr>
           <a:xfrm>
-            <a:off x="7548553" y="12105242"/>
+            <a:off x="9347750" y="13019642"/>
             <a:ext cx="1155922" cy="707886"/>
           </a:xfrm>
           <a:prstGeom prst="rect">
@@ -7068,7 +7145,7 @@
         </p:nvSpPr>
         <p:spPr>
           <a:xfrm>
-            <a:off x="1237490" y="2252064"/>
+            <a:off x="3036687" y="3166464"/>
             <a:ext cx="2436388" cy="1644960"/>
           </a:xfrm>
           <a:prstGeom prst="rect">
@@ -7146,7 +7223,7 @@
         </p:nvCxnSpPr>
         <p:spPr>
           <a:xfrm>
-            <a:off x="2455684" y="3897024"/>
+            <a:off x="4254881" y="4811424"/>
             <a:ext cx="0" cy="1264777"/>
           </a:xfrm>
           <a:prstGeom prst="straightConnector1">
@@ -7186,7 +7263,7 @@
         </p:nvSpPr>
         <p:spPr>
           <a:xfrm>
-            <a:off x="2497525" y="4287236"/>
+            <a:off x="4296722" y="5201636"/>
             <a:ext cx="1206612" cy="400110"/>
           </a:xfrm>
           <a:prstGeom prst="rect">
@@ -7225,7 +7302,7 @@
         </p:nvCxnSpPr>
         <p:spPr>
           <a:xfrm>
-            <a:off x="3673878" y="3074544"/>
+            <a:off x="5473075" y="3988944"/>
             <a:ext cx="1792328" cy="1"/>
           </a:xfrm>
           <a:prstGeom prst="straightConnector1">
@@ -7265,7 +7342,7 @@
         </p:nvSpPr>
         <p:spPr>
           <a:xfrm>
-            <a:off x="5466206" y="2252065"/>
+            <a:off x="7265403" y="3166465"/>
             <a:ext cx="7599855" cy="1644960"/>
           </a:xfrm>
           <a:prstGeom prst="rect">
@@ -7374,7 +7451,7 @@
         </p:nvSpPr>
         <p:spPr>
           <a:xfrm>
-            <a:off x="4048104" y="2357147"/>
+            <a:off x="5847301" y="3271547"/>
             <a:ext cx="1043876" cy="707886"/>
           </a:xfrm>
           <a:prstGeom prst="rect">
@@ -7422,7 +7499,7 @@
         </p:nvCxnSpPr>
         <p:spPr>
           <a:xfrm>
-            <a:off x="8853346" y="11406412"/>
+            <a:off x="10652543" y="12320812"/>
             <a:ext cx="1549927" cy="0"/>
           </a:xfrm>
           <a:prstGeom prst="straightConnector1">
@@ -7466,7 +7543,7 @@
         </p:nvCxnSpPr>
         <p:spPr>
           <a:xfrm flipH="1">
-            <a:off x="2455682" y="9588161"/>
+            <a:off x="4254879" y="10502561"/>
             <a:ext cx="2" cy="998412"/>
           </a:xfrm>
           <a:prstGeom prst="straightConnector1">
@@ -7572,7 +7649,7 @@
         </p:nvSpPr>
         <p:spPr>
           <a:xfrm>
-            <a:off x="4824785" y="8142528"/>
+            <a:off x="6623982" y="9056928"/>
             <a:ext cx="2279745" cy="1259320"/>
           </a:xfrm>
           <a:prstGeom prst="rect">
@@ -7662,7 +7739,7 @@
         </p:nvSpPr>
         <p:spPr>
           <a:xfrm>
-            <a:off x="1237489" y="10586573"/>
+            <a:off x="3036686" y="11500973"/>
             <a:ext cx="2436386" cy="1644960"/>
           </a:xfrm>
           <a:prstGeom prst="rect">
@@ -7736,7 +7813,7 @@
         </p:nvSpPr>
         <p:spPr>
           <a:xfrm>
-            <a:off x="6306646" y="5156346"/>
+            <a:off x="8105843" y="6070746"/>
             <a:ext cx="2436388" cy="1644960"/>
           </a:xfrm>
           <a:prstGeom prst="rect">
@@ -7814,7 +7891,7 @@
         </p:nvCxnSpPr>
         <p:spPr>
           <a:xfrm flipH="1">
-            <a:off x="7521504" y="6801306"/>
+            <a:off x="9320701" y="7715706"/>
             <a:ext cx="3336" cy="3975446"/>
           </a:xfrm>
           <a:prstGeom prst="straightConnector1">
@@ -7854,7 +7931,7 @@
         </p:nvSpPr>
         <p:spPr>
           <a:xfrm>
-            <a:off x="10403273" y="10776752"/>
+            <a:off x="12202470" y="11691152"/>
             <a:ext cx="2663685" cy="1259320"/>
           </a:xfrm>
           <a:prstGeom prst="rect">
@@ -7928,7 +8005,7 @@
         </p:nvSpPr>
         <p:spPr>
           <a:xfrm>
-            <a:off x="5170878" y="12960542"/>
+            <a:off x="6970075" y="13874942"/>
             <a:ext cx="4724962" cy="1554112"/>
           </a:xfrm>
           <a:prstGeom prst="rect">
@@ -8006,7 +8083,7 @@
         </p:nvCxnSpPr>
         <p:spPr>
           <a:xfrm flipH="1">
-            <a:off x="11734219" y="12036072"/>
+            <a:off x="13533416" y="12950472"/>
             <a:ext cx="897" cy="924462"/>
           </a:xfrm>
           <a:prstGeom prst="straightConnector1">
@@ -8046,7 +8123,7 @@
         </p:nvSpPr>
         <p:spPr>
           <a:xfrm>
-            <a:off x="11712587" y="12231533"/>
+            <a:off x="13511784" y="13145933"/>
             <a:ext cx="721103" cy="400110"/>
           </a:xfrm>
           <a:prstGeom prst="rect">
@@ -8082,7 +8159,7 @@
         </p:nvSpPr>
         <p:spPr>
           <a:xfrm>
-            <a:off x="13066061" y="10936227"/>
+            <a:off x="14865258" y="11850627"/>
             <a:ext cx="802351" cy="400110"/>
           </a:xfrm>
           <a:prstGeom prst="rect">
@@ -8122,7 +8199,7 @@
         </p:nvCxnSpPr>
         <p:spPr>
           <a:xfrm>
-            <a:off x="7521504" y="12036072"/>
+            <a:off x="9320701" y="12950472"/>
             <a:ext cx="11855" cy="924470"/>
           </a:xfrm>
           <a:prstGeom prst="straightConnector1">
@@ -8162,7 +8239,7 @@
         </p:nvSpPr>
         <p:spPr>
           <a:xfrm>
-            <a:off x="9406692" y="5218104"/>
+            <a:off x="11205889" y="6132504"/>
             <a:ext cx="3931546" cy="4252210"/>
           </a:xfrm>
           <a:prstGeom prst="rect">
@@ -8379,7 +8456,7 @@
         </p:nvCxnSpPr>
         <p:spPr>
           <a:xfrm>
-            <a:off x="2455682" y="12231533"/>
+            <a:off x="4254879" y="13145933"/>
             <a:ext cx="0" cy="729008"/>
           </a:xfrm>
           <a:prstGeom prst="straightConnector1">
@@ -8566,7 +8643,7 @@
         </p:nvSpPr>
         <p:spPr>
           <a:xfrm>
-            <a:off x="2432189" y="12395982"/>
+            <a:off x="4231386" y="13310382"/>
             <a:ext cx="646232" cy="400110"/>
           </a:xfrm>
           <a:prstGeom prst="rect">
@@ -8602,7 +8679,7 @@
         </p:nvSpPr>
         <p:spPr>
           <a:xfrm>
-            <a:off x="4639503" y="11051361"/>
+            <a:off x="6438700" y="11965761"/>
             <a:ext cx="730306" cy="400110"/>
           </a:xfrm>
           <a:prstGeom prst="rect">
@@ -8642,7 +8719,7 @@
         </p:nvCxnSpPr>
         <p:spPr>
           <a:xfrm flipV="1">
-            <a:off x="3673875" y="11406412"/>
+            <a:off x="5473072" y="12320812"/>
             <a:ext cx="2515786" cy="2641"/>
           </a:xfrm>
           <a:prstGeom prst="straightConnector1">
@@ -8685,7 +8762,7 @@
         </p:nvCxnSpPr>
         <p:spPr>
           <a:xfrm>
-            <a:off x="7104530" y="8772188"/>
+            <a:off x="8903727" y="9686588"/>
             <a:ext cx="223549" cy="2011035"/>
           </a:xfrm>
           <a:prstGeom prst="bentConnector2">
@@ -8729,7 +8806,7 @@
         </p:nvCxnSpPr>
         <p:spPr>
           <a:xfrm flipH="1">
-            <a:off x="7533359" y="11406412"/>
+            <a:off x="9332556" y="12320812"/>
             <a:ext cx="5533599" cy="3108242"/>
           </a:xfrm>
           <a:prstGeom prst="bentConnector4">
@@ -8776,7 +8853,7 @@
         </p:nvCxnSpPr>
         <p:spPr>
           <a:xfrm flipV="1">
-            <a:off x="9895840" y="13737590"/>
+            <a:off x="11695037" y="14651990"/>
             <a:ext cx="506536" cy="8"/>
           </a:xfrm>
           <a:prstGeom prst="straightConnector1">
@@ -8802,6 +8879,41 @@
           </a:fontRef>
         </p:style>
       </p:cxnSp>
+      <p:sp>
+        <p:nvSpPr>
+          <p:cNvPr id="2" name="TextBox 1">
+            <a:extLst>
+              <a:ext uri="{FF2B5EF4-FFF2-40B4-BE49-F238E27FC236}">
+                <a16:creationId xmlns:a16="http://schemas.microsoft.com/office/drawing/2014/main" id="{72FCE891-241C-8D09-352A-6C4AE577572A}"/>
+              </a:ext>
+            </a:extLst>
+          </p:cNvPr>
+          <p:cNvSpPr txBox="1"/>
+          <p:nvPr/>
+        </p:nvSpPr>
+        <p:spPr>
+          <a:xfrm>
+            <a:off x="6917208" y="287920"/>
+            <a:ext cx="4148123" cy="769441"/>
+          </a:xfrm>
+          <a:prstGeom prst="rect">
+            <a:avLst/>
+          </a:prstGeom>
+          <a:noFill/>
+        </p:spPr>
+        <p:txBody>
+          <a:bodyPr wrap="none" rtlCol="0">
+            <a:spAutoFit/>
+          </a:bodyPr>
+          <a:lstStyle/>
+          <a:p>
+            <a:r>
+              <a:rPr lang="en-GB" sz="4400" dirty="0"/>
+              <a:t>Previous version</a:t>
+            </a:r>
+          </a:p>
+        </p:txBody>
+      </p:sp>
     </p:spTree>
     <p:extLst>
       <p:ext uri="{BB962C8B-B14F-4D97-AF65-F5344CB8AC3E}">
@@ -8864,10 +8976,10 @@
       </p:pic>
       <p:sp>
         <p:nvSpPr>
-          <p:cNvPr id="6" name="Rectangle 5">
-            <a:extLst>
-              <a:ext uri="{FF2B5EF4-FFF2-40B4-BE49-F238E27FC236}">
-                <a16:creationId xmlns:a16="http://schemas.microsoft.com/office/drawing/2014/main" id="{6E07BB81-D828-144A-EB02-0B2D729F7626}"/>
+          <p:cNvPr id="9" name="Rectangle 8">
+            <a:extLst>
+              <a:ext uri="{FF2B5EF4-FFF2-40B4-BE49-F238E27FC236}">
+                <a16:creationId xmlns:a16="http://schemas.microsoft.com/office/drawing/2014/main" id="{488FD193-364C-B76F-A576-6A01CC4D876D}"/>
               </a:ext>
             </a:extLst>
           </p:cNvPr>
@@ -8876,16 +8988,16 @@
         </p:nvSpPr>
         <p:spPr>
           <a:xfrm>
-            <a:off x="23473597" y="5333197"/>
-            <a:ext cx="2279745" cy="1259320"/>
+            <a:off x="552093" y="2656201"/>
+            <a:ext cx="1489937" cy="1188720"/>
           </a:xfrm>
           <a:prstGeom prst="rect">
             <a:avLst/>
           </a:prstGeom>
           <a:solidFill>
-            <a:srgbClr val="2596BE">
-              <a:alpha val="30196"/>
-            </a:srgbClr>
+            <a:schemeClr val="bg1">
+              <a:lumMod val="85000"/>
+            </a:schemeClr>
           </a:solidFill>
         </p:spPr>
         <p:style>
@@ -8909,20 +9021,31 @@
           <a:lstStyle/>
           <a:p>
             <a:pPr algn="ctr"/>
-            <a:endParaRPr lang="en-GB" sz="2000" dirty="0">
-              <a:solidFill>
-                <a:schemeClr val="tx1"/>
-              </a:solidFill>
-            </a:endParaRPr>
-          </a:p>
-        </p:txBody>
-      </p:sp>
-      <p:sp>
-        <p:nvSpPr>
-          <p:cNvPr id="7" name="Rectangle 6">
-            <a:extLst>
-              <a:ext uri="{FF2B5EF4-FFF2-40B4-BE49-F238E27FC236}">
-                <a16:creationId xmlns:a16="http://schemas.microsoft.com/office/drawing/2014/main" id="{E84E2C69-83A0-2B5C-C2DA-56CA1C2C769A}"/>
+            <a:r>
+              <a:rPr lang="en-GB" sz="2000" dirty="0">
+                <a:solidFill>
+                  <a:schemeClr val="tx1"/>
+                </a:solidFill>
+              </a:rPr>
+              <a:t>Dark grey boxes are </a:t>
+            </a:r>
+            <a:r>
+              <a:rPr lang="en-GB" sz="2000" b="1" dirty="0">
+                <a:solidFill>
+                  <a:schemeClr val="tx1"/>
+                </a:solidFill>
+              </a:rPr>
+              <a:t>headings</a:t>
+            </a:r>
+          </a:p>
+        </p:txBody>
+      </p:sp>
+      <p:sp>
+        <p:nvSpPr>
+          <p:cNvPr id="19" name="Rectangle 18">
+            <a:extLst>
+              <a:ext uri="{FF2B5EF4-FFF2-40B4-BE49-F238E27FC236}">
+                <a16:creationId xmlns:a16="http://schemas.microsoft.com/office/drawing/2014/main" id="{5F6D6C7C-4C0A-2396-F7DF-836CB63FD869}"/>
               </a:ext>
             </a:extLst>
           </p:cNvPr>
@@ -8931,16 +9054,16 @@
         </p:nvSpPr>
         <p:spPr>
           <a:xfrm>
-            <a:off x="23196466" y="2680298"/>
-            <a:ext cx="2436388" cy="1644960"/>
+            <a:off x="7265864" y="4112378"/>
+            <a:ext cx="3233475" cy="1373012"/>
           </a:xfrm>
           <a:prstGeom prst="rect">
             <a:avLst/>
           </a:prstGeom>
           <a:solidFill>
-            <a:schemeClr val="bg1">
-              <a:lumMod val="85000"/>
-            </a:schemeClr>
+            <a:srgbClr val="2596BE">
+              <a:alpha val="30196"/>
+            </a:srgbClr>
           </a:solidFill>
         </p:spPr>
         <p:style>
@@ -8964,20 +9087,31 @@
           <a:lstStyle/>
           <a:p>
             <a:pPr algn="ctr"/>
-            <a:endParaRPr lang="en-GB" sz="2000" dirty="0">
-              <a:solidFill>
-                <a:schemeClr val="tx1"/>
-              </a:solidFill>
-            </a:endParaRPr>
-          </a:p>
-        </p:txBody>
-      </p:sp>
-      <p:sp>
-        <p:nvSpPr>
-          <p:cNvPr id="9" name="Rectangle 8">
-            <a:extLst>
-              <a:ext uri="{FF2B5EF4-FFF2-40B4-BE49-F238E27FC236}">
-                <a16:creationId xmlns:a16="http://schemas.microsoft.com/office/drawing/2014/main" id="{488FD193-364C-B76F-A576-6A01CC4D876D}"/>
+            <a:r>
+              <a:rPr lang="en-GB" sz="2000" b="1" dirty="0">
+                <a:solidFill>
+                  <a:schemeClr val="tx1"/>
+                </a:solidFill>
+              </a:rPr>
+              <a:t>Server: </a:t>
+            </a:r>
+            <a:r>
+              <a:rPr lang="en-GB" sz="2000" dirty="0">
+                <a:solidFill>
+                  <a:schemeClr val="tx1"/>
+                </a:solidFill>
+              </a:rPr>
+              <a:t>different options for connecting to a server</a:t>
+            </a:r>
+          </a:p>
+        </p:txBody>
+      </p:sp>
+      <p:sp>
+        <p:nvSpPr>
+          <p:cNvPr id="24" name="Rectangle 23">
+            <a:extLst>
+              <a:ext uri="{FF2B5EF4-FFF2-40B4-BE49-F238E27FC236}">
+                <a16:creationId xmlns:a16="http://schemas.microsoft.com/office/drawing/2014/main" id="{172B55A1-694D-BB7C-6665-B121EEA950AF}"/>
               </a:ext>
             </a:extLst>
           </p:cNvPr>
@@ -8986,16 +9120,16 @@
         </p:nvSpPr>
         <p:spPr>
           <a:xfrm>
-            <a:off x="1549872" y="747346"/>
-            <a:ext cx="1489937" cy="1188720"/>
+            <a:off x="11620907" y="7854844"/>
+            <a:ext cx="3227959" cy="1259320"/>
           </a:xfrm>
           <a:prstGeom prst="rect">
             <a:avLst/>
           </a:prstGeom>
           <a:solidFill>
-            <a:schemeClr val="bg1">
-              <a:lumMod val="85000"/>
-            </a:schemeClr>
+            <a:srgbClr val="2596BE">
+              <a:alpha val="30196"/>
+            </a:srgbClr>
           </a:solidFill>
         </p:spPr>
         <p:style>
@@ -9020,30 +9154,35 @@
           <a:p>
             <a:pPr algn="ctr"/>
             <a:r>
+              <a:rPr lang="en-GB" sz="2000" b="1" dirty="0">
+                <a:solidFill>
+                  <a:schemeClr val="tx1"/>
+                </a:solidFill>
+              </a:rPr>
+              <a:t>Disconnect:</a:t>
+            </a:r>
+            <a:r>
               <a:rPr lang="en-GB" sz="2000" dirty="0">
                 <a:solidFill>
                   <a:schemeClr val="tx1"/>
                 </a:solidFill>
               </a:rPr>
-              <a:t>Dark grey boxes are </a:t>
-            </a:r>
-            <a:r>
-              <a:rPr lang="en-GB" sz="2000" b="1" dirty="0">
-                <a:solidFill>
-                  <a:schemeClr val="tx1"/>
-                </a:solidFill>
-              </a:rPr>
-              <a:t>headings</a:t>
-            </a:r>
-          </a:p>
-        </p:txBody>
-      </p:sp>
-      <p:sp>
-        <p:nvSpPr>
-          <p:cNvPr id="10" name="Rectangle 9">
-            <a:extLst>
-              <a:ext uri="{FF2B5EF4-FFF2-40B4-BE49-F238E27FC236}">
-                <a16:creationId xmlns:a16="http://schemas.microsoft.com/office/drawing/2014/main" id="{272927D8-E09A-64A9-A3E1-DDA99FC54C8C}"/>
+              <a:t> if we are connected to a server, disconnect from it.</a:t>
+            </a:r>
+            <a:endParaRPr lang="en-GB" sz="2000" b="1" dirty="0">
+              <a:solidFill>
+                <a:schemeClr val="tx1"/>
+              </a:solidFill>
+            </a:endParaRPr>
+          </a:p>
+        </p:txBody>
+      </p:sp>
+      <p:sp>
+        <p:nvSpPr>
+          <p:cNvPr id="25" name="Rectangle 24">
+            <a:extLst>
+              <a:ext uri="{FF2B5EF4-FFF2-40B4-BE49-F238E27FC236}">
+                <a16:creationId xmlns:a16="http://schemas.microsoft.com/office/drawing/2014/main" id="{86D00E3F-561A-E0ED-F5FF-37A7FDDDD942}"/>
               </a:ext>
             </a:extLst>
           </p:cNvPr>
@@ -9052,16 +9191,16 @@
         </p:nvSpPr>
         <p:spPr>
           <a:xfrm>
-            <a:off x="23348866" y="2832698"/>
-            <a:ext cx="2436388" cy="1644960"/>
+            <a:off x="11620908" y="2656201"/>
+            <a:ext cx="4637956" cy="2441419"/>
           </a:xfrm>
           <a:prstGeom prst="rect">
             <a:avLst/>
           </a:prstGeom>
           <a:solidFill>
-            <a:schemeClr val="bg1">
-              <a:lumMod val="85000"/>
-            </a:schemeClr>
+            <a:srgbClr val="2596BE">
+              <a:alpha val="30196"/>
+            </a:srgbClr>
           </a:solidFill>
         </p:spPr>
         <p:style>
@@ -9085,20 +9224,31 @@
           <a:lstStyle/>
           <a:p>
             <a:pPr algn="ctr"/>
-            <a:endParaRPr lang="en-GB" sz="2000" dirty="0">
-              <a:solidFill>
-                <a:schemeClr val="tx1"/>
-              </a:solidFill>
-            </a:endParaRPr>
-          </a:p>
-        </p:txBody>
-      </p:sp>
-      <p:sp>
-        <p:nvSpPr>
-          <p:cNvPr id="11" name="Rectangle 10">
-            <a:extLst>
-              <a:ext uri="{FF2B5EF4-FFF2-40B4-BE49-F238E27FC236}">
-                <a16:creationId xmlns:a16="http://schemas.microsoft.com/office/drawing/2014/main" id="{72F9AC22-B3D0-400C-C41C-251C4935DF71}"/>
+            <a:r>
+              <a:rPr lang="en-GB" sz="2000" b="1" dirty="0">
+                <a:solidFill>
+                  <a:schemeClr val="tx1"/>
+                </a:solidFill>
+              </a:rPr>
+              <a:t>Direct Connect</a:t>
+            </a:r>
+            <a:r>
+              <a:rPr lang="en-GB" sz="2000" dirty="0">
+                <a:solidFill>
+                  <a:schemeClr val="tx1"/>
+                </a:solidFill>
+              </a:rPr>
+              <a:t>: toggles a menu that allows you to change the IP address and trajectory/multiplayer ports of the server you wish to connect to. Use this if you are not using the default ports (specified when you create a server) or if you are connecting to an IP of a different machine/cloud server.</a:t>
+            </a:r>
+          </a:p>
+        </p:txBody>
+      </p:sp>
+      <p:sp>
+        <p:nvSpPr>
+          <p:cNvPr id="26" name="Rectangle 25">
+            <a:extLst>
+              <a:ext uri="{FF2B5EF4-FFF2-40B4-BE49-F238E27FC236}">
+                <a16:creationId xmlns:a16="http://schemas.microsoft.com/office/drawing/2014/main" id="{CCCA6C18-4808-6C21-A408-320E0F3E159B}"/>
               </a:ext>
             </a:extLst>
           </p:cNvPr>
@@ -9107,16 +9257,16 @@
         </p:nvSpPr>
         <p:spPr>
           <a:xfrm>
-            <a:off x="23501266" y="2985098"/>
-            <a:ext cx="2436388" cy="1644960"/>
+            <a:off x="11626423" y="322675"/>
+            <a:ext cx="4578242" cy="1577139"/>
           </a:xfrm>
           <a:prstGeom prst="rect">
             <a:avLst/>
           </a:prstGeom>
           <a:solidFill>
-            <a:schemeClr val="bg1">
-              <a:lumMod val="85000"/>
-            </a:schemeClr>
+            <a:srgbClr val="2596BE">
+              <a:alpha val="30196"/>
+            </a:srgbClr>
           </a:solidFill>
         </p:spPr>
         <p:style>
@@ -9140,20 +9290,121 @@
           <a:lstStyle/>
           <a:p>
             <a:pPr algn="ctr"/>
-            <a:endParaRPr lang="en-GB" sz="2000" dirty="0">
-              <a:solidFill>
-                <a:schemeClr val="tx1"/>
-              </a:solidFill>
-            </a:endParaRPr>
-          </a:p>
-        </p:txBody>
-      </p:sp>
-      <p:sp>
-        <p:nvSpPr>
-          <p:cNvPr id="12" name="Rectangle 11">
-            <a:extLst>
-              <a:ext uri="{FF2B5EF4-FFF2-40B4-BE49-F238E27FC236}">
-                <a16:creationId xmlns:a16="http://schemas.microsoft.com/office/drawing/2014/main" id="{4B7B1D94-EC90-E19D-9B17-9F38F6661FAD}"/>
+            <a:r>
+              <a:rPr lang="en-GB" sz="2000" b="1" dirty="0" err="1">
+                <a:solidFill>
+                  <a:schemeClr val="tx1"/>
+                </a:solidFill>
+              </a:rPr>
+              <a:t>Autoconnect</a:t>
+            </a:r>
+            <a:r>
+              <a:rPr lang="en-GB" sz="2000" dirty="0">
+                <a:solidFill>
+                  <a:schemeClr val="tx1"/>
+                </a:solidFill>
+              </a:rPr>
+              <a:t>: connects to the first server found on the network (uses the default parameters). Do not use this if there are multiple servers running on your network.</a:t>
+            </a:r>
+          </a:p>
+        </p:txBody>
+      </p:sp>
+      <p:pic>
+        <p:nvPicPr>
+          <p:cNvPr id="28" name="Picture 27">
+            <a:extLst>
+              <a:ext uri="{FF2B5EF4-FFF2-40B4-BE49-F238E27FC236}">
+                <a16:creationId xmlns:a16="http://schemas.microsoft.com/office/drawing/2014/main" id="{883E1A98-ABC3-47D2-BC09-0EE2F3747C93}"/>
+              </a:ext>
+            </a:extLst>
+          </p:cNvPr>
+          <p:cNvPicPr>
+            <a:picLocks noChangeAspect="1"/>
+          </p:cNvPicPr>
+          <p:nvPr/>
+        </p:nvPicPr>
+        <p:blipFill>
+          <a:blip r:embed="rId3"/>
+          <a:stretch>
+            <a:fillRect/>
+          </a:stretch>
+        </p:blipFill>
+        <p:spPr>
+          <a:xfrm>
+            <a:off x="16421475" y="2656201"/>
+            <a:ext cx="2654380" cy="2949310"/>
+          </a:xfrm>
+          <a:prstGeom prst="rect">
+            <a:avLst/>
+          </a:prstGeom>
+        </p:spPr>
+      </p:pic>
+      <p:pic>
+        <p:nvPicPr>
+          <p:cNvPr id="30" name="Picture 29">
+            <a:extLst>
+              <a:ext uri="{FF2B5EF4-FFF2-40B4-BE49-F238E27FC236}">
+                <a16:creationId xmlns:a16="http://schemas.microsoft.com/office/drawing/2014/main" id="{80766357-3B97-AF21-B22A-54AEE5C5D93F}"/>
+              </a:ext>
+            </a:extLst>
+          </p:cNvPr>
+          <p:cNvPicPr>
+            <a:picLocks noChangeAspect="1"/>
+          </p:cNvPicPr>
+          <p:nvPr/>
+        </p:nvPicPr>
+        <p:blipFill>
+          <a:blip r:embed="rId4"/>
+          <a:stretch>
+            <a:fillRect/>
+          </a:stretch>
+        </p:blipFill>
+        <p:spPr>
+          <a:xfrm>
+            <a:off x="15058441" y="6396574"/>
+            <a:ext cx="2887176" cy="1235443"/>
+          </a:xfrm>
+          <a:prstGeom prst="rect">
+            <a:avLst/>
+          </a:prstGeom>
+        </p:spPr>
+      </p:pic>
+      <p:pic>
+        <p:nvPicPr>
+          <p:cNvPr id="32" name="Picture 31">
+            <a:extLst>
+              <a:ext uri="{FF2B5EF4-FFF2-40B4-BE49-F238E27FC236}">
+                <a16:creationId xmlns:a16="http://schemas.microsoft.com/office/drawing/2014/main" id="{76B58336-0005-B29A-D9C1-4CCCF13BDD65}"/>
+              </a:ext>
+            </a:extLst>
+          </p:cNvPr>
+          <p:cNvPicPr>
+            <a:picLocks noChangeAspect="1"/>
+          </p:cNvPicPr>
+          <p:nvPr/>
+        </p:nvPicPr>
+        <p:blipFill>
+          <a:blip r:embed="rId5"/>
+          <a:stretch>
+            <a:fillRect/>
+          </a:stretch>
+        </p:blipFill>
+        <p:spPr>
+          <a:xfrm>
+            <a:off x="18387092" y="6396574"/>
+            <a:ext cx="2860319" cy="1826307"/>
+          </a:xfrm>
+          <a:prstGeom prst="rect">
+            <a:avLst/>
+          </a:prstGeom>
+        </p:spPr>
+      </p:pic>
+      <p:sp>
+        <p:nvSpPr>
+          <p:cNvPr id="33" name="Rectangle 32">
+            <a:extLst>
+              <a:ext uri="{FF2B5EF4-FFF2-40B4-BE49-F238E27FC236}">
+                <a16:creationId xmlns:a16="http://schemas.microsoft.com/office/drawing/2014/main" id="{F6376597-504F-D315-56EB-7DAB12073E45}"/>
               </a:ext>
             </a:extLst>
           </p:cNvPr>
@@ -9162,16 +9413,16 @@
         </p:nvSpPr>
         <p:spPr>
           <a:xfrm>
-            <a:off x="23653666" y="3137498"/>
-            <a:ext cx="2436388" cy="1644960"/>
+            <a:off x="11620907" y="6331974"/>
+            <a:ext cx="3227959" cy="1235443"/>
           </a:xfrm>
           <a:prstGeom prst="rect">
             <a:avLst/>
           </a:prstGeom>
           <a:solidFill>
-            <a:schemeClr val="bg1">
-              <a:lumMod val="85000"/>
-            </a:schemeClr>
+            <a:srgbClr val="2596BE">
+              <a:alpha val="30196"/>
+            </a:srgbClr>
           </a:solidFill>
         </p:spPr>
         <p:style>
@@ -9195,20 +9446,31 @@
           <a:lstStyle/>
           <a:p>
             <a:pPr algn="ctr"/>
-            <a:endParaRPr lang="en-GB" sz="2000" dirty="0">
-              <a:solidFill>
-                <a:schemeClr val="tx1"/>
-              </a:solidFill>
-            </a:endParaRPr>
-          </a:p>
-        </p:txBody>
-      </p:sp>
-      <p:sp>
-        <p:nvSpPr>
-          <p:cNvPr id="13" name="Rectangle 12">
-            <a:extLst>
-              <a:ext uri="{FF2B5EF4-FFF2-40B4-BE49-F238E27FC236}">
-                <a16:creationId xmlns:a16="http://schemas.microsoft.com/office/drawing/2014/main" id="{EE6B7265-0266-9F6D-AB95-EEEEB85CB011}"/>
+            <a:r>
+              <a:rPr lang="en-GB" sz="2000" b="1" dirty="0">
+                <a:solidFill>
+                  <a:schemeClr val="tx1"/>
+                </a:solidFill>
+              </a:rPr>
+              <a:t>Discover Services</a:t>
+            </a:r>
+            <a:r>
+              <a:rPr lang="en-GB" sz="2000" dirty="0">
+                <a:solidFill>
+                  <a:schemeClr val="tx1"/>
+                </a:solidFill>
+              </a:rPr>
+              <a:t>: toggles a menu for searching for servers on the network.</a:t>
+            </a:r>
+          </a:p>
+        </p:txBody>
+      </p:sp>
+      <p:sp>
+        <p:nvSpPr>
+          <p:cNvPr id="35" name="Rectangle 34">
+            <a:extLst>
+              <a:ext uri="{FF2B5EF4-FFF2-40B4-BE49-F238E27FC236}">
+                <a16:creationId xmlns:a16="http://schemas.microsoft.com/office/drawing/2014/main" id="{0397A6E3-6004-1107-CFA4-3DD0A244CBCC}"/>
               </a:ext>
             </a:extLst>
           </p:cNvPr>
@@ -9217,15 +9479,16 @@
         </p:nvSpPr>
         <p:spPr>
           <a:xfrm>
-            <a:off x="23806066" y="3289898"/>
-            <a:ext cx="2436388" cy="1644960"/>
+            <a:off x="15058441" y="7752742"/>
+            <a:ext cx="3227959" cy="907486"/>
           </a:xfrm>
           <a:prstGeom prst="rect">
             <a:avLst/>
           </a:prstGeom>
           <a:solidFill>
-            <a:schemeClr val="bg1">
-              <a:lumMod val="85000"/>
+            <a:schemeClr val="accent2">
+              <a:lumMod val="40000"/>
+              <a:lumOff val="60000"/>
             </a:schemeClr>
           </a:solidFill>
         </p:spPr>
@@ -9250,20 +9513,23 @@
           <a:lstStyle/>
           <a:p>
             <a:pPr algn="ctr"/>
-            <a:endParaRPr lang="en-GB" sz="2000" dirty="0">
-              <a:solidFill>
-                <a:schemeClr val="tx1"/>
-              </a:solidFill>
-            </a:endParaRPr>
-          </a:p>
-        </p:txBody>
-      </p:sp>
-      <p:sp>
-        <p:nvSpPr>
-          <p:cNvPr id="14" name="Rectangle 13">
-            <a:extLst>
-              <a:ext uri="{FF2B5EF4-FFF2-40B4-BE49-F238E27FC236}">
-                <a16:creationId xmlns:a16="http://schemas.microsoft.com/office/drawing/2014/main" id="{D0FD8DF6-25C8-5F43-32EE-2064C0CF7D37}"/>
+            <a:r>
+              <a:rPr lang="en-GB" sz="2000" dirty="0">
+                <a:solidFill>
+                  <a:schemeClr val="tx1"/>
+                </a:solidFill>
+              </a:rPr>
+              <a:t>Click “Search”. If there are servers available, they will appear underneath.</a:t>
+            </a:r>
+          </a:p>
+        </p:txBody>
+      </p:sp>
+      <p:sp>
+        <p:nvSpPr>
+          <p:cNvPr id="37" name="Rectangle 36">
+            <a:extLst>
+              <a:ext uri="{FF2B5EF4-FFF2-40B4-BE49-F238E27FC236}">
+                <a16:creationId xmlns:a16="http://schemas.microsoft.com/office/drawing/2014/main" id="{74F3C1B9-9AF4-244A-FD11-2A291F2B9ED7}"/>
               </a:ext>
             </a:extLst>
           </p:cNvPr>
@@ -9272,16 +9538,16 @@
         </p:nvSpPr>
         <p:spPr>
           <a:xfrm>
-            <a:off x="23958466" y="3442298"/>
-            <a:ext cx="2436388" cy="1644960"/>
+            <a:off x="858968" y="6420057"/>
+            <a:ext cx="3227959" cy="1696046"/>
           </a:xfrm>
           <a:prstGeom prst="rect">
             <a:avLst/>
           </a:prstGeom>
           <a:solidFill>
-            <a:schemeClr val="bg1">
-              <a:lumMod val="85000"/>
-            </a:schemeClr>
+            <a:srgbClr val="2596BE">
+              <a:alpha val="30196"/>
+            </a:srgbClr>
           </a:solidFill>
         </p:spPr>
         <p:style>
@@ -9305,288 +9571,13 @@
           <a:lstStyle/>
           <a:p>
             <a:pPr algn="ctr"/>
-            <a:endParaRPr lang="en-GB" sz="2000" dirty="0">
-              <a:solidFill>
-                <a:schemeClr val="tx1"/>
-              </a:solidFill>
-            </a:endParaRPr>
-          </a:p>
-        </p:txBody>
-      </p:sp>
-      <p:sp>
-        <p:nvSpPr>
-          <p:cNvPr id="15" name="Rectangle 14">
-            <a:extLst>
-              <a:ext uri="{FF2B5EF4-FFF2-40B4-BE49-F238E27FC236}">
-                <a16:creationId xmlns:a16="http://schemas.microsoft.com/office/drawing/2014/main" id="{08256543-4CB1-CE21-0DE7-EE964B3723EA}"/>
-              </a:ext>
-            </a:extLst>
-          </p:cNvPr>
-          <p:cNvSpPr/>
-          <p:nvPr/>
-        </p:nvSpPr>
-        <p:spPr>
-          <a:xfrm>
-            <a:off x="23625997" y="5485597"/>
-            <a:ext cx="2279745" cy="1259320"/>
-          </a:xfrm>
-          <a:prstGeom prst="rect">
-            <a:avLst/>
-          </a:prstGeom>
-          <a:solidFill>
-            <a:srgbClr val="2596BE">
-              <a:alpha val="30196"/>
-            </a:srgbClr>
-          </a:solidFill>
-        </p:spPr>
-        <p:style>
-          <a:lnRef idx="2">
-            <a:schemeClr val="accent1">
-              <a:shade val="15000"/>
-            </a:schemeClr>
-          </a:lnRef>
-          <a:fillRef idx="1">
-            <a:schemeClr val="accent1"/>
-          </a:fillRef>
-          <a:effectRef idx="0">
-            <a:schemeClr val="accent1"/>
-          </a:effectRef>
-          <a:fontRef idx="minor">
-            <a:schemeClr val="lt1"/>
-          </a:fontRef>
-        </p:style>
-        <p:txBody>
-          <a:bodyPr rtlCol="0" anchor="ctr"/>
-          <a:lstStyle/>
-          <a:p>
-            <a:pPr algn="ctr"/>
-            <a:endParaRPr lang="en-GB" sz="2000" dirty="0">
-              <a:solidFill>
-                <a:schemeClr val="tx1"/>
-              </a:solidFill>
-            </a:endParaRPr>
-          </a:p>
-        </p:txBody>
-      </p:sp>
-      <p:sp>
-        <p:nvSpPr>
-          <p:cNvPr id="16" name="Rectangle 15">
-            <a:extLst>
-              <a:ext uri="{FF2B5EF4-FFF2-40B4-BE49-F238E27FC236}">
-                <a16:creationId xmlns:a16="http://schemas.microsoft.com/office/drawing/2014/main" id="{BB874D05-B0E0-860E-9FB0-6D88A7ADC7AC}"/>
-              </a:ext>
-            </a:extLst>
-          </p:cNvPr>
-          <p:cNvSpPr/>
-          <p:nvPr/>
-        </p:nvSpPr>
-        <p:spPr>
-          <a:xfrm>
-            <a:off x="23778397" y="5637997"/>
-            <a:ext cx="2279745" cy="1259320"/>
-          </a:xfrm>
-          <a:prstGeom prst="rect">
-            <a:avLst/>
-          </a:prstGeom>
-          <a:solidFill>
-            <a:srgbClr val="2596BE">
-              <a:alpha val="30196"/>
-            </a:srgbClr>
-          </a:solidFill>
-        </p:spPr>
-        <p:style>
-          <a:lnRef idx="2">
-            <a:schemeClr val="accent1">
-              <a:shade val="15000"/>
-            </a:schemeClr>
-          </a:lnRef>
-          <a:fillRef idx="1">
-            <a:schemeClr val="accent1"/>
-          </a:fillRef>
-          <a:effectRef idx="0">
-            <a:schemeClr val="accent1"/>
-          </a:effectRef>
-          <a:fontRef idx="minor">
-            <a:schemeClr val="lt1"/>
-          </a:fontRef>
-        </p:style>
-        <p:txBody>
-          <a:bodyPr rtlCol="0" anchor="ctr"/>
-          <a:lstStyle/>
-          <a:p>
-            <a:pPr algn="ctr"/>
-            <a:endParaRPr lang="en-GB" sz="2000" dirty="0">
-              <a:solidFill>
-                <a:schemeClr val="tx1"/>
-              </a:solidFill>
-            </a:endParaRPr>
-          </a:p>
-        </p:txBody>
-      </p:sp>
-      <p:sp>
-        <p:nvSpPr>
-          <p:cNvPr id="17" name="Rectangle 16">
-            <a:extLst>
-              <a:ext uri="{FF2B5EF4-FFF2-40B4-BE49-F238E27FC236}">
-                <a16:creationId xmlns:a16="http://schemas.microsoft.com/office/drawing/2014/main" id="{5E7585F8-BEBA-0297-A809-C24BC3EFEC68}"/>
-              </a:ext>
-            </a:extLst>
-          </p:cNvPr>
-          <p:cNvSpPr/>
-          <p:nvPr/>
-        </p:nvSpPr>
-        <p:spPr>
-          <a:xfrm>
-            <a:off x="23930797" y="5790397"/>
-            <a:ext cx="2279745" cy="1259320"/>
-          </a:xfrm>
-          <a:prstGeom prst="rect">
-            <a:avLst/>
-          </a:prstGeom>
-          <a:solidFill>
-            <a:srgbClr val="2596BE">
-              <a:alpha val="30196"/>
-            </a:srgbClr>
-          </a:solidFill>
-        </p:spPr>
-        <p:style>
-          <a:lnRef idx="2">
-            <a:schemeClr val="accent1">
-              <a:shade val="15000"/>
-            </a:schemeClr>
-          </a:lnRef>
-          <a:fillRef idx="1">
-            <a:schemeClr val="accent1"/>
-          </a:fillRef>
-          <a:effectRef idx="0">
-            <a:schemeClr val="accent1"/>
-          </a:effectRef>
-          <a:fontRef idx="minor">
-            <a:schemeClr val="lt1"/>
-          </a:fontRef>
-        </p:style>
-        <p:txBody>
-          <a:bodyPr rtlCol="0" anchor="ctr"/>
-          <a:lstStyle/>
-          <a:p>
-            <a:pPr algn="ctr"/>
-            <a:endParaRPr lang="en-GB" sz="2000" dirty="0">
-              <a:solidFill>
-                <a:schemeClr val="tx1"/>
-              </a:solidFill>
-            </a:endParaRPr>
-          </a:p>
-        </p:txBody>
-      </p:sp>
-      <p:sp>
-        <p:nvSpPr>
-          <p:cNvPr id="18" name="Rectangle 17">
-            <a:extLst>
-              <a:ext uri="{FF2B5EF4-FFF2-40B4-BE49-F238E27FC236}">
-                <a16:creationId xmlns:a16="http://schemas.microsoft.com/office/drawing/2014/main" id="{F8737CFD-76FF-93BD-DF6B-9686F9D59FEE}"/>
-              </a:ext>
-            </a:extLst>
-          </p:cNvPr>
-          <p:cNvSpPr/>
-          <p:nvPr/>
-        </p:nvSpPr>
-        <p:spPr>
-          <a:xfrm>
-            <a:off x="24083197" y="5942797"/>
-            <a:ext cx="2279745" cy="1259320"/>
-          </a:xfrm>
-          <a:prstGeom prst="rect">
-            <a:avLst/>
-          </a:prstGeom>
-          <a:solidFill>
-            <a:srgbClr val="2596BE">
-              <a:alpha val="30196"/>
-            </a:srgbClr>
-          </a:solidFill>
-        </p:spPr>
-        <p:style>
-          <a:lnRef idx="2">
-            <a:schemeClr val="accent1">
-              <a:shade val="15000"/>
-            </a:schemeClr>
-          </a:lnRef>
-          <a:fillRef idx="1">
-            <a:schemeClr val="accent1"/>
-          </a:fillRef>
-          <a:effectRef idx="0">
-            <a:schemeClr val="accent1"/>
-          </a:effectRef>
-          <a:fontRef idx="minor">
-            <a:schemeClr val="lt1"/>
-          </a:fontRef>
-        </p:style>
-        <p:txBody>
-          <a:bodyPr rtlCol="0" anchor="ctr"/>
-          <a:lstStyle/>
-          <a:p>
-            <a:pPr algn="ctr"/>
-            <a:endParaRPr lang="en-GB" sz="2000" dirty="0">
-              <a:solidFill>
-                <a:schemeClr val="tx1"/>
-              </a:solidFill>
-            </a:endParaRPr>
-          </a:p>
-        </p:txBody>
-      </p:sp>
-      <p:sp>
-        <p:nvSpPr>
-          <p:cNvPr id="19" name="Rectangle 18">
-            <a:extLst>
-              <a:ext uri="{FF2B5EF4-FFF2-40B4-BE49-F238E27FC236}">
-                <a16:creationId xmlns:a16="http://schemas.microsoft.com/office/drawing/2014/main" id="{5F6D6C7C-4C0A-2396-F7DF-836CB63FD869}"/>
-              </a:ext>
-            </a:extLst>
-          </p:cNvPr>
-          <p:cNvSpPr/>
-          <p:nvPr/>
-        </p:nvSpPr>
-        <p:spPr>
-          <a:xfrm>
-            <a:off x="7265864" y="4112378"/>
-            <a:ext cx="3233475" cy="1373012"/>
-          </a:xfrm>
-          <a:prstGeom prst="rect">
-            <a:avLst/>
-          </a:prstGeom>
-          <a:solidFill>
-            <a:srgbClr val="2596BE">
-              <a:alpha val="30196"/>
-            </a:srgbClr>
-          </a:solidFill>
-        </p:spPr>
-        <p:style>
-          <a:lnRef idx="2">
-            <a:schemeClr val="accent1">
-              <a:shade val="15000"/>
-            </a:schemeClr>
-          </a:lnRef>
-          <a:fillRef idx="1">
-            <a:schemeClr val="accent1"/>
-          </a:fillRef>
-          <a:effectRef idx="0">
-            <a:schemeClr val="accent1"/>
-          </a:effectRef>
-          <a:fontRef idx="minor">
-            <a:schemeClr val="lt1"/>
-          </a:fontRef>
-        </p:style>
-        <p:txBody>
-          <a:bodyPr rtlCol="0" anchor="ctr"/>
-          <a:lstStyle/>
-          <a:p>
-            <a:pPr algn="ctr"/>
             <a:r>
               <a:rPr lang="en-GB" sz="2000" b="1" dirty="0">
                 <a:solidFill>
                   <a:schemeClr val="tx1"/>
                 </a:solidFill>
               </a:rPr>
-              <a:t>Server: </a:t>
+              <a:t>Simulation: </a:t>
             </a:r>
             <a:r>
               <a:rPr lang="en-GB" sz="2000" dirty="0">
@@ -9594,934 +9585,9 @@
                   <a:schemeClr val="tx1"/>
                 </a:solidFill>
               </a:rPr>
-              <a:t>different options for connecting to a server</a:t>
-            </a:r>
-          </a:p>
-        </p:txBody>
-      </p:sp>
-      <p:sp>
-        <p:nvSpPr>
-          <p:cNvPr id="20" name="Rectangle 19">
-            <a:extLst>
-              <a:ext uri="{FF2B5EF4-FFF2-40B4-BE49-F238E27FC236}">
-                <a16:creationId xmlns:a16="http://schemas.microsoft.com/office/drawing/2014/main" id="{80117929-D4A6-3D34-5660-F6DA5108CD8F}"/>
-              </a:ext>
-            </a:extLst>
-          </p:cNvPr>
-          <p:cNvSpPr/>
-          <p:nvPr/>
-        </p:nvSpPr>
-        <p:spPr>
-          <a:xfrm>
-            <a:off x="24235597" y="6095197"/>
-            <a:ext cx="2279745" cy="1259320"/>
-          </a:xfrm>
-          <a:prstGeom prst="rect">
-            <a:avLst/>
-          </a:prstGeom>
-          <a:solidFill>
-            <a:srgbClr val="2596BE">
-              <a:alpha val="30196"/>
-            </a:srgbClr>
-          </a:solidFill>
-        </p:spPr>
-        <p:style>
-          <a:lnRef idx="2">
-            <a:schemeClr val="accent1">
-              <a:shade val="15000"/>
-            </a:schemeClr>
-          </a:lnRef>
-          <a:fillRef idx="1">
-            <a:schemeClr val="accent1"/>
-          </a:fillRef>
-          <a:effectRef idx="0">
-            <a:schemeClr val="accent1"/>
-          </a:effectRef>
-          <a:fontRef idx="minor">
-            <a:schemeClr val="lt1"/>
-          </a:fontRef>
-        </p:style>
-        <p:txBody>
-          <a:bodyPr rtlCol="0" anchor="ctr"/>
-          <a:lstStyle/>
-          <a:p>
-            <a:pPr algn="ctr"/>
-            <a:endParaRPr lang="en-GB" sz="2000" dirty="0">
-              <a:solidFill>
-                <a:schemeClr val="tx1"/>
-              </a:solidFill>
-            </a:endParaRPr>
-          </a:p>
-        </p:txBody>
-      </p:sp>
-      <p:sp>
-        <p:nvSpPr>
-          <p:cNvPr id="21" name="Rectangle 20">
-            <a:extLst>
-              <a:ext uri="{FF2B5EF4-FFF2-40B4-BE49-F238E27FC236}">
-                <a16:creationId xmlns:a16="http://schemas.microsoft.com/office/drawing/2014/main" id="{55F55DEF-20AD-AAB1-AB29-BC032AA0A40A}"/>
-              </a:ext>
-            </a:extLst>
-          </p:cNvPr>
-          <p:cNvSpPr/>
-          <p:nvPr/>
-        </p:nvSpPr>
-        <p:spPr>
-          <a:xfrm>
-            <a:off x="24387997" y="6247597"/>
-            <a:ext cx="2279745" cy="1259320"/>
-          </a:xfrm>
-          <a:prstGeom prst="rect">
-            <a:avLst/>
-          </a:prstGeom>
-          <a:solidFill>
-            <a:srgbClr val="2596BE">
-              <a:alpha val="30196"/>
-            </a:srgbClr>
-          </a:solidFill>
-        </p:spPr>
-        <p:style>
-          <a:lnRef idx="2">
-            <a:schemeClr val="accent1">
-              <a:shade val="15000"/>
-            </a:schemeClr>
-          </a:lnRef>
-          <a:fillRef idx="1">
-            <a:schemeClr val="accent1"/>
-          </a:fillRef>
-          <a:effectRef idx="0">
-            <a:schemeClr val="accent1"/>
-          </a:effectRef>
-          <a:fontRef idx="minor">
-            <a:schemeClr val="lt1"/>
-          </a:fontRef>
-        </p:style>
-        <p:txBody>
-          <a:bodyPr rtlCol="0" anchor="ctr"/>
-          <a:lstStyle/>
-          <a:p>
-            <a:pPr algn="ctr"/>
-            <a:endParaRPr lang="en-GB" sz="2000" dirty="0">
-              <a:solidFill>
-                <a:schemeClr val="tx1"/>
-              </a:solidFill>
-            </a:endParaRPr>
-          </a:p>
-        </p:txBody>
-      </p:sp>
-      <p:sp>
-        <p:nvSpPr>
-          <p:cNvPr id="22" name="Rectangle 21">
-            <a:extLst>
-              <a:ext uri="{FF2B5EF4-FFF2-40B4-BE49-F238E27FC236}">
-                <a16:creationId xmlns:a16="http://schemas.microsoft.com/office/drawing/2014/main" id="{B92CF2EF-7863-7831-B4CB-A0BAF2922083}"/>
-              </a:ext>
-            </a:extLst>
-          </p:cNvPr>
-          <p:cNvSpPr/>
-          <p:nvPr/>
-        </p:nvSpPr>
-        <p:spPr>
-          <a:xfrm>
-            <a:off x="24540397" y="6399997"/>
-            <a:ext cx="2279745" cy="1259320"/>
-          </a:xfrm>
-          <a:prstGeom prst="rect">
-            <a:avLst/>
-          </a:prstGeom>
-          <a:solidFill>
-            <a:srgbClr val="2596BE">
-              <a:alpha val="30196"/>
-            </a:srgbClr>
-          </a:solidFill>
-        </p:spPr>
-        <p:style>
-          <a:lnRef idx="2">
-            <a:schemeClr val="accent1">
-              <a:shade val="15000"/>
-            </a:schemeClr>
-          </a:lnRef>
-          <a:fillRef idx="1">
-            <a:schemeClr val="accent1"/>
-          </a:fillRef>
-          <a:effectRef idx="0">
-            <a:schemeClr val="accent1"/>
-          </a:effectRef>
-          <a:fontRef idx="minor">
-            <a:schemeClr val="lt1"/>
-          </a:fontRef>
-        </p:style>
-        <p:txBody>
-          <a:bodyPr rtlCol="0" anchor="ctr"/>
-          <a:lstStyle/>
-          <a:p>
-            <a:pPr algn="ctr"/>
-            <a:endParaRPr lang="en-GB" sz="2000" dirty="0">
-              <a:solidFill>
-                <a:schemeClr val="tx1"/>
-              </a:solidFill>
-            </a:endParaRPr>
-          </a:p>
-        </p:txBody>
-      </p:sp>
-      <p:sp>
-        <p:nvSpPr>
-          <p:cNvPr id="23" name="Rectangle 22">
-            <a:extLst>
-              <a:ext uri="{FF2B5EF4-FFF2-40B4-BE49-F238E27FC236}">
-                <a16:creationId xmlns:a16="http://schemas.microsoft.com/office/drawing/2014/main" id="{F8B03F6E-6F35-D78B-8BA0-0EE5BB8C5945}"/>
-              </a:ext>
-            </a:extLst>
-          </p:cNvPr>
-          <p:cNvSpPr/>
-          <p:nvPr/>
-        </p:nvSpPr>
-        <p:spPr>
-          <a:xfrm>
-            <a:off x="24692797" y="6552397"/>
-            <a:ext cx="2279745" cy="1259320"/>
-          </a:xfrm>
-          <a:prstGeom prst="rect">
-            <a:avLst/>
-          </a:prstGeom>
-          <a:solidFill>
-            <a:srgbClr val="2596BE">
-              <a:alpha val="30196"/>
-            </a:srgbClr>
-          </a:solidFill>
-        </p:spPr>
-        <p:style>
-          <a:lnRef idx="2">
-            <a:schemeClr val="accent1">
-              <a:shade val="15000"/>
-            </a:schemeClr>
-          </a:lnRef>
-          <a:fillRef idx="1">
-            <a:schemeClr val="accent1"/>
-          </a:fillRef>
-          <a:effectRef idx="0">
-            <a:schemeClr val="accent1"/>
-          </a:effectRef>
-          <a:fontRef idx="minor">
-            <a:schemeClr val="lt1"/>
-          </a:fontRef>
-        </p:style>
-        <p:txBody>
-          <a:bodyPr rtlCol="0" anchor="ctr"/>
-          <a:lstStyle/>
-          <a:p>
-            <a:pPr algn="ctr"/>
-            <a:endParaRPr lang="en-GB" sz="2000" dirty="0">
-              <a:solidFill>
-                <a:schemeClr val="tx1"/>
-              </a:solidFill>
-            </a:endParaRPr>
-          </a:p>
-        </p:txBody>
-      </p:sp>
-      <p:sp>
-        <p:nvSpPr>
-          <p:cNvPr id="24" name="Rectangle 23">
-            <a:extLst>
-              <a:ext uri="{FF2B5EF4-FFF2-40B4-BE49-F238E27FC236}">
-                <a16:creationId xmlns:a16="http://schemas.microsoft.com/office/drawing/2014/main" id="{172B55A1-694D-BB7C-6665-B121EEA950AF}"/>
-              </a:ext>
-            </a:extLst>
-          </p:cNvPr>
-          <p:cNvSpPr/>
-          <p:nvPr/>
-        </p:nvSpPr>
-        <p:spPr>
-          <a:xfrm>
-            <a:off x="11620907" y="7854844"/>
-            <a:ext cx="3227959" cy="1259320"/>
-          </a:xfrm>
-          <a:prstGeom prst="rect">
-            <a:avLst/>
-          </a:prstGeom>
-          <a:solidFill>
-            <a:srgbClr val="2596BE">
-              <a:alpha val="30196"/>
-            </a:srgbClr>
-          </a:solidFill>
-        </p:spPr>
-        <p:style>
-          <a:lnRef idx="2">
-            <a:schemeClr val="accent1">
-              <a:shade val="15000"/>
-            </a:schemeClr>
-          </a:lnRef>
-          <a:fillRef idx="1">
-            <a:schemeClr val="accent1"/>
-          </a:fillRef>
-          <a:effectRef idx="0">
-            <a:schemeClr val="accent1"/>
-          </a:effectRef>
-          <a:fontRef idx="minor">
-            <a:schemeClr val="lt1"/>
-          </a:fontRef>
-        </p:style>
-        <p:txBody>
-          <a:bodyPr rtlCol="0" anchor="ctr"/>
-          <a:lstStyle/>
-          <a:p>
-            <a:pPr algn="ctr"/>
-            <a:r>
-              <a:rPr lang="en-GB" sz="2000" b="1" dirty="0">
-                <a:solidFill>
-                  <a:schemeClr val="tx1"/>
-                </a:solidFill>
-              </a:rPr>
-              <a:t>Disconnect:</a:t>
-            </a:r>
-            <a:r>
-              <a:rPr lang="en-GB" sz="2000" dirty="0">
-                <a:solidFill>
-                  <a:schemeClr val="tx1"/>
-                </a:solidFill>
-              </a:rPr>
-              <a:t> if we are connected to a server, disconnect from it.</a:t>
+              <a:t>commands relating to the simulation or simulation box.</a:t>
             </a:r>
             <a:endParaRPr lang="en-GB" sz="2000" b="1" dirty="0">
-              <a:solidFill>
-                <a:schemeClr val="tx1"/>
-              </a:solidFill>
-            </a:endParaRPr>
-          </a:p>
-        </p:txBody>
-      </p:sp>
-      <p:sp>
-        <p:nvSpPr>
-          <p:cNvPr id="25" name="Rectangle 24">
-            <a:extLst>
-              <a:ext uri="{FF2B5EF4-FFF2-40B4-BE49-F238E27FC236}">
-                <a16:creationId xmlns:a16="http://schemas.microsoft.com/office/drawing/2014/main" id="{86D00E3F-561A-E0ED-F5FF-37A7FDDDD942}"/>
-              </a:ext>
-            </a:extLst>
-          </p:cNvPr>
-          <p:cNvSpPr/>
-          <p:nvPr/>
-        </p:nvSpPr>
-        <p:spPr>
-          <a:xfrm>
-            <a:off x="11620908" y="2656201"/>
-            <a:ext cx="4637956" cy="2441419"/>
-          </a:xfrm>
-          <a:prstGeom prst="rect">
-            <a:avLst/>
-          </a:prstGeom>
-          <a:solidFill>
-            <a:srgbClr val="2596BE">
-              <a:alpha val="30196"/>
-            </a:srgbClr>
-          </a:solidFill>
-        </p:spPr>
-        <p:style>
-          <a:lnRef idx="2">
-            <a:schemeClr val="accent1">
-              <a:shade val="15000"/>
-            </a:schemeClr>
-          </a:lnRef>
-          <a:fillRef idx="1">
-            <a:schemeClr val="accent1"/>
-          </a:fillRef>
-          <a:effectRef idx="0">
-            <a:schemeClr val="accent1"/>
-          </a:effectRef>
-          <a:fontRef idx="minor">
-            <a:schemeClr val="lt1"/>
-          </a:fontRef>
-        </p:style>
-        <p:txBody>
-          <a:bodyPr rtlCol="0" anchor="ctr"/>
-          <a:lstStyle/>
-          <a:p>
-            <a:pPr algn="ctr"/>
-            <a:r>
-              <a:rPr lang="en-GB" sz="2000" b="1" dirty="0">
-                <a:solidFill>
-                  <a:schemeClr val="tx1"/>
-                </a:solidFill>
-              </a:rPr>
-              <a:t>Direct Connect</a:t>
-            </a:r>
-            <a:r>
-              <a:rPr lang="en-GB" sz="2000" dirty="0">
-                <a:solidFill>
-                  <a:schemeClr val="tx1"/>
-                </a:solidFill>
-              </a:rPr>
-              <a:t>: toggles a menu that allows you to change the IP address and trajectory/multiplayer ports of the server you wish to connect to. Use this if you are not using the default ports (specified when you create a server) or if you are connecting to an IP of a different machine/cloud server.</a:t>
-            </a:r>
-          </a:p>
-        </p:txBody>
-      </p:sp>
-      <p:sp>
-        <p:nvSpPr>
-          <p:cNvPr id="26" name="Rectangle 25">
-            <a:extLst>
-              <a:ext uri="{FF2B5EF4-FFF2-40B4-BE49-F238E27FC236}">
-                <a16:creationId xmlns:a16="http://schemas.microsoft.com/office/drawing/2014/main" id="{CCCA6C18-4808-6C21-A408-320E0F3E159B}"/>
-              </a:ext>
-            </a:extLst>
-          </p:cNvPr>
-          <p:cNvSpPr/>
-          <p:nvPr/>
-        </p:nvSpPr>
-        <p:spPr>
-          <a:xfrm>
-            <a:off x="11626423" y="322675"/>
-            <a:ext cx="4578242" cy="1577139"/>
-          </a:xfrm>
-          <a:prstGeom prst="rect">
-            <a:avLst/>
-          </a:prstGeom>
-          <a:solidFill>
-            <a:srgbClr val="2596BE">
-              <a:alpha val="30196"/>
-            </a:srgbClr>
-          </a:solidFill>
-        </p:spPr>
-        <p:style>
-          <a:lnRef idx="2">
-            <a:schemeClr val="accent1">
-              <a:shade val="15000"/>
-            </a:schemeClr>
-          </a:lnRef>
-          <a:fillRef idx="1">
-            <a:schemeClr val="accent1"/>
-          </a:fillRef>
-          <a:effectRef idx="0">
-            <a:schemeClr val="accent1"/>
-          </a:effectRef>
-          <a:fontRef idx="minor">
-            <a:schemeClr val="lt1"/>
-          </a:fontRef>
-        </p:style>
-        <p:txBody>
-          <a:bodyPr rtlCol="0" anchor="ctr"/>
-          <a:lstStyle/>
-          <a:p>
-            <a:pPr algn="ctr"/>
-            <a:r>
-              <a:rPr lang="en-GB" sz="2000" b="1" dirty="0" err="1">
-                <a:solidFill>
-                  <a:schemeClr val="tx1"/>
-                </a:solidFill>
-              </a:rPr>
-              <a:t>Autoconnect</a:t>
-            </a:r>
-            <a:r>
-              <a:rPr lang="en-GB" sz="2000" dirty="0">
-                <a:solidFill>
-                  <a:schemeClr val="tx1"/>
-                </a:solidFill>
-              </a:rPr>
-              <a:t>: connects to the first server found on the network (uses the default parameters). Do not use this if there are multiple servers running on your network.</a:t>
-            </a:r>
-          </a:p>
-        </p:txBody>
-      </p:sp>
-      <p:pic>
-        <p:nvPicPr>
-          <p:cNvPr id="28" name="Picture 27">
-            <a:extLst>
-              <a:ext uri="{FF2B5EF4-FFF2-40B4-BE49-F238E27FC236}">
-                <a16:creationId xmlns:a16="http://schemas.microsoft.com/office/drawing/2014/main" id="{883E1A98-ABC3-47D2-BC09-0EE2F3747C93}"/>
-              </a:ext>
-            </a:extLst>
-          </p:cNvPr>
-          <p:cNvPicPr>
-            <a:picLocks noChangeAspect="1"/>
-          </p:cNvPicPr>
-          <p:nvPr/>
-        </p:nvPicPr>
-        <p:blipFill>
-          <a:blip r:embed="rId3"/>
-          <a:stretch>
-            <a:fillRect/>
-          </a:stretch>
-        </p:blipFill>
-        <p:spPr>
-          <a:xfrm>
-            <a:off x="16421475" y="2656201"/>
-            <a:ext cx="2654380" cy="2949310"/>
-          </a:xfrm>
-          <a:prstGeom prst="rect">
-            <a:avLst/>
-          </a:prstGeom>
-        </p:spPr>
-      </p:pic>
-      <p:pic>
-        <p:nvPicPr>
-          <p:cNvPr id="30" name="Picture 29">
-            <a:extLst>
-              <a:ext uri="{FF2B5EF4-FFF2-40B4-BE49-F238E27FC236}">
-                <a16:creationId xmlns:a16="http://schemas.microsoft.com/office/drawing/2014/main" id="{80766357-3B97-AF21-B22A-54AEE5C5D93F}"/>
-              </a:ext>
-            </a:extLst>
-          </p:cNvPr>
-          <p:cNvPicPr>
-            <a:picLocks noChangeAspect="1"/>
-          </p:cNvPicPr>
-          <p:nvPr/>
-        </p:nvPicPr>
-        <p:blipFill>
-          <a:blip r:embed="rId4"/>
-          <a:stretch>
-            <a:fillRect/>
-          </a:stretch>
-        </p:blipFill>
-        <p:spPr>
-          <a:xfrm>
-            <a:off x="15058441" y="6396574"/>
-            <a:ext cx="2887176" cy="1235443"/>
-          </a:xfrm>
-          <a:prstGeom prst="rect">
-            <a:avLst/>
-          </a:prstGeom>
-        </p:spPr>
-      </p:pic>
-      <p:pic>
-        <p:nvPicPr>
-          <p:cNvPr id="32" name="Picture 31">
-            <a:extLst>
-              <a:ext uri="{FF2B5EF4-FFF2-40B4-BE49-F238E27FC236}">
-                <a16:creationId xmlns:a16="http://schemas.microsoft.com/office/drawing/2014/main" id="{76B58336-0005-B29A-D9C1-4CCCF13BDD65}"/>
-              </a:ext>
-            </a:extLst>
-          </p:cNvPr>
-          <p:cNvPicPr>
-            <a:picLocks noChangeAspect="1"/>
-          </p:cNvPicPr>
-          <p:nvPr/>
-        </p:nvPicPr>
-        <p:blipFill>
-          <a:blip r:embed="rId5"/>
-          <a:stretch>
-            <a:fillRect/>
-          </a:stretch>
-        </p:blipFill>
-        <p:spPr>
-          <a:xfrm>
-            <a:off x="18387092" y="6396574"/>
-            <a:ext cx="2860319" cy="1826307"/>
-          </a:xfrm>
-          <a:prstGeom prst="rect">
-            <a:avLst/>
-          </a:prstGeom>
-        </p:spPr>
-      </p:pic>
-      <p:sp>
-        <p:nvSpPr>
-          <p:cNvPr id="33" name="Rectangle 32">
-            <a:extLst>
-              <a:ext uri="{FF2B5EF4-FFF2-40B4-BE49-F238E27FC236}">
-                <a16:creationId xmlns:a16="http://schemas.microsoft.com/office/drawing/2014/main" id="{F6376597-504F-D315-56EB-7DAB12073E45}"/>
-              </a:ext>
-            </a:extLst>
-          </p:cNvPr>
-          <p:cNvSpPr/>
-          <p:nvPr/>
-        </p:nvSpPr>
-        <p:spPr>
-          <a:xfrm>
-            <a:off x="11620907" y="6331974"/>
-            <a:ext cx="3227959" cy="1235443"/>
-          </a:xfrm>
-          <a:prstGeom prst="rect">
-            <a:avLst/>
-          </a:prstGeom>
-          <a:solidFill>
-            <a:srgbClr val="2596BE">
-              <a:alpha val="30196"/>
-            </a:srgbClr>
-          </a:solidFill>
-        </p:spPr>
-        <p:style>
-          <a:lnRef idx="2">
-            <a:schemeClr val="accent1">
-              <a:shade val="15000"/>
-            </a:schemeClr>
-          </a:lnRef>
-          <a:fillRef idx="1">
-            <a:schemeClr val="accent1"/>
-          </a:fillRef>
-          <a:effectRef idx="0">
-            <a:schemeClr val="accent1"/>
-          </a:effectRef>
-          <a:fontRef idx="minor">
-            <a:schemeClr val="lt1"/>
-          </a:fontRef>
-        </p:style>
-        <p:txBody>
-          <a:bodyPr rtlCol="0" anchor="ctr"/>
-          <a:lstStyle/>
-          <a:p>
-            <a:pPr algn="ctr"/>
-            <a:r>
-              <a:rPr lang="en-GB" sz="2000" b="1" dirty="0">
-                <a:solidFill>
-                  <a:schemeClr val="tx1"/>
-                </a:solidFill>
-              </a:rPr>
-              <a:t>Discover Services</a:t>
-            </a:r>
-            <a:r>
-              <a:rPr lang="en-GB" sz="2000" dirty="0">
-                <a:solidFill>
-                  <a:schemeClr val="tx1"/>
-                </a:solidFill>
-              </a:rPr>
-              <a:t>: toggles a menu for searching for servers on the network.</a:t>
-            </a:r>
-          </a:p>
-        </p:txBody>
-      </p:sp>
-      <p:sp>
-        <p:nvSpPr>
-          <p:cNvPr id="35" name="Rectangle 34">
-            <a:extLst>
-              <a:ext uri="{FF2B5EF4-FFF2-40B4-BE49-F238E27FC236}">
-                <a16:creationId xmlns:a16="http://schemas.microsoft.com/office/drawing/2014/main" id="{0397A6E3-6004-1107-CFA4-3DD0A244CBCC}"/>
-              </a:ext>
-            </a:extLst>
-          </p:cNvPr>
-          <p:cNvSpPr/>
-          <p:nvPr/>
-        </p:nvSpPr>
-        <p:spPr>
-          <a:xfrm>
-            <a:off x="15058441" y="7752742"/>
-            <a:ext cx="3227959" cy="907486"/>
-          </a:xfrm>
-          <a:prstGeom prst="rect">
-            <a:avLst/>
-          </a:prstGeom>
-          <a:solidFill>
-            <a:schemeClr val="accent2">
-              <a:lumMod val="40000"/>
-              <a:lumOff val="60000"/>
-            </a:schemeClr>
-          </a:solidFill>
-        </p:spPr>
-        <p:style>
-          <a:lnRef idx="2">
-            <a:schemeClr val="accent1">
-              <a:shade val="15000"/>
-            </a:schemeClr>
-          </a:lnRef>
-          <a:fillRef idx="1">
-            <a:schemeClr val="accent1"/>
-          </a:fillRef>
-          <a:effectRef idx="0">
-            <a:schemeClr val="accent1"/>
-          </a:effectRef>
-          <a:fontRef idx="minor">
-            <a:schemeClr val="lt1"/>
-          </a:fontRef>
-        </p:style>
-        <p:txBody>
-          <a:bodyPr rtlCol="0" anchor="ctr"/>
-          <a:lstStyle/>
-          <a:p>
-            <a:pPr algn="ctr"/>
-            <a:r>
-              <a:rPr lang="en-GB" sz="2000" dirty="0">
-                <a:solidFill>
-                  <a:schemeClr val="tx1"/>
-                </a:solidFill>
-              </a:rPr>
-              <a:t>Click “Search”. If there are servers available, they will appear underneath.</a:t>
-            </a:r>
-          </a:p>
-        </p:txBody>
-      </p:sp>
-      <p:sp>
-        <p:nvSpPr>
-          <p:cNvPr id="36" name="Rectangle 35">
-            <a:extLst>
-              <a:ext uri="{FF2B5EF4-FFF2-40B4-BE49-F238E27FC236}">
-                <a16:creationId xmlns:a16="http://schemas.microsoft.com/office/drawing/2014/main" id="{052C7F83-0C2F-5979-5556-BD55491AF710}"/>
-              </a:ext>
-            </a:extLst>
-          </p:cNvPr>
-          <p:cNvSpPr/>
-          <p:nvPr/>
-        </p:nvSpPr>
-        <p:spPr>
-          <a:xfrm>
-            <a:off x="23130873" y="8711176"/>
-            <a:ext cx="2654381" cy="1437287"/>
-          </a:xfrm>
-          <a:prstGeom prst="rect">
-            <a:avLst/>
-          </a:prstGeom>
-          <a:solidFill>
-            <a:schemeClr val="accent2">
-              <a:lumMod val="40000"/>
-              <a:lumOff val="60000"/>
-            </a:schemeClr>
-          </a:solidFill>
-        </p:spPr>
-        <p:style>
-          <a:lnRef idx="2">
-            <a:schemeClr val="accent1">
-              <a:shade val="15000"/>
-            </a:schemeClr>
-          </a:lnRef>
-          <a:fillRef idx="1">
-            <a:schemeClr val="accent1"/>
-          </a:fillRef>
-          <a:effectRef idx="0">
-            <a:schemeClr val="accent1"/>
-          </a:effectRef>
-          <a:fontRef idx="minor">
-            <a:schemeClr val="lt1"/>
-          </a:fontRef>
-        </p:style>
-        <p:txBody>
-          <a:bodyPr rtlCol="0" anchor="ctr"/>
-          <a:lstStyle/>
-          <a:p>
-            <a:pPr algn="ctr"/>
-            <a:endParaRPr lang="en-GB" sz="2000" dirty="0">
-              <a:solidFill>
-                <a:schemeClr val="tx1"/>
-              </a:solidFill>
-            </a:endParaRPr>
-          </a:p>
-        </p:txBody>
-      </p:sp>
-      <p:sp>
-        <p:nvSpPr>
-          <p:cNvPr id="37" name="Rectangle 36">
-            <a:extLst>
-              <a:ext uri="{FF2B5EF4-FFF2-40B4-BE49-F238E27FC236}">
-                <a16:creationId xmlns:a16="http://schemas.microsoft.com/office/drawing/2014/main" id="{74F3C1B9-9AF4-244A-FD11-2A291F2B9ED7}"/>
-              </a:ext>
-            </a:extLst>
-          </p:cNvPr>
-          <p:cNvSpPr/>
-          <p:nvPr/>
-        </p:nvSpPr>
-        <p:spPr>
-          <a:xfrm>
-            <a:off x="858968" y="6420057"/>
-            <a:ext cx="3227959" cy="1696046"/>
-          </a:xfrm>
-          <a:prstGeom prst="rect">
-            <a:avLst/>
-          </a:prstGeom>
-          <a:solidFill>
-            <a:srgbClr val="2596BE">
-              <a:alpha val="30196"/>
-            </a:srgbClr>
-          </a:solidFill>
-        </p:spPr>
-        <p:style>
-          <a:lnRef idx="2">
-            <a:schemeClr val="accent1">
-              <a:shade val="15000"/>
-            </a:schemeClr>
-          </a:lnRef>
-          <a:fillRef idx="1">
-            <a:schemeClr val="accent1"/>
-          </a:fillRef>
-          <a:effectRef idx="0">
-            <a:schemeClr val="accent1"/>
-          </a:effectRef>
-          <a:fontRef idx="minor">
-            <a:schemeClr val="lt1"/>
-          </a:fontRef>
-        </p:style>
-        <p:txBody>
-          <a:bodyPr rtlCol="0" anchor="ctr"/>
-          <a:lstStyle/>
-          <a:p>
-            <a:pPr algn="ctr"/>
-            <a:r>
-              <a:rPr lang="en-GB" sz="2000" b="1" dirty="0">
-                <a:solidFill>
-                  <a:schemeClr val="tx1"/>
-                </a:solidFill>
-              </a:rPr>
-              <a:t>Simulation: </a:t>
-            </a:r>
-            <a:r>
-              <a:rPr lang="en-GB" sz="2000" dirty="0">
-                <a:solidFill>
-                  <a:schemeClr val="tx1"/>
-                </a:solidFill>
-              </a:rPr>
-              <a:t>commands relating to the simulation or simulation box.</a:t>
-            </a:r>
-            <a:endParaRPr lang="en-GB" sz="2000" b="1" dirty="0">
-              <a:solidFill>
-                <a:schemeClr val="tx1"/>
-              </a:solidFill>
-            </a:endParaRPr>
-          </a:p>
-        </p:txBody>
-      </p:sp>
-      <p:sp>
-        <p:nvSpPr>
-          <p:cNvPr id="39" name="Rectangle 38">
-            <a:extLst>
-              <a:ext uri="{FF2B5EF4-FFF2-40B4-BE49-F238E27FC236}">
-                <a16:creationId xmlns:a16="http://schemas.microsoft.com/office/drawing/2014/main" id="{D7CA18CF-27F3-B728-483D-0DCAF0F1EBC3}"/>
-              </a:ext>
-            </a:extLst>
-          </p:cNvPr>
-          <p:cNvSpPr/>
-          <p:nvPr/>
-        </p:nvSpPr>
-        <p:spPr>
-          <a:xfrm>
-            <a:off x="21714556" y="10909705"/>
-            <a:ext cx="2700104" cy="1661459"/>
-          </a:xfrm>
-          <a:prstGeom prst="rect">
-            <a:avLst/>
-          </a:prstGeom>
-          <a:solidFill>
-            <a:schemeClr val="accent5">
-              <a:lumMod val="50000"/>
-              <a:alpha val="30196"/>
-            </a:schemeClr>
-          </a:solidFill>
-        </p:spPr>
-        <p:style>
-          <a:lnRef idx="2">
-            <a:schemeClr val="accent1">
-              <a:shade val="15000"/>
-            </a:schemeClr>
-          </a:lnRef>
-          <a:fillRef idx="1">
-            <a:schemeClr val="accent1"/>
-          </a:fillRef>
-          <a:effectRef idx="0">
-            <a:schemeClr val="accent1"/>
-          </a:effectRef>
-          <a:fontRef idx="minor">
-            <a:schemeClr val="lt1"/>
-          </a:fontRef>
-        </p:style>
-        <p:txBody>
-          <a:bodyPr rtlCol="0" anchor="ctr"/>
-          <a:lstStyle/>
-          <a:p>
-            <a:endParaRPr lang="en-GB" sz="2000" dirty="0">
-              <a:solidFill>
-                <a:schemeClr val="tx1"/>
-              </a:solidFill>
-            </a:endParaRPr>
-          </a:p>
-        </p:txBody>
-      </p:sp>
-      <p:sp>
-        <p:nvSpPr>
-          <p:cNvPr id="40" name="Rectangle 39">
-            <a:extLst>
-              <a:ext uri="{FF2B5EF4-FFF2-40B4-BE49-F238E27FC236}">
-                <a16:creationId xmlns:a16="http://schemas.microsoft.com/office/drawing/2014/main" id="{94180434-932E-8F6F-C486-7C91200BA114}"/>
-              </a:ext>
-            </a:extLst>
-          </p:cNvPr>
-          <p:cNvSpPr/>
-          <p:nvPr/>
-        </p:nvSpPr>
-        <p:spPr>
-          <a:xfrm>
-            <a:off x="21866956" y="11062105"/>
-            <a:ext cx="2700104" cy="1661459"/>
-          </a:xfrm>
-          <a:prstGeom prst="rect">
-            <a:avLst/>
-          </a:prstGeom>
-          <a:solidFill>
-            <a:schemeClr val="accent5">
-              <a:lumMod val="50000"/>
-              <a:alpha val="30196"/>
-            </a:schemeClr>
-          </a:solidFill>
-        </p:spPr>
-        <p:style>
-          <a:lnRef idx="2">
-            <a:schemeClr val="accent1">
-              <a:shade val="15000"/>
-            </a:schemeClr>
-          </a:lnRef>
-          <a:fillRef idx="1">
-            <a:schemeClr val="accent1"/>
-          </a:fillRef>
-          <a:effectRef idx="0">
-            <a:schemeClr val="accent1"/>
-          </a:effectRef>
-          <a:fontRef idx="minor">
-            <a:schemeClr val="lt1"/>
-          </a:fontRef>
-        </p:style>
-        <p:txBody>
-          <a:bodyPr rtlCol="0" anchor="ctr"/>
-          <a:lstStyle/>
-          <a:p>
-            <a:endParaRPr lang="en-GB" sz="2000" dirty="0">
-              <a:solidFill>
-                <a:schemeClr val="tx1"/>
-              </a:solidFill>
-            </a:endParaRPr>
-          </a:p>
-        </p:txBody>
-      </p:sp>
-      <p:sp>
-        <p:nvSpPr>
-          <p:cNvPr id="41" name="Rectangle 40">
-            <a:extLst>
-              <a:ext uri="{FF2B5EF4-FFF2-40B4-BE49-F238E27FC236}">
-                <a16:creationId xmlns:a16="http://schemas.microsoft.com/office/drawing/2014/main" id="{77B2A6A4-A8EE-9506-A49C-610AAF5D7832}"/>
-              </a:ext>
-            </a:extLst>
-          </p:cNvPr>
-          <p:cNvSpPr/>
-          <p:nvPr/>
-        </p:nvSpPr>
-        <p:spPr>
-          <a:xfrm>
-            <a:off x="22019356" y="11214505"/>
-            <a:ext cx="2700104" cy="1661459"/>
-          </a:xfrm>
-          <a:prstGeom prst="rect">
-            <a:avLst/>
-          </a:prstGeom>
-          <a:solidFill>
-            <a:schemeClr val="accent5">
-              <a:lumMod val="50000"/>
-              <a:alpha val="30196"/>
-            </a:schemeClr>
-          </a:solidFill>
-        </p:spPr>
-        <p:style>
-          <a:lnRef idx="2">
-            <a:schemeClr val="accent1">
-              <a:shade val="15000"/>
-            </a:schemeClr>
-          </a:lnRef>
-          <a:fillRef idx="1">
-            <a:schemeClr val="accent1"/>
-          </a:fillRef>
-          <a:effectRef idx="0">
-            <a:schemeClr val="accent1"/>
-          </a:effectRef>
-          <a:fontRef idx="minor">
-            <a:schemeClr val="lt1"/>
-          </a:fontRef>
-        </p:style>
-        <p:txBody>
-          <a:bodyPr rtlCol="0" anchor="ctr"/>
-          <a:lstStyle/>
-          <a:p>
-            <a:endParaRPr lang="en-GB" sz="2000" dirty="0">
               <a:solidFill>
                 <a:schemeClr val="tx1"/>
               </a:solidFill>
@@ -10691,48 +9757,6 @@
       </p:cxnSp>
       <p:cxnSp>
         <p:nvCxnSpPr>
-          <p:cNvPr id="50" name="Straight Arrow Connector 49">
-            <a:extLst>
-              <a:ext uri="{FF2B5EF4-FFF2-40B4-BE49-F238E27FC236}">
-                <a16:creationId xmlns:a16="http://schemas.microsoft.com/office/drawing/2014/main" id="{628EC9C4-2EF7-1F6D-2A9B-942679A3F1A3}"/>
-              </a:ext>
-            </a:extLst>
-          </p:cNvPr>
-          <p:cNvCxnSpPr>
-            <a:cxnSpLocks/>
-          </p:cNvCxnSpPr>
-          <p:nvPr/>
-        </p:nvCxnSpPr>
-        <p:spPr>
-          <a:xfrm flipV="1">
-            <a:off x="16204665" y="11740434"/>
-            <a:ext cx="917198" cy="1835104"/>
-          </a:xfrm>
-          <a:prstGeom prst="straightConnector1">
-            <a:avLst/>
-          </a:prstGeom>
-          <a:ln w="19050">
-            <a:headEnd type="none" w="med" len="med"/>
-            <a:tailEnd type="arrow" w="med" len="med"/>
-          </a:ln>
-        </p:spPr>
-        <p:style>
-          <a:lnRef idx="2">
-            <a:schemeClr val="dk1"/>
-          </a:lnRef>
-          <a:fillRef idx="0">
-            <a:schemeClr val="dk1"/>
-          </a:fillRef>
-          <a:effectRef idx="1">
-            <a:schemeClr val="dk1"/>
-          </a:effectRef>
-          <a:fontRef idx="minor">
-            <a:schemeClr val="tx1"/>
-          </a:fontRef>
-        </p:style>
-      </p:cxnSp>
-      <p:cxnSp>
-        <p:nvCxnSpPr>
           <p:cNvPr id="51" name="Straight Arrow Connector 50">
             <a:extLst>
               <a:ext uri="{FF2B5EF4-FFF2-40B4-BE49-F238E27FC236}">
@@ -10821,216 +9845,6 @@
       </p:cxnSp>
       <p:cxnSp>
         <p:nvCxnSpPr>
-          <p:cNvPr id="71" name="Straight Arrow Connector 70">
-            <a:extLst>
-              <a:ext uri="{FF2B5EF4-FFF2-40B4-BE49-F238E27FC236}">
-                <a16:creationId xmlns:a16="http://schemas.microsoft.com/office/drawing/2014/main" id="{B2395FF4-4C07-F9D7-5A5D-6A3DDD00CE33}"/>
-              </a:ext>
-            </a:extLst>
-          </p:cNvPr>
-          <p:cNvCxnSpPr>
-            <a:cxnSpLocks/>
-          </p:cNvCxnSpPr>
-          <p:nvPr/>
-        </p:nvCxnSpPr>
-        <p:spPr>
-          <a:xfrm flipV="1">
-            <a:off x="26971160" y="11274518"/>
-            <a:ext cx="1127084" cy="3687639"/>
-          </a:xfrm>
-          <a:prstGeom prst="straightConnector1">
-            <a:avLst/>
-          </a:prstGeom>
-          <a:ln w="19050">
-            <a:headEnd type="none" w="med" len="med"/>
-            <a:tailEnd type="arrow" w="med" len="med"/>
-          </a:ln>
-        </p:spPr>
-        <p:style>
-          <a:lnRef idx="2">
-            <a:schemeClr val="dk1"/>
-          </a:lnRef>
-          <a:fillRef idx="0">
-            <a:schemeClr val="dk1"/>
-          </a:fillRef>
-          <a:effectRef idx="1">
-            <a:schemeClr val="dk1"/>
-          </a:effectRef>
-          <a:fontRef idx="minor">
-            <a:schemeClr val="tx1"/>
-          </a:fontRef>
-        </p:style>
-      </p:cxnSp>
-      <p:cxnSp>
-        <p:nvCxnSpPr>
-          <p:cNvPr id="72" name="Straight Arrow Connector 71">
-            <a:extLst>
-              <a:ext uri="{FF2B5EF4-FFF2-40B4-BE49-F238E27FC236}">
-                <a16:creationId xmlns:a16="http://schemas.microsoft.com/office/drawing/2014/main" id="{49F8ABA7-EEB3-AC1F-A146-C5FD67C1D64C}"/>
-              </a:ext>
-            </a:extLst>
-          </p:cNvPr>
-          <p:cNvCxnSpPr>
-            <a:cxnSpLocks/>
-          </p:cNvCxnSpPr>
-          <p:nvPr/>
-        </p:nvCxnSpPr>
-        <p:spPr>
-          <a:xfrm flipV="1">
-            <a:off x="27123560" y="11426918"/>
-            <a:ext cx="1127084" cy="3687639"/>
-          </a:xfrm>
-          <a:prstGeom prst="straightConnector1">
-            <a:avLst/>
-          </a:prstGeom>
-          <a:ln w="19050">
-            <a:headEnd type="none" w="med" len="med"/>
-            <a:tailEnd type="arrow" w="med" len="med"/>
-          </a:ln>
-        </p:spPr>
-        <p:style>
-          <a:lnRef idx="2">
-            <a:schemeClr val="dk1"/>
-          </a:lnRef>
-          <a:fillRef idx="0">
-            <a:schemeClr val="dk1"/>
-          </a:fillRef>
-          <a:effectRef idx="1">
-            <a:schemeClr val="dk1"/>
-          </a:effectRef>
-          <a:fontRef idx="minor">
-            <a:schemeClr val="tx1"/>
-          </a:fontRef>
-        </p:style>
-      </p:cxnSp>
-      <p:cxnSp>
-        <p:nvCxnSpPr>
-          <p:cNvPr id="73" name="Straight Arrow Connector 72">
-            <a:extLst>
-              <a:ext uri="{FF2B5EF4-FFF2-40B4-BE49-F238E27FC236}">
-                <a16:creationId xmlns:a16="http://schemas.microsoft.com/office/drawing/2014/main" id="{730ECFF9-17E1-9676-909B-72EB33CDB34F}"/>
-              </a:ext>
-            </a:extLst>
-          </p:cNvPr>
-          <p:cNvCxnSpPr>
-            <a:cxnSpLocks/>
-          </p:cNvCxnSpPr>
-          <p:nvPr/>
-        </p:nvCxnSpPr>
-        <p:spPr>
-          <a:xfrm flipV="1">
-            <a:off x="27275960" y="11579318"/>
-            <a:ext cx="1127084" cy="3687639"/>
-          </a:xfrm>
-          <a:prstGeom prst="straightConnector1">
-            <a:avLst/>
-          </a:prstGeom>
-          <a:ln w="19050">
-            <a:headEnd type="none" w="med" len="med"/>
-            <a:tailEnd type="arrow" w="med" len="med"/>
-          </a:ln>
-        </p:spPr>
-        <p:style>
-          <a:lnRef idx="2">
-            <a:schemeClr val="dk1"/>
-          </a:lnRef>
-          <a:fillRef idx="0">
-            <a:schemeClr val="dk1"/>
-          </a:fillRef>
-          <a:effectRef idx="1">
-            <a:schemeClr val="dk1"/>
-          </a:effectRef>
-          <a:fontRef idx="minor">
-            <a:schemeClr val="tx1"/>
-          </a:fontRef>
-        </p:style>
-      </p:cxnSp>
-      <p:cxnSp>
-        <p:nvCxnSpPr>
-          <p:cNvPr id="74" name="Straight Arrow Connector 73">
-            <a:extLst>
-              <a:ext uri="{FF2B5EF4-FFF2-40B4-BE49-F238E27FC236}">
-                <a16:creationId xmlns:a16="http://schemas.microsoft.com/office/drawing/2014/main" id="{93E4ADD4-3A8D-A610-30BC-E6CF8956E03E}"/>
-              </a:ext>
-            </a:extLst>
-          </p:cNvPr>
-          <p:cNvCxnSpPr>
-            <a:cxnSpLocks/>
-          </p:cNvCxnSpPr>
-          <p:nvPr/>
-        </p:nvCxnSpPr>
-        <p:spPr>
-          <a:xfrm flipV="1">
-            <a:off x="27428360" y="11731718"/>
-            <a:ext cx="1127084" cy="3687639"/>
-          </a:xfrm>
-          <a:prstGeom prst="straightConnector1">
-            <a:avLst/>
-          </a:prstGeom>
-          <a:ln w="19050">
-            <a:headEnd type="none" w="med" len="med"/>
-            <a:tailEnd type="arrow" w="med" len="med"/>
-          </a:ln>
-        </p:spPr>
-        <p:style>
-          <a:lnRef idx="2">
-            <a:schemeClr val="dk1"/>
-          </a:lnRef>
-          <a:fillRef idx="0">
-            <a:schemeClr val="dk1"/>
-          </a:fillRef>
-          <a:effectRef idx="1">
-            <a:schemeClr val="dk1"/>
-          </a:effectRef>
-          <a:fontRef idx="minor">
-            <a:schemeClr val="tx1"/>
-          </a:fontRef>
-        </p:style>
-      </p:cxnSp>
-      <p:cxnSp>
-        <p:nvCxnSpPr>
-          <p:cNvPr id="75" name="Straight Arrow Connector 74">
-            <a:extLst>
-              <a:ext uri="{FF2B5EF4-FFF2-40B4-BE49-F238E27FC236}">
-                <a16:creationId xmlns:a16="http://schemas.microsoft.com/office/drawing/2014/main" id="{49406745-520E-D0E2-6F86-87C4E811A97F}"/>
-              </a:ext>
-            </a:extLst>
-          </p:cNvPr>
-          <p:cNvCxnSpPr>
-            <a:cxnSpLocks/>
-          </p:cNvCxnSpPr>
-          <p:nvPr/>
-        </p:nvCxnSpPr>
-        <p:spPr>
-          <a:xfrm flipV="1">
-            <a:off x="27580760" y="11884118"/>
-            <a:ext cx="1127084" cy="3687639"/>
-          </a:xfrm>
-          <a:prstGeom prst="straightConnector1">
-            <a:avLst/>
-          </a:prstGeom>
-          <a:ln w="19050">
-            <a:headEnd type="none" w="med" len="med"/>
-            <a:tailEnd type="arrow" w="med" len="med"/>
-          </a:ln>
-        </p:spPr>
-        <p:style>
-          <a:lnRef idx="2">
-            <a:schemeClr val="dk1"/>
-          </a:lnRef>
-          <a:fillRef idx="0">
-            <a:schemeClr val="dk1"/>
-          </a:fillRef>
-          <a:effectRef idx="1">
-            <a:schemeClr val="dk1"/>
-          </a:effectRef>
-          <a:fontRef idx="minor">
-            <a:schemeClr val="tx1"/>
-          </a:fontRef>
-        </p:style>
-      </p:cxnSp>
-      <p:cxnSp>
-        <p:nvCxnSpPr>
           <p:cNvPr id="76" name="Straight Arrow Connector 75">
             <a:extLst>
               <a:ext uri="{FF2B5EF4-FFF2-40B4-BE49-F238E27FC236}">
@@ -11289,6 +10103,41 @@
           </a:prstGeom>
         </p:spPr>
       </p:pic>
+      <p:sp>
+        <p:nvSpPr>
+          <p:cNvPr id="31" name="TextBox 30">
+            <a:extLst>
+              <a:ext uri="{FF2B5EF4-FFF2-40B4-BE49-F238E27FC236}">
+                <a16:creationId xmlns:a16="http://schemas.microsoft.com/office/drawing/2014/main" id="{B62C052F-3ACF-B4AC-366D-B04FD1D77381}"/>
+              </a:ext>
+            </a:extLst>
+          </p:cNvPr>
+          <p:cNvSpPr txBox="1"/>
+          <p:nvPr/>
+        </p:nvSpPr>
+        <p:spPr>
+          <a:xfrm>
+            <a:off x="3041958" y="551152"/>
+            <a:ext cx="7020173" cy="1446550"/>
+          </a:xfrm>
+          <a:prstGeom prst="rect">
+            <a:avLst/>
+          </a:prstGeom>
+          <a:noFill/>
+        </p:spPr>
+        <p:txBody>
+          <a:bodyPr wrap="square" rtlCol="0">
+            <a:spAutoFit/>
+          </a:bodyPr>
+          <a:lstStyle/>
+          <a:p>
+            <a:r>
+              <a:rPr lang="en-GB" sz="4400" dirty="0"/>
+              <a:t>Ideas &amp; notes for documenting the VR UI</a:t>
+            </a:r>
+          </a:p>
+        </p:txBody>
+      </p:sp>
     </p:spTree>
     <p:extLst>
       <p:ext uri="{BB962C8B-B14F-4D97-AF65-F5344CB8AC3E}">

</xml_diff>

<commit_message>
Add option to use mobile hotspot instead of Eduroam (#176)
* Add mobile hotspot as option to flow diagram

Modified the flow diagram for "choosing your iMD-VR setup" to specify that private networks include both private Wi-Fi and mobile hotspots. This change is reflected in the png image and the powerpoint source file. Also added headings to the powerpoint to make it clear what is on each page.

* Add URL to NanoVer-iMD-VR tutorial page

Add hyperlink to nanover-imd-vr github page.

* Clarify use of mobile hotspot for wireless setup

Add clarification to the "requirements for a wireless setup" that you may use a mobile hotspot.
</commit_message>
<xml_diff>
--- a/source/assets/flow-chart.pptx
+++ b/source/assets/flow-chart.pptx
@@ -556,7 +556,7 @@
           <a:p>
             <a:fld id="{E198B52E-59E9-459A-8A51-6D063C146C47}" type="datetimeFigureOut">
               <a:rPr lang="en-GB" smtClean="0"/>
-              <a:t>12/11/2024</a:t>
+              <a:t>27/01/2025</a:t>
             </a:fld>
             <a:endParaRPr lang="en-GB"/>
           </a:p>
@@ -1147,7 +1147,7 @@
           <a:p>
             <a:fld id="{3FBAF93D-98AC-4FE3-B4B6-00701F2D46F7}" type="datetimeFigureOut">
               <a:rPr lang="en-GB" smtClean="0"/>
-              <a:t>12/11/2024</a:t>
+              <a:t>27/01/2025</a:t>
             </a:fld>
             <a:endParaRPr lang="en-GB"/>
           </a:p>
@@ -1317,7 +1317,7 @@
           <a:p>
             <a:fld id="{3FBAF93D-98AC-4FE3-B4B6-00701F2D46F7}" type="datetimeFigureOut">
               <a:rPr lang="en-GB" smtClean="0"/>
-              <a:t>12/11/2024</a:t>
+              <a:t>27/01/2025</a:t>
             </a:fld>
             <a:endParaRPr lang="en-GB"/>
           </a:p>
@@ -1497,7 +1497,7 @@
           <a:p>
             <a:fld id="{3FBAF93D-98AC-4FE3-B4B6-00701F2D46F7}" type="datetimeFigureOut">
               <a:rPr lang="en-GB" smtClean="0"/>
-              <a:t>12/11/2024</a:t>
+              <a:t>27/01/2025</a:t>
             </a:fld>
             <a:endParaRPr lang="en-GB"/>
           </a:p>
@@ -1667,7 +1667,7 @@
           <a:p>
             <a:fld id="{3FBAF93D-98AC-4FE3-B4B6-00701F2D46F7}" type="datetimeFigureOut">
               <a:rPr lang="en-GB" smtClean="0"/>
-              <a:t>12/11/2024</a:t>
+              <a:t>27/01/2025</a:t>
             </a:fld>
             <a:endParaRPr lang="en-GB"/>
           </a:p>
@@ -1913,7 +1913,7 @@
           <a:p>
             <a:fld id="{3FBAF93D-98AC-4FE3-B4B6-00701F2D46F7}" type="datetimeFigureOut">
               <a:rPr lang="en-GB" smtClean="0"/>
-              <a:t>12/11/2024</a:t>
+              <a:t>27/01/2025</a:t>
             </a:fld>
             <a:endParaRPr lang="en-GB"/>
           </a:p>
@@ -2145,7 +2145,7 @@
           <a:p>
             <a:fld id="{3FBAF93D-98AC-4FE3-B4B6-00701F2D46F7}" type="datetimeFigureOut">
               <a:rPr lang="en-GB" smtClean="0"/>
-              <a:t>12/11/2024</a:t>
+              <a:t>27/01/2025</a:t>
             </a:fld>
             <a:endParaRPr lang="en-GB"/>
           </a:p>
@@ -2512,7 +2512,7 @@
           <a:p>
             <a:fld id="{3FBAF93D-98AC-4FE3-B4B6-00701F2D46F7}" type="datetimeFigureOut">
               <a:rPr lang="en-GB" smtClean="0"/>
-              <a:t>12/11/2024</a:t>
+              <a:t>27/01/2025</a:t>
             </a:fld>
             <a:endParaRPr lang="en-GB"/>
           </a:p>
@@ -2630,7 +2630,7 @@
           <a:p>
             <a:fld id="{3FBAF93D-98AC-4FE3-B4B6-00701F2D46F7}" type="datetimeFigureOut">
               <a:rPr lang="en-GB" smtClean="0"/>
-              <a:t>12/11/2024</a:t>
+              <a:t>27/01/2025</a:t>
             </a:fld>
             <a:endParaRPr lang="en-GB"/>
           </a:p>
@@ -2725,7 +2725,7 @@
           <a:p>
             <a:fld id="{3FBAF93D-98AC-4FE3-B4B6-00701F2D46F7}" type="datetimeFigureOut">
               <a:rPr lang="en-GB" smtClean="0"/>
-              <a:t>12/11/2024</a:t>
+              <a:t>27/01/2025</a:t>
             </a:fld>
             <a:endParaRPr lang="en-GB"/>
           </a:p>
@@ -3002,7 +3002,7 @@
           <a:p>
             <a:fld id="{3FBAF93D-98AC-4FE3-B4B6-00701F2D46F7}" type="datetimeFigureOut">
               <a:rPr lang="en-GB" smtClean="0"/>
-              <a:t>12/11/2024</a:t>
+              <a:t>27/01/2025</a:t>
             </a:fld>
             <a:endParaRPr lang="en-GB"/>
           </a:p>
@@ -3259,7 +3259,7 @@
           <a:p>
             <a:fld id="{3FBAF93D-98AC-4FE3-B4B6-00701F2D46F7}" type="datetimeFigureOut">
               <a:rPr lang="en-GB" smtClean="0"/>
-              <a:t>12/11/2024</a:t>
+              <a:t>27/01/2025</a:t>
             </a:fld>
             <a:endParaRPr lang="en-GB"/>
           </a:p>
@@ -3472,7 +3472,7 @@
           <a:p>
             <a:fld id="{3FBAF93D-98AC-4FE3-B4B6-00701F2D46F7}" type="datetimeFigureOut">
               <a:rPr lang="en-GB" smtClean="0"/>
-              <a:t>12/11/2024</a:t>
+              <a:t>27/01/2025</a:t>
             </a:fld>
             <a:endParaRPr lang="en-GB"/>
           </a:p>
@@ -3891,7 +3891,7 @@
         </p:nvSpPr>
         <p:spPr>
           <a:xfrm>
-            <a:off x="6189662" y="9820434"/>
+            <a:off x="7935991" y="11803562"/>
             <a:ext cx="2663685" cy="1259320"/>
           </a:xfrm>
           <a:prstGeom prst="rect">
@@ -3965,7 +3965,7 @@
         </p:nvSpPr>
         <p:spPr>
           <a:xfrm>
-            <a:off x="1237490" y="4564051"/>
+            <a:off x="2983819" y="6055967"/>
             <a:ext cx="2436388" cy="1644960"/>
           </a:xfrm>
           <a:prstGeom prst="rect">
@@ -4039,8 +4039,8 @@
         </p:nvSpPr>
         <p:spPr>
           <a:xfrm>
-            <a:off x="2455682" y="6373915"/>
-            <a:ext cx="942374" cy="400110"/>
+            <a:off x="4202011" y="7970137"/>
+            <a:ext cx="2195409" cy="707886"/>
           </a:xfrm>
           <a:prstGeom prst="rect">
             <a:avLst/>
@@ -4055,7 +4055,13 @@
           <a:p>
             <a:r>
               <a:rPr lang="en-GB" sz="2000" dirty="0"/>
-              <a:t>Private</a:t>
+              <a:t>e.g. private Wi-Fi</a:t>
+            </a:r>
+          </a:p>
+          <a:p>
+            <a:r>
+              <a:rPr lang="en-GB" sz="2000" dirty="0"/>
+              <a:t> or mobile hotspot</a:t>
             </a:r>
             <a:endParaRPr lang="en-GB" sz="2000" b="1" dirty="0"/>
           </a:p>
@@ -4079,7 +4085,7 @@
         </p:nvCxnSpPr>
         <p:spPr>
           <a:xfrm flipV="1">
-            <a:off x="3673878" y="5381076"/>
+            <a:off x="5420207" y="6872992"/>
             <a:ext cx="2632768" cy="5455"/>
           </a:xfrm>
           <a:prstGeom prst="straightConnector1">
@@ -4119,7 +4125,7 @@
         </p:nvSpPr>
         <p:spPr>
           <a:xfrm>
-            <a:off x="1237491" y="6986883"/>
+            <a:off x="2983820" y="8970011"/>
             <a:ext cx="2436387" cy="1644960"/>
           </a:xfrm>
           <a:prstGeom prst="rect">
@@ -4197,8 +4203,8 @@
         </p:nvCxnSpPr>
         <p:spPr>
           <a:xfrm>
-            <a:off x="2455684" y="6209011"/>
-            <a:ext cx="1" cy="777872"/>
+            <a:off x="4202013" y="7700927"/>
+            <a:ext cx="1" cy="1269084"/>
           </a:xfrm>
           <a:prstGeom prst="straightConnector1">
             <a:avLst/>
@@ -4237,7 +4243,7 @@
         </p:nvSpPr>
         <p:spPr>
           <a:xfrm>
-            <a:off x="1237490" y="12185799"/>
+            <a:off x="2983819" y="14168927"/>
             <a:ext cx="2436386" cy="1093980"/>
           </a:xfrm>
           <a:prstGeom prst="rect">
@@ -4312,7 +4318,7 @@
         </p:nvSpPr>
         <p:spPr>
           <a:xfrm>
-            <a:off x="3776743" y="7442101"/>
+            <a:off x="5523072" y="9425229"/>
             <a:ext cx="920445" cy="400110"/>
           </a:xfrm>
           <a:prstGeom prst="rect">
@@ -4361,7 +4367,7 @@
         </p:nvCxnSpPr>
         <p:spPr>
           <a:xfrm>
-            <a:off x="3673878" y="7809363"/>
+            <a:off x="5420207" y="9792491"/>
             <a:ext cx="1150908" cy="6507"/>
           </a:xfrm>
           <a:prstGeom prst="straightConnector1">
@@ -4401,7 +4407,7 @@
         </p:nvSpPr>
         <p:spPr>
           <a:xfrm>
-            <a:off x="1226608" y="8764555"/>
+            <a:off x="2972937" y="10747683"/>
             <a:ext cx="1205582" cy="707886"/>
           </a:xfrm>
           <a:prstGeom prst="rect">
@@ -4437,7 +4443,7 @@
         </p:nvSpPr>
         <p:spPr>
           <a:xfrm>
-            <a:off x="3790863" y="4878699"/>
+            <a:off x="5537192" y="6370615"/>
             <a:ext cx="2398798" cy="1015663"/>
           </a:xfrm>
           <a:prstGeom prst="rect">
@@ -4483,7 +4489,7 @@
         </p:nvSpPr>
         <p:spPr>
           <a:xfrm>
-            <a:off x="8697192" y="9707619"/>
+            <a:off x="10443521" y="11690747"/>
             <a:ext cx="1756246" cy="707886"/>
           </a:xfrm>
           <a:prstGeom prst="rect">
@@ -4526,7 +4532,7 @@
         </p:nvSpPr>
         <p:spPr>
           <a:xfrm>
-            <a:off x="10402377" y="12004216"/>
+            <a:off x="12148706" y="13987344"/>
             <a:ext cx="2663685" cy="1554111"/>
           </a:xfrm>
           <a:prstGeom prst="rect">
@@ -4601,7 +4607,7 @@
         </p:nvSpPr>
         <p:spPr>
           <a:xfrm>
-            <a:off x="7548554" y="11148924"/>
+            <a:off x="9294883" y="13132052"/>
             <a:ext cx="1155922" cy="707886"/>
           </a:xfrm>
           <a:prstGeom prst="rect">
@@ -4636,7 +4642,7 @@
         </p:nvSpPr>
         <p:spPr>
           <a:xfrm>
-            <a:off x="1237490" y="2252064"/>
+            <a:off x="2983819" y="3743980"/>
             <a:ext cx="2436388" cy="1644960"/>
           </a:xfrm>
           <a:prstGeom prst="rect">
@@ -4714,7 +4720,7 @@
         </p:nvCxnSpPr>
         <p:spPr>
           <a:xfrm>
-            <a:off x="2455684" y="3897024"/>
+            <a:off x="4202013" y="5388940"/>
             <a:ext cx="0" cy="667027"/>
           </a:xfrm>
           <a:prstGeom prst="straightConnector1">
@@ -4754,7 +4760,7 @@
         </p:nvSpPr>
         <p:spPr>
           <a:xfrm>
-            <a:off x="2455682" y="4022141"/>
+            <a:off x="4202011" y="5514057"/>
             <a:ext cx="1206612" cy="400110"/>
           </a:xfrm>
           <a:prstGeom prst="rect">
@@ -4793,7 +4799,7 @@
         </p:nvCxnSpPr>
         <p:spPr>
           <a:xfrm>
-            <a:off x="3673878" y="3074544"/>
+            <a:off x="5420207" y="4566460"/>
             <a:ext cx="1792328" cy="1"/>
           </a:xfrm>
           <a:prstGeom prst="straightConnector1">
@@ -4833,7 +4839,7 @@
         </p:nvSpPr>
         <p:spPr>
           <a:xfrm>
-            <a:off x="5466206" y="2252065"/>
+            <a:off x="7212535" y="3743981"/>
             <a:ext cx="7599855" cy="1644960"/>
           </a:xfrm>
           <a:prstGeom prst="rect">
@@ -4959,7 +4965,7 @@
         </p:nvSpPr>
         <p:spPr>
           <a:xfrm>
-            <a:off x="4048104" y="2357147"/>
+            <a:off x="5794433" y="3849063"/>
             <a:ext cx="1043876" cy="707886"/>
           </a:xfrm>
           <a:prstGeom prst="rect">
@@ -5007,7 +5013,7 @@
         </p:nvCxnSpPr>
         <p:spPr>
           <a:xfrm>
-            <a:off x="8853347" y="10450094"/>
+            <a:off x="10599676" y="12433222"/>
             <a:ext cx="1549927" cy="0"/>
           </a:xfrm>
           <a:prstGeom prst="straightConnector1">
@@ -5051,7 +5057,7 @@
         </p:nvCxnSpPr>
         <p:spPr>
           <a:xfrm flipH="1">
-            <a:off x="2455683" y="8631843"/>
+            <a:off x="4202012" y="10614971"/>
             <a:ext cx="2" cy="998412"/>
           </a:xfrm>
           <a:prstGeom prst="straightConnector1">
@@ -5091,7 +5097,7 @@
         </p:nvSpPr>
         <p:spPr>
           <a:xfrm>
-            <a:off x="4824786" y="7186210"/>
+            <a:off x="6571115" y="9169338"/>
             <a:ext cx="2279745" cy="1259320"/>
           </a:xfrm>
           <a:prstGeom prst="rect">
@@ -5181,7 +5187,7 @@
         </p:nvSpPr>
         <p:spPr>
           <a:xfrm>
-            <a:off x="1237490" y="9630255"/>
+            <a:off x="2983819" y="11613383"/>
             <a:ext cx="2436386" cy="1644960"/>
           </a:xfrm>
           <a:prstGeom prst="rect">
@@ -5255,7 +5261,7 @@
         </p:nvSpPr>
         <p:spPr>
           <a:xfrm>
-            <a:off x="6306646" y="4558596"/>
+            <a:off x="8052975" y="6050512"/>
             <a:ext cx="2436388" cy="1644960"/>
           </a:xfrm>
           <a:prstGeom prst="rect">
@@ -5333,8 +5339,8 @@
         </p:nvCxnSpPr>
         <p:spPr>
           <a:xfrm flipH="1">
-            <a:off x="7521505" y="6203556"/>
-            <a:ext cx="3335" cy="3616878"/>
+            <a:off x="9267834" y="7695472"/>
+            <a:ext cx="3335" cy="4108090"/>
           </a:xfrm>
           <a:prstGeom prst="straightConnector1">
             <a:avLst/>
@@ -5373,7 +5379,7 @@
         </p:nvSpPr>
         <p:spPr>
           <a:xfrm>
-            <a:off x="10403274" y="9820434"/>
+            <a:off x="12149603" y="11803562"/>
             <a:ext cx="2663685" cy="1259320"/>
           </a:xfrm>
           <a:prstGeom prst="rect">
@@ -5447,7 +5453,7 @@
         </p:nvSpPr>
         <p:spPr>
           <a:xfrm>
-            <a:off x="5170879" y="12004224"/>
+            <a:off x="6917208" y="13987352"/>
             <a:ext cx="4724962" cy="1554112"/>
           </a:xfrm>
           <a:prstGeom prst="rect">
@@ -5525,7 +5531,7 @@
         </p:nvCxnSpPr>
         <p:spPr>
           <a:xfrm flipH="1">
-            <a:off x="11734220" y="11079754"/>
+            <a:off x="13480549" y="13062882"/>
             <a:ext cx="897" cy="924462"/>
           </a:xfrm>
           <a:prstGeom prst="straightConnector1">
@@ -5565,7 +5571,7 @@
         </p:nvSpPr>
         <p:spPr>
           <a:xfrm>
-            <a:off x="11657207" y="11368769"/>
+            <a:off x="13403536" y="13351897"/>
             <a:ext cx="721103" cy="400110"/>
           </a:xfrm>
           <a:prstGeom prst="rect">
@@ -5601,7 +5607,7 @@
         </p:nvSpPr>
         <p:spPr>
           <a:xfrm>
-            <a:off x="13066062" y="9979909"/>
+            <a:off x="14812391" y="11963037"/>
             <a:ext cx="802351" cy="400110"/>
           </a:xfrm>
           <a:prstGeom prst="rect">
@@ -5641,7 +5647,7 @@
         </p:nvCxnSpPr>
         <p:spPr>
           <a:xfrm>
-            <a:off x="7521505" y="11079754"/>
+            <a:off x="9267834" y="13062882"/>
             <a:ext cx="11855" cy="924470"/>
           </a:xfrm>
           <a:prstGeom prst="straightConnector1">
@@ -5685,7 +5691,7 @@
         </p:nvCxnSpPr>
         <p:spPr>
           <a:xfrm>
-            <a:off x="2455683" y="11275215"/>
+            <a:off x="4202012" y="13258343"/>
             <a:ext cx="0" cy="910584"/>
           </a:xfrm>
           <a:prstGeom prst="straightConnector1">
@@ -5725,7 +5731,7 @@
         </p:nvSpPr>
         <p:spPr>
           <a:xfrm>
-            <a:off x="2432190" y="11439664"/>
+            <a:off x="4178519" y="13422792"/>
             <a:ext cx="646232" cy="400110"/>
           </a:xfrm>
           <a:prstGeom prst="rect">
@@ -5761,7 +5767,7 @@
         </p:nvSpPr>
         <p:spPr>
           <a:xfrm>
-            <a:off x="4639504" y="10095043"/>
+            <a:off x="6385833" y="12078171"/>
             <a:ext cx="730306" cy="400110"/>
           </a:xfrm>
           <a:prstGeom prst="rect">
@@ -5801,7 +5807,7 @@
         </p:nvCxnSpPr>
         <p:spPr>
           <a:xfrm flipV="1">
-            <a:off x="3673876" y="10450094"/>
+            <a:off x="5420205" y="12433222"/>
             <a:ext cx="2515786" cy="2641"/>
           </a:xfrm>
           <a:prstGeom prst="straightConnector1">
@@ -5844,7 +5850,7 @@
         </p:nvCxnSpPr>
         <p:spPr>
           <a:xfrm rot="5400000">
-            <a:off x="4040538" y="8075537"/>
+            <a:off x="5786867" y="10058665"/>
             <a:ext cx="1554129" cy="2294115"/>
           </a:xfrm>
           <a:prstGeom prst="bentConnector2">
@@ -5888,7 +5894,7 @@
         </p:nvCxnSpPr>
         <p:spPr>
           <a:xfrm flipH="1">
-            <a:off x="7533360" y="10450094"/>
+            <a:off x="9279689" y="12433222"/>
             <a:ext cx="5533599" cy="3108242"/>
           </a:xfrm>
           <a:prstGeom prst="bentConnector4">
@@ -5935,7 +5941,7 @@
         </p:nvCxnSpPr>
         <p:spPr>
           <a:xfrm flipV="1">
-            <a:off x="9895841" y="12781272"/>
+            <a:off x="11642170" y="14764400"/>
             <a:ext cx="506536" cy="8"/>
           </a:xfrm>
           <a:prstGeom prst="straightConnector1">
@@ -5975,7 +5981,7 @@
         </p:nvGrpSpPr>
         <p:grpSpPr>
           <a:xfrm>
-            <a:off x="9426119" y="5937933"/>
+            <a:off x="11172448" y="7429849"/>
             <a:ext cx="3892696" cy="2242295"/>
             <a:chOff x="2801026" y="13978522"/>
             <a:chExt cx="3892696" cy="2242295"/>
@@ -6228,6 +6234,77 @@
           </p:txBody>
         </p:sp>
       </p:grpSp>
+      <p:sp>
+        <p:nvSpPr>
+          <p:cNvPr id="2" name="TextBox 1">
+            <a:extLst>
+              <a:ext uri="{FF2B5EF4-FFF2-40B4-BE49-F238E27FC236}">
+                <a16:creationId xmlns:a16="http://schemas.microsoft.com/office/drawing/2014/main" id="{ECB4CC63-F65B-1B06-1F77-5E21AF60CBB2}"/>
+              </a:ext>
+            </a:extLst>
+          </p:cNvPr>
+          <p:cNvSpPr txBox="1"/>
+          <p:nvPr/>
+        </p:nvSpPr>
+        <p:spPr>
+          <a:xfrm>
+            <a:off x="6917208" y="287920"/>
+            <a:ext cx="3574248" cy="769441"/>
+          </a:xfrm>
+          <a:prstGeom prst="rect">
+            <a:avLst/>
+          </a:prstGeom>
+          <a:noFill/>
+        </p:spPr>
+        <p:txBody>
+          <a:bodyPr wrap="none" rtlCol="0">
+            <a:spAutoFit/>
+          </a:bodyPr>
+          <a:lstStyle/>
+          <a:p>
+            <a:r>
+              <a:rPr lang="en-GB" sz="4400" dirty="0"/>
+              <a:t>Latest version</a:t>
+            </a:r>
+          </a:p>
+        </p:txBody>
+      </p:sp>
+      <p:sp>
+        <p:nvSpPr>
+          <p:cNvPr id="8" name="TextBox 7">
+            <a:extLst>
+              <a:ext uri="{FF2B5EF4-FFF2-40B4-BE49-F238E27FC236}">
+                <a16:creationId xmlns:a16="http://schemas.microsoft.com/office/drawing/2014/main" id="{D7E353EA-A529-B799-6CC2-BFD169EE4D00}"/>
+              </a:ext>
+            </a:extLst>
+          </p:cNvPr>
+          <p:cNvSpPr txBox="1"/>
+          <p:nvPr/>
+        </p:nvSpPr>
+        <p:spPr>
+          <a:xfrm>
+            <a:off x="3226499" y="8066841"/>
+            <a:ext cx="942374" cy="400110"/>
+          </a:xfrm>
+          <a:prstGeom prst="rect">
+            <a:avLst/>
+          </a:prstGeom>
+          <a:noFill/>
+        </p:spPr>
+        <p:txBody>
+          <a:bodyPr wrap="none" rtlCol="0">
+            <a:spAutoFit/>
+          </a:bodyPr>
+          <a:lstStyle/>
+          <a:p>
+            <a:r>
+              <a:rPr lang="en-GB" sz="2000" dirty="0"/>
+              <a:t>Private</a:t>
+            </a:r>
+            <a:endParaRPr lang="en-GB" sz="2000" b="1" dirty="0"/>
+          </a:p>
+        </p:txBody>
+      </p:sp>
     </p:spTree>
     <p:extLst>
       <p:ext uri="{BB962C8B-B14F-4D97-AF65-F5344CB8AC3E}">
@@ -6278,7 +6355,7 @@
         </p:nvSpPr>
         <p:spPr>
           <a:xfrm>
-            <a:off x="6189661" y="10776752"/>
+            <a:off x="7988858" y="11691152"/>
             <a:ext cx="2663685" cy="1259320"/>
           </a:xfrm>
           <a:prstGeom prst="rect">
@@ -6352,7 +6429,7 @@
         </p:nvSpPr>
         <p:spPr>
           <a:xfrm>
-            <a:off x="1237490" y="5161801"/>
+            <a:off x="3036687" y="6076201"/>
             <a:ext cx="2436388" cy="1644960"/>
           </a:xfrm>
           <a:prstGeom prst="rect">
@@ -6426,7 +6503,7 @@
         </p:nvSpPr>
         <p:spPr>
           <a:xfrm>
-            <a:off x="2497525" y="7137935"/>
+            <a:off x="4296722" y="8052335"/>
             <a:ext cx="942374" cy="400110"/>
           </a:xfrm>
           <a:prstGeom prst="rect">
@@ -6466,7 +6543,7 @@
         </p:nvCxnSpPr>
         <p:spPr>
           <a:xfrm flipV="1">
-            <a:off x="3673878" y="5978826"/>
+            <a:off x="5473075" y="6893226"/>
             <a:ext cx="2632768" cy="5455"/>
           </a:xfrm>
           <a:prstGeom prst="straightConnector1">
@@ -6506,7 +6583,7 @@
         </p:nvSpPr>
         <p:spPr>
           <a:xfrm>
-            <a:off x="1237490" y="7943201"/>
+            <a:off x="3036687" y="8857601"/>
             <a:ext cx="2436387" cy="1644960"/>
           </a:xfrm>
           <a:prstGeom prst="rect">
@@ -6584,7 +6661,7 @@
         </p:nvCxnSpPr>
         <p:spPr>
           <a:xfrm>
-            <a:off x="2455684" y="6806761"/>
+            <a:off x="4254881" y="7721161"/>
             <a:ext cx="0" cy="1136440"/>
           </a:xfrm>
           <a:prstGeom prst="straightConnector1">
@@ -6624,7 +6701,7 @@
         </p:nvSpPr>
         <p:spPr>
           <a:xfrm>
-            <a:off x="1237489" y="12960541"/>
+            <a:off x="3036686" y="13874941"/>
             <a:ext cx="2436386" cy="1644960"/>
           </a:xfrm>
           <a:prstGeom prst="rect">
@@ -6699,7 +6776,7 @@
         </p:nvSpPr>
         <p:spPr>
           <a:xfrm>
-            <a:off x="3776742" y="8398419"/>
+            <a:off x="5575939" y="9312819"/>
             <a:ext cx="920445" cy="400110"/>
           </a:xfrm>
           <a:prstGeom prst="rect">
@@ -6748,7 +6825,7 @@
         </p:nvCxnSpPr>
         <p:spPr>
           <a:xfrm>
-            <a:off x="3673877" y="8765681"/>
+            <a:off x="5473074" y="9680081"/>
             <a:ext cx="1150908" cy="6507"/>
           </a:xfrm>
           <a:prstGeom prst="straightConnector1">
@@ -6788,7 +6865,7 @@
         </p:nvSpPr>
         <p:spPr>
           <a:xfrm>
-            <a:off x="2468294" y="9733424"/>
+            <a:off x="4267491" y="10647824"/>
             <a:ext cx="1205582" cy="707886"/>
           </a:xfrm>
           <a:prstGeom prst="rect">
@@ -6823,7 +6900,7 @@
         </p:nvSpPr>
         <p:spPr>
           <a:xfrm>
-            <a:off x="3790863" y="5476449"/>
+            <a:off x="5590060" y="6390849"/>
             <a:ext cx="2398798" cy="1015663"/>
           </a:xfrm>
           <a:prstGeom prst="rect">
@@ -6869,7 +6946,7 @@
         </p:nvSpPr>
         <p:spPr>
           <a:xfrm>
-            <a:off x="8697191" y="10663937"/>
+            <a:off x="10496388" y="11578337"/>
             <a:ext cx="1756246" cy="707886"/>
           </a:xfrm>
           <a:prstGeom prst="rect">
@@ -6912,7 +6989,7 @@
         </p:nvSpPr>
         <p:spPr>
           <a:xfrm>
-            <a:off x="10402376" y="12960534"/>
+            <a:off x="12201573" y="13874934"/>
             <a:ext cx="2663685" cy="1554111"/>
           </a:xfrm>
           <a:prstGeom prst="rect">
@@ -7033,7 +7110,7 @@
         </p:nvSpPr>
         <p:spPr>
           <a:xfrm>
-            <a:off x="7548553" y="12105242"/>
+            <a:off x="9347750" y="13019642"/>
             <a:ext cx="1155922" cy="707886"/>
           </a:xfrm>
           <a:prstGeom prst="rect">
@@ -7068,7 +7145,7 @@
         </p:nvSpPr>
         <p:spPr>
           <a:xfrm>
-            <a:off x="1237490" y="2252064"/>
+            <a:off x="3036687" y="3166464"/>
             <a:ext cx="2436388" cy="1644960"/>
           </a:xfrm>
           <a:prstGeom prst="rect">
@@ -7146,7 +7223,7 @@
         </p:nvCxnSpPr>
         <p:spPr>
           <a:xfrm>
-            <a:off x="2455684" y="3897024"/>
+            <a:off x="4254881" y="4811424"/>
             <a:ext cx="0" cy="1264777"/>
           </a:xfrm>
           <a:prstGeom prst="straightConnector1">
@@ -7186,7 +7263,7 @@
         </p:nvSpPr>
         <p:spPr>
           <a:xfrm>
-            <a:off x="2497525" y="4287236"/>
+            <a:off x="4296722" y="5201636"/>
             <a:ext cx="1206612" cy="400110"/>
           </a:xfrm>
           <a:prstGeom prst="rect">
@@ -7225,7 +7302,7 @@
         </p:nvCxnSpPr>
         <p:spPr>
           <a:xfrm>
-            <a:off x="3673878" y="3074544"/>
+            <a:off x="5473075" y="3988944"/>
             <a:ext cx="1792328" cy="1"/>
           </a:xfrm>
           <a:prstGeom prst="straightConnector1">
@@ -7265,7 +7342,7 @@
         </p:nvSpPr>
         <p:spPr>
           <a:xfrm>
-            <a:off x="5466206" y="2252065"/>
+            <a:off x="7265403" y="3166465"/>
             <a:ext cx="7599855" cy="1644960"/>
           </a:xfrm>
           <a:prstGeom prst="rect">
@@ -7374,7 +7451,7 @@
         </p:nvSpPr>
         <p:spPr>
           <a:xfrm>
-            <a:off x="4048104" y="2357147"/>
+            <a:off x="5847301" y="3271547"/>
             <a:ext cx="1043876" cy="707886"/>
           </a:xfrm>
           <a:prstGeom prst="rect">
@@ -7422,7 +7499,7 @@
         </p:nvCxnSpPr>
         <p:spPr>
           <a:xfrm>
-            <a:off x="8853346" y="11406412"/>
+            <a:off x="10652543" y="12320812"/>
             <a:ext cx="1549927" cy="0"/>
           </a:xfrm>
           <a:prstGeom prst="straightConnector1">
@@ -7466,7 +7543,7 @@
         </p:nvCxnSpPr>
         <p:spPr>
           <a:xfrm flipH="1">
-            <a:off x="2455682" y="9588161"/>
+            <a:off x="4254879" y="10502561"/>
             <a:ext cx="2" cy="998412"/>
           </a:xfrm>
           <a:prstGeom prst="straightConnector1">
@@ -7572,7 +7649,7 @@
         </p:nvSpPr>
         <p:spPr>
           <a:xfrm>
-            <a:off x="4824785" y="8142528"/>
+            <a:off x="6623982" y="9056928"/>
             <a:ext cx="2279745" cy="1259320"/>
           </a:xfrm>
           <a:prstGeom prst="rect">
@@ -7662,7 +7739,7 @@
         </p:nvSpPr>
         <p:spPr>
           <a:xfrm>
-            <a:off x="1237489" y="10586573"/>
+            <a:off x="3036686" y="11500973"/>
             <a:ext cx="2436386" cy="1644960"/>
           </a:xfrm>
           <a:prstGeom prst="rect">
@@ -7736,7 +7813,7 @@
         </p:nvSpPr>
         <p:spPr>
           <a:xfrm>
-            <a:off x="6306646" y="5156346"/>
+            <a:off x="8105843" y="6070746"/>
             <a:ext cx="2436388" cy="1644960"/>
           </a:xfrm>
           <a:prstGeom prst="rect">
@@ -7814,7 +7891,7 @@
         </p:nvCxnSpPr>
         <p:spPr>
           <a:xfrm flipH="1">
-            <a:off x="7521504" y="6801306"/>
+            <a:off x="9320701" y="7715706"/>
             <a:ext cx="3336" cy="3975446"/>
           </a:xfrm>
           <a:prstGeom prst="straightConnector1">
@@ -7854,7 +7931,7 @@
         </p:nvSpPr>
         <p:spPr>
           <a:xfrm>
-            <a:off x="10403273" y="10776752"/>
+            <a:off x="12202470" y="11691152"/>
             <a:ext cx="2663685" cy="1259320"/>
           </a:xfrm>
           <a:prstGeom prst="rect">
@@ -7928,7 +8005,7 @@
         </p:nvSpPr>
         <p:spPr>
           <a:xfrm>
-            <a:off x="5170878" y="12960542"/>
+            <a:off x="6970075" y="13874942"/>
             <a:ext cx="4724962" cy="1554112"/>
           </a:xfrm>
           <a:prstGeom prst="rect">
@@ -8006,7 +8083,7 @@
         </p:nvCxnSpPr>
         <p:spPr>
           <a:xfrm flipH="1">
-            <a:off x="11734219" y="12036072"/>
+            <a:off x="13533416" y="12950472"/>
             <a:ext cx="897" cy="924462"/>
           </a:xfrm>
           <a:prstGeom prst="straightConnector1">
@@ -8046,7 +8123,7 @@
         </p:nvSpPr>
         <p:spPr>
           <a:xfrm>
-            <a:off x="11712587" y="12231533"/>
+            <a:off x="13511784" y="13145933"/>
             <a:ext cx="721103" cy="400110"/>
           </a:xfrm>
           <a:prstGeom prst="rect">
@@ -8082,7 +8159,7 @@
         </p:nvSpPr>
         <p:spPr>
           <a:xfrm>
-            <a:off x="13066061" y="10936227"/>
+            <a:off x="14865258" y="11850627"/>
             <a:ext cx="802351" cy="400110"/>
           </a:xfrm>
           <a:prstGeom prst="rect">
@@ -8122,7 +8199,7 @@
         </p:nvCxnSpPr>
         <p:spPr>
           <a:xfrm>
-            <a:off x="7521504" y="12036072"/>
+            <a:off x="9320701" y="12950472"/>
             <a:ext cx="11855" cy="924470"/>
           </a:xfrm>
           <a:prstGeom prst="straightConnector1">
@@ -8162,7 +8239,7 @@
         </p:nvSpPr>
         <p:spPr>
           <a:xfrm>
-            <a:off x="9406692" y="5218104"/>
+            <a:off x="11205889" y="6132504"/>
             <a:ext cx="3931546" cy="4252210"/>
           </a:xfrm>
           <a:prstGeom prst="rect">
@@ -8379,7 +8456,7 @@
         </p:nvCxnSpPr>
         <p:spPr>
           <a:xfrm>
-            <a:off x="2455682" y="12231533"/>
+            <a:off x="4254879" y="13145933"/>
             <a:ext cx="0" cy="729008"/>
           </a:xfrm>
           <a:prstGeom prst="straightConnector1">
@@ -8566,7 +8643,7 @@
         </p:nvSpPr>
         <p:spPr>
           <a:xfrm>
-            <a:off x="2432189" y="12395982"/>
+            <a:off x="4231386" y="13310382"/>
             <a:ext cx="646232" cy="400110"/>
           </a:xfrm>
           <a:prstGeom prst="rect">
@@ -8602,7 +8679,7 @@
         </p:nvSpPr>
         <p:spPr>
           <a:xfrm>
-            <a:off x="4639503" y="11051361"/>
+            <a:off x="6438700" y="11965761"/>
             <a:ext cx="730306" cy="400110"/>
           </a:xfrm>
           <a:prstGeom prst="rect">
@@ -8642,7 +8719,7 @@
         </p:nvCxnSpPr>
         <p:spPr>
           <a:xfrm flipV="1">
-            <a:off x="3673875" y="11406412"/>
+            <a:off x="5473072" y="12320812"/>
             <a:ext cx="2515786" cy="2641"/>
           </a:xfrm>
           <a:prstGeom prst="straightConnector1">
@@ -8685,7 +8762,7 @@
         </p:nvCxnSpPr>
         <p:spPr>
           <a:xfrm>
-            <a:off x="7104530" y="8772188"/>
+            <a:off x="8903727" y="9686588"/>
             <a:ext cx="223549" cy="2011035"/>
           </a:xfrm>
           <a:prstGeom prst="bentConnector2">
@@ -8729,7 +8806,7 @@
         </p:nvCxnSpPr>
         <p:spPr>
           <a:xfrm flipH="1">
-            <a:off x="7533359" y="11406412"/>
+            <a:off x="9332556" y="12320812"/>
             <a:ext cx="5533599" cy="3108242"/>
           </a:xfrm>
           <a:prstGeom prst="bentConnector4">
@@ -8776,7 +8853,7 @@
         </p:nvCxnSpPr>
         <p:spPr>
           <a:xfrm flipV="1">
-            <a:off x="9895840" y="13737590"/>
+            <a:off x="11695037" y="14651990"/>
             <a:ext cx="506536" cy="8"/>
           </a:xfrm>
           <a:prstGeom prst="straightConnector1">
@@ -8802,6 +8879,41 @@
           </a:fontRef>
         </p:style>
       </p:cxnSp>
+      <p:sp>
+        <p:nvSpPr>
+          <p:cNvPr id="2" name="TextBox 1">
+            <a:extLst>
+              <a:ext uri="{FF2B5EF4-FFF2-40B4-BE49-F238E27FC236}">
+                <a16:creationId xmlns:a16="http://schemas.microsoft.com/office/drawing/2014/main" id="{72FCE891-241C-8D09-352A-6C4AE577572A}"/>
+              </a:ext>
+            </a:extLst>
+          </p:cNvPr>
+          <p:cNvSpPr txBox="1"/>
+          <p:nvPr/>
+        </p:nvSpPr>
+        <p:spPr>
+          <a:xfrm>
+            <a:off x="6917208" y="287920"/>
+            <a:ext cx="4148123" cy="769441"/>
+          </a:xfrm>
+          <a:prstGeom prst="rect">
+            <a:avLst/>
+          </a:prstGeom>
+          <a:noFill/>
+        </p:spPr>
+        <p:txBody>
+          <a:bodyPr wrap="none" rtlCol="0">
+            <a:spAutoFit/>
+          </a:bodyPr>
+          <a:lstStyle/>
+          <a:p>
+            <a:r>
+              <a:rPr lang="en-GB" sz="4400" dirty="0"/>
+              <a:t>Previous version</a:t>
+            </a:r>
+          </a:p>
+        </p:txBody>
+      </p:sp>
     </p:spTree>
     <p:extLst>
       <p:ext uri="{BB962C8B-B14F-4D97-AF65-F5344CB8AC3E}">
@@ -8864,10 +8976,10 @@
       </p:pic>
       <p:sp>
         <p:nvSpPr>
-          <p:cNvPr id="6" name="Rectangle 5">
-            <a:extLst>
-              <a:ext uri="{FF2B5EF4-FFF2-40B4-BE49-F238E27FC236}">
-                <a16:creationId xmlns:a16="http://schemas.microsoft.com/office/drawing/2014/main" id="{6E07BB81-D828-144A-EB02-0B2D729F7626}"/>
+          <p:cNvPr id="9" name="Rectangle 8">
+            <a:extLst>
+              <a:ext uri="{FF2B5EF4-FFF2-40B4-BE49-F238E27FC236}">
+                <a16:creationId xmlns:a16="http://schemas.microsoft.com/office/drawing/2014/main" id="{488FD193-364C-B76F-A576-6A01CC4D876D}"/>
               </a:ext>
             </a:extLst>
           </p:cNvPr>
@@ -8876,16 +8988,16 @@
         </p:nvSpPr>
         <p:spPr>
           <a:xfrm>
-            <a:off x="23473597" y="5333197"/>
-            <a:ext cx="2279745" cy="1259320"/>
+            <a:off x="552093" y="2656201"/>
+            <a:ext cx="1489937" cy="1188720"/>
           </a:xfrm>
           <a:prstGeom prst="rect">
             <a:avLst/>
           </a:prstGeom>
           <a:solidFill>
-            <a:srgbClr val="2596BE">
-              <a:alpha val="30196"/>
-            </a:srgbClr>
+            <a:schemeClr val="bg1">
+              <a:lumMod val="85000"/>
+            </a:schemeClr>
           </a:solidFill>
         </p:spPr>
         <p:style>
@@ -8909,20 +9021,31 @@
           <a:lstStyle/>
           <a:p>
             <a:pPr algn="ctr"/>
-            <a:endParaRPr lang="en-GB" sz="2000" dirty="0">
-              <a:solidFill>
-                <a:schemeClr val="tx1"/>
-              </a:solidFill>
-            </a:endParaRPr>
-          </a:p>
-        </p:txBody>
-      </p:sp>
-      <p:sp>
-        <p:nvSpPr>
-          <p:cNvPr id="7" name="Rectangle 6">
-            <a:extLst>
-              <a:ext uri="{FF2B5EF4-FFF2-40B4-BE49-F238E27FC236}">
-                <a16:creationId xmlns:a16="http://schemas.microsoft.com/office/drawing/2014/main" id="{E84E2C69-83A0-2B5C-C2DA-56CA1C2C769A}"/>
+            <a:r>
+              <a:rPr lang="en-GB" sz="2000" dirty="0">
+                <a:solidFill>
+                  <a:schemeClr val="tx1"/>
+                </a:solidFill>
+              </a:rPr>
+              <a:t>Dark grey boxes are </a:t>
+            </a:r>
+            <a:r>
+              <a:rPr lang="en-GB" sz="2000" b="1" dirty="0">
+                <a:solidFill>
+                  <a:schemeClr val="tx1"/>
+                </a:solidFill>
+              </a:rPr>
+              <a:t>headings</a:t>
+            </a:r>
+          </a:p>
+        </p:txBody>
+      </p:sp>
+      <p:sp>
+        <p:nvSpPr>
+          <p:cNvPr id="19" name="Rectangle 18">
+            <a:extLst>
+              <a:ext uri="{FF2B5EF4-FFF2-40B4-BE49-F238E27FC236}">
+                <a16:creationId xmlns:a16="http://schemas.microsoft.com/office/drawing/2014/main" id="{5F6D6C7C-4C0A-2396-F7DF-836CB63FD869}"/>
               </a:ext>
             </a:extLst>
           </p:cNvPr>
@@ -8931,16 +9054,16 @@
         </p:nvSpPr>
         <p:spPr>
           <a:xfrm>
-            <a:off x="23196466" y="2680298"/>
-            <a:ext cx="2436388" cy="1644960"/>
+            <a:off x="7265864" y="4112378"/>
+            <a:ext cx="3233475" cy="1373012"/>
           </a:xfrm>
           <a:prstGeom prst="rect">
             <a:avLst/>
           </a:prstGeom>
           <a:solidFill>
-            <a:schemeClr val="bg1">
-              <a:lumMod val="85000"/>
-            </a:schemeClr>
+            <a:srgbClr val="2596BE">
+              <a:alpha val="30196"/>
+            </a:srgbClr>
           </a:solidFill>
         </p:spPr>
         <p:style>
@@ -8964,20 +9087,31 @@
           <a:lstStyle/>
           <a:p>
             <a:pPr algn="ctr"/>
-            <a:endParaRPr lang="en-GB" sz="2000" dirty="0">
-              <a:solidFill>
-                <a:schemeClr val="tx1"/>
-              </a:solidFill>
-            </a:endParaRPr>
-          </a:p>
-        </p:txBody>
-      </p:sp>
-      <p:sp>
-        <p:nvSpPr>
-          <p:cNvPr id="9" name="Rectangle 8">
-            <a:extLst>
-              <a:ext uri="{FF2B5EF4-FFF2-40B4-BE49-F238E27FC236}">
-                <a16:creationId xmlns:a16="http://schemas.microsoft.com/office/drawing/2014/main" id="{488FD193-364C-B76F-A576-6A01CC4D876D}"/>
+            <a:r>
+              <a:rPr lang="en-GB" sz="2000" b="1" dirty="0">
+                <a:solidFill>
+                  <a:schemeClr val="tx1"/>
+                </a:solidFill>
+              </a:rPr>
+              <a:t>Server: </a:t>
+            </a:r>
+            <a:r>
+              <a:rPr lang="en-GB" sz="2000" dirty="0">
+                <a:solidFill>
+                  <a:schemeClr val="tx1"/>
+                </a:solidFill>
+              </a:rPr>
+              <a:t>different options for connecting to a server</a:t>
+            </a:r>
+          </a:p>
+        </p:txBody>
+      </p:sp>
+      <p:sp>
+        <p:nvSpPr>
+          <p:cNvPr id="24" name="Rectangle 23">
+            <a:extLst>
+              <a:ext uri="{FF2B5EF4-FFF2-40B4-BE49-F238E27FC236}">
+                <a16:creationId xmlns:a16="http://schemas.microsoft.com/office/drawing/2014/main" id="{172B55A1-694D-BB7C-6665-B121EEA950AF}"/>
               </a:ext>
             </a:extLst>
           </p:cNvPr>
@@ -8986,16 +9120,16 @@
         </p:nvSpPr>
         <p:spPr>
           <a:xfrm>
-            <a:off x="1549872" y="747346"/>
-            <a:ext cx="1489937" cy="1188720"/>
+            <a:off x="11620907" y="7854844"/>
+            <a:ext cx="3227959" cy="1259320"/>
           </a:xfrm>
           <a:prstGeom prst="rect">
             <a:avLst/>
           </a:prstGeom>
           <a:solidFill>
-            <a:schemeClr val="bg1">
-              <a:lumMod val="85000"/>
-            </a:schemeClr>
+            <a:srgbClr val="2596BE">
+              <a:alpha val="30196"/>
+            </a:srgbClr>
           </a:solidFill>
         </p:spPr>
         <p:style>
@@ -9020,30 +9154,35 @@
           <a:p>
             <a:pPr algn="ctr"/>
             <a:r>
+              <a:rPr lang="en-GB" sz="2000" b="1" dirty="0">
+                <a:solidFill>
+                  <a:schemeClr val="tx1"/>
+                </a:solidFill>
+              </a:rPr>
+              <a:t>Disconnect:</a:t>
+            </a:r>
+            <a:r>
               <a:rPr lang="en-GB" sz="2000" dirty="0">
                 <a:solidFill>
                   <a:schemeClr val="tx1"/>
                 </a:solidFill>
               </a:rPr>
-              <a:t>Dark grey boxes are </a:t>
-            </a:r>
-            <a:r>
-              <a:rPr lang="en-GB" sz="2000" b="1" dirty="0">
-                <a:solidFill>
-                  <a:schemeClr val="tx1"/>
-                </a:solidFill>
-              </a:rPr>
-              <a:t>headings</a:t>
-            </a:r>
-          </a:p>
-        </p:txBody>
-      </p:sp>
-      <p:sp>
-        <p:nvSpPr>
-          <p:cNvPr id="10" name="Rectangle 9">
-            <a:extLst>
-              <a:ext uri="{FF2B5EF4-FFF2-40B4-BE49-F238E27FC236}">
-                <a16:creationId xmlns:a16="http://schemas.microsoft.com/office/drawing/2014/main" id="{272927D8-E09A-64A9-A3E1-DDA99FC54C8C}"/>
+              <a:t> if we are connected to a server, disconnect from it.</a:t>
+            </a:r>
+            <a:endParaRPr lang="en-GB" sz="2000" b="1" dirty="0">
+              <a:solidFill>
+                <a:schemeClr val="tx1"/>
+              </a:solidFill>
+            </a:endParaRPr>
+          </a:p>
+        </p:txBody>
+      </p:sp>
+      <p:sp>
+        <p:nvSpPr>
+          <p:cNvPr id="25" name="Rectangle 24">
+            <a:extLst>
+              <a:ext uri="{FF2B5EF4-FFF2-40B4-BE49-F238E27FC236}">
+                <a16:creationId xmlns:a16="http://schemas.microsoft.com/office/drawing/2014/main" id="{86D00E3F-561A-E0ED-F5FF-37A7FDDDD942}"/>
               </a:ext>
             </a:extLst>
           </p:cNvPr>
@@ -9052,16 +9191,16 @@
         </p:nvSpPr>
         <p:spPr>
           <a:xfrm>
-            <a:off x="23348866" y="2832698"/>
-            <a:ext cx="2436388" cy="1644960"/>
+            <a:off x="11620908" y="2656201"/>
+            <a:ext cx="4637956" cy="2441419"/>
           </a:xfrm>
           <a:prstGeom prst="rect">
             <a:avLst/>
           </a:prstGeom>
           <a:solidFill>
-            <a:schemeClr val="bg1">
-              <a:lumMod val="85000"/>
-            </a:schemeClr>
+            <a:srgbClr val="2596BE">
+              <a:alpha val="30196"/>
+            </a:srgbClr>
           </a:solidFill>
         </p:spPr>
         <p:style>
@@ -9085,20 +9224,31 @@
           <a:lstStyle/>
           <a:p>
             <a:pPr algn="ctr"/>
-            <a:endParaRPr lang="en-GB" sz="2000" dirty="0">
-              <a:solidFill>
-                <a:schemeClr val="tx1"/>
-              </a:solidFill>
-            </a:endParaRPr>
-          </a:p>
-        </p:txBody>
-      </p:sp>
-      <p:sp>
-        <p:nvSpPr>
-          <p:cNvPr id="11" name="Rectangle 10">
-            <a:extLst>
-              <a:ext uri="{FF2B5EF4-FFF2-40B4-BE49-F238E27FC236}">
-                <a16:creationId xmlns:a16="http://schemas.microsoft.com/office/drawing/2014/main" id="{72F9AC22-B3D0-400C-C41C-251C4935DF71}"/>
+            <a:r>
+              <a:rPr lang="en-GB" sz="2000" b="1" dirty="0">
+                <a:solidFill>
+                  <a:schemeClr val="tx1"/>
+                </a:solidFill>
+              </a:rPr>
+              <a:t>Direct Connect</a:t>
+            </a:r>
+            <a:r>
+              <a:rPr lang="en-GB" sz="2000" dirty="0">
+                <a:solidFill>
+                  <a:schemeClr val="tx1"/>
+                </a:solidFill>
+              </a:rPr>
+              <a:t>: toggles a menu that allows you to change the IP address and trajectory/multiplayer ports of the server you wish to connect to. Use this if you are not using the default ports (specified when you create a server) or if you are connecting to an IP of a different machine/cloud server.</a:t>
+            </a:r>
+          </a:p>
+        </p:txBody>
+      </p:sp>
+      <p:sp>
+        <p:nvSpPr>
+          <p:cNvPr id="26" name="Rectangle 25">
+            <a:extLst>
+              <a:ext uri="{FF2B5EF4-FFF2-40B4-BE49-F238E27FC236}">
+                <a16:creationId xmlns:a16="http://schemas.microsoft.com/office/drawing/2014/main" id="{CCCA6C18-4808-6C21-A408-320E0F3E159B}"/>
               </a:ext>
             </a:extLst>
           </p:cNvPr>
@@ -9107,16 +9257,16 @@
         </p:nvSpPr>
         <p:spPr>
           <a:xfrm>
-            <a:off x="23501266" y="2985098"/>
-            <a:ext cx="2436388" cy="1644960"/>
+            <a:off x="11626423" y="322675"/>
+            <a:ext cx="4578242" cy="1577139"/>
           </a:xfrm>
           <a:prstGeom prst="rect">
             <a:avLst/>
           </a:prstGeom>
           <a:solidFill>
-            <a:schemeClr val="bg1">
-              <a:lumMod val="85000"/>
-            </a:schemeClr>
+            <a:srgbClr val="2596BE">
+              <a:alpha val="30196"/>
+            </a:srgbClr>
           </a:solidFill>
         </p:spPr>
         <p:style>
@@ -9140,20 +9290,121 @@
           <a:lstStyle/>
           <a:p>
             <a:pPr algn="ctr"/>
-            <a:endParaRPr lang="en-GB" sz="2000" dirty="0">
-              <a:solidFill>
-                <a:schemeClr val="tx1"/>
-              </a:solidFill>
-            </a:endParaRPr>
-          </a:p>
-        </p:txBody>
-      </p:sp>
-      <p:sp>
-        <p:nvSpPr>
-          <p:cNvPr id="12" name="Rectangle 11">
-            <a:extLst>
-              <a:ext uri="{FF2B5EF4-FFF2-40B4-BE49-F238E27FC236}">
-                <a16:creationId xmlns:a16="http://schemas.microsoft.com/office/drawing/2014/main" id="{4B7B1D94-EC90-E19D-9B17-9F38F6661FAD}"/>
+            <a:r>
+              <a:rPr lang="en-GB" sz="2000" b="1" dirty="0" err="1">
+                <a:solidFill>
+                  <a:schemeClr val="tx1"/>
+                </a:solidFill>
+              </a:rPr>
+              <a:t>Autoconnect</a:t>
+            </a:r>
+            <a:r>
+              <a:rPr lang="en-GB" sz="2000" dirty="0">
+                <a:solidFill>
+                  <a:schemeClr val="tx1"/>
+                </a:solidFill>
+              </a:rPr>
+              <a:t>: connects to the first server found on the network (uses the default parameters). Do not use this if there are multiple servers running on your network.</a:t>
+            </a:r>
+          </a:p>
+        </p:txBody>
+      </p:sp>
+      <p:pic>
+        <p:nvPicPr>
+          <p:cNvPr id="28" name="Picture 27">
+            <a:extLst>
+              <a:ext uri="{FF2B5EF4-FFF2-40B4-BE49-F238E27FC236}">
+                <a16:creationId xmlns:a16="http://schemas.microsoft.com/office/drawing/2014/main" id="{883E1A98-ABC3-47D2-BC09-0EE2F3747C93}"/>
+              </a:ext>
+            </a:extLst>
+          </p:cNvPr>
+          <p:cNvPicPr>
+            <a:picLocks noChangeAspect="1"/>
+          </p:cNvPicPr>
+          <p:nvPr/>
+        </p:nvPicPr>
+        <p:blipFill>
+          <a:blip r:embed="rId3"/>
+          <a:stretch>
+            <a:fillRect/>
+          </a:stretch>
+        </p:blipFill>
+        <p:spPr>
+          <a:xfrm>
+            <a:off x="16421475" y="2656201"/>
+            <a:ext cx="2654380" cy="2949310"/>
+          </a:xfrm>
+          <a:prstGeom prst="rect">
+            <a:avLst/>
+          </a:prstGeom>
+        </p:spPr>
+      </p:pic>
+      <p:pic>
+        <p:nvPicPr>
+          <p:cNvPr id="30" name="Picture 29">
+            <a:extLst>
+              <a:ext uri="{FF2B5EF4-FFF2-40B4-BE49-F238E27FC236}">
+                <a16:creationId xmlns:a16="http://schemas.microsoft.com/office/drawing/2014/main" id="{80766357-3B97-AF21-B22A-54AEE5C5D93F}"/>
+              </a:ext>
+            </a:extLst>
+          </p:cNvPr>
+          <p:cNvPicPr>
+            <a:picLocks noChangeAspect="1"/>
+          </p:cNvPicPr>
+          <p:nvPr/>
+        </p:nvPicPr>
+        <p:blipFill>
+          <a:blip r:embed="rId4"/>
+          <a:stretch>
+            <a:fillRect/>
+          </a:stretch>
+        </p:blipFill>
+        <p:spPr>
+          <a:xfrm>
+            <a:off x="15058441" y="6396574"/>
+            <a:ext cx="2887176" cy="1235443"/>
+          </a:xfrm>
+          <a:prstGeom prst="rect">
+            <a:avLst/>
+          </a:prstGeom>
+        </p:spPr>
+      </p:pic>
+      <p:pic>
+        <p:nvPicPr>
+          <p:cNvPr id="32" name="Picture 31">
+            <a:extLst>
+              <a:ext uri="{FF2B5EF4-FFF2-40B4-BE49-F238E27FC236}">
+                <a16:creationId xmlns:a16="http://schemas.microsoft.com/office/drawing/2014/main" id="{76B58336-0005-B29A-D9C1-4CCCF13BDD65}"/>
+              </a:ext>
+            </a:extLst>
+          </p:cNvPr>
+          <p:cNvPicPr>
+            <a:picLocks noChangeAspect="1"/>
+          </p:cNvPicPr>
+          <p:nvPr/>
+        </p:nvPicPr>
+        <p:blipFill>
+          <a:blip r:embed="rId5"/>
+          <a:stretch>
+            <a:fillRect/>
+          </a:stretch>
+        </p:blipFill>
+        <p:spPr>
+          <a:xfrm>
+            <a:off x="18387092" y="6396574"/>
+            <a:ext cx="2860319" cy="1826307"/>
+          </a:xfrm>
+          <a:prstGeom prst="rect">
+            <a:avLst/>
+          </a:prstGeom>
+        </p:spPr>
+      </p:pic>
+      <p:sp>
+        <p:nvSpPr>
+          <p:cNvPr id="33" name="Rectangle 32">
+            <a:extLst>
+              <a:ext uri="{FF2B5EF4-FFF2-40B4-BE49-F238E27FC236}">
+                <a16:creationId xmlns:a16="http://schemas.microsoft.com/office/drawing/2014/main" id="{F6376597-504F-D315-56EB-7DAB12073E45}"/>
               </a:ext>
             </a:extLst>
           </p:cNvPr>
@@ -9162,16 +9413,16 @@
         </p:nvSpPr>
         <p:spPr>
           <a:xfrm>
-            <a:off x="23653666" y="3137498"/>
-            <a:ext cx="2436388" cy="1644960"/>
+            <a:off x="11620907" y="6331974"/>
+            <a:ext cx="3227959" cy="1235443"/>
           </a:xfrm>
           <a:prstGeom prst="rect">
             <a:avLst/>
           </a:prstGeom>
           <a:solidFill>
-            <a:schemeClr val="bg1">
-              <a:lumMod val="85000"/>
-            </a:schemeClr>
+            <a:srgbClr val="2596BE">
+              <a:alpha val="30196"/>
+            </a:srgbClr>
           </a:solidFill>
         </p:spPr>
         <p:style>
@@ -9195,20 +9446,31 @@
           <a:lstStyle/>
           <a:p>
             <a:pPr algn="ctr"/>
-            <a:endParaRPr lang="en-GB" sz="2000" dirty="0">
-              <a:solidFill>
-                <a:schemeClr val="tx1"/>
-              </a:solidFill>
-            </a:endParaRPr>
-          </a:p>
-        </p:txBody>
-      </p:sp>
-      <p:sp>
-        <p:nvSpPr>
-          <p:cNvPr id="13" name="Rectangle 12">
-            <a:extLst>
-              <a:ext uri="{FF2B5EF4-FFF2-40B4-BE49-F238E27FC236}">
-                <a16:creationId xmlns:a16="http://schemas.microsoft.com/office/drawing/2014/main" id="{EE6B7265-0266-9F6D-AB95-EEEEB85CB011}"/>
+            <a:r>
+              <a:rPr lang="en-GB" sz="2000" b="1" dirty="0">
+                <a:solidFill>
+                  <a:schemeClr val="tx1"/>
+                </a:solidFill>
+              </a:rPr>
+              <a:t>Discover Services</a:t>
+            </a:r>
+            <a:r>
+              <a:rPr lang="en-GB" sz="2000" dirty="0">
+                <a:solidFill>
+                  <a:schemeClr val="tx1"/>
+                </a:solidFill>
+              </a:rPr>
+              <a:t>: toggles a menu for searching for servers on the network.</a:t>
+            </a:r>
+          </a:p>
+        </p:txBody>
+      </p:sp>
+      <p:sp>
+        <p:nvSpPr>
+          <p:cNvPr id="35" name="Rectangle 34">
+            <a:extLst>
+              <a:ext uri="{FF2B5EF4-FFF2-40B4-BE49-F238E27FC236}">
+                <a16:creationId xmlns:a16="http://schemas.microsoft.com/office/drawing/2014/main" id="{0397A6E3-6004-1107-CFA4-3DD0A244CBCC}"/>
               </a:ext>
             </a:extLst>
           </p:cNvPr>
@@ -9217,15 +9479,16 @@
         </p:nvSpPr>
         <p:spPr>
           <a:xfrm>
-            <a:off x="23806066" y="3289898"/>
-            <a:ext cx="2436388" cy="1644960"/>
+            <a:off x="15058441" y="7752742"/>
+            <a:ext cx="3227959" cy="907486"/>
           </a:xfrm>
           <a:prstGeom prst="rect">
             <a:avLst/>
           </a:prstGeom>
           <a:solidFill>
-            <a:schemeClr val="bg1">
-              <a:lumMod val="85000"/>
+            <a:schemeClr val="accent2">
+              <a:lumMod val="40000"/>
+              <a:lumOff val="60000"/>
             </a:schemeClr>
           </a:solidFill>
         </p:spPr>
@@ -9250,20 +9513,23 @@
           <a:lstStyle/>
           <a:p>
             <a:pPr algn="ctr"/>
-            <a:endParaRPr lang="en-GB" sz="2000" dirty="0">
-              <a:solidFill>
-                <a:schemeClr val="tx1"/>
-              </a:solidFill>
-            </a:endParaRPr>
-          </a:p>
-        </p:txBody>
-      </p:sp>
-      <p:sp>
-        <p:nvSpPr>
-          <p:cNvPr id="14" name="Rectangle 13">
-            <a:extLst>
-              <a:ext uri="{FF2B5EF4-FFF2-40B4-BE49-F238E27FC236}">
-                <a16:creationId xmlns:a16="http://schemas.microsoft.com/office/drawing/2014/main" id="{D0FD8DF6-25C8-5F43-32EE-2064C0CF7D37}"/>
+            <a:r>
+              <a:rPr lang="en-GB" sz="2000" dirty="0">
+                <a:solidFill>
+                  <a:schemeClr val="tx1"/>
+                </a:solidFill>
+              </a:rPr>
+              <a:t>Click “Search”. If there are servers available, they will appear underneath.</a:t>
+            </a:r>
+          </a:p>
+        </p:txBody>
+      </p:sp>
+      <p:sp>
+        <p:nvSpPr>
+          <p:cNvPr id="37" name="Rectangle 36">
+            <a:extLst>
+              <a:ext uri="{FF2B5EF4-FFF2-40B4-BE49-F238E27FC236}">
+                <a16:creationId xmlns:a16="http://schemas.microsoft.com/office/drawing/2014/main" id="{74F3C1B9-9AF4-244A-FD11-2A291F2B9ED7}"/>
               </a:ext>
             </a:extLst>
           </p:cNvPr>
@@ -9272,16 +9538,16 @@
         </p:nvSpPr>
         <p:spPr>
           <a:xfrm>
-            <a:off x="23958466" y="3442298"/>
-            <a:ext cx="2436388" cy="1644960"/>
+            <a:off x="858968" y="6420057"/>
+            <a:ext cx="3227959" cy="1696046"/>
           </a:xfrm>
           <a:prstGeom prst="rect">
             <a:avLst/>
           </a:prstGeom>
           <a:solidFill>
-            <a:schemeClr val="bg1">
-              <a:lumMod val="85000"/>
-            </a:schemeClr>
+            <a:srgbClr val="2596BE">
+              <a:alpha val="30196"/>
+            </a:srgbClr>
           </a:solidFill>
         </p:spPr>
         <p:style>
@@ -9305,288 +9571,13 @@
           <a:lstStyle/>
           <a:p>
             <a:pPr algn="ctr"/>
-            <a:endParaRPr lang="en-GB" sz="2000" dirty="0">
-              <a:solidFill>
-                <a:schemeClr val="tx1"/>
-              </a:solidFill>
-            </a:endParaRPr>
-          </a:p>
-        </p:txBody>
-      </p:sp>
-      <p:sp>
-        <p:nvSpPr>
-          <p:cNvPr id="15" name="Rectangle 14">
-            <a:extLst>
-              <a:ext uri="{FF2B5EF4-FFF2-40B4-BE49-F238E27FC236}">
-                <a16:creationId xmlns:a16="http://schemas.microsoft.com/office/drawing/2014/main" id="{08256543-4CB1-CE21-0DE7-EE964B3723EA}"/>
-              </a:ext>
-            </a:extLst>
-          </p:cNvPr>
-          <p:cNvSpPr/>
-          <p:nvPr/>
-        </p:nvSpPr>
-        <p:spPr>
-          <a:xfrm>
-            <a:off x="23625997" y="5485597"/>
-            <a:ext cx="2279745" cy="1259320"/>
-          </a:xfrm>
-          <a:prstGeom prst="rect">
-            <a:avLst/>
-          </a:prstGeom>
-          <a:solidFill>
-            <a:srgbClr val="2596BE">
-              <a:alpha val="30196"/>
-            </a:srgbClr>
-          </a:solidFill>
-        </p:spPr>
-        <p:style>
-          <a:lnRef idx="2">
-            <a:schemeClr val="accent1">
-              <a:shade val="15000"/>
-            </a:schemeClr>
-          </a:lnRef>
-          <a:fillRef idx="1">
-            <a:schemeClr val="accent1"/>
-          </a:fillRef>
-          <a:effectRef idx="0">
-            <a:schemeClr val="accent1"/>
-          </a:effectRef>
-          <a:fontRef idx="minor">
-            <a:schemeClr val="lt1"/>
-          </a:fontRef>
-        </p:style>
-        <p:txBody>
-          <a:bodyPr rtlCol="0" anchor="ctr"/>
-          <a:lstStyle/>
-          <a:p>
-            <a:pPr algn="ctr"/>
-            <a:endParaRPr lang="en-GB" sz="2000" dirty="0">
-              <a:solidFill>
-                <a:schemeClr val="tx1"/>
-              </a:solidFill>
-            </a:endParaRPr>
-          </a:p>
-        </p:txBody>
-      </p:sp>
-      <p:sp>
-        <p:nvSpPr>
-          <p:cNvPr id="16" name="Rectangle 15">
-            <a:extLst>
-              <a:ext uri="{FF2B5EF4-FFF2-40B4-BE49-F238E27FC236}">
-                <a16:creationId xmlns:a16="http://schemas.microsoft.com/office/drawing/2014/main" id="{BB874D05-B0E0-860E-9FB0-6D88A7ADC7AC}"/>
-              </a:ext>
-            </a:extLst>
-          </p:cNvPr>
-          <p:cNvSpPr/>
-          <p:nvPr/>
-        </p:nvSpPr>
-        <p:spPr>
-          <a:xfrm>
-            <a:off x="23778397" y="5637997"/>
-            <a:ext cx="2279745" cy="1259320"/>
-          </a:xfrm>
-          <a:prstGeom prst="rect">
-            <a:avLst/>
-          </a:prstGeom>
-          <a:solidFill>
-            <a:srgbClr val="2596BE">
-              <a:alpha val="30196"/>
-            </a:srgbClr>
-          </a:solidFill>
-        </p:spPr>
-        <p:style>
-          <a:lnRef idx="2">
-            <a:schemeClr val="accent1">
-              <a:shade val="15000"/>
-            </a:schemeClr>
-          </a:lnRef>
-          <a:fillRef idx="1">
-            <a:schemeClr val="accent1"/>
-          </a:fillRef>
-          <a:effectRef idx="0">
-            <a:schemeClr val="accent1"/>
-          </a:effectRef>
-          <a:fontRef idx="minor">
-            <a:schemeClr val="lt1"/>
-          </a:fontRef>
-        </p:style>
-        <p:txBody>
-          <a:bodyPr rtlCol="0" anchor="ctr"/>
-          <a:lstStyle/>
-          <a:p>
-            <a:pPr algn="ctr"/>
-            <a:endParaRPr lang="en-GB" sz="2000" dirty="0">
-              <a:solidFill>
-                <a:schemeClr val="tx1"/>
-              </a:solidFill>
-            </a:endParaRPr>
-          </a:p>
-        </p:txBody>
-      </p:sp>
-      <p:sp>
-        <p:nvSpPr>
-          <p:cNvPr id="17" name="Rectangle 16">
-            <a:extLst>
-              <a:ext uri="{FF2B5EF4-FFF2-40B4-BE49-F238E27FC236}">
-                <a16:creationId xmlns:a16="http://schemas.microsoft.com/office/drawing/2014/main" id="{5E7585F8-BEBA-0297-A809-C24BC3EFEC68}"/>
-              </a:ext>
-            </a:extLst>
-          </p:cNvPr>
-          <p:cNvSpPr/>
-          <p:nvPr/>
-        </p:nvSpPr>
-        <p:spPr>
-          <a:xfrm>
-            <a:off x="23930797" y="5790397"/>
-            <a:ext cx="2279745" cy="1259320"/>
-          </a:xfrm>
-          <a:prstGeom prst="rect">
-            <a:avLst/>
-          </a:prstGeom>
-          <a:solidFill>
-            <a:srgbClr val="2596BE">
-              <a:alpha val="30196"/>
-            </a:srgbClr>
-          </a:solidFill>
-        </p:spPr>
-        <p:style>
-          <a:lnRef idx="2">
-            <a:schemeClr val="accent1">
-              <a:shade val="15000"/>
-            </a:schemeClr>
-          </a:lnRef>
-          <a:fillRef idx="1">
-            <a:schemeClr val="accent1"/>
-          </a:fillRef>
-          <a:effectRef idx="0">
-            <a:schemeClr val="accent1"/>
-          </a:effectRef>
-          <a:fontRef idx="minor">
-            <a:schemeClr val="lt1"/>
-          </a:fontRef>
-        </p:style>
-        <p:txBody>
-          <a:bodyPr rtlCol="0" anchor="ctr"/>
-          <a:lstStyle/>
-          <a:p>
-            <a:pPr algn="ctr"/>
-            <a:endParaRPr lang="en-GB" sz="2000" dirty="0">
-              <a:solidFill>
-                <a:schemeClr val="tx1"/>
-              </a:solidFill>
-            </a:endParaRPr>
-          </a:p>
-        </p:txBody>
-      </p:sp>
-      <p:sp>
-        <p:nvSpPr>
-          <p:cNvPr id="18" name="Rectangle 17">
-            <a:extLst>
-              <a:ext uri="{FF2B5EF4-FFF2-40B4-BE49-F238E27FC236}">
-                <a16:creationId xmlns:a16="http://schemas.microsoft.com/office/drawing/2014/main" id="{F8737CFD-76FF-93BD-DF6B-9686F9D59FEE}"/>
-              </a:ext>
-            </a:extLst>
-          </p:cNvPr>
-          <p:cNvSpPr/>
-          <p:nvPr/>
-        </p:nvSpPr>
-        <p:spPr>
-          <a:xfrm>
-            <a:off x="24083197" y="5942797"/>
-            <a:ext cx="2279745" cy="1259320"/>
-          </a:xfrm>
-          <a:prstGeom prst="rect">
-            <a:avLst/>
-          </a:prstGeom>
-          <a:solidFill>
-            <a:srgbClr val="2596BE">
-              <a:alpha val="30196"/>
-            </a:srgbClr>
-          </a:solidFill>
-        </p:spPr>
-        <p:style>
-          <a:lnRef idx="2">
-            <a:schemeClr val="accent1">
-              <a:shade val="15000"/>
-            </a:schemeClr>
-          </a:lnRef>
-          <a:fillRef idx="1">
-            <a:schemeClr val="accent1"/>
-          </a:fillRef>
-          <a:effectRef idx="0">
-            <a:schemeClr val="accent1"/>
-          </a:effectRef>
-          <a:fontRef idx="minor">
-            <a:schemeClr val="lt1"/>
-          </a:fontRef>
-        </p:style>
-        <p:txBody>
-          <a:bodyPr rtlCol="0" anchor="ctr"/>
-          <a:lstStyle/>
-          <a:p>
-            <a:pPr algn="ctr"/>
-            <a:endParaRPr lang="en-GB" sz="2000" dirty="0">
-              <a:solidFill>
-                <a:schemeClr val="tx1"/>
-              </a:solidFill>
-            </a:endParaRPr>
-          </a:p>
-        </p:txBody>
-      </p:sp>
-      <p:sp>
-        <p:nvSpPr>
-          <p:cNvPr id="19" name="Rectangle 18">
-            <a:extLst>
-              <a:ext uri="{FF2B5EF4-FFF2-40B4-BE49-F238E27FC236}">
-                <a16:creationId xmlns:a16="http://schemas.microsoft.com/office/drawing/2014/main" id="{5F6D6C7C-4C0A-2396-F7DF-836CB63FD869}"/>
-              </a:ext>
-            </a:extLst>
-          </p:cNvPr>
-          <p:cNvSpPr/>
-          <p:nvPr/>
-        </p:nvSpPr>
-        <p:spPr>
-          <a:xfrm>
-            <a:off x="7265864" y="4112378"/>
-            <a:ext cx="3233475" cy="1373012"/>
-          </a:xfrm>
-          <a:prstGeom prst="rect">
-            <a:avLst/>
-          </a:prstGeom>
-          <a:solidFill>
-            <a:srgbClr val="2596BE">
-              <a:alpha val="30196"/>
-            </a:srgbClr>
-          </a:solidFill>
-        </p:spPr>
-        <p:style>
-          <a:lnRef idx="2">
-            <a:schemeClr val="accent1">
-              <a:shade val="15000"/>
-            </a:schemeClr>
-          </a:lnRef>
-          <a:fillRef idx="1">
-            <a:schemeClr val="accent1"/>
-          </a:fillRef>
-          <a:effectRef idx="0">
-            <a:schemeClr val="accent1"/>
-          </a:effectRef>
-          <a:fontRef idx="minor">
-            <a:schemeClr val="lt1"/>
-          </a:fontRef>
-        </p:style>
-        <p:txBody>
-          <a:bodyPr rtlCol="0" anchor="ctr"/>
-          <a:lstStyle/>
-          <a:p>
-            <a:pPr algn="ctr"/>
             <a:r>
               <a:rPr lang="en-GB" sz="2000" b="1" dirty="0">
                 <a:solidFill>
                   <a:schemeClr val="tx1"/>
                 </a:solidFill>
               </a:rPr>
-              <a:t>Server: </a:t>
+              <a:t>Simulation: </a:t>
             </a:r>
             <a:r>
               <a:rPr lang="en-GB" sz="2000" dirty="0">
@@ -9594,934 +9585,9 @@
                   <a:schemeClr val="tx1"/>
                 </a:solidFill>
               </a:rPr>
-              <a:t>different options for connecting to a server</a:t>
-            </a:r>
-          </a:p>
-        </p:txBody>
-      </p:sp>
-      <p:sp>
-        <p:nvSpPr>
-          <p:cNvPr id="20" name="Rectangle 19">
-            <a:extLst>
-              <a:ext uri="{FF2B5EF4-FFF2-40B4-BE49-F238E27FC236}">
-                <a16:creationId xmlns:a16="http://schemas.microsoft.com/office/drawing/2014/main" id="{80117929-D4A6-3D34-5660-F6DA5108CD8F}"/>
-              </a:ext>
-            </a:extLst>
-          </p:cNvPr>
-          <p:cNvSpPr/>
-          <p:nvPr/>
-        </p:nvSpPr>
-        <p:spPr>
-          <a:xfrm>
-            <a:off x="24235597" y="6095197"/>
-            <a:ext cx="2279745" cy="1259320"/>
-          </a:xfrm>
-          <a:prstGeom prst="rect">
-            <a:avLst/>
-          </a:prstGeom>
-          <a:solidFill>
-            <a:srgbClr val="2596BE">
-              <a:alpha val="30196"/>
-            </a:srgbClr>
-          </a:solidFill>
-        </p:spPr>
-        <p:style>
-          <a:lnRef idx="2">
-            <a:schemeClr val="accent1">
-              <a:shade val="15000"/>
-            </a:schemeClr>
-          </a:lnRef>
-          <a:fillRef idx="1">
-            <a:schemeClr val="accent1"/>
-          </a:fillRef>
-          <a:effectRef idx="0">
-            <a:schemeClr val="accent1"/>
-          </a:effectRef>
-          <a:fontRef idx="minor">
-            <a:schemeClr val="lt1"/>
-          </a:fontRef>
-        </p:style>
-        <p:txBody>
-          <a:bodyPr rtlCol="0" anchor="ctr"/>
-          <a:lstStyle/>
-          <a:p>
-            <a:pPr algn="ctr"/>
-            <a:endParaRPr lang="en-GB" sz="2000" dirty="0">
-              <a:solidFill>
-                <a:schemeClr val="tx1"/>
-              </a:solidFill>
-            </a:endParaRPr>
-          </a:p>
-        </p:txBody>
-      </p:sp>
-      <p:sp>
-        <p:nvSpPr>
-          <p:cNvPr id="21" name="Rectangle 20">
-            <a:extLst>
-              <a:ext uri="{FF2B5EF4-FFF2-40B4-BE49-F238E27FC236}">
-                <a16:creationId xmlns:a16="http://schemas.microsoft.com/office/drawing/2014/main" id="{55F55DEF-20AD-AAB1-AB29-BC032AA0A40A}"/>
-              </a:ext>
-            </a:extLst>
-          </p:cNvPr>
-          <p:cNvSpPr/>
-          <p:nvPr/>
-        </p:nvSpPr>
-        <p:spPr>
-          <a:xfrm>
-            <a:off x="24387997" y="6247597"/>
-            <a:ext cx="2279745" cy="1259320"/>
-          </a:xfrm>
-          <a:prstGeom prst="rect">
-            <a:avLst/>
-          </a:prstGeom>
-          <a:solidFill>
-            <a:srgbClr val="2596BE">
-              <a:alpha val="30196"/>
-            </a:srgbClr>
-          </a:solidFill>
-        </p:spPr>
-        <p:style>
-          <a:lnRef idx="2">
-            <a:schemeClr val="accent1">
-              <a:shade val="15000"/>
-            </a:schemeClr>
-          </a:lnRef>
-          <a:fillRef idx="1">
-            <a:schemeClr val="accent1"/>
-          </a:fillRef>
-          <a:effectRef idx="0">
-            <a:schemeClr val="accent1"/>
-          </a:effectRef>
-          <a:fontRef idx="minor">
-            <a:schemeClr val="lt1"/>
-          </a:fontRef>
-        </p:style>
-        <p:txBody>
-          <a:bodyPr rtlCol="0" anchor="ctr"/>
-          <a:lstStyle/>
-          <a:p>
-            <a:pPr algn="ctr"/>
-            <a:endParaRPr lang="en-GB" sz="2000" dirty="0">
-              <a:solidFill>
-                <a:schemeClr val="tx1"/>
-              </a:solidFill>
-            </a:endParaRPr>
-          </a:p>
-        </p:txBody>
-      </p:sp>
-      <p:sp>
-        <p:nvSpPr>
-          <p:cNvPr id="22" name="Rectangle 21">
-            <a:extLst>
-              <a:ext uri="{FF2B5EF4-FFF2-40B4-BE49-F238E27FC236}">
-                <a16:creationId xmlns:a16="http://schemas.microsoft.com/office/drawing/2014/main" id="{B92CF2EF-7863-7831-B4CB-A0BAF2922083}"/>
-              </a:ext>
-            </a:extLst>
-          </p:cNvPr>
-          <p:cNvSpPr/>
-          <p:nvPr/>
-        </p:nvSpPr>
-        <p:spPr>
-          <a:xfrm>
-            <a:off x="24540397" y="6399997"/>
-            <a:ext cx="2279745" cy="1259320"/>
-          </a:xfrm>
-          <a:prstGeom prst="rect">
-            <a:avLst/>
-          </a:prstGeom>
-          <a:solidFill>
-            <a:srgbClr val="2596BE">
-              <a:alpha val="30196"/>
-            </a:srgbClr>
-          </a:solidFill>
-        </p:spPr>
-        <p:style>
-          <a:lnRef idx="2">
-            <a:schemeClr val="accent1">
-              <a:shade val="15000"/>
-            </a:schemeClr>
-          </a:lnRef>
-          <a:fillRef idx="1">
-            <a:schemeClr val="accent1"/>
-          </a:fillRef>
-          <a:effectRef idx="0">
-            <a:schemeClr val="accent1"/>
-          </a:effectRef>
-          <a:fontRef idx="minor">
-            <a:schemeClr val="lt1"/>
-          </a:fontRef>
-        </p:style>
-        <p:txBody>
-          <a:bodyPr rtlCol="0" anchor="ctr"/>
-          <a:lstStyle/>
-          <a:p>
-            <a:pPr algn="ctr"/>
-            <a:endParaRPr lang="en-GB" sz="2000" dirty="0">
-              <a:solidFill>
-                <a:schemeClr val="tx1"/>
-              </a:solidFill>
-            </a:endParaRPr>
-          </a:p>
-        </p:txBody>
-      </p:sp>
-      <p:sp>
-        <p:nvSpPr>
-          <p:cNvPr id="23" name="Rectangle 22">
-            <a:extLst>
-              <a:ext uri="{FF2B5EF4-FFF2-40B4-BE49-F238E27FC236}">
-                <a16:creationId xmlns:a16="http://schemas.microsoft.com/office/drawing/2014/main" id="{F8B03F6E-6F35-D78B-8BA0-0EE5BB8C5945}"/>
-              </a:ext>
-            </a:extLst>
-          </p:cNvPr>
-          <p:cNvSpPr/>
-          <p:nvPr/>
-        </p:nvSpPr>
-        <p:spPr>
-          <a:xfrm>
-            <a:off x="24692797" y="6552397"/>
-            <a:ext cx="2279745" cy="1259320"/>
-          </a:xfrm>
-          <a:prstGeom prst="rect">
-            <a:avLst/>
-          </a:prstGeom>
-          <a:solidFill>
-            <a:srgbClr val="2596BE">
-              <a:alpha val="30196"/>
-            </a:srgbClr>
-          </a:solidFill>
-        </p:spPr>
-        <p:style>
-          <a:lnRef idx="2">
-            <a:schemeClr val="accent1">
-              <a:shade val="15000"/>
-            </a:schemeClr>
-          </a:lnRef>
-          <a:fillRef idx="1">
-            <a:schemeClr val="accent1"/>
-          </a:fillRef>
-          <a:effectRef idx="0">
-            <a:schemeClr val="accent1"/>
-          </a:effectRef>
-          <a:fontRef idx="minor">
-            <a:schemeClr val="lt1"/>
-          </a:fontRef>
-        </p:style>
-        <p:txBody>
-          <a:bodyPr rtlCol="0" anchor="ctr"/>
-          <a:lstStyle/>
-          <a:p>
-            <a:pPr algn="ctr"/>
-            <a:endParaRPr lang="en-GB" sz="2000" dirty="0">
-              <a:solidFill>
-                <a:schemeClr val="tx1"/>
-              </a:solidFill>
-            </a:endParaRPr>
-          </a:p>
-        </p:txBody>
-      </p:sp>
-      <p:sp>
-        <p:nvSpPr>
-          <p:cNvPr id="24" name="Rectangle 23">
-            <a:extLst>
-              <a:ext uri="{FF2B5EF4-FFF2-40B4-BE49-F238E27FC236}">
-                <a16:creationId xmlns:a16="http://schemas.microsoft.com/office/drawing/2014/main" id="{172B55A1-694D-BB7C-6665-B121EEA950AF}"/>
-              </a:ext>
-            </a:extLst>
-          </p:cNvPr>
-          <p:cNvSpPr/>
-          <p:nvPr/>
-        </p:nvSpPr>
-        <p:spPr>
-          <a:xfrm>
-            <a:off x="11620907" y="7854844"/>
-            <a:ext cx="3227959" cy="1259320"/>
-          </a:xfrm>
-          <a:prstGeom prst="rect">
-            <a:avLst/>
-          </a:prstGeom>
-          <a:solidFill>
-            <a:srgbClr val="2596BE">
-              <a:alpha val="30196"/>
-            </a:srgbClr>
-          </a:solidFill>
-        </p:spPr>
-        <p:style>
-          <a:lnRef idx="2">
-            <a:schemeClr val="accent1">
-              <a:shade val="15000"/>
-            </a:schemeClr>
-          </a:lnRef>
-          <a:fillRef idx="1">
-            <a:schemeClr val="accent1"/>
-          </a:fillRef>
-          <a:effectRef idx="0">
-            <a:schemeClr val="accent1"/>
-          </a:effectRef>
-          <a:fontRef idx="minor">
-            <a:schemeClr val="lt1"/>
-          </a:fontRef>
-        </p:style>
-        <p:txBody>
-          <a:bodyPr rtlCol="0" anchor="ctr"/>
-          <a:lstStyle/>
-          <a:p>
-            <a:pPr algn="ctr"/>
-            <a:r>
-              <a:rPr lang="en-GB" sz="2000" b="1" dirty="0">
-                <a:solidFill>
-                  <a:schemeClr val="tx1"/>
-                </a:solidFill>
-              </a:rPr>
-              <a:t>Disconnect:</a:t>
-            </a:r>
-            <a:r>
-              <a:rPr lang="en-GB" sz="2000" dirty="0">
-                <a:solidFill>
-                  <a:schemeClr val="tx1"/>
-                </a:solidFill>
-              </a:rPr>
-              <a:t> if we are connected to a server, disconnect from it.</a:t>
+              <a:t>commands relating to the simulation or simulation box.</a:t>
             </a:r>
             <a:endParaRPr lang="en-GB" sz="2000" b="1" dirty="0">
-              <a:solidFill>
-                <a:schemeClr val="tx1"/>
-              </a:solidFill>
-            </a:endParaRPr>
-          </a:p>
-        </p:txBody>
-      </p:sp>
-      <p:sp>
-        <p:nvSpPr>
-          <p:cNvPr id="25" name="Rectangle 24">
-            <a:extLst>
-              <a:ext uri="{FF2B5EF4-FFF2-40B4-BE49-F238E27FC236}">
-                <a16:creationId xmlns:a16="http://schemas.microsoft.com/office/drawing/2014/main" id="{86D00E3F-561A-E0ED-F5FF-37A7FDDDD942}"/>
-              </a:ext>
-            </a:extLst>
-          </p:cNvPr>
-          <p:cNvSpPr/>
-          <p:nvPr/>
-        </p:nvSpPr>
-        <p:spPr>
-          <a:xfrm>
-            <a:off x="11620908" y="2656201"/>
-            <a:ext cx="4637956" cy="2441419"/>
-          </a:xfrm>
-          <a:prstGeom prst="rect">
-            <a:avLst/>
-          </a:prstGeom>
-          <a:solidFill>
-            <a:srgbClr val="2596BE">
-              <a:alpha val="30196"/>
-            </a:srgbClr>
-          </a:solidFill>
-        </p:spPr>
-        <p:style>
-          <a:lnRef idx="2">
-            <a:schemeClr val="accent1">
-              <a:shade val="15000"/>
-            </a:schemeClr>
-          </a:lnRef>
-          <a:fillRef idx="1">
-            <a:schemeClr val="accent1"/>
-          </a:fillRef>
-          <a:effectRef idx="0">
-            <a:schemeClr val="accent1"/>
-          </a:effectRef>
-          <a:fontRef idx="minor">
-            <a:schemeClr val="lt1"/>
-          </a:fontRef>
-        </p:style>
-        <p:txBody>
-          <a:bodyPr rtlCol="0" anchor="ctr"/>
-          <a:lstStyle/>
-          <a:p>
-            <a:pPr algn="ctr"/>
-            <a:r>
-              <a:rPr lang="en-GB" sz="2000" b="1" dirty="0">
-                <a:solidFill>
-                  <a:schemeClr val="tx1"/>
-                </a:solidFill>
-              </a:rPr>
-              <a:t>Direct Connect</a:t>
-            </a:r>
-            <a:r>
-              <a:rPr lang="en-GB" sz="2000" dirty="0">
-                <a:solidFill>
-                  <a:schemeClr val="tx1"/>
-                </a:solidFill>
-              </a:rPr>
-              <a:t>: toggles a menu that allows you to change the IP address and trajectory/multiplayer ports of the server you wish to connect to. Use this if you are not using the default ports (specified when you create a server) or if you are connecting to an IP of a different machine/cloud server.</a:t>
-            </a:r>
-          </a:p>
-        </p:txBody>
-      </p:sp>
-      <p:sp>
-        <p:nvSpPr>
-          <p:cNvPr id="26" name="Rectangle 25">
-            <a:extLst>
-              <a:ext uri="{FF2B5EF4-FFF2-40B4-BE49-F238E27FC236}">
-                <a16:creationId xmlns:a16="http://schemas.microsoft.com/office/drawing/2014/main" id="{CCCA6C18-4808-6C21-A408-320E0F3E159B}"/>
-              </a:ext>
-            </a:extLst>
-          </p:cNvPr>
-          <p:cNvSpPr/>
-          <p:nvPr/>
-        </p:nvSpPr>
-        <p:spPr>
-          <a:xfrm>
-            <a:off x="11626423" y="322675"/>
-            <a:ext cx="4578242" cy="1577139"/>
-          </a:xfrm>
-          <a:prstGeom prst="rect">
-            <a:avLst/>
-          </a:prstGeom>
-          <a:solidFill>
-            <a:srgbClr val="2596BE">
-              <a:alpha val="30196"/>
-            </a:srgbClr>
-          </a:solidFill>
-        </p:spPr>
-        <p:style>
-          <a:lnRef idx="2">
-            <a:schemeClr val="accent1">
-              <a:shade val="15000"/>
-            </a:schemeClr>
-          </a:lnRef>
-          <a:fillRef idx="1">
-            <a:schemeClr val="accent1"/>
-          </a:fillRef>
-          <a:effectRef idx="0">
-            <a:schemeClr val="accent1"/>
-          </a:effectRef>
-          <a:fontRef idx="minor">
-            <a:schemeClr val="lt1"/>
-          </a:fontRef>
-        </p:style>
-        <p:txBody>
-          <a:bodyPr rtlCol="0" anchor="ctr"/>
-          <a:lstStyle/>
-          <a:p>
-            <a:pPr algn="ctr"/>
-            <a:r>
-              <a:rPr lang="en-GB" sz="2000" b="1" dirty="0" err="1">
-                <a:solidFill>
-                  <a:schemeClr val="tx1"/>
-                </a:solidFill>
-              </a:rPr>
-              <a:t>Autoconnect</a:t>
-            </a:r>
-            <a:r>
-              <a:rPr lang="en-GB" sz="2000" dirty="0">
-                <a:solidFill>
-                  <a:schemeClr val="tx1"/>
-                </a:solidFill>
-              </a:rPr>
-              <a:t>: connects to the first server found on the network (uses the default parameters). Do not use this if there are multiple servers running on your network.</a:t>
-            </a:r>
-          </a:p>
-        </p:txBody>
-      </p:sp>
-      <p:pic>
-        <p:nvPicPr>
-          <p:cNvPr id="28" name="Picture 27">
-            <a:extLst>
-              <a:ext uri="{FF2B5EF4-FFF2-40B4-BE49-F238E27FC236}">
-                <a16:creationId xmlns:a16="http://schemas.microsoft.com/office/drawing/2014/main" id="{883E1A98-ABC3-47D2-BC09-0EE2F3747C93}"/>
-              </a:ext>
-            </a:extLst>
-          </p:cNvPr>
-          <p:cNvPicPr>
-            <a:picLocks noChangeAspect="1"/>
-          </p:cNvPicPr>
-          <p:nvPr/>
-        </p:nvPicPr>
-        <p:blipFill>
-          <a:blip r:embed="rId3"/>
-          <a:stretch>
-            <a:fillRect/>
-          </a:stretch>
-        </p:blipFill>
-        <p:spPr>
-          <a:xfrm>
-            <a:off x="16421475" y="2656201"/>
-            <a:ext cx="2654380" cy="2949310"/>
-          </a:xfrm>
-          <a:prstGeom prst="rect">
-            <a:avLst/>
-          </a:prstGeom>
-        </p:spPr>
-      </p:pic>
-      <p:pic>
-        <p:nvPicPr>
-          <p:cNvPr id="30" name="Picture 29">
-            <a:extLst>
-              <a:ext uri="{FF2B5EF4-FFF2-40B4-BE49-F238E27FC236}">
-                <a16:creationId xmlns:a16="http://schemas.microsoft.com/office/drawing/2014/main" id="{80766357-3B97-AF21-B22A-54AEE5C5D93F}"/>
-              </a:ext>
-            </a:extLst>
-          </p:cNvPr>
-          <p:cNvPicPr>
-            <a:picLocks noChangeAspect="1"/>
-          </p:cNvPicPr>
-          <p:nvPr/>
-        </p:nvPicPr>
-        <p:blipFill>
-          <a:blip r:embed="rId4"/>
-          <a:stretch>
-            <a:fillRect/>
-          </a:stretch>
-        </p:blipFill>
-        <p:spPr>
-          <a:xfrm>
-            <a:off x="15058441" y="6396574"/>
-            <a:ext cx="2887176" cy="1235443"/>
-          </a:xfrm>
-          <a:prstGeom prst="rect">
-            <a:avLst/>
-          </a:prstGeom>
-        </p:spPr>
-      </p:pic>
-      <p:pic>
-        <p:nvPicPr>
-          <p:cNvPr id="32" name="Picture 31">
-            <a:extLst>
-              <a:ext uri="{FF2B5EF4-FFF2-40B4-BE49-F238E27FC236}">
-                <a16:creationId xmlns:a16="http://schemas.microsoft.com/office/drawing/2014/main" id="{76B58336-0005-B29A-D9C1-4CCCF13BDD65}"/>
-              </a:ext>
-            </a:extLst>
-          </p:cNvPr>
-          <p:cNvPicPr>
-            <a:picLocks noChangeAspect="1"/>
-          </p:cNvPicPr>
-          <p:nvPr/>
-        </p:nvPicPr>
-        <p:blipFill>
-          <a:blip r:embed="rId5"/>
-          <a:stretch>
-            <a:fillRect/>
-          </a:stretch>
-        </p:blipFill>
-        <p:spPr>
-          <a:xfrm>
-            <a:off x="18387092" y="6396574"/>
-            <a:ext cx="2860319" cy="1826307"/>
-          </a:xfrm>
-          <a:prstGeom prst="rect">
-            <a:avLst/>
-          </a:prstGeom>
-        </p:spPr>
-      </p:pic>
-      <p:sp>
-        <p:nvSpPr>
-          <p:cNvPr id="33" name="Rectangle 32">
-            <a:extLst>
-              <a:ext uri="{FF2B5EF4-FFF2-40B4-BE49-F238E27FC236}">
-                <a16:creationId xmlns:a16="http://schemas.microsoft.com/office/drawing/2014/main" id="{F6376597-504F-D315-56EB-7DAB12073E45}"/>
-              </a:ext>
-            </a:extLst>
-          </p:cNvPr>
-          <p:cNvSpPr/>
-          <p:nvPr/>
-        </p:nvSpPr>
-        <p:spPr>
-          <a:xfrm>
-            <a:off x="11620907" y="6331974"/>
-            <a:ext cx="3227959" cy="1235443"/>
-          </a:xfrm>
-          <a:prstGeom prst="rect">
-            <a:avLst/>
-          </a:prstGeom>
-          <a:solidFill>
-            <a:srgbClr val="2596BE">
-              <a:alpha val="30196"/>
-            </a:srgbClr>
-          </a:solidFill>
-        </p:spPr>
-        <p:style>
-          <a:lnRef idx="2">
-            <a:schemeClr val="accent1">
-              <a:shade val="15000"/>
-            </a:schemeClr>
-          </a:lnRef>
-          <a:fillRef idx="1">
-            <a:schemeClr val="accent1"/>
-          </a:fillRef>
-          <a:effectRef idx="0">
-            <a:schemeClr val="accent1"/>
-          </a:effectRef>
-          <a:fontRef idx="minor">
-            <a:schemeClr val="lt1"/>
-          </a:fontRef>
-        </p:style>
-        <p:txBody>
-          <a:bodyPr rtlCol="0" anchor="ctr"/>
-          <a:lstStyle/>
-          <a:p>
-            <a:pPr algn="ctr"/>
-            <a:r>
-              <a:rPr lang="en-GB" sz="2000" b="1" dirty="0">
-                <a:solidFill>
-                  <a:schemeClr val="tx1"/>
-                </a:solidFill>
-              </a:rPr>
-              <a:t>Discover Services</a:t>
-            </a:r>
-            <a:r>
-              <a:rPr lang="en-GB" sz="2000" dirty="0">
-                <a:solidFill>
-                  <a:schemeClr val="tx1"/>
-                </a:solidFill>
-              </a:rPr>
-              <a:t>: toggles a menu for searching for servers on the network.</a:t>
-            </a:r>
-          </a:p>
-        </p:txBody>
-      </p:sp>
-      <p:sp>
-        <p:nvSpPr>
-          <p:cNvPr id="35" name="Rectangle 34">
-            <a:extLst>
-              <a:ext uri="{FF2B5EF4-FFF2-40B4-BE49-F238E27FC236}">
-                <a16:creationId xmlns:a16="http://schemas.microsoft.com/office/drawing/2014/main" id="{0397A6E3-6004-1107-CFA4-3DD0A244CBCC}"/>
-              </a:ext>
-            </a:extLst>
-          </p:cNvPr>
-          <p:cNvSpPr/>
-          <p:nvPr/>
-        </p:nvSpPr>
-        <p:spPr>
-          <a:xfrm>
-            <a:off x="15058441" y="7752742"/>
-            <a:ext cx="3227959" cy="907486"/>
-          </a:xfrm>
-          <a:prstGeom prst="rect">
-            <a:avLst/>
-          </a:prstGeom>
-          <a:solidFill>
-            <a:schemeClr val="accent2">
-              <a:lumMod val="40000"/>
-              <a:lumOff val="60000"/>
-            </a:schemeClr>
-          </a:solidFill>
-        </p:spPr>
-        <p:style>
-          <a:lnRef idx="2">
-            <a:schemeClr val="accent1">
-              <a:shade val="15000"/>
-            </a:schemeClr>
-          </a:lnRef>
-          <a:fillRef idx="1">
-            <a:schemeClr val="accent1"/>
-          </a:fillRef>
-          <a:effectRef idx="0">
-            <a:schemeClr val="accent1"/>
-          </a:effectRef>
-          <a:fontRef idx="minor">
-            <a:schemeClr val="lt1"/>
-          </a:fontRef>
-        </p:style>
-        <p:txBody>
-          <a:bodyPr rtlCol="0" anchor="ctr"/>
-          <a:lstStyle/>
-          <a:p>
-            <a:pPr algn="ctr"/>
-            <a:r>
-              <a:rPr lang="en-GB" sz="2000" dirty="0">
-                <a:solidFill>
-                  <a:schemeClr val="tx1"/>
-                </a:solidFill>
-              </a:rPr>
-              <a:t>Click “Search”. If there are servers available, they will appear underneath.</a:t>
-            </a:r>
-          </a:p>
-        </p:txBody>
-      </p:sp>
-      <p:sp>
-        <p:nvSpPr>
-          <p:cNvPr id="36" name="Rectangle 35">
-            <a:extLst>
-              <a:ext uri="{FF2B5EF4-FFF2-40B4-BE49-F238E27FC236}">
-                <a16:creationId xmlns:a16="http://schemas.microsoft.com/office/drawing/2014/main" id="{052C7F83-0C2F-5979-5556-BD55491AF710}"/>
-              </a:ext>
-            </a:extLst>
-          </p:cNvPr>
-          <p:cNvSpPr/>
-          <p:nvPr/>
-        </p:nvSpPr>
-        <p:spPr>
-          <a:xfrm>
-            <a:off x="23130873" y="8711176"/>
-            <a:ext cx="2654381" cy="1437287"/>
-          </a:xfrm>
-          <a:prstGeom prst="rect">
-            <a:avLst/>
-          </a:prstGeom>
-          <a:solidFill>
-            <a:schemeClr val="accent2">
-              <a:lumMod val="40000"/>
-              <a:lumOff val="60000"/>
-            </a:schemeClr>
-          </a:solidFill>
-        </p:spPr>
-        <p:style>
-          <a:lnRef idx="2">
-            <a:schemeClr val="accent1">
-              <a:shade val="15000"/>
-            </a:schemeClr>
-          </a:lnRef>
-          <a:fillRef idx="1">
-            <a:schemeClr val="accent1"/>
-          </a:fillRef>
-          <a:effectRef idx="0">
-            <a:schemeClr val="accent1"/>
-          </a:effectRef>
-          <a:fontRef idx="minor">
-            <a:schemeClr val="lt1"/>
-          </a:fontRef>
-        </p:style>
-        <p:txBody>
-          <a:bodyPr rtlCol="0" anchor="ctr"/>
-          <a:lstStyle/>
-          <a:p>
-            <a:pPr algn="ctr"/>
-            <a:endParaRPr lang="en-GB" sz="2000" dirty="0">
-              <a:solidFill>
-                <a:schemeClr val="tx1"/>
-              </a:solidFill>
-            </a:endParaRPr>
-          </a:p>
-        </p:txBody>
-      </p:sp>
-      <p:sp>
-        <p:nvSpPr>
-          <p:cNvPr id="37" name="Rectangle 36">
-            <a:extLst>
-              <a:ext uri="{FF2B5EF4-FFF2-40B4-BE49-F238E27FC236}">
-                <a16:creationId xmlns:a16="http://schemas.microsoft.com/office/drawing/2014/main" id="{74F3C1B9-9AF4-244A-FD11-2A291F2B9ED7}"/>
-              </a:ext>
-            </a:extLst>
-          </p:cNvPr>
-          <p:cNvSpPr/>
-          <p:nvPr/>
-        </p:nvSpPr>
-        <p:spPr>
-          <a:xfrm>
-            <a:off x="858968" y="6420057"/>
-            <a:ext cx="3227959" cy="1696046"/>
-          </a:xfrm>
-          <a:prstGeom prst="rect">
-            <a:avLst/>
-          </a:prstGeom>
-          <a:solidFill>
-            <a:srgbClr val="2596BE">
-              <a:alpha val="30196"/>
-            </a:srgbClr>
-          </a:solidFill>
-        </p:spPr>
-        <p:style>
-          <a:lnRef idx="2">
-            <a:schemeClr val="accent1">
-              <a:shade val="15000"/>
-            </a:schemeClr>
-          </a:lnRef>
-          <a:fillRef idx="1">
-            <a:schemeClr val="accent1"/>
-          </a:fillRef>
-          <a:effectRef idx="0">
-            <a:schemeClr val="accent1"/>
-          </a:effectRef>
-          <a:fontRef idx="minor">
-            <a:schemeClr val="lt1"/>
-          </a:fontRef>
-        </p:style>
-        <p:txBody>
-          <a:bodyPr rtlCol="0" anchor="ctr"/>
-          <a:lstStyle/>
-          <a:p>
-            <a:pPr algn="ctr"/>
-            <a:r>
-              <a:rPr lang="en-GB" sz="2000" b="1" dirty="0">
-                <a:solidFill>
-                  <a:schemeClr val="tx1"/>
-                </a:solidFill>
-              </a:rPr>
-              <a:t>Simulation: </a:t>
-            </a:r>
-            <a:r>
-              <a:rPr lang="en-GB" sz="2000" dirty="0">
-                <a:solidFill>
-                  <a:schemeClr val="tx1"/>
-                </a:solidFill>
-              </a:rPr>
-              <a:t>commands relating to the simulation or simulation box.</a:t>
-            </a:r>
-            <a:endParaRPr lang="en-GB" sz="2000" b="1" dirty="0">
-              <a:solidFill>
-                <a:schemeClr val="tx1"/>
-              </a:solidFill>
-            </a:endParaRPr>
-          </a:p>
-        </p:txBody>
-      </p:sp>
-      <p:sp>
-        <p:nvSpPr>
-          <p:cNvPr id="39" name="Rectangle 38">
-            <a:extLst>
-              <a:ext uri="{FF2B5EF4-FFF2-40B4-BE49-F238E27FC236}">
-                <a16:creationId xmlns:a16="http://schemas.microsoft.com/office/drawing/2014/main" id="{D7CA18CF-27F3-B728-483D-0DCAF0F1EBC3}"/>
-              </a:ext>
-            </a:extLst>
-          </p:cNvPr>
-          <p:cNvSpPr/>
-          <p:nvPr/>
-        </p:nvSpPr>
-        <p:spPr>
-          <a:xfrm>
-            <a:off x="21714556" y="10909705"/>
-            <a:ext cx="2700104" cy="1661459"/>
-          </a:xfrm>
-          <a:prstGeom prst="rect">
-            <a:avLst/>
-          </a:prstGeom>
-          <a:solidFill>
-            <a:schemeClr val="accent5">
-              <a:lumMod val="50000"/>
-              <a:alpha val="30196"/>
-            </a:schemeClr>
-          </a:solidFill>
-        </p:spPr>
-        <p:style>
-          <a:lnRef idx="2">
-            <a:schemeClr val="accent1">
-              <a:shade val="15000"/>
-            </a:schemeClr>
-          </a:lnRef>
-          <a:fillRef idx="1">
-            <a:schemeClr val="accent1"/>
-          </a:fillRef>
-          <a:effectRef idx="0">
-            <a:schemeClr val="accent1"/>
-          </a:effectRef>
-          <a:fontRef idx="minor">
-            <a:schemeClr val="lt1"/>
-          </a:fontRef>
-        </p:style>
-        <p:txBody>
-          <a:bodyPr rtlCol="0" anchor="ctr"/>
-          <a:lstStyle/>
-          <a:p>
-            <a:endParaRPr lang="en-GB" sz="2000" dirty="0">
-              <a:solidFill>
-                <a:schemeClr val="tx1"/>
-              </a:solidFill>
-            </a:endParaRPr>
-          </a:p>
-        </p:txBody>
-      </p:sp>
-      <p:sp>
-        <p:nvSpPr>
-          <p:cNvPr id="40" name="Rectangle 39">
-            <a:extLst>
-              <a:ext uri="{FF2B5EF4-FFF2-40B4-BE49-F238E27FC236}">
-                <a16:creationId xmlns:a16="http://schemas.microsoft.com/office/drawing/2014/main" id="{94180434-932E-8F6F-C486-7C91200BA114}"/>
-              </a:ext>
-            </a:extLst>
-          </p:cNvPr>
-          <p:cNvSpPr/>
-          <p:nvPr/>
-        </p:nvSpPr>
-        <p:spPr>
-          <a:xfrm>
-            <a:off x="21866956" y="11062105"/>
-            <a:ext cx="2700104" cy="1661459"/>
-          </a:xfrm>
-          <a:prstGeom prst="rect">
-            <a:avLst/>
-          </a:prstGeom>
-          <a:solidFill>
-            <a:schemeClr val="accent5">
-              <a:lumMod val="50000"/>
-              <a:alpha val="30196"/>
-            </a:schemeClr>
-          </a:solidFill>
-        </p:spPr>
-        <p:style>
-          <a:lnRef idx="2">
-            <a:schemeClr val="accent1">
-              <a:shade val="15000"/>
-            </a:schemeClr>
-          </a:lnRef>
-          <a:fillRef idx="1">
-            <a:schemeClr val="accent1"/>
-          </a:fillRef>
-          <a:effectRef idx="0">
-            <a:schemeClr val="accent1"/>
-          </a:effectRef>
-          <a:fontRef idx="minor">
-            <a:schemeClr val="lt1"/>
-          </a:fontRef>
-        </p:style>
-        <p:txBody>
-          <a:bodyPr rtlCol="0" anchor="ctr"/>
-          <a:lstStyle/>
-          <a:p>
-            <a:endParaRPr lang="en-GB" sz="2000" dirty="0">
-              <a:solidFill>
-                <a:schemeClr val="tx1"/>
-              </a:solidFill>
-            </a:endParaRPr>
-          </a:p>
-        </p:txBody>
-      </p:sp>
-      <p:sp>
-        <p:nvSpPr>
-          <p:cNvPr id="41" name="Rectangle 40">
-            <a:extLst>
-              <a:ext uri="{FF2B5EF4-FFF2-40B4-BE49-F238E27FC236}">
-                <a16:creationId xmlns:a16="http://schemas.microsoft.com/office/drawing/2014/main" id="{77B2A6A4-A8EE-9506-A49C-610AAF5D7832}"/>
-              </a:ext>
-            </a:extLst>
-          </p:cNvPr>
-          <p:cNvSpPr/>
-          <p:nvPr/>
-        </p:nvSpPr>
-        <p:spPr>
-          <a:xfrm>
-            <a:off x="22019356" y="11214505"/>
-            <a:ext cx="2700104" cy="1661459"/>
-          </a:xfrm>
-          <a:prstGeom prst="rect">
-            <a:avLst/>
-          </a:prstGeom>
-          <a:solidFill>
-            <a:schemeClr val="accent5">
-              <a:lumMod val="50000"/>
-              <a:alpha val="30196"/>
-            </a:schemeClr>
-          </a:solidFill>
-        </p:spPr>
-        <p:style>
-          <a:lnRef idx="2">
-            <a:schemeClr val="accent1">
-              <a:shade val="15000"/>
-            </a:schemeClr>
-          </a:lnRef>
-          <a:fillRef idx="1">
-            <a:schemeClr val="accent1"/>
-          </a:fillRef>
-          <a:effectRef idx="0">
-            <a:schemeClr val="accent1"/>
-          </a:effectRef>
-          <a:fontRef idx="minor">
-            <a:schemeClr val="lt1"/>
-          </a:fontRef>
-        </p:style>
-        <p:txBody>
-          <a:bodyPr rtlCol="0" anchor="ctr"/>
-          <a:lstStyle/>
-          <a:p>
-            <a:endParaRPr lang="en-GB" sz="2000" dirty="0">
               <a:solidFill>
                 <a:schemeClr val="tx1"/>
               </a:solidFill>
@@ -10691,48 +9757,6 @@
       </p:cxnSp>
       <p:cxnSp>
         <p:nvCxnSpPr>
-          <p:cNvPr id="50" name="Straight Arrow Connector 49">
-            <a:extLst>
-              <a:ext uri="{FF2B5EF4-FFF2-40B4-BE49-F238E27FC236}">
-                <a16:creationId xmlns:a16="http://schemas.microsoft.com/office/drawing/2014/main" id="{628EC9C4-2EF7-1F6D-2A9B-942679A3F1A3}"/>
-              </a:ext>
-            </a:extLst>
-          </p:cNvPr>
-          <p:cNvCxnSpPr>
-            <a:cxnSpLocks/>
-          </p:cNvCxnSpPr>
-          <p:nvPr/>
-        </p:nvCxnSpPr>
-        <p:spPr>
-          <a:xfrm flipV="1">
-            <a:off x="16204665" y="11740434"/>
-            <a:ext cx="917198" cy="1835104"/>
-          </a:xfrm>
-          <a:prstGeom prst="straightConnector1">
-            <a:avLst/>
-          </a:prstGeom>
-          <a:ln w="19050">
-            <a:headEnd type="none" w="med" len="med"/>
-            <a:tailEnd type="arrow" w="med" len="med"/>
-          </a:ln>
-        </p:spPr>
-        <p:style>
-          <a:lnRef idx="2">
-            <a:schemeClr val="dk1"/>
-          </a:lnRef>
-          <a:fillRef idx="0">
-            <a:schemeClr val="dk1"/>
-          </a:fillRef>
-          <a:effectRef idx="1">
-            <a:schemeClr val="dk1"/>
-          </a:effectRef>
-          <a:fontRef idx="minor">
-            <a:schemeClr val="tx1"/>
-          </a:fontRef>
-        </p:style>
-      </p:cxnSp>
-      <p:cxnSp>
-        <p:nvCxnSpPr>
           <p:cNvPr id="51" name="Straight Arrow Connector 50">
             <a:extLst>
               <a:ext uri="{FF2B5EF4-FFF2-40B4-BE49-F238E27FC236}">
@@ -10821,216 +9845,6 @@
       </p:cxnSp>
       <p:cxnSp>
         <p:nvCxnSpPr>
-          <p:cNvPr id="71" name="Straight Arrow Connector 70">
-            <a:extLst>
-              <a:ext uri="{FF2B5EF4-FFF2-40B4-BE49-F238E27FC236}">
-                <a16:creationId xmlns:a16="http://schemas.microsoft.com/office/drawing/2014/main" id="{B2395FF4-4C07-F9D7-5A5D-6A3DDD00CE33}"/>
-              </a:ext>
-            </a:extLst>
-          </p:cNvPr>
-          <p:cNvCxnSpPr>
-            <a:cxnSpLocks/>
-          </p:cNvCxnSpPr>
-          <p:nvPr/>
-        </p:nvCxnSpPr>
-        <p:spPr>
-          <a:xfrm flipV="1">
-            <a:off x="26971160" y="11274518"/>
-            <a:ext cx="1127084" cy="3687639"/>
-          </a:xfrm>
-          <a:prstGeom prst="straightConnector1">
-            <a:avLst/>
-          </a:prstGeom>
-          <a:ln w="19050">
-            <a:headEnd type="none" w="med" len="med"/>
-            <a:tailEnd type="arrow" w="med" len="med"/>
-          </a:ln>
-        </p:spPr>
-        <p:style>
-          <a:lnRef idx="2">
-            <a:schemeClr val="dk1"/>
-          </a:lnRef>
-          <a:fillRef idx="0">
-            <a:schemeClr val="dk1"/>
-          </a:fillRef>
-          <a:effectRef idx="1">
-            <a:schemeClr val="dk1"/>
-          </a:effectRef>
-          <a:fontRef idx="minor">
-            <a:schemeClr val="tx1"/>
-          </a:fontRef>
-        </p:style>
-      </p:cxnSp>
-      <p:cxnSp>
-        <p:nvCxnSpPr>
-          <p:cNvPr id="72" name="Straight Arrow Connector 71">
-            <a:extLst>
-              <a:ext uri="{FF2B5EF4-FFF2-40B4-BE49-F238E27FC236}">
-                <a16:creationId xmlns:a16="http://schemas.microsoft.com/office/drawing/2014/main" id="{49F8ABA7-EEB3-AC1F-A146-C5FD67C1D64C}"/>
-              </a:ext>
-            </a:extLst>
-          </p:cNvPr>
-          <p:cNvCxnSpPr>
-            <a:cxnSpLocks/>
-          </p:cNvCxnSpPr>
-          <p:nvPr/>
-        </p:nvCxnSpPr>
-        <p:spPr>
-          <a:xfrm flipV="1">
-            <a:off x="27123560" y="11426918"/>
-            <a:ext cx="1127084" cy="3687639"/>
-          </a:xfrm>
-          <a:prstGeom prst="straightConnector1">
-            <a:avLst/>
-          </a:prstGeom>
-          <a:ln w="19050">
-            <a:headEnd type="none" w="med" len="med"/>
-            <a:tailEnd type="arrow" w="med" len="med"/>
-          </a:ln>
-        </p:spPr>
-        <p:style>
-          <a:lnRef idx="2">
-            <a:schemeClr val="dk1"/>
-          </a:lnRef>
-          <a:fillRef idx="0">
-            <a:schemeClr val="dk1"/>
-          </a:fillRef>
-          <a:effectRef idx="1">
-            <a:schemeClr val="dk1"/>
-          </a:effectRef>
-          <a:fontRef idx="minor">
-            <a:schemeClr val="tx1"/>
-          </a:fontRef>
-        </p:style>
-      </p:cxnSp>
-      <p:cxnSp>
-        <p:nvCxnSpPr>
-          <p:cNvPr id="73" name="Straight Arrow Connector 72">
-            <a:extLst>
-              <a:ext uri="{FF2B5EF4-FFF2-40B4-BE49-F238E27FC236}">
-                <a16:creationId xmlns:a16="http://schemas.microsoft.com/office/drawing/2014/main" id="{730ECFF9-17E1-9676-909B-72EB33CDB34F}"/>
-              </a:ext>
-            </a:extLst>
-          </p:cNvPr>
-          <p:cNvCxnSpPr>
-            <a:cxnSpLocks/>
-          </p:cNvCxnSpPr>
-          <p:nvPr/>
-        </p:nvCxnSpPr>
-        <p:spPr>
-          <a:xfrm flipV="1">
-            <a:off x="27275960" y="11579318"/>
-            <a:ext cx="1127084" cy="3687639"/>
-          </a:xfrm>
-          <a:prstGeom prst="straightConnector1">
-            <a:avLst/>
-          </a:prstGeom>
-          <a:ln w="19050">
-            <a:headEnd type="none" w="med" len="med"/>
-            <a:tailEnd type="arrow" w="med" len="med"/>
-          </a:ln>
-        </p:spPr>
-        <p:style>
-          <a:lnRef idx="2">
-            <a:schemeClr val="dk1"/>
-          </a:lnRef>
-          <a:fillRef idx="0">
-            <a:schemeClr val="dk1"/>
-          </a:fillRef>
-          <a:effectRef idx="1">
-            <a:schemeClr val="dk1"/>
-          </a:effectRef>
-          <a:fontRef idx="minor">
-            <a:schemeClr val="tx1"/>
-          </a:fontRef>
-        </p:style>
-      </p:cxnSp>
-      <p:cxnSp>
-        <p:nvCxnSpPr>
-          <p:cNvPr id="74" name="Straight Arrow Connector 73">
-            <a:extLst>
-              <a:ext uri="{FF2B5EF4-FFF2-40B4-BE49-F238E27FC236}">
-                <a16:creationId xmlns:a16="http://schemas.microsoft.com/office/drawing/2014/main" id="{93E4ADD4-3A8D-A610-30BC-E6CF8956E03E}"/>
-              </a:ext>
-            </a:extLst>
-          </p:cNvPr>
-          <p:cNvCxnSpPr>
-            <a:cxnSpLocks/>
-          </p:cNvCxnSpPr>
-          <p:nvPr/>
-        </p:nvCxnSpPr>
-        <p:spPr>
-          <a:xfrm flipV="1">
-            <a:off x="27428360" y="11731718"/>
-            <a:ext cx="1127084" cy="3687639"/>
-          </a:xfrm>
-          <a:prstGeom prst="straightConnector1">
-            <a:avLst/>
-          </a:prstGeom>
-          <a:ln w="19050">
-            <a:headEnd type="none" w="med" len="med"/>
-            <a:tailEnd type="arrow" w="med" len="med"/>
-          </a:ln>
-        </p:spPr>
-        <p:style>
-          <a:lnRef idx="2">
-            <a:schemeClr val="dk1"/>
-          </a:lnRef>
-          <a:fillRef idx="0">
-            <a:schemeClr val="dk1"/>
-          </a:fillRef>
-          <a:effectRef idx="1">
-            <a:schemeClr val="dk1"/>
-          </a:effectRef>
-          <a:fontRef idx="minor">
-            <a:schemeClr val="tx1"/>
-          </a:fontRef>
-        </p:style>
-      </p:cxnSp>
-      <p:cxnSp>
-        <p:nvCxnSpPr>
-          <p:cNvPr id="75" name="Straight Arrow Connector 74">
-            <a:extLst>
-              <a:ext uri="{FF2B5EF4-FFF2-40B4-BE49-F238E27FC236}">
-                <a16:creationId xmlns:a16="http://schemas.microsoft.com/office/drawing/2014/main" id="{49406745-520E-D0E2-6F86-87C4E811A97F}"/>
-              </a:ext>
-            </a:extLst>
-          </p:cNvPr>
-          <p:cNvCxnSpPr>
-            <a:cxnSpLocks/>
-          </p:cNvCxnSpPr>
-          <p:nvPr/>
-        </p:nvCxnSpPr>
-        <p:spPr>
-          <a:xfrm flipV="1">
-            <a:off x="27580760" y="11884118"/>
-            <a:ext cx="1127084" cy="3687639"/>
-          </a:xfrm>
-          <a:prstGeom prst="straightConnector1">
-            <a:avLst/>
-          </a:prstGeom>
-          <a:ln w="19050">
-            <a:headEnd type="none" w="med" len="med"/>
-            <a:tailEnd type="arrow" w="med" len="med"/>
-          </a:ln>
-        </p:spPr>
-        <p:style>
-          <a:lnRef idx="2">
-            <a:schemeClr val="dk1"/>
-          </a:lnRef>
-          <a:fillRef idx="0">
-            <a:schemeClr val="dk1"/>
-          </a:fillRef>
-          <a:effectRef idx="1">
-            <a:schemeClr val="dk1"/>
-          </a:effectRef>
-          <a:fontRef idx="minor">
-            <a:schemeClr val="tx1"/>
-          </a:fontRef>
-        </p:style>
-      </p:cxnSp>
-      <p:cxnSp>
-        <p:nvCxnSpPr>
           <p:cNvPr id="76" name="Straight Arrow Connector 75">
             <a:extLst>
               <a:ext uri="{FF2B5EF4-FFF2-40B4-BE49-F238E27FC236}">
@@ -11289,6 +10103,41 @@
           </a:prstGeom>
         </p:spPr>
       </p:pic>
+      <p:sp>
+        <p:nvSpPr>
+          <p:cNvPr id="31" name="TextBox 30">
+            <a:extLst>
+              <a:ext uri="{FF2B5EF4-FFF2-40B4-BE49-F238E27FC236}">
+                <a16:creationId xmlns:a16="http://schemas.microsoft.com/office/drawing/2014/main" id="{B62C052F-3ACF-B4AC-366D-B04FD1D77381}"/>
+              </a:ext>
+            </a:extLst>
+          </p:cNvPr>
+          <p:cNvSpPr txBox="1"/>
+          <p:nvPr/>
+        </p:nvSpPr>
+        <p:spPr>
+          <a:xfrm>
+            <a:off x="3041958" y="551152"/>
+            <a:ext cx="7020173" cy="1446550"/>
+          </a:xfrm>
+          <a:prstGeom prst="rect">
+            <a:avLst/>
+          </a:prstGeom>
+          <a:noFill/>
+        </p:spPr>
+        <p:txBody>
+          <a:bodyPr wrap="square" rtlCol="0">
+            <a:spAutoFit/>
+          </a:bodyPr>
+          <a:lstStyle/>
+          <a:p>
+            <a:r>
+              <a:rPr lang="en-GB" sz="4400" dirty="0"/>
+              <a:t>Ideas &amp; notes for documenting the VR UI</a:t>
+            </a:r>
+          </a:p>
+        </p:txBody>
+      </p:sp>
     </p:spTree>
     <p:extLst>
       <p:ext uri="{BB962C8B-B14F-4D97-AF65-F5344CB8AC3E}">

</xml_diff>

<commit_message>
updated flowchart and fixed warning
</commit_message>
<xml_diff>
--- a/source/assets/flow-chart.pptx
+++ b/source/assets/flow-chart.pptx
@@ -556,7 +556,7 @@
           <a:p>
             <a:fld id="{E198B52E-59E9-459A-8A51-6D063C146C47}" type="datetimeFigureOut">
               <a:rPr lang="en-GB" smtClean="0"/>
-              <a:t>27/01/2025</a:t>
+              <a:t>06/03/2025</a:t>
             </a:fld>
             <a:endParaRPr lang="en-GB"/>
           </a:p>
@@ -1147,7 +1147,7 @@
           <a:p>
             <a:fld id="{3FBAF93D-98AC-4FE3-B4B6-00701F2D46F7}" type="datetimeFigureOut">
               <a:rPr lang="en-GB" smtClean="0"/>
-              <a:t>27/01/2025</a:t>
+              <a:t>06/03/2025</a:t>
             </a:fld>
             <a:endParaRPr lang="en-GB"/>
           </a:p>
@@ -1317,7 +1317,7 @@
           <a:p>
             <a:fld id="{3FBAF93D-98AC-4FE3-B4B6-00701F2D46F7}" type="datetimeFigureOut">
               <a:rPr lang="en-GB" smtClean="0"/>
-              <a:t>27/01/2025</a:t>
+              <a:t>06/03/2025</a:t>
             </a:fld>
             <a:endParaRPr lang="en-GB"/>
           </a:p>
@@ -1497,7 +1497,7 @@
           <a:p>
             <a:fld id="{3FBAF93D-98AC-4FE3-B4B6-00701F2D46F7}" type="datetimeFigureOut">
               <a:rPr lang="en-GB" smtClean="0"/>
-              <a:t>27/01/2025</a:t>
+              <a:t>06/03/2025</a:t>
             </a:fld>
             <a:endParaRPr lang="en-GB"/>
           </a:p>
@@ -1667,7 +1667,7 @@
           <a:p>
             <a:fld id="{3FBAF93D-98AC-4FE3-B4B6-00701F2D46F7}" type="datetimeFigureOut">
               <a:rPr lang="en-GB" smtClean="0"/>
-              <a:t>27/01/2025</a:t>
+              <a:t>06/03/2025</a:t>
             </a:fld>
             <a:endParaRPr lang="en-GB"/>
           </a:p>
@@ -1913,7 +1913,7 @@
           <a:p>
             <a:fld id="{3FBAF93D-98AC-4FE3-B4B6-00701F2D46F7}" type="datetimeFigureOut">
               <a:rPr lang="en-GB" smtClean="0"/>
-              <a:t>27/01/2025</a:t>
+              <a:t>06/03/2025</a:t>
             </a:fld>
             <a:endParaRPr lang="en-GB"/>
           </a:p>
@@ -2145,7 +2145,7 @@
           <a:p>
             <a:fld id="{3FBAF93D-98AC-4FE3-B4B6-00701F2D46F7}" type="datetimeFigureOut">
               <a:rPr lang="en-GB" smtClean="0"/>
-              <a:t>27/01/2025</a:t>
+              <a:t>06/03/2025</a:t>
             </a:fld>
             <a:endParaRPr lang="en-GB"/>
           </a:p>
@@ -2512,7 +2512,7 @@
           <a:p>
             <a:fld id="{3FBAF93D-98AC-4FE3-B4B6-00701F2D46F7}" type="datetimeFigureOut">
               <a:rPr lang="en-GB" smtClean="0"/>
-              <a:t>27/01/2025</a:t>
+              <a:t>06/03/2025</a:t>
             </a:fld>
             <a:endParaRPr lang="en-GB"/>
           </a:p>
@@ -2630,7 +2630,7 @@
           <a:p>
             <a:fld id="{3FBAF93D-98AC-4FE3-B4B6-00701F2D46F7}" type="datetimeFigureOut">
               <a:rPr lang="en-GB" smtClean="0"/>
-              <a:t>27/01/2025</a:t>
+              <a:t>06/03/2025</a:t>
             </a:fld>
             <a:endParaRPr lang="en-GB"/>
           </a:p>
@@ -2725,7 +2725,7 @@
           <a:p>
             <a:fld id="{3FBAF93D-98AC-4FE3-B4B6-00701F2D46F7}" type="datetimeFigureOut">
               <a:rPr lang="en-GB" smtClean="0"/>
-              <a:t>27/01/2025</a:t>
+              <a:t>06/03/2025</a:t>
             </a:fld>
             <a:endParaRPr lang="en-GB"/>
           </a:p>
@@ -3002,7 +3002,7 @@
           <a:p>
             <a:fld id="{3FBAF93D-98AC-4FE3-B4B6-00701F2D46F7}" type="datetimeFigureOut">
               <a:rPr lang="en-GB" smtClean="0"/>
-              <a:t>27/01/2025</a:t>
+              <a:t>06/03/2025</a:t>
             </a:fld>
             <a:endParaRPr lang="en-GB"/>
           </a:p>
@@ -3259,7 +3259,7 @@
           <a:p>
             <a:fld id="{3FBAF93D-98AC-4FE3-B4B6-00701F2D46F7}" type="datetimeFigureOut">
               <a:rPr lang="en-GB" smtClean="0"/>
-              <a:t>27/01/2025</a:t>
+              <a:t>06/03/2025</a:t>
             </a:fld>
             <a:endParaRPr lang="en-GB"/>
           </a:p>
@@ -3472,7 +3472,7 @@
           <a:p>
             <a:fld id="{3FBAF93D-98AC-4FE3-B4B6-00701F2D46F7}" type="datetimeFigureOut">
               <a:rPr lang="en-GB" smtClean="0"/>
-              <a:t>27/01/2025</a:t>
+              <a:t>06/03/2025</a:t>
             </a:fld>
             <a:endParaRPr lang="en-GB"/>
           </a:p>
@@ -4085,8 +4085,8 @@
         </p:nvCxnSpPr>
         <p:spPr>
           <a:xfrm flipV="1">
-            <a:off x="5420207" y="6872992"/>
-            <a:ext cx="2632768" cy="5455"/>
+            <a:off x="5420207" y="6878446"/>
+            <a:ext cx="2515783" cy="1"/>
           </a:xfrm>
           <a:prstGeom prst="straightConnector1">
             <a:avLst/>
@@ -5261,8 +5261,8 @@
         </p:nvSpPr>
         <p:spPr>
           <a:xfrm>
-            <a:off x="8052975" y="6050512"/>
-            <a:ext cx="2436388" cy="1644960"/>
+            <a:off x="7935990" y="5670226"/>
+            <a:ext cx="3185514" cy="2416439"/>
           </a:xfrm>
           <a:prstGeom prst="rect">
             <a:avLst/>
@@ -5300,7 +5300,7 @@
                   <a:schemeClr val="tx1"/>
                 </a:solidFill>
               </a:rPr>
-              <a:t>You will need to use a cable to connect your VR headset to your computer (a </a:t>
+              <a:t>You will need to use either a cable to connect your VR headset to your computer (a </a:t>
             </a:r>
             <a:r>
               <a:rPr lang="en-GB" sz="2000" b="1" dirty="0">
@@ -5316,55 +5316,27 @@
                   <a:schemeClr val="tx1"/>
                 </a:solidFill>
               </a:rPr>
-              <a:t>setup).</a:t>
-            </a:r>
-          </a:p>
-        </p:txBody>
-      </p:sp>
-      <p:cxnSp>
-        <p:nvCxnSpPr>
-          <p:cNvPr id="320" name="Straight Arrow Connector 319">
-            <a:extLst>
-              <a:ext uri="{FF2B5EF4-FFF2-40B4-BE49-F238E27FC236}">
-                <a16:creationId xmlns:a16="http://schemas.microsoft.com/office/drawing/2014/main" id="{B010DB81-FF87-6096-9227-5030260B4C51}"/>
-              </a:ext>
-            </a:extLst>
-          </p:cNvPr>
-          <p:cNvCxnSpPr>
-            <a:cxnSpLocks/>
-            <a:stCxn id="314" idx="2"/>
-            <a:endCxn id="4" idx="0"/>
-          </p:cNvCxnSpPr>
-          <p:nvPr/>
-        </p:nvCxnSpPr>
-        <p:spPr>
-          <a:xfrm flipH="1">
-            <a:off x="9267834" y="7695472"/>
-            <a:ext cx="3335" cy="4108090"/>
-          </a:xfrm>
-          <a:prstGeom prst="straightConnector1">
-            <a:avLst/>
-          </a:prstGeom>
-          <a:ln>
-            <a:headEnd type="none" w="med" len="med"/>
-            <a:tailEnd type="arrow" w="med" len="med"/>
-          </a:ln>
-        </p:spPr>
-        <p:style>
-          <a:lnRef idx="2">
-            <a:schemeClr val="dk1"/>
-          </a:lnRef>
-          <a:fillRef idx="0">
-            <a:schemeClr val="dk1"/>
-          </a:fillRef>
-          <a:effectRef idx="1">
-            <a:schemeClr val="dk1"/>
-          </a:effectRef>
-          <a:fontRef idx="minor">
-            <a:schemeClr val="tx1"/>
-          </a:fontRef>
-        </p:style>
-      </p:cxnSp>
+              <a:t>setup) or use a VPN Service (a </a:t>
+            </a:r>
+            <a:r>
+              <a:rPr lang="en-GB" sz="2000" b="1" dirty="0">
+                <a:solidFill>
+                  <a:schemeClr val="tx1"/>
+                </a:solidFill>
+              </a:rPr>
+              <a:t>wireless</a:t>
+            </a:r>
+            <a:r>
+              <a:rPr lang="en-GB" sz="2000" dirty="0">
+                <a:solidFill>
+                  <a:schemeClr val="tx1"/>
+                </a:solidFill>
+              </a:rPr>
+              <a:t> setup).</a:t>
+            </a:r>
+          </a:p>
+        </p:txBody>
+      </p:sp>
       <p:sp>
         <p:nvSpPr>
           <p:cNvPr id="324" name="Rectangle 323">
@@ -6305,6 +6277,53 @@
           </a:p>
         </p:txBody>
       </p:sp>
+      <p:cxnSp>
+        <p:nvCxnSpPr>
+          <p:cNvPr id="33" name="Connector: Elbow 32">
+            <a:extLst>
+              <a:ext uri="{FF2B5EF4-FFF2-40B4-BE49-F238E27FC236}">
+                <a16:creationId xmlns:a16="http://schemas.microsoft.com/office/drawing/2014/main" id="{C35DE11D-3F5C-8C62-956F-3B38E4156141}"/>
+              </a:ext>
+            </a:extLst>
+          </p:cNvPr>
+          <p:cNvCxnSpPr>
+            <a:cxnSpLocks/>
+            <a:stCxn id="314" idx="3"/>
+            <a:endCxn id="305" idx="1"/>
+          </p:cNvCxnSpPr>
+          <p:nvPr/>
+        </p:nvCxnSpPr>
+        <p:spPr>
+          <a:xfrm flipH="1">
+            <a:off x="2983819" y="6878446"/>
+            <a:ext cx="8137685" cy="5557417"/>
+          </a:xfrm>
+          <a:prstGeom prst="bentConnector5">
+            <a:avLst>
+              <a:gd name="adj1" fmla="val -53669"/>
+              <a:gd name="adj2" fmla="val 165182"/>
+              <a:gd name="adj3" fmla="val 102809"/>
+            </a:avLst>
+          </a:prstGeom>
+          <a:ln>
+            <a:tailEnd type="triangle"/>
+          </a:ln>
+        </p:spPr>
+        <p:style>
+          <a:lnRef idx="2">
+            <a:schemeClr val="dk1"/>
+          </a:lnRef>
+          <a:fillRef idx="0">
+            <a:schemeClr val="dk1"/>
+          </a:fillRef>
+          <a:effectRef idx="1">
+            <a:schemeClr val="dk1"/>
+          </a:effectRef>
+          <a:fontRef idx="minor">
+            <a:schemeClr val="tx1"/>
+          </a:fontRef>
+        </p:style>
+      </p:cxnSp>
     </p:spTree>
     <p:extLst>
       <p:ext uri="{BB962C8B-B14F-4D97-AF65-F5344CB8AC3E}">

</xml_diff>

<commit_message>
Fix typos + formatting, reformat text
Fix typos and formatting. Correct flow diagram and save missing image of flow diagram. Reformat the text to avoid using three admonitions in a row.
</commit_message>
<xml_diff>
--- a/source/assets/flow-chart.pptx
+++ b/source/assets/flow-chart.pptx
@@ -556,7 +556,7 @@
           <a:p>
             <a:fld id="{E198B52E-59E9-459A-8A51-6D063C146C47}" type="datetimeFigureOut">
               <a:rPr lang="en-GB" smtClean="0"/>
-              <a:t>06/03/2025</a:t>
+              <a:t>01/04/2025</a:t>
             </a:fld>
             <a:endParaRPr lang="en-GB"/>
           </a:p>
@@ -1147,7 +1147,7 @@
           <a:p>
             <a:fld id="{3FBAF93D-98AC-4FE3-B4B6-00701F2D46F7}" type="datetimeFigureOut">
               <a:rPr lang="en-GB" smtClean="0"/>
-              <a:t>06/03/2025</a:t>
+              <a:t>01/04/2025</a:t>
             </a:fld>
             <a:endParaRPr lang="en-GB"/>
           </a:p>
@@ -1317,7 +1317,7 @@
           <a:p>
             <a:fld id="{3FBAF93D-98AC-4FE3-B4B6-00701F2D46F7}" type="datetimeFigureOut">
               <a:rPr lang="en-GB" smtClean="0"/>
-              <a:t>06/03/2025</a:t>
+              <a:t>01/04/2025</a:t>
             </a:fld>
             <a:endParaRPr lang="en-GB"/>
           </a:p>
@@ -1497,7 +1497,7 @@
           <a:p>
             <a:fld id="{3FBAF93D-98AC-4FE3-B4B6-00701F2D46F7}" type="datetimeFigureOut">
               <a:rPr lang="en-GB" smtClean="0"/>
-              <a:t>06/03/2025</a:t>
+              <a:t>01/04/2025</a:t>
             </a:fld>
             <a:endParaRPr lang="en-GB"/>
           </a:p>
@@ -1667,7 +1667,7 @@
           <a:p>
             <a:fld id="{3FBAF93D-98AC-4FE3-B4B6-00701F2D46F7}" type="datetimeFigureOut">
               <a:rPr lang="en-GB" smtClean="0"/>
-              <a:t>06/03/2025</a:t>
+              <a:t>01/04/2025</a:t>
             </a:fld>
             <a:endParaRPr lang="en-GB"/>
           </a:p>
@@ -1913,7 +1913,7 @@
           <a:p>
             <a:fld id="{3FBAF93D-98AC-4FE3-B4B6-00701F2D46F7}" type="datetimeFigureOut">
               <a:rPr lang="en-GB" smtClean="0"/>
-              <a:t>06/03/2025</a:t>
+              <a:t>01/04/2025</a:t>
             </a:fld>
             <a:endParaRPr lang="en-GB"/>
           </a:p>
@@ -2145,7 +2145,7 @@
           <a:p>
             <a:fld id="{3FBAF93D-98AC-4FE3-B4B6-00701F2D46F7}" type="datetimeFigureOut">
               <a:rPr lang="en-GB" smtClean="0"/>
-              <a:t>06/03/2025</a:t>
+              <a:t>01/04/2025</a:t>
             </a:fld>
             <a:endParaRPr lang="en-GB"/>
           </a:p>
@@ -2512,7 +2512,7 @@
           <a:p>
             <a:fld id="{3FBAF93D-98AC-4FE3-B4B6-00701F2D46F7}" type="datetimeFigureOut">
               <a:rPr lang="en-GB" smtClean="0"/>
-              <a:t>06/03/2025</a:t>
+              <a:t>01/04/2025</a:t>
             </a:fld>
             <a:endParaRPr lang="en-GB"/>
           </a:p>
@@ -2630,7 +2630,7 @@
           <a:p>
             <a:fld id="{3FBAF93D-98AC-4FE3-B4B6-00701F2D46F7}" type="datetimeFigureOut">
               <a:rPr lang="en-GB" smtClean="0"/>
-              <a:t>06/03/2025</a:t>
+              <a:t>01/04/2025</a:t>
             </a:fld>
             <a:endParaRPr lang="en-GB"/>
           </a:p>
@@ -2725,7 +2725,7 @@
           <a:p>
             <a:fld id="{3FBAF93D-98AC-4FE3-B4B6-00701F2D46F7}" type="datetimeFigureOut">
               <a:rPr lang="en-GB" smtClean="0"/>
-              <a:t>06/03/2025</a:t>
+              <a:t>01/04/2025</a:t>
             </a:fld>
             <a:endParaRPr lang="en-GB"/>
           </a:p>
@@ -3002,7 +3002,7 @@
           <a:p>
             <a:fld id="{3FBAF93D-98AC-4FE3-B4B6-00701F2D46F7}" type="datetimeFigureOut">
               <a:rPr lang="en-GB" smtClean="0"/>
-              <a:t>06/03/2025</a:t>
+              <a:t>01/04/2025</a:t>
             </a:fld>
             <a:endParaRPr lang="en-GB"/>
           </a:p>
@@ -3259,7 +3259,7 @@
           <a:p>
             <a:fld id="{3FBAF93D-98AC-4FE3-B4B6-00701F2D46F7}" type="datetimeFigureOut">
               <a:rPr lang="en-GB" smtClean="0"/>
-              <a:t>06/03/2025</a:t>
+              <a:t>01/04/2025</a:t>
             </a:fld>
             <a:endParaRPr lang="en-GB"/>
           </a:p>
@@ -3472,7 +3472,7 @@
           <a:p>
             <a:fld id="{3FBAF93D-98AC-4FE3-B4B6-00701F2D46F7}" type="datetimeFigureOut">
               <a:rPr lang="en-GB" smtClean="0"/>
-              <a:t>06/03/2025</a:t>
+              <a:t>01/04/2025</a:t>
             </a:fld>
             <a:endParaRPr lang="en-GB"/>
           </a:p>
@@ -4084,9 +4084,9 @@
           <p:nvPr/>
         </p:nvCxnSpPr>
         <p:spPr>
-          <a:xfrm flipV="1">
-            <a:off x="5420207" y="6878446"/>
-            <a:ext cx="2515783" cy="1"/>
+          <a:xfrm>
+            <a:off x="5420207" y="6878447"/>
+            <a:ext cx="2494222" cy="28363"/>
           </a:xfrm>
           <a:prstGeom prst="straightConnector1">
             <a:avLst/>
@@ -5261,8 +5261,8 @@
         </p:nvSpPr>
         <p:spPr>
           <a:xfrm>
-            <a:off x="7935990" y="5670226"/>
-            <a:ext cx="3185514" cy="2416439"/>
+            <a:off x="7914429" y="5681168"/>
+            <a:ext cx="5170409" cy="2451283"/>
           </a:xfrm>
           <a:prstGeom prst="rect">
             <a:avLst/>
@@ -5300,7 +5300,29 @@
                   <a:schemeClr val="tx1"/>
                 </a:solidFill>
               </a:rPr>
-              <a:t>You will need to use either a cable to connect your VR headset to your computer (a </a:t>
+              <a:t>You will need to use either:</a:t>
+            </a:r>
+          </a:p>
+          <a:p>
+            <a:pPr algn="ctr"/>
+            <a:endParaRPr lang="en-GB" sz="500" dirty="0">
+              <a:solidFill>
+                <a:schemeClr val="tx1"/>
+              </a:solidFill>
+            </a:endParaRPr>
+          </a:p>
+          <a:p>
+            <a:pPr marL="342900" indent="-342900">
+              <a:buFont typeface="Arial" panose="020B0604020202020204" pitchFamily="34" charset="0"/>
+              <a:buChar char="•"/>
+            </a:pPr>
+            <a:r>
+              <a:rPr lang="en-GB" sz="2000" dirty="0">
+                <a:solidFill>
+                  <a:schemeClr val="tx1"/>
+                </a:solidFill>
+              </a:rPr>
+              <a:t>a cable connecting your VR headset to your computer (</a:t>
             </a:r>
             <a:r>
               <a:rPr lang="en-GB" sz="2000" b="1" dirty="0">
@@ -5308,7 +5330,7 @@
                   <a:schemeClr val="tx1"/>
                 </a:solidFill>
               </a:rPr>
-              <a:t>tethered </a:t>
+              <a:t>tethered</a:t>
             </a:r>
             <a:r>
               <a:rPr lang="en-GB" sz="2000" dirty="0">
@@ -5316,7 +5338,7 @@
                   <a:schemeClr val="tx1"/>
                 </a:solidFill>
               </a:rPr>
-              <a:t>setup) or use a VPN Service (a </a:t>
+              <a:t> setup), compatible with</a:t>
             </a:r>
             <a:r>
               <a:rPr lang="en-GB" sz="2000" b="1" dirty="0">
@@ -5324,6 +5346,59 @@
                   <a:schemeClr val="tx1"/>
                 </a:solidFill>
               </a:rPr>
+              <a:t> single player </a:t>
+            </a:r>
+            <a:r>
+              <a:rPr lang="en-GB" sz="2000" dirty="0">
+                <a:solidFill>
+                  <a:schemeClr val="tx1"/>
+                </a:solidFill>
+              </a:rPr>
+              <a:t>setups only</a:t>
+            </a:r>
+          </a:p>
+          <a:p>
+            <a:endParaRPr lang="en-GB" sz="500" dirty="0">
+              <a:solidFill>
+                <a:schemeClr val="tx1"/>
+              </a:solidFill>
+            </a:endParaRPr>
+          </a:p>
+          <a:p>
+            <a:pPr marL="342900" indent="-342900">
+              <a:buFont typeface="Arial" panose="020B0604020202020204" pitchFamily="34" charset="0"/>
+              <a:buChar char="•"/>
+            </a:pPr>
+            <a:r>
+              <a:rPr lang="en-GB" sz="2000" dirty="0">
+                <a:solidFill>
+                  <a:schemeClr val="tx1"/>
+                </a:solidFill>
+              </a:rPr>
+              <a:t>A mobile hotspot or VPN service, compatible with </a:t>
+            </a:r>
+            <a:r>
+              <a:rPr lang="en-GB" sz="2000" b="1" dirty="0">
+                <a:solidFill>
+                  <a:schemeClr val="tx1"/>
+                </a:solidFill>
+              </a:rPr>
+              <a:t>tethered</a:t>
+            </a:r>
+            <a:r>
+              <a:rPr lang="en-GB" sz="2000" dirty="0">
+                <a:solidFill>
+                  <a:schemeClr val="tx1"/>
+                </a:solidFill>
+              </a:rPr>
+              <a:t>, </a:t>
+            </a:r>
+            <a:r>
+              <a:rPr lang="en-GB" sz="2000" b="1" dirty="0">
+                <a:solidFill>
+                  <a:schemeClr val="tx1"/>
+                </a:solidFill>
+              </a:rPr>
               <a:t>wireless</a:t>
             </a:r>
             <a:r>
@@ -5332,8 +5407,35 @@
                   <a:schemeClr val="tx1"/>
                 </a:solidFill>
               </a:rPr>
-              <a:t> setup).</a:t>
-            </a:r>
+              <a:t> and </a:t>
+            </a:r>
+            <a:r>
+              <a:rPr lang="en-GB" sz="2000" b="1" dirty="0">
+                <a:solidFill>
+                  <a:schemeClr val="tx1"/>
+                </a:solidFill>
+              </a:rPr>
+              <a:t>multiplayer</a:t>
+            </a:r>
+            <a:r>
+              <a:rPr lang="en-GB" sz="2000" dirty="0">
+                <a:solidFill>
+                  <a:schemeClr val="tx1"/>
+                </a:solidFill>
+              </a:rPr>
+              <a:t> setups</a:t>
+            </a:r>
+          </a:p>
+          <a:p>
+            <a:pPr marL="342900" indent="-342900">
+              <a:buFont typeface="Arial" panose="020B0604020202020204" pitchFamily="34" charset="0"/>
+              <a:buChar char="•"/>
+            </a:pPr>
+            <a:endParaRPr lang="en-GB" sz="500" dirty="0">
+              <a:solidFill>
+                <a:schemeClr val="tx1"/>
+              </a:solidFill>
+            </a:endParaRPr>
           </a:p>
         </p:txBody>
       </p:sp>
@@ -5953,7 +6055,7 @@
         </p:nvGrpSpPr>
         <p:grpSpPr>
           <a:xfrm>
-            <a:off x="11172448" y="7429849"/>
+            <a:off x="11139574" y="8683310"/>
             <a:ext cx="3892696" cy="2242295"/>
             <a:chOff x="2801026" y="13978522"/>
             <a:chExt cx="3892696" cy="2242295"/>
@@ -6288,22 +6390,17 @@
           </p:cNvPr>
           <p:cNvCxnSpPr>
             <a:cxnSpLocks/>
-            <a:stCxn id="314" idx="3"/>
-            <a:endCxn id="305" idx="1"/>
+            <a:stCxn id="314" idx="2"/>
           </p:cNvCxnSpPr>
           <p:nvPr/>
         </p:nvCxnSpPr>
         <p:spPr>
-          <a:xfrm flipH="1">
-            <a:off x="2983819" y="6878446"/>
-            <a:ext cx="8137685" cy="5557417"/>
-          </a:xfrm>
-          <a:prstGeom prst="bentConnector5">
-            <a:avLst>
-              <a:gd name="adj1" fmla="val -53669"/>
-              <a:gd name="adj2" fmla="val 165182"/>
-              <a:gd name="adj3" fmla="val 102809"/>
-            </a:avLst>
+          <a:xfrm rot="5400000">
+            <a:off x="7513518" y="6035807"/>
+            <a:ext cx="889473" cy="5082760"/>
+          </a:xfrm>
+          <a:prstGeom prst="bentConnector2">
+            <a:avLst/>
           </a:prstGeom>
           <a:ln>
             <a:tailEnd type="triangle"/>

</xml_diff>

<commit_message>
Added a note about institutional networks and vpn services (#182)
* Added a note about institutional networks and vpn services

* updated flowchart and fixed warning

* updated flowchart

* fixed flowchart size

* Splitted the vpn solution and technical explanation and moved the details further down.

* Fix typos + formatting, reformat text

Fix typos and formatting. Correct flow diagram and save missing image of flow diagram. Reformat the text to avoid using three admonitions in a row.

* Reword

* clarify that you need to type your IP when using a VPN

Clarify in the docs that you cannot use the autoconnect or discover services features when using a VPN, you must type your IP instead.

---------

Co-authored-by: Rhoslyn Roebuck Williams <rhoslynroebuck@gmail.com>
</commit_message>
<xml_diff>
--- a/source/assets/flow-chart.pptx
+++ b/source/assets/flow-chart.pptx
@@ -556,7 +556,7 @@
           <a:p>
             <a:fld id="{E198B52E-59E9-459A-8A51-6D063C146C47}" type="datetimeFigureOut">
               <a:rPr lang="en-GB" smtClean="0"/>
-              <a:t>27/01/2025</a:t>
+              <a:t>01/04/2025</a:t>
             </a:fld>
             <a:endParaRPr lang="en-GB"/>
           </a:p>
@@ -1147,7 +1147,7 @@
           <a:p>
             <a:fld id="{3FBAF93D-98AC-4FE3-B4B6-00701F2D46F7}" type="datetimeFigureOut">
               <a:rPr lang="en-GB" smtClean="0"/>
-              <a:t>27/01/2025</a:t>
+              <a:t>01/04/2025</a:t>
             </a:fld>
             <a:endParaRPr lang="en-GB"/>
           </a:p>
@@ -1317,7 +1317,7 @@
           <a:p>
             <a:fld id="{3FBAF93D-98AC-4FE3-B4B6-00701F2D46F7}" type="datetimeFigureOut">
               <a:rPr lang="en-GB" smtClean="0"/>
-              <a:t>27/01/2025</a:t>
+              <a:t>01/04/2025</a:t>
             </a:fld>
             <a:endParaRPr lang="en-GB"/>
           </a:p>
@@ -1497,7 +1497,7 @@
           <a:p>
             <a:fld id="{3FBAF93D-98AC-4FE3-B4B6-00701F2D46F7}" type="datetimeFigureOut">
               <a:rPr lang="en-GB" smtClean="0"/>
-              <a:t>27/01/2025</a:t>
+              <a:t>01/04/2025</a:t>
             </a:fld>
             <a:endParaRPr lang="en-GB"/>
           </a:p>
@@ -1667,7 +1667,7 @@
           <a:p>
             <a:fld id="{3FBAF93D-98AC-4FE3-B4B6-00701F2D46F7}" type="datetimeFigureOut">
               <a:rPr lang="en-GB" smtClean="0"/>
-              <a:t>27/01/2025</a:t>
+              <a:t>01/04/2025</a:t>
             </a:fld>
             <a:endParaRPr lang="en-GB"/>
           </a:p>
@@ -1913,7 +1913,7 @@
           <a:p>
             <a:fld id="{3FBAF93D-98AC-4FE3-B4B6-00701F2D46F7}" type="datetimeFigureOut">
               <a:rPr lang="en-GB" smtClean="0"/>
-              <a:t>27/01/2025</a:t>
+              <a:t>01/04/2025</a:t>
             </a:fld>
             <a:endParaRPr lang="en-GB"/>
           </a:p>
@@ -2145,7 +2145,7 @@
           <a:p>
             <a:fld id="{3FBAF93D-98AC-4FE3-B4B6-00701F2D46F7}" type="datetimeFigureOut">
               <a:rPr lang="en-GB" smtClean="0"/>
-              <a:t>27/01/2025</a:t>
+              <a:t>01/04/2025</a:t>
             </a:fld>
             <a:endParaRPr lang="en-GB"/>
           </a:p>
@@ -2512,7 +2512,7 @@
           <a:p>
             <a:fld id="{3FBAF93D-98AC-4FE3-B4B6-00701F2D46F7}" type="datetimeFigureOut">
               <a:rPr lang="en-GB" smtClean="0"/>
-              <a:t>27/01/2025</a:t>
+              <a:t>01/04/2025</a:t>
             </a:fld>
             <a:endParaRPr lang="en-GB"/>
           </a:p>
@@ -2630,7 +2630,7 @@
           <a:p>
             <a:fld id="{3FBAF93D-98AC-4FE3-B4B6-00701F2D46F7}" type="datetimeFigureOut">
               <a:rPr lang="en-GB" smtClean="0"/>
-              <a:t>27/01/2025</a:t>
+              <a:t>01/04/2025</a:t>
             </a:fld>
             <a:endParaRPr lang="en-GB"/>
           </a:p>
@@ -2725,7 +2725,7 @@
           <a:p>
             <a:fld id="{3FBAF93D-98AC-4FE3-B4B6-00701F2D46F7}" type="datetimeFigureOut">
               <a:rPr lang="en-GB" smtClean="0"/>
-              <a:t>27/01/2025</a:t>
+              <a:t>01/04/2025</a:t>
             </a:fld>
             <a:endParaRPr lang="en-GB"/>
           </a:p>
@@ -3002,7 +3002,7 @@
           <a:p>
             <a:fld id="{3FBAF93D-98AC-4FE3-B4B6-00701F2D46F7}" type="datetimeFigureOut">
               <a:rPr lang="en-GB" smtClean="0"/>
-              <a:t>27/01/2025</a:t>
+              <a:t>01/04/2025</a:t>
             </a:fld>
             <a:endParaRPr lang="en-GB"/>
           </a:p>
@@ -3259,7 +3259,7 @@
           <a:p>
             <a:fld id="{3FBAF93D-98AC-4FE3-B4B6-00701F2D46F7}" type="datetimeFigureOut">
               <a:rPr lang="en-GB" smtClean="0"/>
-              <a:t>27/01/2025</a:t>
+              <a:t>01/04/2025</a:t>
             </a:fld>
             <a:endParaRPr lang="en-GB"/>
           </a:p>
@@ -3472,7 +3472,7 @@
           <a:p>
             <a:fld id="{3FBAF93D-98AC-4FE3-B4B6-00701F2D46F7}" type="datetimeFigureOut">
               <a:rPr lang="en-GB" smtClean="0"/>
-              <a:t>27/01/2025</a:t>
+              <a:t>01/04/2025</a:t>
             </a:fld>
             <a:endParaRPr lang="en-GB"/>
           </a:p>
@@ -4084,9 +4084,9 @@
           <p:nvPr/>
         </p:nvCxnSpPr>
         <p:spPr>
-          <a:xfrm flipV="1">
-            <a:off x="5420207" y="6872992"/>
-            <a:ext cx="2632768" cy="5455"/>
+          <a:xfrm>
+            <a:off x="5420207" y="6878447"/>
+            <a:ext cx="2494222" cy="28363"/>
           </a:xfrm>
           <a:prstGeom prst="straightConnector1">
             <a:avLst/>
@@ -5261,8 +5261,8 @@
         </p:nvSpPr>
         <p:spPr>
           <a:xfrm>
-            <a:off x="8052975" y="6050512"/>
-            <a:ext cx="2436388" cy="1644960"/>
+            <a:off x="7914429" y="5681168"/>
+            <a:ext cx="5170409" cy="2451283"/>
           </a:xfrm>
           <a:prstGeom prst="rect">
             <a:avLst/>
@@ -5300,7 +5300,29 @@
                   <a:schemeClr val="tx1"/>
                 </a:solidFill>
               </a:rPr>
-              <a:t>You will need to use a cable to connect your VR headset to your computer (a </a:t>
+              <a:t>You will need to use either:</a:t>
+            </a:r>
+          </a:p>
+          <a:p>
+            <a:pPr algn="ctr"/>
+            <a:endParaRPr lang="en-GB" sz="500" dirty="0">
+              <a:solidFill>
+                <a:schemeClr val="tx1"/>
+              </a:solidFill>
+            </a:endParaRPr>
+          </a:p>
+          <a:p>
+            <a:pPr marL="342900" indent="-342900">
+              <a:buFont typeface="Arial" panose="020B0604020202020204" pitchFamily="34" charset="0"/>
+              <a:buChar char="•"/>
+            </a:pPr>
+            <a:r>
+              <a:rPr lang="en-GB" sz="2000" dirty="0">
+                <a:solidFill>
+                  <a:schemeClr val="tx1"/>
+                </a:solidFill>
+              </a:rPr>
+              <a:t>a cable connecting your VR headset to your computer (</a:t>
             </a:r>
             <a:r>
               <a:rPr lang="en-GB" sz="2000" b="1" dirty="0">
@@ -5308,7 +5330,7 @@
                   <a:schemeClr val="tx1"/>
                 </a:solidFill>
               </a:rPr>
-              <a:t>tethered </a:t>
+              <a:t>tethered</a:t>
             </a:r>
             <a:r>
               <a:rPr lang="en-GB" sz="2000" dirty="0">
@@ -5316,55 +5338,107 @@
                   <a:schemeClr val="tx1"/>
                 </a:solidFill>
               </a:rPr>
-              <a:t>setup).</a:t>
-            </a:r>
-          </a:p>
-        </p:txBody>
-      </p:sp>
-      <p:cxnSp>
-        <p:nvCxnSpPr>
-          <p:cNvPr id="320" name="Straight Arrow Connector 319">
-            <a:extLst>
-              <a:ext uri="{FF2B5EF4-FFF2-40B4-BE49-F238E27FC236}">
-                <a16:creationId xmlns:a16="http://schemas.microsoft.com/office/drawing/2014/main" id="{B010DB81-FF87-6096-9227-5030260B4C51}"/>
-              </a:ext>
-            </a:extLst>
-          </p:cNvPr>
-          <p:cNvCxnSpPr>
-            <a:cxnSpLocks/>
-            <a:stCxn id="314" idx="2"/>
-            <a:endCxn id="4" idx="0"/>
-          </p:cNvCxnSpPr>
-          <p:nvPr/>
-        </p:nvCxnSpPr>
-        <p:spPr>
-          <a:xfrm flipH="1">
-            <a:off x="9267834" y="7695472"/>
-            <a:ext cx="3335" cy="4108090"/>
-          </a:xfrm>
-          <a:prstGeom prst="straightConnector1">
-            <a:avLst/>
-          </a:prstGeom>
-          <a:ln>
-            <a:headEnd type="none" w="med" len="med"/>
-            <a:tailEnd type="arrow" w="med" len="med"/>
-          </a:ln>
-        </p:spPr>
-        <p:style>
-          <a:lnRef idx="2">
-            <a:schemeClr val="dk1"/>
-          </a:lnRef>
-          <a:fillRef idx="0">
-            <a:schemeClr val="dk1"/>
-          </a:fillRef>
-          <a:effectRef idx="1">
-            <a:schemeClr val="dk1"/>
-          </a:effectRef>
-          <a:fontRef idx="minor">
-            <a:schemeClr val="tx1"/>
-          </a:fontRef>
-        </p:style>
-      </p:cxnSp>
+              <a:t> setup), compatible with</a:t>
+            </a:r>
+            <a:r>
+              <a:rPr lang="en-GB" sz="2000" b="1" dirty="0">
+                <a:solidFill>
+                  <a:schemeClr val="tx1"/>
+                </a:solidFill>
+              </a:rPr>
+              <a:t> single player </a:t>
+            </a:r>
+            <a:r>
+              <a:rPr lang="en-GB" sz="2000" dirty="0">
+                <a:solidFill>
+                  <a:schemeClr val="tx1"/>
+                </a:solidFill>
+              </a:rPr>
+              <a:t>setups only</a:t>
+            </a:r>
+          </a:p>
+          <a:p>
+            <a:endParaRPr lang="en-GB" sz="500" dirty="0">
+              <a:solidFill>
+                <a:schemeClr val="tx1"/>
+              </a:solidFill>
+            </a:endParaRPr>
+          </a:p>
+          <a:p>
+            <a:pPr marL="342900" indent="-342900">
+              <a:buFont typeface="Arial" panose="020B0604020202020204" pitchFamily="34" charset="0"/>
+              <a:buChar char="•"/>
+            </a:pPr>
+            <a:r>
+              <a:rPr lang="en-GB" sz="2000" dirty="0">
+                <a:solidFill>
+                  <a:schemeClr val="tx1"/>
+                </a:solidFill>
+              </a:rPr>
+              <a:t>A mobile hotspot or VPN service, compatible with </a:t>
+            </a:r>
+            <a:r>
+              <a:rPr lang="en-GB" sz="2000" b="1" dirty="0">
+                <a:solidFill>
+                  <a:schemeClr val="tx1"/>
+                </a:solidFill>
+              </a:rPr>
+              <a:t>tethered</a:t>
+            </a:r>
+            <a:r>
+              <a:rPr lang="en-GB" sz="2000" dirty="0">
+                <a:solidFill>
+                  <a:schemeClr val="tx1"/>
+                </a:solidFill>
+              </a:rPr>
+              <a:t>, </a:t>
+            </a:r>
+            <a:r>
+              <a:rPr lang="en-GB" sz="2000" b="1" dirty="0">
+                <a:solidFill>
+                  <a:schemeClr val="tx1"/>
+                </a:solidFill>
+              </a:rPr>
+              <a:t>wireless</a:t>
+            </a:r>
+            <a:r>
+              <a:rPr lang="en-GB" sz="2000" dirty="0">
+                <a:solidFill>
+                  <a:schemeClr val="tx1"/>
+                </a:solidFill>
+              </a:rPr>
+              <a:t> and </a:t>
+            </a:r>
+            <a:r>
+              <a:rPr lang="en-GB" sz="2000" b="1" dirty="0">
+                <a:solidFill>
+                  <a:schemeClr val="tx1"/>
+                </a:solidFill>
+              </a:rPr>
+              <a:t>multiplayer</a:t>
+            </a:r>
+            <a:r>
+              <a:rPr lang="en-GB" sz="2000" dirty="0">
+                <a:solidFill>
+                  <a:schemeClr val="tx1"/>
+                </a:solidFill>
+              </a:rPr>
+              <a:t> setups</a:t>
+            </a:r>
+          </a:p>
+          <a:p>
+            <a:pPr marL="342900" indent="-342900">
+              <a:buFont typeface="Arial" panose="020B0604020202020204" pitchFamily="34" charset="0"/>
+              <a:buChar char="•"/>
+            </a:pPr>
+            <a:endParaRPr lang="en-GB" sz="500" dirty="0">
+              <a:solidFill>
+                <a:schemeClr val="tx1"/>
+              </a:solidFill>
+            </a:endParaRPr>
+          </a:p>
+        </p:txBody>
+      </p:sp>
       <p:sp>
         <p:nvSpPr>
           <p:cNvPr id="324" name="Rectangle 323">
@@ -5981,7 +6055,7 @@
         </p:nvGrpSpPr>
         <p:grpSpPr>
           <a:xfrm>
-            <a:off x="11172448" y="7429849"/>
+            <a:off x="11139574" y="8683310"/>
             <a:ext cx="3892696" cy="2242295"/>
             <a:chOff x="2801026" y="13978522"/>
             <a:chExt cx="3892696" cy="2242295"/>
@@ -6305,6 +6379,48 @@
           </a:p>
         </p:txBody>
       </p:sp>
+      <p:cxnSp>
+        <p:nvCxnSpPr>
+          <p:cNvPr id="33" name="Connector: Elbow 32">
+            <a:extLst>
+              <a:ext uri="{FF2B5EF4-FFF2-40B4-BE49-F238E27FC236}">
+                <a16:creationId xmlns:a16="http://schemas.microsoft.com/office/drawing/2014/main" id="{C35DE11D-3F5C-8C62-956F-3B38E4156141}"/>
+              </a:ext>
+            </a:extLst>
+          </p:cNvPr>
+          <p:cNvCxnSpPr>
+            <a:cxnSpLocks/>
+            <a:stCxn id="314" idx="2"/>
+          </p:cNvCxnSpPr>
+          <p:nvPr/>
+        </p:nvCxnSpPr>
+        <p:spPr>
+          <a:xfrm rot="5400000">
+            <a:off x="7513518" y="6035807"/>
+            <a:ext cx="889473" cy="5082760"/>
+          </a:xfrm>
+          <a:prstGeom prst="bentConnector2">
+            <a:avLst/>
+          </a:prstGeom>
+          <a:ln>
+            <a:tailEnd type="triangle"/>
+          </a:ln>
+        </p:spPr>
+        <p:style>
+          <a:lnRef idx="2">
+            <a:schemeClr val="dk1"/>
+          </a:lnRef>
+          <a:fillRef idx="0">
+            <a:schemeClr val="dk1"/>
+          </a:fillRef>
+          <a:effectRef idx="1">
+            <a:schemeClr val="dk1"/>
+          </a:effectRef>
+          <a:fontRef idx="minor">
+            <a:schemeClr val="tx1"/>
+          </a:fontRef>
+        </p:style>
+      </p:cxnSp>
     </p:spTree>
     <p:extLst>
       <p:ext uri="{BB962C8B-B14F-4D97-AF65-F5344CB8AC3E}">

</xml_diff>